<commit_message>
[RP - Presentazione] Aggiornato il file .pptx
</commit_message>
<xml_diff>
--- a/RP/Esterni/Presentazione/RP-Presentazione.pptx
+++ b/RP/Esterni/Presentazione/RP-Presentazione.pptx
@@ -5,12 +5,24 @@
     <p:sldMasterId id="2147483732" r:id="rId1"/>
   </p:sldMasterIdLst>
   <p:notesMasterIdLst>
-    <p:notesMasterId r:id="rId5"/>
+    <p:notesMasterId r:id="rId17"/>
   </p:notesMasterIdLst>
   <p:sldIdLst>
     <p:sldId id="256" r:id="rId2"/>
-    <p:sldId id="266" r:id="rId3"/>
-    <p:sldId id="258" r:id="rId4"/>
+    <p:sldId id="269" r:id="rId3"/>
+    <p:sldId id="274" r:id="rId4"/>
+    <p:sldId id="267" r:id="rId5"/>
+    <p:sldId id="258" r:id="rId6"/>
+    <p:sldId id="270" r:id="rId7"/>
+    <p:sldId id="275" r:id="rId8"/>
+    <p:sldId id="272" r:id="rId9"/>
+    <p:sldId id="276" r:id="rId10"/>
+    <p:sldId id="279" r:id="rId11"/>
+    <p:sldId id="277" r:id="rId12"/>
+    <p:sldId id="278" r:id="rId13"/>
+    <p:sldId id="280" r:id="rId14"/>
+    <p:sldId id="281" r:id="rId15"/>
+    <p:sldId id="282" r:id="rId16"/>
   </p:sldIdLst>
   <p:sldSz cx="9144000" cy="6858000" type="screen4x3"/>
   <p:notesSz cx="6858000" cy="9144000"/>
@@ -111,7 +123,7 @@
   </p:defaultTextStyle>
   <p:extLst>
     <p:ext uri="{521415D9-36F7-43E2-AB2F-B90AF26B5E84}">
-      <p14:sectionLst xmlns:p14="http://schemas.microsoft.com/office/powerpoint/2010/main" xmlns="">
+      <p14:sectionLst xmlns="" xmlns:p14="http://schemas.microsoft.com/office/powerpoint/2010/main">
         <p14:section name="Presentazione" id="{34E9BEB9-075B-4CFE-8BA4-B412D906568B}">
           <p14:sldIdLst>
             <p14:sldId id="256"/>
@@ -469,7 +481,7 @@
     </p:spTree>
     <p:extLst>
       <p:ext uri="{BB962C8B-B14F-4D97-AF65-F5344CB8AC3E}">
-        <p14:creationId xmlns:p14="http://schemas.microsoft.com/office/powerpoint/2010/main" xmlns="" val="1382979574"/>
+        <p14:creationId xmlns="" xmlns:p14="http://schemas.microsoft.com/office/powerpoint/2010/main" val="1382979574"/>
       </p:ext>
     </p:extLst>
   </p:cSld>
@@ -644,7 +656,7 @@
     </p:spTree>
     <p:extLst>
       <p:ext uri="{BB962C8B-B14F-4D97-AF65-F5344CB8AC3E}">
-        <p14:creationId xmlns:p14="http://schemas.microsoft.com/office/powerpoint/2010/main" xmlns="" val="4174330178"/>
+        <p14:creationId xmlns="" xmlns:p14="http://schemas.microsoft.com/office/powerpoint/2010/main" val="4174330178"/>
       </p:ext>
     </p:extLst>
   </p:cSld>
@@ -14416,7 +14428,7 @@
           <a:blip r:embed="rId3" cstate="print">
             <a:extLst>
               <a:ext uri="{28A0092B-C50C-407E-A947-70E740481C1C}">
-                <a14:useLocalDpi xmlns:a14="http://schemas.microsoft.com/office/drawing/2010/main" xmlns="" val="0"/>
+                <a14:useLocalDpi xmlns="" xmlns:a14="http://schemas.microsoft.com/office/drawing/2010/main" val="0"/>
               </a:ext>
             </a:extLst>
           </a:blip>
@@ -14437,7 +14449,823 @@
     </p:spTree>
     <p:extLst>
       <p:ext uri="{BB962C8B-B14F-4D97-AF65-F5344CB8AC3E}">
-        <p14:creationId xmlns:p14="http://schemas.microsoft.com/office/powerpoint/2010/main" xmlns="" val="3567273252"/>
+        <p14:creationId xmlns="" xmlns:p14="http://schemas.microsoft.com/office/powerpoint/2010/main" val="3567273252"/>
+      </p:ext>
+    </p:extLst>
+  </p:cSld>
+  <p:clrMapOvr>
+    <a:masterClrMapping/>
+  </p:clrMapOvr>
+  <p:timing>
+    <p:tnLst>
+      <p:par>
+        <p:cTn id="1" dur="indefinite" restart="never" nodeType="tmRoot"/>
+      </p:par>
+    </p:tnLst>
+  </p:timing>
+</p:sld>
+</file>
+
+<file path=ppt/slides/slide10.xml><?xml version="1.0" encoding="utf-8"?>
+<p:sld xmlns:a="http://schemas.openxmlformats.org/drawingml/2006/main" xmlns:r="http://schemas.openxmlformats.org/officeDocument/2006/relationships" xmlns:p="http://schemas.openxmlformats.org/presentationml/2006/main">
+  <p:cSld>
+    <p:spTree>
+      <p:nvGrpSpPr>
+        <p:cNvPr id="1" name=""/>
+        <p:cNvGrpSpPr/>
+        <p:nvPr/>
+      </p:nvGrpSpPr>
+      <p:grpSpPr>
+        <a:xfrm>
+          <a:off x="0" y="0"/>
+          <a:ext cx="0" cy="0"/>
+          <a:chOff x="0" y="0"/>
+          <a:chExt cx="0" cy="0"/>
+        </a:xfrm>
+      </p:grpSpPr>
+      <p:sp>
+        <p:nvSpPr>
+          <p:cNvPr id="6" name="Segnaposto data 5"/>
+          <p:cNvSpPr>
+            <a:spLocks noGrp="1"/>
+          </p:cNvSpPr>
+          <p:nvPr>
+            <p:ph type="dt" sz="half" idx="10"/>
+          </p:nvPr>
+        </p:nvSpPr>
+        <p:spPr/>
+        <p:txBody>
+          <a:bodyPr/>
+          <a:lstStyle/>
+          <a:p>
+            <a:r>
+              <a:rPr lang="it-IT" dirty="0" smtClean="0"/>
+              <a:t>Progetto </a:t>
+            </a:r>
+            <a:r>
+              <a:rPr lang="it-IT" dirty="0" err="1" smtClean="0"/>
+              <a:t>Gamification</a:t>
+            </a:r>
+            <a:r>
+              <a:rPr lang="it-IT" dirty="0" smtClean="0"/>
+              <a:t> - Team </a:t>
+            </a:r>
+            <a:r>
+              <a:rPr lang="it-IT" dirty="0" err="1" smtClean="0"/>
+              <a:t>Committed</a:t>
+            </a:r>
+            <a:endParaRPr lang="it-IT" dirty="0"/>
+          </a:p>
+        </p:txBody>
+      </p:sp>
+      <p:sp>
+        <p:nvSpPr>
+          <p:cNvPr id="9" name="Segnaposto numero diapositiva 8"/>
+          <p:cNvSpPr>
+            <a:spLocks noGrp="1"/>
+          </p:cNvSpPr>
+          <p:nvPr>
+            <p:ph type="sldNum" sz="quarter" idx="12"/>
+          </p:nvPr>
+        </p:nvSpPr>
+        <p:spPr/>
+        <p:txBody>
+          <a:bodyPr/>
+          <a:lstStyle/>
+          <a:p>
+            <a:fld id="{017EC607-BD11-4D4E-AC5F-155C854A0B9D}" type="slidenum">
+              <a:rPr lang="it-IT" smtClean="0"/>
+              <a:pPr/>
+              <a:t>10</a:t>
+            </a:fld>
+            <a:r>
+              <a:rPr lang="it-IT" dirty="0" smtClean="0"/>
+              <a:t> di 67</a:t>
+            </a:r>
+            <a:endParaRPr lang="it-IT" dirty="0"/>
+          </a:p>
+        </p:txBody>
+      </p:sp>
+      <p:pic>
+        <p:nvPicPr>
+          <p:cNvPr id="7" name="Immagine 6" descr="Gui-Desk-Login.jpg"/>
+          <p:cNvPicPr>
+            <a:picLocks noChangeAspect="1"/>
+          </p:cNvPicPr>
+          <p:nvPr/>
+        </p:nvPicPr>
+        <p:blipFill>
+          <a:blip r:embed="rId2" cstate="print"/>
+          <a:stretch>
+            <a:fillRect/>
+          </a:stretch>
+        </p:blipFill>
+        <p:spPr>
+          <a:xfrm>
+            <a:off x="2123728" y="1916832"/>
+            <a:ext cx="5040560" cy="3173327"/>
+          </a:xfrm>
+          <a:prstGeom prst="rect">
+            <a:avLst/>
+          </a:prstGeom>
+        </p:spPr>
+      </p:pic>
+    </p:spTree>
+    <p:extLst>
+      <p:ext uri="{BB962C8B-B14F-4D97-AF65-F5344CB8AC3E}">
+        <p14:creationId xmlns="" xmlns:p14="http://schemas.microsoft.com/office/powerpoint/2010/main" val="200703652"/>
+      </p:ext>
+    </p:extLst>
+  </p:cSld>
+  <p:clrMapOvr>
+    <a:masterClrMapping/>
+  </p:clrMapOvr>
+  <p:timing>
+    <p:tnLst>
+      <p:par>
+        <p:cTn id="1" dur="indefinite" restart="never" nodeType="tmRoot"/>
+      </p:par>
+    </p:tnLst>
+  </p:timing>
+</p:sld>
+</file>
+
+<file path=ppt/slides/slide11.xml><?xml version="1.0" encoding="utf-8"?>
+<p:sld xmlns:a="http://schemas.openxmlformats.org/drawingml/2006/main" xmlns:r="http://schemas.openxmlformats.org/officeDocument/2006/relationships" xmlns:p="http://schemas.openxmlformats.org/presentationml/2006/main">
+  <p:cSld>
+    <p:spTree>
+      <p:nvGrpSpPr>
+        <p:cNvPr id="1" name=""/>
+        <p:cNvGrpSpPr/>
+        <p:nvPr/>
+      </p:nvGrpSpPr>
+      <p:grpSpPr>
+        <a:xfrm>
+          <a:off x="0" y="0"/>
+          <a:ext cx="0" cy="0"/>
+          <a:chOff x="0" y="0"/>
+          <a:chExt cx="0" cy="0"/>
+        </a:xfrm>
+      </p:grpSpPr>
+      <p:sp>
+        <p:nvSpPr>
+          <p:cNvPr id="6" name="Segnaposto data 5"/>
+          <p:cNvSpPr>
+            <a:spLocks noGrp="1"/>
+          </p:cNvSpPr>
+          <p:nvPr>
+            <p:ph type="dt" sz="half" idx="10"/>
+          </p:nvPr>
+        </p:nvSpPr>
+        <p:spPr/>
+        <p:txBody>
+          <a:bodyPr/>
+          <a:lstStyle/>
+          <a:p>
+            <a:r>
+              <a:rPr lang="it-IT" dirty="0" smtClean="0"/>
+              <a:t>Progetto </a:t>
+            </a:r>
+            <a:r>
+              <a:rPr lang="it-IT" dirty="0" err="1" smtClean="0"/>
+              <a:t>Gamification</a:t>
+            </a:r>
+            <a:r>
+              <a:rPr lang="it-IT" dirty="0" smtClean="0"/>
+              <a:t> - Team </a:t>
+            </a:r>
+            <a:r>
+              <a:rPr lang="it-IT" dirty="0" err="1" smtClean="0"/>
+              <a:t>Committed</a:t>
+            </a:r>
+            <a:endParaRPr lang="it-IT" dirty="0"/>
+          </a:p>
+        </p:txBody>
+      </p:sp>
+      <p:sp>
+        <p:nvSpPr>
+          <p:cNvPr id="9" name="Segnaposto numero diapositiva 8"/>
+          <p:cNvSpPr>
+            <a:spLocks noGrp="1"/>
+          </p:cNvSpPr>
+          <p:nvPr>
+            <p:ph type="sldNum" sz="quarter" idx="12"/>
+          </p:nvPr>
+        </p:nvSpPr>
+        <p:spPr/>
+        <p:txBody>
+          <a:bodyPr/>
+          <a:lstStyle/>
+          <a:p>
+            <a:fld id="{017EC607-BD11-4D4E-AC5F-155C854A0B9D}" type="slidenum">
+              <a:rPr lang="it-IT" smtClean="0"/>
+              <a:pPr/>
+              <a:t>11</a:t>
+            </a:fld>
+            <a:r>
+              <a:rPr lang="it-IT" dirty="0" smtClean="0"/>
+              <a:t> di 67</a:t>
+            </a:r>
+            <a:endParaRPr lang="it-IT" dirty="0"/>
+          </a:p>
+        </p:txBody>
+      </p:sp>
+      <p:pic>
+        <p:nvPicPr>
+          <p:cNvPr id="7" name="Immagine 6" descr="Gui-Mob-Login.jpg"/>
+          <p:cNvPicPr>
+            <a:picLocks noChangeAspect="1"/>
+          </p:cNvPicPr>
+          <p:nvPr/>
+        </p:nvPicPr>
+        <p:blipFill>
+          <a:blip r:embed="rId2" cstate="print"/>
+          <a:stretch>
+            <a:fillRect/>
+          </a:stretch>
+        </p:blipFill>
+        <p:spPr>
+          <a:xfrm>
+            <a:off x="5004048" y="980728"/>
+            <a:ext cx="3384375" cy="5060746"/>
+          </a:xfrm>
+          <a:prstGeom prst="rect">
+            <a:avLst/>
+          </a:prstGeom>
+        </p:spPr>
+      </p:pic>
+      <p:pic>
+        <p:nvPicPr>
+          <p:cNvPr id="8" name="Immagine 7" descr="Gui-Mob-Notifica.jpg"/>
+          <p:cNvPicPr>
+            <a:picLocks noChangeAspect="1"/>
+          </p:cNvPicPr>
+          <p:nvPr/>
+        </p:nvPicPr>
+        <p:blipFill>
+          <a:blip r:embed="rId3" cstate="print"/>
+          <a:stretch>
+            <a:fillRect/>
+          </a:stretch>
+        </p:blipFill>
+        <p:spPr>
+          <a:xfrm>
+            <a:off x="755576" y="908720"/>
+            <a:ext cx="3415928" cy="5123892"/>
+          </a:xfrm>
+          <a:prstGeom prst="rect">
+            <a:avLst/>
+          </a:prstGeom>
+        </p:spPr>
+      </p:pic>
+    </p:spTree>
+    <p:extLst>
+      <p:ext uri="{BB962C8B-B14F-4D97-AF65-F5344CB8AC3E}">
+        <p14:creationId xmlns="" xmlns:p14="http://schemas.microsoft.com/office/powerpoint/2010/main" val="200703652"/>
+      </p:ext>
+    </p:extLst>
+  </p:cSld>
+  <p:clrMapOvr>
+    <a:masterClrMapping/>
+  </p:clrMapOvr>
+  <p:timing>
+    <p:tnLst>
+      <p:par>
+        <p:cTn id="1" dur="indefinite" restart="never" nodeType="tmRoot"/>
+      </p:par>
+    </p:tnLst>
+  </p:timing>
+</p:sld>
+</file>
+
+<file path=ppt/slides/slide12.xml><?xml version="1.0" encoding="utf-8"?>
+<p:sld xmlns:a="http://schemas.openxmlformats.org/drawingml/2006/main" xmlns:r="http://schemas.openxmlformats.org/officeDocument/2006/relationships" xmlns:p="http://schemas.openxmlformats.org/presentationml/2006/main">
+  <p:cSld>
+    <p:spTree>
+      <p:nvGrpSpPr>
+        <p:cNvPr id="1" name=""/>
+        <p:cNvGrpSpPr/>
+        <p:nvPr/>
+      </p:nvGrpSpPr>
+      <p:grpSpPr>
+        <a:xfrm>
+          <a:off x="0" y="0"/>
+          <a:ext cx="0" cy="0"/>
+          <a:chOff x="0" y="0"/>
+          <a:chExt cx="0" cy="0"/>
+        </a:xfrm>
+      </p:grpSpPr>
+      <p:sp>
+        <p:nvSpPr>
+          <p:cNvPr id="6" name="Segnaposto data 5"/>
+          <p:cNvSpPr>
+            <a:spLocks noGrp="1"/>
+          </p:cNvSpPr>
+          <p:nvPr>
+            <p:ph type="dt" sz="half" idx="10"/>
+          </p:nvPr>
+        </p:nvSpPr>
+        <p:spPr/>
+        <p:txBody>
+          <a:bodyPr/>
+          <a:lstStyle/>
+          <a:p>
+            <a:r>
+              <a:rPr lang="it-IT" dirty="0" smtClean="0"/>
+              <a:t>Progetto </a:t>
+            </a:r>
+            <a:r>
+              <a:rPr lang="it-IT" dirty="0" err="1" smtClean="0"/>
+              <a:t>Gamification</a:t>
+            </a:r>
+            <a:r>
+              <a:rPr lang="it-IT" dirty="0" smtClean="0"/>
+              <a:t> - Team </a:t>
+            </a:r>
+            <a:r>
+              <a:rPr lang="it-IT" dirty="0" err="1" smtClean="0"/>
+              <a:t>Committed</a:t>
+            </a:r>
+            <a:endParaRPr lang="it-IT" dirty="0"/>
+          </a:p>
+        </p:txBody>
+      </p:sp>
+      <p:sp>
+        <p:nvSpPr>
+          <p:cNvPr id="9" name="Segnaposto numero diapositiva 8"/>
+          <p:cNvSpPr>
+            <a:spLocks noGrp="1"/>
+          </p:cNvSpPr>
+          <p:nvPr>
+            <p:ph type="sldNum" sz="quarter" idx="12"/>
+          </p:nvPr>
+        </p:nvSpPr>
+        <p:spPr/>
+        <p:txBody>
+          <a:bodyPr/>
+          <a:lstStyle/>
+          <a:p>
+            <a:fld id="{017EC607-BD11-4D4E-AC5F-155C854A0B9D}" type="slidenum">
+              <a:rPr lang="it-IT" smtClean="0"/>
+              <a:pPr/>
+              <a:t>12</a:t>
+            </a:fld>
+            <a:r>
+              <a:rPr lang="it-IT" dirty="0" smtClean="0"/>
+              <a:t> di 67</a:t>
+            </a:r>
+            <a:endParaRPr lang="it-IT" dirty="0"/>
+          </a:p>
+        </p:txBody>
+      </p:sp>
+      <p:pic>
+        <p:nvPicPr>
+          <p:cNvPr id="7" name="Immagine 6" descr="Gui-Mob-Datiutente.jpg"/>
+          <p:cNvPicPr>
+            <a:picLocks noChangeAspect="1"/>
+          </p:cNvPicPr>
+          <p:nvPr/>
+        </p:nvPicPr>
+        <p:blipFill>
+          <a:blip r:embed="rId2" cstate="print"/>
+          <a:stretch>
+            <a:fillRect/>
+          </a:stretch>
+        </p:blipFill>
+        <p:spPr>
+          <a:xfrm>
+            <a:off x="611560" y="1556792"/>
+            <a:ext cx="2487573" cy="3719736"/>
+          </a:xfrm>
+          <a:prstGeom prst="rect">
+            <a:avLst/>
+          </a:prstGeom>
+        </p:spPr>
+      </p:pic>
+      <p:pic>
+        <p:nvPicPr>
+          <p:cNvPr id="8" name="Immagine 7" descr="Gui-Mob-Risposta.jpg"/>
+          <p:cNvPicPr>
+            <a:picLocks noChangeAspect="1"/>
+          </p:cNvPicPr>
+          <p:nvPr/>
+        </p:nvPicPr>
+        <p:blipFill>
+          <a:blip r:embed="rId3" cstate="print"/>
+          <a:stretch>
+            <a:fillRect/>
+          </a:stretch>
+        </p:blipFill>
+        <p:spPr>
+          <a:xfrm>
+            <a:off x="6084168" y="1556792"/>
+            <a:ext cx="2487573" cy="3719736"/>
+          </a:xfrm>
+          <a:prstGeom prst="rect">
+            <a:avLst/>
+          </a:prstGeom>
+        </p:spPr>
+      </p:pic>
+      <p:pic>
+        <p:nvPicPr>
+          <p:cNvPr id="10" name="Immagine 9" descr="Gui-Mob-Statistiche.jpg"/>
+          <p:cNvPicPr>
+            <a:picLocks noChangeAspect="1"/>
+          </p:cNvPicPr>
+          <p:nvPr/>
+        </p:nvPicPr>
+        <p:blipFill>
+          <a:blip r:embed="rId4" cstate="print"/>
+          <a:stretch>
+            <a:fillRect/>
+          </a:stretch>
+        </p:blipFill>
+        <p:spPr>
+          <a:xfrm>
+            <a:off x="3347864" y="1556792"/>
+            <a:ext cx="2487573" cy="3719736"/>
+          </a:xfrm>
+          <a:prstGeom prst="rect">
+            <a:avLst/>
+          </a:prstGeom>
+        </p:spPr>
+      </p:pic>
+    </p:spTree>
+    <p:extLst>
+      <p:ext uri="{BB962C8B-B14F-4D97-AF65-F5344CB8AC3E}">
+        <p14:creationId xmlns="" xmlns:p14="http://schemas.microsoft.com/office/powerpoint/2010/main" val="200703652"/>
+      </p:ext>
+    </p:extLst>
+  </p:cSld>
+  <p:clrMapOvr>
+    <a:masterClrMapping/>
+  </p:clrMapOvr>
+  <p:timing>
+    <p:tnLst>
+      <p:par>
+        <p:cTn id="1" dur="indefinite" restart="never" nodeType="tmRoot"/>
+      </p:par>
+    </p:tnLst>
+  </p:timing>
+</p:sld>
+</file>
+
+<file path=ppt/slides/slide13.xml><?xml version="1.0" encoding="utf-8"?>
+<p:sld xmlns:a="http://schemas.openxmlformats.org/drawingml/2006/main" xmlns:r="http://schemas.openxmlformats.org/officeDocument/2006/relationships" xmlns:p="http://schemas.openxmlformats.org/presentationml/2006/main">
+  <p:cSld>
+    <p:spTree>
+      <p:nvGrpSpPr>
+        <p:cNvPr id="1" name=""/>
+        <p:cNvGrpSpPr/>
+        <p:nvPr/>
+      </p:nvGrpSpPr>
+      <p:grpSpPr>
+        <a:xfrm>
+          <a:off x="0" y="0"/>
+          <a:ext cx="0" cy="0"/>
+          <a:chOff x="0" y="0"/>
+          <a:chExt cx="0" cy="0"/>
+        </a:xfrm>
+      </p:grpSpPr>
+      <p:sp>
+        <p:nvSpPr>
+          <p:cNvPr id="6" name="Segnaposto data 5"/>
+          <p:cNvSpPr>
+            <a:spLocks noGrp="1"/>
+          </p:cNvSpPr>
+          <p:nvPr>
+            <p:ph type="dt" sz="half" idx="10"/>
+          </p:nvPr>
+        </p:nvSpPr>
+        <p:spPr/>
+        <p:txBody>
+          <a:bodyPr/>
+          <a:lstStyle/>
+          <a:p>
+            <a:r>
+              <a:rPr lang="it-IT" dirty="0" smtClean="0"/>
+              <a:t>Progetto </a:t>
+            </a:r>
+            <a:r>
+              <a:rPr lang="it-IT" dirty="0" err="1" smtClean="0"/>
+              <a:t>Gamification</a:t>
+            </a:r>
+            <a:r>
+              <a:rPr lang="it-IT" dirty="0" smtClean="0"/>
+              <a:t> - Team </a:t>
+            </a:r>
+            <a:r>
+              <a:rPr lang="it-IT" dirty="0" err="1" smtClean="0"/>
+              <a:t>Committed</a:t>
+            </a:r>
+            <a:endParaRPr lang="it-IT" dirty="0"/>
+          </a:p>
+        </p:txBody>
+      </p:sp>
+      <p:sp>
+        <p:nvSpPr>
+          <p:cNvPr id="9" name="Segnaposto numero diapositiva 8"/>
+          <p:cNvSpPr>
+            <a:spLocks noGrp="1"/>
+          </p:cNvSpPr>
+          <p:nvPr>
+            <p:ph type="sldNum" sz="quarter" idx="12"/>
+          </p:nvPr>
+        </p:nvSpPr>
+        <p:spPr/>
+        <p:txBody>
+          <a:bodyPr/>
+          <a:lstStyle/>
+          <a:p>
+            <a:fld id="{017EC607-BD11-4D4E-AC5F-155C854A0B9D}" type="slidenum">
+              <a:rPr lang="it-IT" smtClean="0"/>
+              <a:pPr/>
+              <a:t>13</a:t>
+            </a:fld>
+            <a:r>
+              <a:rPr lang="it-IT" dirty="0" smtClean="0"/>
+              <a:t> di 67</a:t>
+            </a:r>
+            <a:endParaRPr lang="it-IT" dirty="0"/>
+          </a:p>
+        </p:txBody>
+      </p:sp>
+      <p:pic>
+        <p:nvPicPr>
+          <p:cNvPr id="5" name="Immagine 4" descr="Gui-web-GestioneDomande-Insert.jpg"/>
+          <p:cNvPicPr>
+            <a:picLocks noChangeAspect="1"/>
+          </p:cNvPicPr>
+          <p:nvPr/>
+        </p:nvPicPr>
+        <p:blipFill>
+          <a:blip r:embed="rId2" cstate="print"/>
+          <a:stretch>
+            <a:fillRect/>
+          </a:stretch>
+        </p:blipFill>
+        <p:spPr>
+          <a:xfrm>
+            <a:off x="683568" y="1052736"/>
+            <a:ext cx="7812360" cy="4861024"/>
+          </a:xfrm>
+          <a:prstGeom prst="rect">
+            <a:avLst/>
+          </a:prstGeom>
+        </p:spPr>
+      </p:pic>
+    </p:spTree>
+    <p:extLst>
+      <p:ext uri="{BB962C8B-B14F-4D97-AF65-F5344CB8AC3E}">
+        <p14:creationId xmlns="" xmlns:p14="http://schemas.microsoft.com/office/powerpoint/2010/main" val="200703652"/>
+      </p:ext>
+    </p:extLst>
+  </p:cSld>
+  <p:clrMapOvr>
+    <a:masterClrMapping/>
+  </p:clrMapOvr>
+  <p:timing>
+    <p:tnLst>
+      <p:par>
+        <p:cTn id="1" dur="indefinite" restart="never" nodeType="tmRoot"/>
+      </p:par>
+    </p:tnLst>
+  </p:timing>
+</p:sld>
+</file>
+
+<file path=ppt/slides/slide14.xml><?xml version="1.0" encoding="utf-8"?>
+<p:sld xmlns:a="http://schemas.openxmlformats.org/drawingml/2006/main" xmlns:r="http://schemas.openxmlformats.org/officeDocument/2006/relationships" xmlns:p="http://schemas.openxmlformats.org/presentationml/2006/main">
+  <p:cSld>
+    <p:spTree>
+      <p:nvGrpSpPr>
+        <p:cNvPr id="1" name=""/>
+        <p:cNvGrpSpPr/>
+        <p:nvPr/>
+      </p:nvGrpSpPr>
+      <p:grpSpPr>
+        <a:xfrm>
+          <a:off x="0" y="0"/>
+          <a:ext cx="0" cy="0"/>
+          <a:chOff x="0" y="0"/>
+          <a:chExt cx="0" cy="0"/>
+        </a:xfrm>
+      </p:grpSpPr>
+      <p:sp>
+        <p:nvSpPr>
+          <p:cNvPr id="6" name="Segnaposto data 5"/>
+          <p:cNvSpPr>
+            <a:spLocks noGrp="1"/>
+          </p:cNvSpPr>
+          <p:nvPr>
+            <p:ph type="dt" sz="half" idx="10"/>
+          </p:nvPr>
+        </p:nvSpPr>
+        <p:spPr/>
+        <p:txBody>
+          <a:bodyPr/>
+          <a:lstStyle/>
+          <a:p>
+            <a:r>
+              <a:rPr lang="it-IT" dirty="0" smtClean="0"/>
+              <a:t>Progetto </a:t>
+            </a:r>
+            <a:r>
+              <a:rPr lang="it-IT" dirty="0" err="1" smtClean="0"/>
+              <a:t>Gamification</a:t>
+            </a:r>
+            <a:r>
+              <a:rPr lang="it-IT" dirty="0" smtClean="0"/>
+              <a:t> - Team </a:t>
+            </a:r>
+            <a:r>
+              <a:rPr lang="it-IT" dirty="0" err="1" smtClean="0"/>
+              <a:t>Committed</a:t>
+            </a:r>
+            <a:endParaRPr lang="it-IT" dirty="0"/>
+          </a:p>
+        </p:txBody>
+      </p:sp>
+      <p:sp>
+        <p:nvSpPr>
+          <p:cNvPr id="9" name="Segnaposto numero diapositiva 8"/>
+          <p:cNvSpPr>
+            <a:spLocks noGrp="1"/>
+          </p:cNvSpPr>
+          <p:nvPr>
+            <p:ph type="sldNum" sz="quarter" idx="12"/>
+          </p:nvPr>
+        </p:nvSpPr>
+        <p:spPr/>
+        <p:txBody>
+          <a:bodyPr/>
+          <a:lstStyle/>
+          <a:p>
+            <a:fld id="{017EC607-BD11-4D4E-AC5F-155C854A0B9D}" type="slidenum">
+              <a:rPr lang="it-IT" smtClean="0"/>
+              <a:pPr/>
+              <a:t>14</a:t>
+            </a:fld>
+            <a:r>
+              <a:rPr lang="it-IT" dirty="0" smtClean="0"/>
+              <a:t> di 67</a:t>
+            </a:r>
+            <a:endParaRPr lang="it-IT" dirty="0"/>
+          </a:p>
+        </p:txBody>
+      </p:sp>
+      <p:pic>
+        <p:nvPicPr>
+          <p:cNvPr id="5" name="Immagine 4" descr="Gui-web-GestioneDomande-Insert.jpg"/>
+          <p:cNvPicPr>
+            <a:picLocks noChangeAspect="1"/>
+          </p:cNvPicPr>
+          <p:nvPr/>
+        </p:nvPicPr>
+        <p:blipFill>
+          <a:blip r:embed="rId2" cstate="print"/>
+          <a:stretch>
+            <a:fillRect/>
+          </a:stretch>
+        </p:blipFill>
+        <p:spPr>
+          <a:xfrm>
+            <a:off x="683568" y="1052736"/>
+            <a:ext cx="7812360" cy="4861024"/>
+          </a:xfrm>
+          <a:prstGeom prst="rect">
+            <a:avLst/>
+          </a:prstGeom>
+        </p:spPr>
+      </p:pic>
+    </p:spTree>
+    <p:extLst>
+      <p:ext uri="{BB962C8B-B14F-4D97-AF65-F5344CB8AC3E}">
+        <p14:creationId xmlns="" xmlns:p14="http://schemas.microsoft.com/office/powerpoint/2010/main" val="200703652"/>
+      </p:ext>
+    </p:extLst>
+  </p:cSld>
+  <p:clrMapOvr>
+    <a:masterClrMapping/>
+  </p:clrMapOvr>
+  <p:timing>
+    <p:tnLst>
+      <p:par>
+        <p:cTn id="1" dur="indefinite" restart="never" nodeType="tmRoot"/>
+      </p:par>
+    </p:tnLst>
+  </p:timing>
+</p:sld>
+</file>
+
+<file path=ppt/slides/slide15.xml><?xml version="1.0" encoding="utf-8"?>
+<p:sld xmlns:a="http://schemas.openxmlformats.org/drawingml/2006/main" xmlns:r="http://schemas.openxmlformats.org/officeDocument/2006/relationships" xmlns:p="http://schemas.openxmlformats.org/presentationml/2006/main">
+  <p:cSld>
+    <p:spTree>
+      <p:nvGrpSpPr>
+        <p:cNvPr id="1" name=""/>
+        <p:cNvGrpSpPr/>
+        <p:nvPr/>
+      </p:nvGrpSpPr>
+      <p:grpSpPr>
+        <a:xfrm>
+          <a:off x="0" y="0"/>
+          <a:ext cx="0" cy="0"/>
+          <a:chOff x="0" y="0"/>
+          <a:chExt cx="0" cy="0"/>
+        </a:xfrm>
+      </p:grpSpPr>
+      <p:sp>
+        <p:nvSpPr>
+          <p:cNvPr id="6" name="Segnaposto data 5"/>
+          <p:cNvSpPr>
+            <a:spLocks noGrp="1"/>
+          </p:cNvSpPr>
+          <p:nvPr>
+            <p:ph type="dt" sz="half" idx="10"/>
+          </p:nvPr>
+        </p:nvSpPr>
+        <p:spPr/>
+        <p:txBody>
+          <a:bodyPr/>
+          <a:lstStyle/>
+          <a:p>
+            <a:r>
+              <a:rPr lang="it-IT" dirty="0" smtClean="0"/>
+              <a:t>Progetto </a:t>
+            </a:r>
+            <a:r>
+              <a:rPr lang="it-IT" dirty="0" err="1" smtClean="0"/>
+              <a:t>Gamification</a:t>
+            </a:r>
+            <a:r>
+              <a:rPr lang="it-IT" dirty="0" smtClean="0"/>
+              <a:t> - Team </a:t>
+            </a:r>
+            <a:r>
+              <a:rPr lang="it-IT" dirty="0" err="1" smtClean="0"/>
+              <a:t>Committed</a:t>
+            </a:r>
+            <a:endParaRPr lang="it-IT" dirty="0"/>
+          </a:p>
+        </p:txBody>
+      </p:sp>
+      <p:sp>
+        <p:nvSpPr>
+          <p:cNvPr id="9" name="Segnaposto numero diapositiva 8"/>
+          <p:cNvSpPr>
+            <a:spLocks noGrp="1"/>
+          </p:cNvSpPr>
+          <p:nvPr>
+            <p:ph type="sldNum" sz="quarter" idx="12"/>
+          </p:nvPr>
+        </p:nvSpPr>
+        <p:spPr/>
+        <p:txBody>
+          <a:bodyPr/>
+          <a:lstStyle/>
+          <a:p>
+            <a:fld id="{017EC607-BD11-4D4E-AC5F-155C854A0B9D}" type="slidenum">
+              <a:rPr lang="it-IT" smtClean="0"/>
+              <a:pPr/>
+              <a:t>15</a:t>
+            </a:fld>
+            <a:r>
+              <a:rPr lang="it-IT" dirty="0" smtClean="0"/>
+              <a:t> di 67</a:t>
+            </a:r>
+            <a:endParaRPr lang="it-IT" dirty="0"/>
+          </a:p>
+        </p:txBody>
+      </p:sp>
+      <p:pic>
+        <p:nvPicPr>
+          <p:cNvPr id="5" name="Immagine 4" descr="Gui-web-GestioneDomande-Insert.jpg"/>
+          <p:cNvPicPr>
+            <a:picLocks noChangeAspect="1"/>
+          </p:cNvPicPr>
+          <p:nvPr/>
+        </p:nvPicPr>
+        <p:blipFill>
+          <a:blip r:embed="rId2" cstate="print"/>
+          <a:stretch>
+            <a:fillRect/>
+          </a:stretch>
+        </p:blipFill>
+        <p:spPr>
+          <a:xfrm>
+            <a:off x="683568" y="1052736"/>
+            <a:ext cx="7812360" cy="4861024"/>
+          </a:xfrm>
+          <a:prstGeom prst="rect">
+            <a:avLst/>
+          </a:prstGeom>
+        </p:spPr>
+      </p:pic>
+    </p:spTree>
+    <p:extLst>
+      <p:ext uri="{BB962C8B-B14F-4D97-AF65-F5344CB8AC3E}">
+        <p14:creationId xmlns="" xmlns:p14="http://schemas.microsoft.com/office/powerpoint/2010/main" val="200703652"/>
       </p:ext>
     </p:extLst>
   </p:cSld>
@@ -14483,7 +15311,7 @@
           <a:blip r:embed="rId2" cstate="print">
             <a:extLst>
               <a:ext uri="{28A0092B-C50C-407E-A947-70E740481C1C}">
-                <a14:useLocalDpi xmlns:a14="http://schemas.microsoft.com/office/drawing/2010/main" xmlns="" val="0"/>
+                <a14:useLocalDpi xmlns="" xmlns:a14="http://schemas.microsoft.com/office/drawing/2010/main" val="0"/>
               </a:ext>
             </a:extLst>
           </a:blip>
@@ -14524,7 +15352,7 @@
             <a:pPr algn="ctr"/>
             <a:r>
               <a:rPr lang="it-IT" dirty="0" smtClean="0"/>
-              <a:t>3</a:t>
+              <a:t>2</a:t>
             </a:r>
             <a:r>
               <a:rPr lang="it-IT" dirty="0" smtClean="0"/>
@@ -14532,15 +15360,7 @@
             </a:r>
             <a:r>
               <a:rPr lang="it-IT" dirty="0" err="1" smtClean="0"/>
-              <a:t>Front</a:t>
-            </a:r>
-            <a:r>
-              <a:rPr lang="it-IT" dirty="0" err="1" smtClean="0"/>
-              <a:t>-End</a:t>
-            </a:r>
-            <a:r>
-              <a:rPr lang="it-IT" dirty="0" smtClean="0"/>
-              <a:t> web</a:t>
+              <a:t>Back-End</a:t>
             </a:r>
             <a:endParaRPr lang="it-IT" dirty="0"/>
           </a:p>
@@ -14599,7 +15419,7 @@
     </p:spTree>
     <p:extLst>
       <p:ext uri="{BB962C8B-B14F-4D97-AF65-F5344CB8AC3E}">
-        <p14:creationId xmlns:p14="http://schemas.microsoft.com/office/powerpoint/2010/main" xmlns="" val="2537002"/>
+        <p14:creationId xmlns="" xmlns:p14="http://schemas.microsoft.com/office/powerpoint/2010/main" val="2537002"/>
       </p:ext>
     </p:extLst>
   </p:cSld>
@@ -14698,6 +15518,288 @@
       </p:sp>
       <p:pic>
         <p:nvPicPr>
+          <p:cNvPr id="5" name="Immagine 4" descr="BackEnd.png"/>
+          <p:cNvPicPr>
+            <a:picLocks noChangeAspect="1"/>
+          </p:cNvPicPr>
+          <p:nvPr/>
+        </p:nvPicPr>
+        <p:blipFill>
+          <a:blip r:embed="rId2" cstate="print"/>
+          <a:stretch>
+            <a:fillRect/>
+          </a:stretch>
+        </p:blipFill>
+        <p:spPr>
+          <a:xfrm>
+            <a:off x="2339752" y="692696"/>
+            <a:ext cx="4418852" cy="5776071"/>
+          </a:xfrm>
+          <a:prstGeom prst="rect">
+            <a:avLst/>
+          </a:prstGeom>
+        </p:spPr>
+      </p:pic>
+    </p:spTree>
+    <p:extLst>
+      <p:ext uri="{BB962C8B-B14F-4D97-AF65-F5344CB8AC3E}">
+        <p14:creationId xmlns="" xmlns:p14="http://schemas.microsoft.com/office/powerpoint/2010/main" val="200703652"/>
+      </p:ext>
+    </p:extLst>
+  </p:cSld>
+  <p:clrMapOvr>
+    <a:masterClrMapping/>
+  </p:clrMapOvr>
+  <p:timing>
+    <p:tnLst>
+      <p:par>
+        <p:cTn id="1" dur="indefinite" restart="never" nodeType="tmRoot"/>
+      </p:par>
+    </p:tnLst>
+  </p:timing>
+</p:sld>
+</file>
+
+<file path=ppt/slides/slide4.xml><?xml version="1.0" encoding="utf-8"?>
+<p:sld xmlns:a="http://schemas.openxmlformats.org/drawingml/2006/main" xmlns:r="http://schemas.openxmlformats.org/officeDocument/2006/relationships" xmlns:p="http://schemas.openxmlformats.org/presentationml/2006/main">
+  <p:cSld>
+    <p:spTree>
+      <p:nvGrpSpPr>
+        <p:cNvPr id="1" name=""/>
+        <p:cNvGrpSpPr/>
+        <p:nvPr/>
+      </p:nvGrpSpPr>
+      <p:grpSpPr>
+        <a:xfrm>
+          <a:off x="0" y="0"/>
+          <a:ext cx="0" cy="0"/>
+          <a:chOff x="0" y="0"/>
+          <a:chExt cx="0" cy="0"/>
+        </a:xfrm>
+      </p:grpSpPr>
+      <p:pic>
+        <p:nvPicPr>
+          <p:cNvPr id="3" name="Immagine 2"/>
+          <p:cNvPicPr>
+            <a:picLocks noChangeAspect="1"/>
+          </p:cNvPicPr>
+          <p:nvPr/>
+        </p:nvPicPr>
+        <p:blipFill>
+          <a:blip r:embed="rId2" cstate="print">
+            <a:extLst>
+              <a:ext uri="{28A0092B-C50C-407E-A947-70E740481C1C}">
+                <a14:useLocalDpi xmlns="" xmlns:a14="http://schemas.microsoft.com/office/drawing/2010/main" val="0"/>
+              </a:ext>
+            </a:extLst>
+          </a:blip>
+          <a:stretch>
+            <a:fillRect/>
+          </a:stretch>
+        </p:blipFill>
+        <p:spPr>
+          <a:xfrm>
+            <a:off x="2750630" y="1268760"/>
+            <a:ext cx="3765586" cy="4581128"/>
+          </a:xfrm>
+          <a:prstGeom prst="rect">
+            <a:avLst/>
+          </a:prstGeom>
+        </p:spPr>
+      </p:pic>
+      <p:sp>
+        <p:nvSpPr>
+          <p:cNvPr id="2" name="Titolo 1"/>
+          <p:cNvSpPr>
+            <a:spLocks noGrp="1"/>
+          </p:cNvSpPr>
+          <p:nvPr>
+            <p:ph type="title"/>
+          </p:nvPr>
+        </p:nvSpPr>
+        <p:spPr>
+          <a:xfrm>
+            <a:off x="1043608" y="2996952"/>
+            <a:ext cx="7024744" cy="1143000"/>
+          </a:xfrm>
+        </p:spPr>
+        <p:txBody>
+          <a:bodyPr/>
+          <a:lstStyle/>
+          <a:p>
+            <a:pPr algn="ctr"/>
+            <a:r>
+              <a:rPr lang="it-IT" dirty="0" smtClean="0"/>
+              <a:t>4</a:t>
+            </a:r>
+            <a:r>
+              <a:rPr lang="it-IT" dirty="0" smtClean="0"/>
+              <a:t>. </a:t>
+            </a:r>
+            <a:r>
+              <a:rPr lang="it-IT" dirty="0" err="1" smtClean="0"/>
+              <a:t>Front-End</a:t>
+            </a:r>
+            <a:r>
+              <a:rPr lang="it-IT" dirty="0" smtClean="0"/>
+              <a:t> web</a:t>
+            </a:r>
+            <a:endParaRPr lang="it-IT" dirty="0"/>
+          </a:p>
+        </p:txBody>
+      </p:sp>
+      <p:sp>
+        <p:nvSpPr>
+          <p:cNvPr id="4" name="Segnaposto data 3"/>
+          <p:cNvSpPr>
+            <a:spLocks noGrp="1"/>
+          </p:cNvSpPr>
+          <p:nvPr>
+            <p:ph type="dt" sz="half" idx="10"/>
+          </p:nvPr>
+        </p:nvSpPr>
+        <p:spPr/>
+        <p:txBody>
+          <a:bodyPr/>
+          <a:lstStyle/>
+          <a:p>
+            <a:r>
+              <a:rPr lang="it-IT" smtClean="0"/>
+              <a:t>Progetto Gamification - Team Committed</a:t>
+            </a:r>
+            <a:endParaRPr lang="it-IT"/>
+          </a:p>
+        </p:txBody>
+      </p:sp>
+      <p:sp>
+        <p:nvSpPr>
+          <p:cNvPr id="7" name="Segnaposto numero diapositiva 6"/>
+          <p:cNvSpPr>
+            <a:spLocks noGrp="1"/>
+          </p:cNvSpPr>
+          <p:nvPr>
+            <p:ph type="sldNum" sz="quarter" idx="12"/>
+          </p:nvPr>
+        </p:nvSpPr>
+        <p:spPr/>
+        <p:txBody>
+          <a:bodyPr/>
+          <a:lstStyle/>
+          <a:p>
+            <a:fld id="{017EC607-BD11-4D4E-AC5F-155C854A0B9D}" type="slidenum">
+              <a:rPr lang="it-IT" smtClean="0"/>
+              <a:pPr/>
+              <a:t>4</a:t>
+            </a:fld>
+            <a:r>
+              <a:rPr lang="it-IT" dirty="0" smtClean="0"/>
+              <a:t> di 67</a:t>
+            </a:r>
+          </a:p>
+        </p:txBody>
+      </p:sp>
+    </p:spTree>
+    <p:extLst>
+      <p:ext uri="{BB962C8B-B14F-4D97-AF65-F5344CB8AC3E}">
+        <p14:creationId xmlns="" xmlns:p14="http://schemas.microsoft.com/office/powerpoint/2010/main" val="2537002"/>
+      </p:ext>
+    </p:extLst>
+  </p:cSld>
+  <p:clrMapOvr>
+    <a:masterClrMapping/>
+  </p:clrMapOvr>
+  <p:timing>
+    <p:tnLst>
+      <p:par>
+        <p:cTn id="1" dur="indefinite" restart="never" nodeType="tmRoot"/>
+      </p:par>
+    </p:tnLst>
+  </p:timing>
+</p:sld>
+</file>
+
+<file path=ppt/slides/slide5.xml><?xml version="1.0" encoding="utf-8"?>
+<p:sld xmlns:a="http://schemas.openxmlformats.org/drawingml/2006/main" xmlns:r="http://schemas.openxmlformats.org/officeDocument/2006/relationships" xmlns:p="http://schemas.openxmlformats.org/presentationml/2006/main">
+  <p:cSld>
+    <p:spTree>
+      <p:nvGrpSpPr>
+        <p:cNvPr id="1" name=""/>
+        <p:cNvGrpSpPr/>
+        <p:nvPr/>
+      </p:nvGrpSpPr>
+      <p:grpSpPr>
+        <a:xfrm>
+          <a:off x="0" y="0"/>
+          <a:ext cx="0" cy="0"/>
+          <a:chOff x="0" y="0"/>
+          <a:chExt cx="0" cy="0"/>
+        </a:xfrm>
+      </p:grpSpPr>
+      <p:sp>
+        <p:nvSpPr>
+          <p:cNvPr id="6" name="Segnaposto data 5"/>
+          <p:cNvSpPr>
+            <a:spLocks noGrp="1"/>
+          </p:cNvSpPr>
+          <p:nvPr>
+            <p:ph type="dt" sz="half" idx="10"/>
+          </p:nvPr>
+        </p:nvSpPr>
+        <p:spPr/>
+        <p:txBody>
+          <a:bodyPr/>
+          <a:lstStyle/>
+          <a:p>
+            <a:r>
+              <a:rPr lang="it-IT" dirty="0" smtClean="0"/>
+              <a:t>Progetto </a:t>
+            </a:r>
+            <a:r>
+              <a:rPr lang="it-IT" dirty="0" err="1" smtClean="0"/>
+              <a:t>Gamification</a:t>
+            </a:r>
+            <a:r>
+              <a:rPr lang="it-IT" dirty="0" smtClean="0"/>
+              <a:t> - Team </a:t>
+            </a:r>
+            <a:r>
+              <a:rPr lang="it-IT" dirty="0" err="1" smtClean="0"/>
+              <a:t>Committed</a:t>
+            </a:r>
+            <a:endParaRPr lang="it-IT" dirty="0"/>
+          </a:p>
+        </p:txBody>
+      </p:sp>
+      <p:sp>
+        <p:nvSpPr>
+          <p:cNvPr id="9" name="Segnaposto numero diapositiva 8"/>
+          <p:cNvSpPr>
+            <a:spLocks noGrp="1"/>
+          </p:cNvSpPr>
+          <p:nvPr>
+            <p:ph type="sldNum" sz="quarter" idx="12"/>
+          </p:nvPr>
+        </p:nvSpPr>
+        <p:spPr/>
+        <p:txBody>
+          <a:bodyPr/>
+          <a:lstStyle/>
+          <a:p>
+            <a:fld id="{017EC607-BD11-4D4E-AC5F-155C854A0B9D}" type="slidenum">
+              <a:rPr lang="it-IT" smtClean="0"/>
+              <a:pPr/>
+              <a:t>5</a:t>
+            </a:fld>
+            <a:r>
+              <a:rPr lang="it-IT" dirty="0" smtClean="0"/>
+              <a:t> di 67</a:t>
+            </a:r>
+            <a:endParaRPr lang="it-IT" dirty="0"/>
+          </a:p>
+        </p:txBody>
+      </p:sp>
+      <p:pic>
+        <p:nvPicPr>
           <p:cNvPr id="11" name="Immagine 10" descr="frontEndWeb.png"/>
           <p:cNvPicPr>
             <a:picLocks noChangeAspect="1"/>
@@ -14723,7 +15825,563 @@
     </p:spTree>
     <p:extLst>
       <p:ext uri="{BB962C8B-B14F-4D97-AF65-F5344CB8AC3E}">
-        <p14:creationId xmlns:p14="http://schemas.microsoft.com/office/powerpoint/2010/main" xmlns="" val="200703652"/>
+        <p14:creationId xmlns="" xmlns:p14="http://schemas.microsoft.com/office/powerpoint/2010/main" val="200703652"/>
+      </p:ext>
+    </p:extLst>
+  </p:cSld>
+  <p:clrMapOvr>
+    <a:masterClrMapping/>
+  </p:clrMapOvr>
+  <p:timing>
+    <p:tnLst>
+      <p:par>
+        <p:cTn id="1" dur="indefinite" restart="never" nodeType="tmRoot"/>
+      </p:par>
+    </p:tnLst>
+  </p:timing>
+</p:sld>
+</file>
+
+<file path=ppt/slides/slide6.xml><?xml version="1.0" encoding="utf-8"?>
+<p:sld xmlns:a="http://schemas.openxmlformats.org/drawingml/2006/main" xmlns:r="http://schemas.openxmlformats.org/officeDocument/2006/relationships" xmlns:p="http://schemas.openxmlformats.org/presentationml/2006/main">
+  <p:cSld>
+    <p:spTree>
+      <p:nvGrpSpPr>
+        <p:cNvPr id="1" name=""/>
+        <p:cNvGrpSpPr/>
+        <p:nvPr/>
+      </p:nvGrpSpPr>
+      <p:grpSpPr>
+        <a:xfrm>
+          <a:off x="0" y="0"/>
+          <a:ext cx="0" cy="0"/>
+          <a:chOff x="0" y="0"/>
+          <a:chExt cx="0" cy="0"/>
+        </a:xfrm>
+      </p:grpSpPr>
+      <p:pic>
+        <p:nvPicPr>
+          <p:cNvPr id="3" name="Immagine 2"/>
+          <p:cNvPicPr>
+            <a:picLocks noChangeAspect="1"/>
+          </p:cNvPicPr>
+          <p:nvPr/>
+        </p:nvPicPr>
+        <p:blipFill>
+          <a:blip r:embed="rId2" cstate="print">
+            <a:extLst>
+              <a:ext uri="{28A0092B-C50C-407E-A947-70E740481C1C}">
+                <a14:useLocalDpi xmlns="" xmlns:a14="http://schemas.microsoft.com/office/drawing/2010/main" val="0"/>
+              </a:ext>
+            </a:extLst>
+          </a:blip>
+          <a:stretch>
+            <a:fillRect/>
+          </a:stretch>
+        </p:blipFill>
+        <p:spPr>
+          <a:xfrm>
+            <a:off x="2750630" y="1268760"/>
+            <a:ext cx="3765586" cy="4581128"/>
+          </a:xfrm>
+          <a:prstGeom prst="rect">
+            <a:avLst/>
+          </a:prstGeom>
+        </p:spPr>
+      </p:pic>
+      <p:sp>
+        <p:nvSpPr>
+          <p:cNvPr id="2" name="Titolo 1"/>
+          <p:cNvSpPr>
+            <a:spLocks noGrp="1"/>
+          </p:cNvSpPr>
+          <p:nvPr>
+            <p:ph type="title"/>
+          </p:nvPr>
+        </p:nvSpPr>
+        <p:spPr>
+          <a:xfrm>
+            <a:off x="1043608" y="2996952"/>
+            <a:ext cx="7024744" cy="1143000"/>
+          </a:xfrm>
+        </p:spPr>
+        <p:txBody>
+          <a:bodyPr/>
+          <a:lstStyle/>
+          <a:p>
+            <a:pPr algn="ctr"/>
+            <a:r>
+              <a:rPr lang="it-IT" dirty="0" smtClean="0"/>
+              <a:t>5. </a:t>
+            </a:r>
+            <a:r>
+              <a:rPr lang="it-IT" dirty="0" err="1" smtClean="0"/>
+              <a:t>Front-End</a:t>
+            </a:r>
+            <a:r>
+              <a:rPr lang="it-IT" dirty="0" smtClean="0"/>
+              <a:t> </a:t>
+            </a:r>
+            <a:r>
+              <a:rPr lang="it-IT" dirty="0" smtClean="0"/>
+              <a:t>Mobile</a:t>
+            </a:r>
+            <a:endParaRPr lang="it-IT" dirty="0"/>
+          </a:p>
+        </p:txBody>
+      </p:sp>
+      <p:sp>
+        <p:nvSpPr>
+          <p:cNvPr id="4" name="Segnaposto data 3"/>
+          <p:cNvSpPr>
+            <a:spLocks noGrp="1"/>
+          </p:cNvSpPr>
+          <p:nvPr>
+            <p:ph type="dt" sz="half" idx="10"/>
+          </p:nvPr>
+        </p:nvSpPr>
+        <p:spPr/>
+        <p:txBody>
+          <a:bodyPr/>
+          <a:lstStyle/>
+          <a:p>
+            <a:r>
+              <a:rPr lang="it-IT" smtClean="0"/>
+              <a:t>Progetto Gamification - Team Committed</a:t>
+            </a:r>
+            <a:endParaRPr lang="it-IT"/>
+          </a:p>
+        </p:txBody>
+      </p:sp>
+      <p:sp>
+        <p:nvSpPr>
+          <p:cNvPr id="7" name="Segnaposto numero diapositiva 6"/>
+          <p:cNvSpPr>
+            <a:spLocks noGrp="1"/>
+          </p:cNvSpPr>
+          <p:nvPr>
+            <p:ph type="sldNum" sz="quarter" idx="12"/>
+          </p:nvPr>
+        </p:nvSpPr>
+        <p:spPr/>
+        <p:txBody>
+          <a:bodyPr/>
+          <a:lstStyle/>
+          <a:p>
+            <a:fld id="{017EC607-BD11-4D4E-AC5F-155C854A0B9D}" type="slidenum">
+              <a:rPr lang="it-IT" smtClean="0"/>
+              <a:pPr/>
+              <a:t>6</a:t>
+            </a:fld>
+            <a:r>
+              <a:rPr lang="it-IT" dirty="0" smtClean="0"/>
+              <a:t> di 67</a:t>
+            </a:r>
+          </a:p>
+        </p:txBody>
+      </p:sp>
+    </p:spTree>
+    <p:extLst>
+      <p:ext uri="{BB962C8B-B14F-4D97-AF65-F5344CB8AC3E}">
+        <p14:creationId xmlns="" xmlns:p14="http://schemas.microsoft.com/office/powerpoint/2010/main" val="2537002"/>
+      </p:ext>
+    </p:extLst>
+  </p:cSld>
+  <p:clrMapOvr>
+    <a:masterClrMapping/>
+  </p:clrMapOvr>
+  <p:timing>
+    <p:tnLst>
+      <p:par>
+        <p:cTn id="1" dur="indefinite" restart="never" nodeType="tmRoot"/>
+      </p:par>
+    </p:tnLst>
+  </p:timing>
+</p:sld>
+</file>
+
+<file path=ppt/slides/slide7.xml><?xml version="1.0" encoding="utf-8"?>
+<p:sld xmlns:a="http://schemas.openxmlformats.org/drawingml/2006/main" xmlns:r="http://schemas.openxmlformats.org/officeDocument/2006/relationships" xmlns:p="http://schemas.openxmlformats.org/presentationml/2006/main">
+  <p:cSld>
+    <p:spTree>
+      <p:nvGrpSpPr>
+        <p:cNvPr id="1" name=""/>
+        <p:cNvGrpSpPr/>
+        <p:nvPr/>
+      </p:nvGrpSpPr>
+      <p:grpSpPr>
+        <a:xfrm>
+          <a:off x="0" y="0"/>
+          <a:ext cx="0" cy="0"/>
+          <a:chOff x="0" y="0"/>
+          <a:chExt cx="0" cy="0"/>
+        </a:xfrm>
+      </p:grpSpPr>
+      <p:sp>
+        <p:nvSpPr>
+          <p:cNvPr id="6" name="Segnaposto data 5"/>
+          <p:cNvSpPr>
+            <a:spLocks noGrp="1"/>
+          </p:cNvSpPr>
+          <p:nvPr>
+            <p:ph type="dt" sz="half" idx="10"/>
+          </p:nvPr>
+        </p:nvSpPr>
+        <p:spPr/>
+        <p:txBody>
+          <a:bodyPr/>
+          <a:lstStyle/>
+          <a:p>
+            <a:r>
+              <a:rPr lang="it-IT" dirty="0" smtClean="0"/>
+              <a:t>Progetto </a:t>
+            </a:r>
+            <a:r>
+              <a:rPr lang="it-IT" dirty="0" err="1" smtClean="0"/>
+              <a:t>Gamification</a:t>
+            </a:r>
+            <a:r>
+              <a:rPr lang="it-IT" dirty="0" smtClean="0"/>
+              <a:t> - Team </a:t>
+            </a:r>
+            <a:r>
+              <a:rPr lang="it-IT" dirty="0" err="1" smtClean="0"/>
+              <a:t>Committed</a:t>
+            </a:r>
+            <a:endParaRPr lang="it-IT" dirty="0"/>
+          </a:p>
+        </p:txBody>
+      </p:sp>
+      <p:sp>
+        <p:nvSpPr>
+          <p:cNvPr id="9" name="Segnaposto numero diapositiva 8"/>
+          <p:cNvSpPr>
+            <a:spLocks noGrp="1"/>
+          </p:cNvSpPr>
+          <p:nvPr>
+            <p:ph type="sldNum" sz="quarter" idx="12"/>
+          </p:nvPr>
+        </p:nvSpPr>
+        <p:spPr/>
+        <p:txBody>
+          <a:bodyPr/>
+          <a:lstStyle/>
+          <a:p>
+            <a:fld id="{017EC607-BD11-4D4E-AC5F-155C854A0B9D}" type="slidenum">
+              <a:rPr lang="it-IT" smtClean="0"/>
+              <a:pPr/>
+              <a:t>7</a:t>
+            </a:fld>
+            <a:r>
+              <a:rPr lang="it-IT" dirty="0" smtClean="0"/>
+              <a:t> di 67</a:t>
+            </a:r>
+            <a:endParaRPr lang="it-IT" dirty="0"/>
+          </a:p>
+        </p:txBody>
+      </p:sp>
+      <p:pic>
+        <p:nvPicPr>
+          <p:cNvPr id="5" name="Immagine 4" descr="frontEndMobile.png"/>
+          <p:cNvPicPr>
+            <a:picLocks noChangeAspect="1"/>
+          </p:cNvPicPr>
+          <p:nvPr/>
+        </p:nvPicPr>
+        <p:blipFill>
+          <a:blip r:embed="rId2" cstate="print"/>
+          <a:stretch>
+            <a:fillRect/>
+          </a:stretch>
+        </p:blipFill>
+        <p:spPr>
+          <a:xfrm>
+            <a:off x="2411760" y="692696"/>
+            <a:ext cx="4328268" cy="5797109"/>
+          </a:xfrm>
+          <a:prstGeom prst="rect">
+            <a:avLst/>
+          </a:prstGeom>
+        </p:spPr>
+      </p:pic>
+    </p:spTree>
+    <p:extLst>
+      <p:ext uri="{BB962C8B-B14F-4D97-AF65-F5344CB8AC3E}">
+        <p14:creationId xmlns="" xmlns:p14="http://schemas.microsoft.com/office/powerpoint/2010/main" val="200703652"/>
+      </p:ext>
+    </p:extLst>
+  </p:cSld>
+  <p:clrMapOvr>
+    <a:masterClrMapping/>
+  </p:clrMapOvr>
+  <p:timing>
+    <p:tnLst>
+      <p:par>
+        <p:cTn id="1" dur="indefinite" restart="never" nodeType="tmRoot"/>
+      </p:par>
+    </p:tnLst>
+  </p:timing>
+</p:sld>
+</file>
+
+<file path=ppt/slides/slide8.xml><?xml version="1.0" encoding="utf-8"?>
+<p:sld xmlns:a="http://schemas.openxmlformats.org/drawingml/2006/main" xmlns:r="http://schemas.openxmlformats.org/officeDocument/2006/relationships" xmlns:p="http://schemas.openxmlformats.org/presentationml/2006/main">
+  <p:cSld>
+    <p:spTree>
+      <p:nvGrpSpPr>
+        <p:cNvPr id="1" name=""/>
+        <p:cNvGrpSpPr/>
+        <p:nvPr/>
+      </p:nvGrpSpPr>
+      <p:grpSpPr>
+        <a:xfrm>
+          <a:off x="0" y="0"/>
+          <a:ext cx="0" cy="0"/>
+          <a:chOff x="0" y="0"/>
+          <a:chExt cx="0" cy="0"/>
+        </a:xfrm>
+      </p:grpSpPr>
+      <p:pic>
+        <p:nvPicPr>
+          <p:cNvPr id="3" name="Immagine 2"/>
+          <p:cNvPicPr>
+            <a:picLocks noChangeAspect="1"/>
+          </p:cNvPicPr>
+          <p:nvPr/>
+        </p:nvPicPr>
+        <p:blipFill>
+          <a:blip r:embed="rId2" cstate="print">
+            <a:extLst>
+              <a:ext uri="{28A0092B-C50C-407E-A947-70E740481C1C}">
+                <a14:useLocalDpi xmlns="" xmlns:a14="http://schemas.microsoft.com/office/drawing/2010/main" val="0"/>
+              </a:ext>
+            </a:extLst>
+          </a:blip>
+          <a:stretch>
+            <a:fillRect/>
+          </a:stretch>
+        </p:blipFill>
+        <p:spPr>
+          <a:xfrm>
+            <a:off x="2750630" y="1268760"/>
+            <a:ext cx="3765586" cy="4581128"/>
+          </a:xfrm>
+          <a:prstGeom prst="rect">
+            <a:avLst/>
+          </a:prstGeom>
+        </p:spPr>
+      </p:pic>
+      <p:sp>
+        <p:nvSpPr>
+          <p:cNvPr id="2" name="Titolo 1"/>
+          <p:cNvSpPr>
+            <a:spLocks noGrp="1"/>
+          </p:cNvSpPr>
+          <p:nvPr>
+            <p:ph type="title"/>
+          </p:nvPr>
+        </p:nvSpPr>
+        <p:spPr>
+          <a:xfrm>
+            <a:off x="1043608" y="2996952"/>
+            <a:ext cx="7024744" cy="1143000"/>
+          </a:xfrm>
+        </p:spPr>
+        <p:txBody>
+          <a:bodyPr/>
+          <a:lstStyle/>
+          <a:p>
+            <a:pPr algn="ctr"/>
+            <a:r>
+              <a:rPr lang="it-IT" dirty="0" smtClean="0"/>
+              <a:t>7</a:t>
+            </a:r>
+            <a:r>
+              <a:rPr lang="it-IT" dirty="0" smtClean="0"/>
+              <a:t>. Prototipi di Interfaccia</a:t>
+            </a:r>
+            <a:endParaRPr lang="it-IT" dirty="0"/>
+          </a:p>
+        </p:txBody>
+      </p:sp>
+      <p:sp>
+        <p:nvSpPr>
+          <p:cNvPr id="4" name="Segnaposto data 3"/>
+          <p:cNvSpPr>
+            <a:spLocks noGrp="1"/>
+          </p:cNvSpPr>
+          <p:nvPr>
+            <p:ph type="dt" sz="half" idx="10"/>
+          </p:nvPr>
+        </p:nvSpPr>
+        <p:spPr/>
+        <p:txBody>
+          <a:bodyPr/>
+          <a:lstStyle/>
+          <a:p>
+            <a:r>
+              <a:rPr lang="it-IT" smtClean="0"/>
+              <a:t>Progetto Gamification - Team Committed</a:t>
+            </a:r>
+            <a:endParaRPr lang="it-IT"/>
+          </a:p>
+        </p:txBody>
+      </p:sp>
+      <p:sp>
+        <p:nvSpPr>
+          <p:cNvPr id="7" name="Segnaposto numero diapositiva 6"/>
+          <p:cNvSpPr>
+            <a:spLocks noGrp="1"/>
+          </p:cNvSpPr>
+          <p:nvPr>
+            <p:ph type="sldNum" sz="quarter" idx="12"/>
+          </p:nvPr>
+        </p:nvSpPr>
+        <p:spPr/>
+        <p:txBody>
+          <a:bodyPr/>
+          <a:lstStyle/>
+          <a:p>
+            <a:fld id="{017EC607-BD11-4D4E-AC5F-155C854A0B9D}" type="slidenum">
+              <a:rPr lang="it-IT" smtClean="0"/>
+              <a:pPr/>
+              <a:t>8</a:t>
+            </a:fld>
+            <a:r>
+              <a:rPr lang="it-IT" dirty="0" smtClean="0"/>
+              <a:t> di 67</a:t>
+            </a:r>
+          </a:p>
+        </p:txBody>
+      </p:sp>
+    </p:spTree>
+    <p:extLst>
+      <p:ext uri="{BB962C8B-B14F-4D97-AF65-F5344CB8AC3E}">
+        <p14:creationId xmlns="" xmlns:p14="http://schemas.microsoft.com/office/powerpoint/2010/main" val="2537002"/>
+      </p:ext>
+    </p:extLst>
+  </p:cSld>
+  <p:clrMapOvr>
+    <a:masterClrMapping/>
+  </p:clrMapOvr>
+  <p:timing>
+    <p:tnLst>
+      <p:par>
+        <p:cTn id="1" dur="indefinite" restart="never" nodeType="tmRoot"/>
+      </p:par>
+    </p:tnLst>
+  </p:timing>
+</p:sld>
+</file>
+
+<file path=ppt/slides/slide9.xml><?xml version="1.0" encoding="utf-8"?>
+<p:sld xmlns:a="http://schemas.openxmlformats.org/drawingml/2006/main" xmlns:r="http://schemas.openxmlformats.org/officeDocument/2006/relationships" xmlns:p="http://schemas.openxmlformats.org/presentationml/2006/main">
+  <p:cSld>
+    <p:spTree>
+      <p:nvGrpSpPr>
+        <p:cNvPr id="1" name=""/>
+        <p:cNvGrpSpPr/>
+        <p:nvPr/>
+      </p:nvGrpSpPr>
+      <p:grpSpPr>
+        <a:xfrm>
+          <a:off x="0" y="0"/>
+          <a:ext cx="0" cy="0"/>
+          <a:chOff x="0" y="0"/>
+          <a:chExt cx="0" cy="0"/>
+        </a:xfrm>
+      </p:grpSpPr>
+      <p:sp>
+        <p:nvSpPr>
+          <p:cNvPr id="6" name="Segnaposto data 5"/>
+          <p:cNvSpPr>
+            <a:spLocks noGrp="1"/>
+          </p:cNvSpPr>
+          <p:nvPr>
+            <p:ph type="dt" sz="half" idx="10"/>
+          </p:nvPr>
+        </p:nvSpPr>
+        <p:spPr/>
+        <p:txBody>
+          <a:bodyPr/>
+          <a:lstStyle/>
+          <a:p>
+            <a:r>
+              <a:rPr lang="it-IT" dirty="0" smtClean="0"/>
+              <a:t>Progetto </a:t>
+            </a:r>
+            <a:r>
+              <a:rPr lang="it-IT" dirty="0" err="1" smtClean="0"/>
+              <a:t>Gamification</a:t>
+            </a:r>
+            <a:r>
+              <a:rPr lang="it-IT" dirty="0" smtClean="0"/>
+              <a:t> - Team </a:t>
+            </a:r>
+            <a:r>
+              <a:rPr lang="it-IT" dirty="0" err="1" smtClean="0"/>
+              <a:t>Committed</a:t>
+            </a:r>
+            <a:endParaRPr lang="it-IT" dirty="0"/>
+          </a:p>
+        </p:txBody>
+      </p:sp>
+      <p:sp>
+        <p:nvSpPr>
+          <p:cNvPr id="9" name="Segnaposto numero diapositiva 8"/>
+          <p:cNvSpPr>
+            <a:spLocks noGrp="1"/>
+          </p:cNvSpPr>
+          <p:nvPr>
+            <p:ph type="sldNum" sz="quarter" idx="12"/>
+          </p:nvPr>
+        </p:nvSpPr>
+        <p:spPr/>
+        <p:txBody>
+          <a:bodyPr/>
+          <a:lstStyle/>
+          <a:p>
+            <a:fld id="{017EC607-BD11-4D4E-AC5F-155C854A0B9D}" type="slidenum">
+              <a:rPr lang="it-IT" smtClean="0"/>
+              <a:pPr/>
+              <a:t>9</a:t>
+            </a:fld>
+            <a:r>
+              <a:rPr lang="it-IT" dirty="0" smtClean="0"/>
+              <a:t> di 67</a:t>
+            </a:r>
+            <a:endParaRPr lang="it-IT" dirty="0"/>
+          </a:p>
+        </p:txBody>
+      </p:sp>
+      <p:pic>
+        <p:nvPicPr>
+          <p:cNvPr id="7" name="Immagine 6" descr="Gui-Desk-Login.jpg"/>
+          <p:cNvPicPr>
+            <a:picLocks noChangeAspect="1"/>
+          </p:cNvPicPr>
+          <p:nvPr/>
+        </p:nvPicPr>
+        <p:blipFill>
+          <a:blip r:embed="rId2" cstate="print"/>
+          <a:stretch>
+            <a:fillRect/>
+          </a:stretch>
+        </p:blipFill>
+        <p:spPr>
+          <a:xfrm>
+            <a:off x="2123728" y="1916832"/>
+            <a:ext cx="5040560" cy="3173328"/>
+          </a:xfrm>
+          <a:prstGeom prst="rect">
+            <a:avLst/>
+          </a:prstGeom>
+        </p:spPr>
+      </p:pic>
+    </p:spTree>
+    <p:extLst>
+      <p:ext uri="{BB962C8B-B14F-4D97-AF65-F5344CB8AC3E}">
+        <p14:creationId xmlns="" xmlns:p14="http://schemas.microsoft.com/office/powerpoint/2010/main" val="200703652"/>
       </p:ext>
     </p:extLst>
   </p:cSld>

</xml_diff>

<commit_message>
aggiornato immagine e pptx
</commit_message>
<xml_diff>
--- a/RP/Esterni/Presentazione/RP-Presentazione.pptx
+++ b/RP/Esterni/Presentazione/RP-Presentazione.pptx
@@ -5,7 +5,7 @@
     <p:sldMasterId id="2147483732" r:id="rId1"/>
   </p:sldMasterIdLst>
   <p:notesMasterIdLst>
-    <p:notesMasterId r:id="rId17"/>
+    <p:notesMasterId r:id="rId19"/>
   </p:notesMasterIdLst>
   <p:sldIdLst>
     <p:sldId id="256" r:id="rId2"/>
@@ -15,14 +15,16 @@
     <p:sldId id="258" r:id="rId6"/>
     <p:sldId id="270" r:id="rId7"/>
     <p:sldId id="275" r:id="rId8"/>
-    <p:sldId id="272" r:id="rId9"/>
-    <p:sldId id="276" r:id="rId10"/>
-    <p:sldId id="279" r:id="rId11"/>
-    <p:sldId id="277" r:id="rId12"/>
-    <p:sldId id="278" r:id="rId13"/>
-    <p:sldId id="280" r:id="rId14"/>
-    <p:sldId id="281" r:id="rId15"/>
-    <p:sldId id="282" r:id="rId16"/>
+    <p:sldId id="283" r:id="rId9"/>
+    <p:sldId id="284" r:id="rId10"/>
+    <p:sldId id="272" r:id="rId11"/>
+    <p:sldId id="276" r:id="rId12"/>
+    <p:sldId id="279" r:id="rId13"/>
+    <p:sldId id="277" r:id="rId14"/>
+    <p:sldId id="278" r:id="rId15"/>
+    <p:sldId id="280" r:id="rId16"/>
+    <p:sldId id="281" r:id="rId17"/>
+    <p:sldId id="282" r:id="rId18"/>
   </p:sldIdLst>
   <p:sldSz cx="9144000" cy="6858000" type="screen4x3"/>
   <p:notesSz cx="6858000" cy="9144000"/>
@@ -123,7 +125,7 @@
   </p:defaultTextStyle>
   <p:extLst>
     <p:ext uri="{521415D9-36F7-43E2-AB2F-B90AF26B5E84}">
-      <p14:sectionLst xmlns="" xmlns:p14="http://schemas.microsoft.com/office/powerpoint/2010/main">
+      <p14:sectionLst xmlns:p14="http://schemas.microsoft.com/office/powerpoint/2010/main" xmlns="">
         <p14:section name="Presentazione" id="{34E9BEB9-075B-4CFE-8BA4-B412D906568B}">
           <p14:sldIdLst>
             <p14:sldId id="256"/>
@@ -481,7 +483,7 @@
     </p:spTree>
     <p:extLst>
       <p:ext uri="{BB962C8B-B14F-4D97-AF65-F5344CB8AC3E}">
-        <p14:creationId xmlns="" xmlns:p14="http://schemas.microsoft.com/office/powerpoint/2010/main" val="1382979574"/>
+        <p14:creationId xmlns:p14="http://schemas.microsoft.com/office/powerpoint/2010/main" xmlns="" val="1382979574"/>
       </p:ext>
     </p:extLst>
   </p:cSld>
@@ -656,7 +658,7 @@
     </p:spTree>
     <p:extLst>
       <p:ext uri="{BB962C8B-B14F-4D97-AF65-F5344CB8AC3E}">
-        <p14:creationId xmlns="" xmlns:p14="http://schemas.microsoft.com/office/powerpoint/2010/main" val="4174330178"/>
+        <p14:creationId xmlns:p14="http://schemas.microsoft.com/office/powerpoint/2010/main" xmlns="" val="4174330178"/>
       </p:ext>
     </p:extLst>
   </p:cSld>
@@ -14428,7 +14430,7 @@
           <a:blip r:embed="rId3" cstate="print">
             <a:extLst>
               <a:ext uri="{28A0092B-C50C-407E-A947-70E740481C1C}">
-                <a14:useLocalDpi xmlns="" xmlns:a14="http://schemas.microsoft.com/office/drawing/2010/main" val="0"/>
+                <a14:useLocalDpi xmlns:a14="http://schemas.microsoft.com/office/drawing/2010/main" xmlns="" val="0"/>
               </a:ext>
             </a:extLst>
           </a:blip>
@@ -14449,7 +14451,7 @@
     </p:spTree>
     <p:extLst>
       <p:ext uri="{BB962C8B-B14F-4D97-AF65-F5344CB8AC3E}">
-        <p14:creationId xmlns="" xmlns:p14="http://schemas.microsoft.com/office/powerpoint/2010/main" val="3567273252"/>
+        <p14:creationId xmlns:p14="http://schemas.microsoft.com/office/powerpoint/2010/main" xmlns="" val="3567273252"/>
       </p:ext>
     </p:extLst>
   </p:cSld>
@@ -14483,9 +14485,68 @@
           <a:chExt cx="0" cy="0"/>
         </a:xfrm>
       </p:grpSpPr>
+      <p:pic>
+        <p:nvPicPr>
+          <p:cNvPr id="3" name="Immagine 2"/>
+          <p:cNvPicPr>
+            <a:picLocks noChangeAspect="1"/>
+          </p:cNvPicPr>
+          <p:nvPr/>
+        </p:nvPicPr>
+        <p:blipFill>
+          <a:blip r:embed="rId2" cstate="print">
+            <a:extLst>
+              <a:ext uri="{28A0092B-C50C-407E-A947-70E740481C1C}">
+                <a14:useLocalDpi xmlns:a14="http://schemas.microsoft.com/office/drawing/2010/main" xmlns="" val="0"/>
+              </a:ext>
+            </a:extLst>
+          </a:blip>
+          <a:stretch>
+            <a:fillRect/>
+          </a:stretch>
+        </p:blipFill>
+        <p:spPr>
+          <a:xfrm>
+            <a:off x="2750630" y="1268760"/>
+            <a:ext cx="3765586" cy="4581128"/>
+          </a:xfrm>
+          <a:prstGeom prst="rect">
+            <a:avLst/>
+          </a:prstGeom>
+        </p:spPr>
+      </p:pic>
       <p:sp>
         <p:nvSpPr>
-          <p:cNvPr id="6" name="Segnaposto data 5"/>
+          <p:cNvPr id="2" name="Titolo 1"/>
+          <p:cNvSpPr>
+            <a:spLocks noGrp="1"/>
+          </p:cNvSpPr>
+          <p:nvPr>
+            <p:ph type="title"/>
+          </p:nvPr>
+        </p:nvSpPr>
+        <p:spPr>
+          <a:xfrm>
+            <a:off x="1043608" y="2996952"/>
+            <a:ext cx="7024744" cy="1143000"/>
+          </a:xfrm>
+        </p:spPr>
+        <p:txBody>
+          <a:bodyPr/>
+          <a:lstStyle/>
+          <a:p>
+            <a:pPr algn="ctr"/>
+            <a:r>
+              <a:rPr lang="it-IT" dirty="0" smtClean="0"/>
+              <a:t>7. Prototipi di Interfaccia</a:t>
+            </a:r>
+            <a:endParaRPr lang="it-IT" dirty="0"/>
+          </a:p>
+        </p:txBody>
+      </p:sp>
+      <p:sp>
+        <p:nvSpPr>
+          <p:cNvPr id="4" name="Segnaposto data 3"/>
           <p:cNvSpPr>
             <a:spLocks noGrp="1"/>
           </p:cNvSpPr>
@@ -14499,28 +14560,16 @@
           <a:lstStyle/>
           <a:p>
             <a:r>
-              <a:rPr lang="it-IT" dirty="0" smtClean="0"/>
-              <a:t>Progetto </a:t>
+              <a:rPr lang="it-IT" smtClean="0"/>
+              <a:t>Progetto Gamification - Team Committed</a:t>
             </a:r>
-            <a:r>
-              <a:rPr lang="it-IT" dirty="0" err="1" smtClean="0"/>
-              <a:t>Gamification</a:t>
-            </a:r>
-            <a:r>
-              <a:rPr lang="it-IT" dirty="0" smtClean="0"/>
-              <a:t> - Team </a:t>
-            </a:r>
-            <a:r>
-              <a:rPr lang="it-IT" dirty="0" err="1" smtClean="0"/>
-              <a:t>Committed</a:t>
-            </a:r>
-            <a:endParaRPr lang="it-IT" dirty="0"/>
+            <a:endParaRPr lang="it-IT"/>
           </a:p>
         </p:txBody>
       </p:sp>
       <p:sp>
         <p:nvSpPr>
-          <p:cNvPr id="9" name="Segnaposto numero diapositiva 8"/>
+          <p:cNvPr id="7" name="Segnaposto numero diapositiva 6"/>
           <p:cNvSpPr>
             <a:spLocks noGrp="1"/>
           </p:cNvSpPr>
@@ -14542,38 +14591,13 @@
               <a:rPr lang="it-IT" dirty="0" smtClean="0"/>
               <a:t> di 67</a:t>
             </a:r>
-            <a:endParaRPr lang="it-IT" dirty="0"/>
           </a:p>
         </p:txBody>
       </p:sp>
-      <p:pic>
-        <p:nvPicPr>
-          <p:cNvPr id="7" name="Immagine 6" descr="Gui-Desk-Login.jpg"/>
-          <p:cNvPicPr>
-            <a:picLocks noChangeAspect="1"/>
-          </p:cNvPicPr>
-          <p:nvPr/>
-        </p:nvPicPr>
-        <p:blipFill>
-          <a:blip r:embed="rId2" cstate="print"/>
-          <a:stretch>
-            <a:fillRect/>
-          </a:stretch>
-        </p:blipFill>
-        <p:spPr>
-          <a:xfrm>
-            <a:off x="2123728" y="1916832"/>
-            <a:ext cx="5040560" cy="3173327"/>
-          </a:xfrm>
-          <a:prstGeom prst="rect">
-            <a:avLst/>
-          </a:prstGeom>
-        </p:spPr>
-      </p:pic>
     </p:spTree>
     <p:extLst>
       <p:ext uri="{BB962C8B-B14F-4D97-AF65-F5344CB8AC3E}">
-        <p14:creationId xmlns="" xmlns:p14="http://schemas.microsoft.com/office/powerpoint/2010/main" val="200703652"/>
+        <p14:creationId xmlns:p14="http://schemas.microsoft.com/office/powerpoint/2010/main" xmlns="" val="2537002"/>
       </p:ext>
     </p:extLst>
   </p:cSld>
@@ -14672,7 +14696,7 @@
       </p:sp>
       <p:pic>
         <p:nvPicPr>
-          <p:cNvPr id="7" name="Immagine 6" descr="Gui-Mob-Login.jpg"/>
+          <p:cNvPr id="7" name="Immagine 6" descr="Gui-Desk-Login.jpg"/>
           <p:cNvPicPr>
             <a:picLocks noChangeAspect="1"/>
           </p:cNvPicPr>
@@ -14686,32 +14710,8 @@
         </p:blipFill>
         <p:spPr>
           <a:xfrm>
-            <a:off x="5004048" y="980728"/>
-            <a:ext cx="3384375" cy="5060746"/>
-          </a:xfrm>
-          <a:prstGeom prst="rect">
-            <a:avLst/>
-          </a:prstGeom>
-        </p:spPr>
-      </p:pic>
-      <p:pic>
-        <p:nvPicPr>
-          <p:cNvPr id="8" name="Immagine 7" descr="Gui-Mob-Notifica.jpg"/>
-          <p:cNvPicPr>
-            <a:picLocks noChangeAspect="1"/>
-          </p:cNvPicPr>
-          <p:nvPr/>
-        </p:nvPicPr>
-        <p:blipFill>
-          <a:blip r:embed="rId3" cstate="print"/>
-          <a:stretch>
-            <a:fillRect/>
-          </a:stretch>
-        </p:blipFill>
-        <p:spPr>
-          <a:xfrm>
-            <a:off x="755576" y="908720"/>
-            <a:ext cx="3415928" cy="5123892"/>
+            <a:off x="2123728" y="1916832"/>
+            <a:ext cx="5040560" cy="3173328"/>
           </a:xfrm>
           <a:prstGeom prst="rect">
             <a:avLst/>
@@ -14721,7 +14721,7 @@
     </p:spTree>
     <p:extLst>
       <p:ext uri="{BB962C8B-B14F-4D97-AF65-F5344CB8AC3E}">
-        <p14:creationId xmlns="" xmlns:p14="http://schemas.microsoft.com/office/powerpoint/2010/main" val="200703652"/>
+        <p14:creationId xmlns:p14="http://schemas.microsoft.com/office/powerpoint/2010/main" xmlns="" val="200703652"/>
       </p:ext>
     </p:extLst>
   </p:cSld>
@@ -14820,7 +14820,7 @@
       </p:sp>
       <p:pic>
         <p:nvPicPr>
-          <p:cNvPr id="7" name="Immagine 6" descr="Gui-Mob-Datiutente.jpg"/>
+          <p:cNvPr id="7" name="Immagine 6" descr="Gui-Desk-Login.jpg"/>
           <p:cNvPicPr>
             <a:picLocks noChangeAspect="1"/>
           </p:cNvPicPr>
@@ -14834,56 +14834,8 @@
         </p:blipFill>
         <p:spPr>
           <a:xfrm>
-            <a:off x="611560" y="1556792"/>
-            <a:ext cx="2487573" cy="3719736"/>
-          </a:xfrm>
-          <a:prstGeom prst="rect">
-            <a:avLst/>
-          </a:prstGeom>
-        </p:spPr>
-      </p:pic>
-      <p:pic>
-        <p:nvPicPr>
-          <p:cNvPr id="8" name="Immagine 7" descr="Gui-Mob-Risposta.jpg"/>
-          <p:cNvPicPr>
-            <a:picLocks noChangeAspect="1"/>
-          </p:cNvPicPr>
-          <p:nvPr/>
-        </p:nvPicPr>
-        <p:blipFill>
-          <a:blip r:embed="rId3" cstate="print"/>
-          <a:stretch>
-            <a:fillRect/>
-          </a:stretch>
-        </p:blipFill>
-        <p:spPr>
-          <a:xfrm>
-            <a:off x="6084168" y="1556792"/>
-            <a:ext cx="2487573" cy="3719736"/>
-          </a:xfrm>
-          <a:prstGeom prst="rect">
-            <a:avLst/>
-          </a:prstGeom>
-        </p:spPr>
-      </p:pic>
-      <p:pic>
-        <p:nvPicPr>
-          <p:cNvPr id="10" name="Immagine 9" descr="Gui-Mob-Statistiche.jpg"/>
-          <p:cNvPicPr>
-            <a:picLocks noChangeAspect="1"/>
-          </p:cNvPicPr>
-          <p:nvPr/>
-        </p:nvPicPr>
-        <p:blipFill>
-          <a:blip r:embed="rId4" cstate="print"/>
-          <a:stretch>
-            <a:fillRect/>
-          </a:stretch>
-        </p:blipFill>
-        <p:spPr>
-          <a:xfrm>
-            <a:off x="3347864" y="1556792"/>
-            <a:ext cx="2487573" cy="3719736"/>
+            <a:off x="2123728" y="1916832"/>
+            <a:ext cx="5040560" cy="3173327"/>
           </a:xfrm>
           <a:prstGeom prst="rect">
             <a:avLst/>
@@ -14893,7 +14845,7 @@
     </p:spTree>
     <p:extLst>
       <p:ext uri="{BB962C8B-B14F-4D97-AF65-F5344CB8AC3E}">
-        <p14:creationId xmlns="" xmlns:p14="http://schemas.microsoft.com/office/powerpoint/2010/main" val="200703652"/>
+        <p14:creationId xmlns:p14="http://schemas.microsoft.com/office/powerpoint/2010/main" xmlns="" val="200703652"/>
       </p:ext>
     </p:extLst>
   </p:cSld>
@@ -14992,7 +14944,7 @@
       </p:sp>
       <p:pic>
         <p:nvPicPr>
-          <p:cNvPr id="5" name="Immagine 4" descr="Gui-web-GestioneDomande-Insert.jpg"/>
+          <p:cNvPr id="7" name="Immagine 6" descr="Gui-Mob-Login.jpg"/>
           <p:cNvPicPr>
             <a:picLocks noChangeAspect="1"/>
           </p:cNvPicPr>
@@ -15006,8 +14958,32 @@
         </p:blipFill>
         <p:spPr>
           <a:xfrm>
-            <a:off x="683568" y="1052736"/>
-            <a:ext cx="7812360" cy="4861024"/>
+            <a:off x="5004048" y="980728"/>
+            <a:ext cx="3384375" cy="5060746"/>
+          </a:xfrm>
+          <a:prstGeom prst="rect">
+            <a:avLst/>
+          </a:prstGeom>
+        </p:spPr>
+      </p:pic>
+      <p:pic>
+        <p:nvPicPr>
+          <p:cNvPr id="8" name="Immagine 7" descr="Gui-Mob-Notifica.jpg"/>
+          <p:cNvPicPr>
+            <a:picLocks noChangeAspect="1"/>
+          </p:cNvPicPr>
+          <p:nvPr/>
+        </p:nvPicPr>
+        <p:blipFill>
+          <a:blip r:embed="rId3" cstate="print"/>
+          <a:stretch>
+            <a:fillRect/>
+          </a:stretch>
+        </p:blipFill>
+        <p:spPr>
+          <a:xfrm>
+            <a:off x="755576" y="908720"/>
+            <a:ext cx="3415928" cy="5123892"/>
           </a:xfrm>
           <a:prstGeom prst="rect">
             <a:avLst/>
@@ -15017,7 +14993,7 @@
     </p:spTree>
     <p:extLst>
       <p:ext uri="{BB962C8B-B14F-4D97-AF65-F5344CB8AC3E}">
-        <p14:creationId xmlns="" xmlns:p14="http://schemas.microsoft.com/office/powerpoint/2010/main" val="200703652"/>
+        <p14:creationId xmlns:p14="http://schemas.microsoft.com/office/powerpoint/2010/main" xmlns="" val="200703652"/>
       </p:ext>
     </p:extLst>
   </p:cSld>
@@ -15116,7 +15092,7 @@
       </p:sp>
       <p:pic>
         <p:nvPicPr>
-          <p:cNvPr id="5" name="Immagine 4" descr="Gui-web-GestioneDomande-Insert.jpg"/>
+          <p:cNvPr id="7" name="Immagine 6" descr="Gui-Mob-Datiutente.jpg"/>
           <p:cNvPicPr>
             <a:picLocks noChangeAspect="1"/>
           </p:cNvPicPr>
@@ -15130,8 +15106,56 @@
         </p:blipFill>
         <p:spPr>
           <a:xfrm>
-            <a:off x="683568" y="1052736"/>
-            <a:ext cx="7812360" cy="4861024"/>
+            <a:off x="611560" y="1556792"/>
+            <a:ext cx="2487573" cy="3719736"/>
+          </a:xfrm>
+          <a:prstGeom prst="rect">
+            <a:avLst/>
+          </a:prstGeom>
+        </p:spPr>
+      </p:pic>
+      <p:pic>
+        <p:nvPicPr>
+          <p:cNvPr id="8" name="Immagine 7" descr="Gui-Mob-Risposta.jpg"/>
+          <p:cNvPicPr>
+            <a:picLocks noChangeAspect="1"/>
+          </p:cNvPicPr>
+          <p:nvPr/>
+        </p:nvPicPr>
+        <p:blipFill>
+          <a:blip r:embed="rId3" cstate="print"/>
+          <a:stretch>
+            <a:fillRect/>
+          </a:stretch>
+        </p:blipFill>
+        <p:spPr>
+          <a:xfrm>
+            <a:off x="6084168" y="1556792"/>
+            <a:ext cx="2487573" cy="3719736"/>
+          </a:xfrm>
+          <a:prstGeom prst="rect">
+            <a:avLst/>
+          </a:prstGeom>
+        </p:spPr>
+      </p:pic>
+      <p:pic>
+        <p:nvPicPr>
+          <p:cNvPr id="10" name="Immagine 9" descr="Gui-Mob-Statistiche.jpg"/>
+          <p:cNvPicPr>
+            <a:picLocks noChangeAspect="1"/>
+          </p:cNvPicPr>
+          <p:nvPr/>
+        </p:nvPicPr>
+        <p:blipFill>
+          <a:blip r:embed="rId4" cstate="print"/>
+          <a:stretch>
+            <a:fillRect/>
+          </a:stretch>
+        </p:blipFill>
+        <p:spPr>
+          <a:xfrm>
+            <a:off x="3347864" y="1556792"/>
+            <a:ext cx="2487573" cy="3719736"/>
           </a:xfrm>
           <a:prstGeom prst="rect">
             <a:avLst/>
@@ -15141,7 +15165,7 @@
     </p:spTree>
     <p:extLst>
       <p:ext uri="{BB962C8B-B14F-4D97-AF65-F5344CB8AC3E}">
-        <p14:creationId xmlns="" xmlns:p14="http://schemas.microsoft.com/office/powerpoint/2010/main" val="200703652"/>
+        <p14:creationId xmlns:p14="http://schemas.microsoft.com/office/powerpoint/2010/main" xmlns="" val="200703652"/>
       </p:ext>
     </p:extLst>
   </p:cSld>
@@ -15265,7 +15289,255 @@
     </p:spTree>
     <p:extLst>
       <p:ext uri="{BB962C8B-B14F-4D97-AF65-F5344CB8AC3E}">
-        <p14:creationId xmlns="" xmlns:p14="http://schemas.microsoft.com/office/powerpoint/2010/main" val="200703652"/>
+        <p14:creationId xmlns:p14="http://schemas.microsoft.com/office/powerpoint/2010/main" xmlns="" val="200703652"/>
+      </p:ext>
+    </p:extLst>
+  </p:cSld>
+  <p:clrMapOvr>
+    <a:masterClrMapping/>
+  </p:clrMapOvr>
+  <p:timing>
+    <p:tnLst>
+      <p:par>
+        <p:cTn id="1" dur="indefinite" restart="never" nodeType="tmRoot"/>
+      </p:par>
+    </p:tnLst>
+  </p:timing>
+</p:sld>
+</file>
+
+<file path=ppt/slides/slide16.xml><?xml version="1.0" encoding="utf-8"?>
+<p:sld xmlns:a="http://schemas.openxmlformats.org/drawingml/2006/main" xmlns:r="http://schemas.openxmlformats.org/officeDocument/2006/relationships" xmlns:p="http://schemas.openxmlformats.org/presentationml/2006/main">
+  <p:cSld>
+    <p:spTree>
+      <p:nvGrpSpPr>
+        <p:cNvPr id="1" name=""/>
+        <p:cNvGrpSpPr/>
+        <p:nvPr/>
+      </p:nvGrpSpPr>
+      <p:grpSpPr>
+        <a:xfrm>
+          <a:off x="0" y="0"/>
+          <a:ext cx="0" cy="0"/>
+          <a:chOff x="0" y="0"/>
+          <a:chExt cx="0" cy="0"/>
+        </a:xfrm>
+      </p:grpSpPr>
+      <p:sp>
+        <p:nvSpPr>
+          <p:cNvPr id="6" name="Segnaposto data 5"/>
+          <p:cNvSpPr>
+            <a:spLocks noGrp="1"/>
+          </p:cNvSpPr>
+          <p:nvPr>
+            <p:ph type="dt" sz="half" idx="10"/>
+          </p:nvPr>
+        </p:nvSpPr>
+        <p:spPr/>
+        <p:txBody>
+          <a:bodyPr/>
+          <a:lstStyle/>
+          <a:p>
+            <a:r>
+              <a:rPr lang="it-IT" dirty="0" smtClean="0"/>
+              <a:t>Progetto </a:t>
+            </a:r>
+            <a:r>
+              <a:rPr lang="it-IT" dirty="0" err="1" smtClean="0"/>
+              <a:t>Gamification</a:t>
+            </a:r>
+            <a:r>
+              <a:rPr lang="it-IT" dirty="0" smtClean="0"/>
+              <a:t> - Team </a:t>
+            </a:r>
+            <a:r>
+              <a:rPr lang="it-IT" dirty="0" err="1" smtClean="0"/>
+              <a:t>Committed</a:t>
+            </a:r>
+            <a:endParaRPr lang="it-IT" dirty="0"/>
+          </a:p>
+        </p:txBody>
+      </p:sp>
+      <p:sp>
+        <p:nvSpPr>
+          <p:cNvPr id="9" name="Segnaposto numero diapositiva 8"/>
+          <p:cNvSpPr>
+            <a:spLocks noGrp="1"/>
+          </p:cNvSpPr>
+          <p:nvPr>
+            <p:ph type="sldNum" sz="quarter" idx="12"/>
+          </p:nvPr>
+        </p:nvSpPr>
+        <p:spPr/>
+        <p:txBody>
+          <a:bodyPr/>
+          <a:lstStyle/>
+          <a:p>
+            <a:fld id="{017EC607-BD11-4D4E-AC5F-155C854A0B9D}" type="slidenum">
+              <a:rPr lang="it-IT" smtClean="0"/>
+              <a:pPr/>
+              <a:t>16</a:t>
+            </a:fld>
+            <a:r>
+              <a:rPr lang="it-IT" dirty="0" smtClean="0"/>
+              <a:t> di 67</a:t>
+            </a:r>
+            <a:endParaRPr lang="it-IT" dirty="0"/>
+          </a:p>
+        </p:txBody>
+      </p:sp>
+      <p:pic>
+        <p:nvPicPr>
+          <p:cNvPr id="5" name="Immagine 4" descr="Gui-web-GestioneDomande-Insert.jpg"/>
+          <p:cNvPicPr>
+            <a:picLocks noChangeAspect="1"/>
+          </p:cNvPicPr>
+          <p:nvPr/>
+        </p:nvPicPr>
+        <p:blipFill>
+          <a:blip r:embed="rId2" cstate="print"/>
+          <a:stretch>
+            <a:fillRect/>
+          </a:stretch>
+        </p:blipFill>
+        <p:spPr>
+          <a:xfrm>
+            <a:off x="683568" y="1052736"/>
+            <a:ext cx="7812360" cy="4861024"/>
+          </a:xfrm>
+          <a:prstGeom prst="rect">
+            <a:avLst/>
+          </a:prstGeom>
+        </p:spPr>
+      </p:pic>
+    </p:spTree>
+    <p:extLst>
+      <p:ext uri="{BB962C8B-B14F-4D97-AF65-F5344CB8AC3E}">
+        <p14:creationId xmlns:p14="http://schemas.microsoft.com/office/powerpoint/2010/main" xmlns="" val="200703652"/>
+      </p:ext>
+    </p:extLst>
+  </p:cSld>
+  <p:clrMapOvr>
+    <a:masterClrMapping/>
+  </p:clrMapOvr>
+  <p:timing>
+    <p:tnLst>
+      <p:par>
+        <p:cTn id="1" dur="indefinite" restart="never" nodeType="tmRoot"/>
+      </p:par>
+    </p:tnLst>
+  </p:timing>
+</p:sld>
+</file>
+
+<file path=ppt/slides/slide17.xml><?xml version="1.0" encoding="utf-8"?>
+<p:sld xmlns:a="http://schemas.openxmlformats.org/drawingml/2006/main" xmlns:r="http://schemas.openxmlformats.org/officeDocument/2006/relationships" xmlns:p="http://schemas.openxmlformats.org/presentationml/2006/main">
+  <p:cSld>
+    <p:spTree>
+      <p:nvGrpSpPr>
+        <p:cNvPr id="1" name=""/>
+        <p:cNvGrpSpPr/>
+        <p:nvPr/>
+      </p:nvGrpSpPr>
+      <p:grpSpPr>
+        <a:xfrm>
+          <a:off x="0" y="0"/>
+          <a:ext cx="0" cy="0"/>
+          <a:chOff x="0" y="0"/>
+          <a:chExt cx="0" cy="0"/>
+        </a:xfrm>
+      </p:grpSpPr>
+      <p:sp>
+        <p:nvSpPr>
+          <p:cNvPr id="6" name="Segnaposto data 5"/>
+          <p:cNvSpPr>
+            <a:spLocks noGrp="1"/>
+          </p:cNvSpPr>
+          <p:nvPr>
+            <p:ph type="dt" sz="half" idx="10"/>
+          </p:nvPr>
+        </p:nvSpPr>
+        <p:spPr/>
+        <p:txBody>
+          <a:bodyPr/>
+          <a:lstStyle/>
+          <a:p>
+            <a:r>
+              <a:rPr lang="it-IT" dirty="0" smtClean="0"/>
+              <a:t>Progetto </a:t>
+            </a:r>
+            <a:r>
+              <a:rPr lang="it-IT" dirty="0" err="1" smtClean="0"/>
+              <a:t>Gamification</a:t>
+            </a:r>
+            <a:r>
+              <a:rPr lang="it-IT" dirty="0" smtClean="0"/>
+              <a:t> - Team </a:t>
+            </a:r>
+            <a:r>
+              <a:rPr lang="it-IT" dirty="0" err="1" smtClean="0"/>
+              <a:t>Committed</a:t>
+            </a:r>
+            <a:endParaRPr lang="it-IT" dirty="0"/>
+          </a:p>
+        </p:txBody>
+      </p:sp>
+      <p:sp>
+        <p:nvSpPr>
+          <p:cNvPr id="9" name="Segnaposto numero diapositiva 8"/>
+          <p:cNvSpPr>
+            <a:spLocks noGrp="1"/>
+          </p:cNvSpPr>
+          <p:nvPr>
+            <p:ph type="sldNum" sz="quarter" idx="12"/>
+          </p:nvPr>
+        </p:nvSpPr>
+        <p:spPr/>
+        <p:txBody>
+          <a:bodyPr/>
+          <a:lstStyle/>
+          <a:p>
+            <a:fld id="{017EC607-BD11-4D4E-AC5F-155C854A0B9D}" type="slidenum">
+              <a:rPr lang="it-IT" smtClean="0"/>
+              <a:pPr/>
+              <a:t>17</a:t>
+            </a:fld>
+            <a:r>
+              <a:rPr lang="it-IT" dirty="0" smtClean="0"/>
+              <a:t> di 67</a:t>
+            </a:r>
+            <a:endParaRPr lang="it-IT" dirty="0"/>
+          </a:p>
+        </p:txBody>
+      </p:sp>
+      <p:pic>
+        <p:nvPicPr>
+          <p:cNvPr id="5" name="Immagine 4" descr="Gui-web-GestioneDomande-Insert.jpg"/>
+          <p:cNvPicPr>
+            <a:picLocks noChangeAspect="1"/>
+          </p:cNvPicPr>
+          <p:nvPr/>
+        </p:nvPicPr>
+        <p:blipFill>
+          <a:blip r:embed="rId2" cstate="print"/>
+          <a:stretch>
+            <a:fillRect/>
+          </a:stretch>
+        </p:blipFill>
+        <p:spPr>
+          <a:xfrm>
+            <a:off x="683568" y="1052736"/>
+            <a:ext cx="7812360" cy="4861024"/>
+          </a:xfrm>
+          <a:prstGeom prst="rect">
+            <a:avLst/>
+          </a:prstGeom>
+        </p:spPr>
+      </p:pic>
+    </p:spTree>
+    <p:extLst>
+      <p:ext uri="{BB962C8B-B14F-4D97-AF65-F5344CB8AC3E}">
+        <p14:creationId xmlns:p14="http://schemas.microsoft.com/office/powerpoint/2010/main" xmlns="" val="200703652"/>
       </p:ext>
     </p:extLst>
   </p:cSld>
@@ -15311,7 +15583,7 @@
           <a:blip r:embed="rId2" cstate="print">
             <a:extLst>
               <a:ext uri="{28A0092B-C50C-407E-A947-70E740481C1C}">
-                <a14:useLocalDpi xmlns="" xmlns:a14="http://schemas.microsoft.com/office/drawing/2010/main" val="0"/>
+                <a14:useLocalDpi xmlns:a14="http://schemas.microsoft.com/office/drawing/2010/main" xmlns="" val="0"/>
               </a:ext>
             </a:extLst>
           </a:blip>
@@ -15352,11 +15624,7 @@
             <a:pPr algn="ctr"/>
             <a:r>
               <a:rPr lang="it-IT" dirty="0" smtClean="0"/>
-              <a:t>2</a:t>
-            </a:r>
-            <a:r>
-              <a:rPr lang="it-IT" dirty="0" smtClean="0"/>
-              <a:t>. </a:t>
+              <a:t>2. </a:t>
             </a:r>
             <a:r>
               <a:rPr lang="it-IT" dirty="0" err="1" smtClean="0"/>
@@ -15419,7 +15687,7 @@
     </p:spTree>
     <p:extLst>
       <p:ext uri="{BB962C8B-B14F-4D97-AF65-F5344CB8AC3E}">
-        <p14:creationId xmlns="" xmlns:p14="http://schemas.microsoft.com/office/powerpoint/2010/main" val="2537002"/>
+        <p14:creationId xmlns:p14="http://schemas.microsoft.com/office/powerpoint/2010/main" xmlns="" val="2537002"/>
       </p:ext>
     </p:extLst>
   </p:cSld>
@@ -15543,7 +15811,7 @@
     </p:spTree>
     <p:extLst>
       <p:ext uri="{BB962C8B-B14F-4D97-AF65-F5344CB8AC3E}">
-        <p14:creationId xmlns="" xmlns:p14="http://schemas.microsoft.com/office/powerpoint/2010/main" val="200703652"/>
+        <p14:creationId xmlns:p14="http://schemas.microsoft.com/office/powerpoint/2010/main" xmlns="" val="200703652"/>
       </p:ext>
     </p:extLst>
   </p:cSld>
@@ -15589,7 +15857,7 @@
           <a:blip r:embed="rId2" cstate="print">
             <a:extLst>
               <a:ext uri="{28A0092B-C50C-407E-A947-70E740481C1C}">
-                <a14:useLocalDpi xmlns="" xmlns:a14="http://schemas.microsoft.com/office/drawing/2010/main" val="0"/>
+                <a14:useLocalDpi xmlns:a14="http://schemas.microsoft.com/office/drawing/2010/main" xmlns="" val="0"/>
               </a:ext>
             </a:extLst>
           </a:blip>
@@ -15630,11 +15898,7 @@
             <a:pPr algn="ctr"/>
             <a:r>
               <a:rPr lang="it-IT" dirty="0" smtClean="0"/>
-              <a:t>4</a:t>
-            </a:r>
-            <a:r>
-              <a:rPr lang="it-IT" dirty="0" smtClean="0"/>
-              <a:t>. </a:t>
+              <a:t>4. </a:t>
             </a:r>
             <a:r>
               <a:rPr lang="it-IT" dirty="0" err="1" smtClean="0"/>
@@ -15701,7 +15965,7 @@
     </p:spTree>
     <p:extLst>
       <p:ext uri="{BB962C8B-B14F-4D97-AF65-F5344CB8AC3E}">
-        <p14:creationId xmlns="" xmlns:p14="http://schemas.microsoft.com/office/powerpoint/2010/main" val="2537002"/>
+        <p14:creationId xmlns:p14="http://schemas.microsoft.com/office/powerpoint/2010/main" xmlns="" val="2537002"/>
       </p:ext>
     </p:extLst>
   </p:cSld>
@@ -15825,7 +16089,7 @@
     </p:spTree>
     <p:extLst>
       <p:ext uri="{BB962C8B-B14F-4D97-AF65-F5344CB8AC3E}">
-        <p14:creationId xmlns="" xmlns:p14="http://schemas.microsoft.com/office/powerpoint/2010/main" val="200703652"/>
+        <p14:creationId xmlns:p14="http://schemas.microsoft.com/office/powerpoint/2010/main" xmlns="" val="200703652"/>
       </p:ext>
     </p:extLst>
   </p:cSld>
@@ -15871,7 +16135,7 @@
           <a:blip r:embed="rId2" cstate="print">
             <a:extLst>
               <a:ext uri="{28A0092B-C50C-407E-A947-70E740481C1C}">
-                <a14:useLocalDpi xmlns="" xmlns:a14="http://schemas.microsoft.com/office/drawing/2010/main" val="0"/>
+                <a14:useLocalDpi xmlns:a14="http://schemas.microsoft.com/office/drawing/2010/main" xmlns="" val="0"/>
               </a:ext>
             </a:extLst>
           </a:blip>
@@ -15920,11 +16184,7 @@
             </a:r>
             <a:r>
               <a:rPr lang="it-IT" dirty="0" smtClean="0"/>
-              <a:t> </a:t>
-            </a:r>
-            <a:r>
-              <a:rPr lang="it-IT" dirty="0" smtClean="0"/>
-              <a:t>Mobile</a:t>
+              <a:t> Mobile</a:t>
             </a:r>
             <a:endParaRPr lang="it-IT" dirty="0"/>
           </a:p>
@@ -15983,7 +16243,7 @@
     </p:spTree>
     <p:extLst>
       <p:ext uri="{BB962C8B-B14F-4D97-AF65-F5344CB8AC3E}">
-        <p14:creationId xmlns="" xmlns:p14="http://schemas.microsoft.com/office/powerpoint/2010/main" val="2537002"/>
+        <p14:creationId xmlns:p14="http://schemas.microsoft.com/office/powerpoint/2010/main" xmlns="" val="2537002"/>
       </p:ext>
     </p:extLst>
   </p:cSld>
@@ -16107,7 +16367,7 @@
     </p:spTree>
     <p:extLst>
       <p:ext uri="{BB962C8B-B14F-4D97-AF65-F5344CB8AC3E}">
-        <p14:creationId xmlns="" xmlns:p14="http://schemas.microsoft.com/office/powerpoint/2010/main" val="200703652"/>
+        <p14:creationId xmlns:p14="http://schemas.microsoft.com/office/powerpoint/2010/main" xmlns="" val="200703652"/>
       </p:ext>
     </p:extLst>
   </p:cSld>
@@ -16153,7 +16413,7 @@
           <a:blip r:embed="rId2" cstate="print">
             <a:extLst>
               <a:ext uri="{28A0092B-C50C-407E-A947-70E740481C1C}">
-                <a14:useLocalDpi xmlns="" xmlns:a14="http://schemas.microsoft.com/office/drawing/2010/main" val="0"/>
+                <a14:useLocalDpi xmlns:a14="http://schemas.microsoft.com/office/drawing/2010/main" xmlns="" val="0"/>
               </a:ext>
             </a:extLst>
           </a:blip>
@@ -16194,11 +16454,11 @@
             <a:pPr algn="ctr"/>
             <a:r>
               <a:rPr lang="it-IT" dirty="0" smtClean="0"/>
-              <a:t>7</a:t>
+              <a:t>6</a:t>
             </a:r>
             <a:r>
               <a:rPr lang="it-IT" dirty="0" smtClean="0"/>
-              <a:t>. Prototipi di Interfaccia</a:t>
+              <a:t>. Diagrammi delle Attività</a:t>
             </a:r>
             <a:endParaRPr lang="it-IT" dirty="0"/>
           </a:p>
@@ -16257,7 +16517,7 @@
     </p:spTree>
     <p:extLst>
       <p:ext uri="{BB962C8B-B14F-4D97-AF65-F5344CB8AC3E}">
-        <p14:creationId xmlns="" xmlns:p14="http://schemas.microsoft.com/office/powerpoint/2010/main" val="2537002"/>
+        <p14:creationId xmlns:p14="http://schemas.microsoft.com/office/powerpoint/2010/main" xmlns="" val="2537002"/>
       </p:ext>
     </p:extLst>
   </p:cSld>
@@ -16356,7 +16616,7 @@
       </p:sp>
       <p:pic>
         <p:nvPicPr>
-          <p:cNvPr id="7" name="Immagine 6" descr="Gui-Desk-Login.jpg"/>
+          <p:cNvPr id="7" name="Immagine 6" descr="attivita_generale.png"/>
           <p:cNvPicPr>
             <a:picLocks noChangeAspect="1"/>
           </p:cNvPicPr>
@@ -16370,8 +16630,8 @@
         </p:blipFill>
         <p:spPr>
           <a:xfrm>
-            <a:off x="2123728" y="1916832"/>
-            <a:ext cx="5040560" cy="3173328"/>
+            <a:off x="971600" y="1772816"/>
+            <a:ext cx="7439867" cy="2952328"/>
           </a:xfrm>
           <a:prstGeom prst="rect">
             <a:avLst/>
@@ -16381,7 +16641,7 @@
     </p:spTree>
     <p:extLst>
       <p:ext uri="{BB962C8B-B14F-4D97-AF65-F5344CB8AC3E}">
-        <p14:creationId xmlns="" xmlns:p14="http://schemas.microsoft.com/office/powerpoint/2010/main" val="200703652"/>
+        <p14:creationId xmlns:p14="http://schemas.microsoft.com/office/powerpoint/2010/main" xmlns="" val="200703652"/>
       </p:ext>
     </p:extLst>
   </p:cSld>

</xml_diff>

<commit_message>
[Presentazione] Sistemata la presentazione perchè sballata la sua organizzazione interna. Ho inserito il pdf e il file .lyx della tabella ruoli-persona perchè non saprei come inserirla (Marco, faresti tu per favore?) Inoltre all'interno del file excel ci sono i grafici da inserire.
</commit_message>
<xml_diff>
--- a/RP/Esterni/Presentazione/RP-Presentazione.pptx
+++ b/RP/Esterni/Presentazione/RP-Presentazione.pptx
@@ -5,7 +5,7 @@
     <p:sldMasterId id="2147483732" r:id="rId1"/>
   </p:sldMasterIdLst>
   <p:notesMasterIdLst>
-    <p:notesMasterId r:id="rId19"/>
+    <p:notesMasterId r:id="rId20"/>
   </p:notesMasterIdLst>
   <p:sldIdLst>
     <p:sldId id="256" r:id="rId2"/>
@@ -25,6 +25,7 @@
     <p:sldId id="280" r:id="rId16"/>
     <p:sldId id="281" r:id="rId17"/>
     <p:sldId id="282" r:id="rId18"/>
+    <p:sldId id="285" r:id="rId19"/>
   </p:sldIdLst>
   <p:sldSz cx="9144000" cy="6858000" type="screen4x3"/>
   <p:notesSz cx="6858000" cy="9144000"/>
@@ -125,104 +126,54 @@
   </p:defaultTextStyle>
   <p:extLst>
     <p:ext uri="{521415D9-36F7-43E2-AB2F-B90AF26B5E84}">
-      <p14:sectionLst xmlns:p14="http://schemas.microsoft.com/office/powerpoint/2010/main" xmlns="">
+      <p14:sectionLst xmlns:p14="http://schemas.microsoft.com/office/powerpoint/2010/main">
         <p14:section name="Presentazione" id="{34E9BEB9-075B-4CFE-8BA4-B412D906568B}">
           <p14:sldIdLst>
             <p14:sldId id="256"/>
-            <p14:sldId id="257"/>
-          </p14:sldIdLst>
-        </p14:section>
-        <p14:section name="Descrizione" id="{6219A79B-3513-4FC7-8C97-BF4EC9505F50}">
-          <p14:sldIdLst>
-            <p14:sldId id="266"/>
-            <p14:sldId id="258"/>
-            <p14:sldId id="267"/>
-            <p14:sldId id="259"/>
-            <p14:sldId id="260"/>
-            <p14:sldId id="261"/>
-            <p14:sldId id="263"/>
-            <p14:sldId id="265"/>
-          </p14:sldIdLst>
-        </p14:section>
-        <p14:section name="Studio di fattibilità" id="{9803A084-00CD-45F5-A431-DE7866E01E45}">
-          <p14:sldIdLst>
-            <p14:sldId id="308"/>
-            <p14:sldId id="309"/>
-            <p14:sldId id="310"/>
-            <p14:sldId id="311"/>
-            <p14:sldId id="312"/>
-            <p14:sldId id="313"/>
-            <p14:sldId id="314"/>
-            <p14:sldId id="315"/>
-            <p14:sldId id="316"/>
-            <p14:sldId id="317"/>
-          </p14:sldIdLst>
-        </p14:section>
-        <p14:section name="Analisi dei requisiti" id="{CBE3E966-F4A3-44C2-AFCF-28AFB5D6F6F9}">
-          <p14:sldIdLst>
-            <p14:sldId id="282"/>
-            <p14:sldId id="283"/>
-            <p14:sldId id="284"/>
-            <p14:sldId id="285"/>
-            <p14:sldId id="286"/>
-            <p14:sldId id="287"/>
-            <p14:sldId id="318"/>
-            <p14:sldId id="319"/>
-            <p14:sldId id="320"/>
-            <p14:sldId id="321"/>
-            <p14:sldId id="322"/>
-            <p14:sldId id="323"/>
-            <p14:sldId id="324"/>
-          </p14:sldIdLst>
-        </p14:section>
-        <p14:section name="Piano di Qualifica" id="{E780F9A5-37C5-48FF-AE02-2985A4AE9384}">
-          <p14:sldIdLst>
-            <p14:sldId id="278"/>
-            <p14:sldId id="279"/>
-            <p14:sldId id="281"/>
-            <p14:sldId id="280"/>
           </p14:sldIdLst>
         </p14:section>
         <p14:section name="Norme di Progetto" id="{971F0FE5-E1A9-4D70-B37A-4393ED988001}">
+          <p14:sldIdLst/>
+        </p14:section>
+        <p14:section name="Back-end" id="{B1AC9BCB-654F-44A6-9A36-56CD55C0B211}">
           <p14:sldIdLst>
-            <p14:sldId id="300"/>
-            <p14:sldId id="288"/>
-            <p14:sldId id="289"/>
-            <p14:sldId id="290"/>
-            <p14:sldId id="291"/>
-            <p14:sldId id="292"/>
-            <p14:sldId id="293"/>
-            <p14:sldId id="294"/>
-            <p14:sldId id="295"/>
-            <p14:sldId id="296"/>
-            <p14:sldId id="297"/>
-            <p14:sldId id="298"/>
-            <p14:sldId id="299"/>
+            <p14:sldId id="269"/>
+            <p14:sldId id="274"/>
           </p14:sldIdLst>
         </p14:section>
-        <p14:section name="Piano di Progetto" id="{B1AC9BCB-654F-44A6-9A36-56CD55C0B211}">
+        <p14:section name="Front-end Web" id="{6219A79B-3513-4FC7-8C97-BF4EC9505F50}">
           <p14:sldIdLst>
-            <p14:sldId id="268"/>
-            <p14:sldId id="269"/>
-            <p14:sldId id="270"/>
-            <p14:sldId id="271"/>
-            <p14:sldId id="272"/>
-            <p14:sldId id="273"/>
-            <p14:sldId id="274"/>
-            <p14:sldId id="275"/>
-            <p14:sldId id="276"/>
-            <p14:sldId id="277"/>
+            <p14:sldId id="267"/>
+            <p14:sldId id="258"/>
           </p14:sldIdLst>
         </p14:section>
-        <p14:section name="Preventivo" id="{4B5ACF17-8ACC-4077-A4BF-9871FAE06CA9}">
+        <p14:section name="Front-end Mobile" id="{9803A084-00CD-45F5-A431-DE7866E01E45}">
           <p14:sldIdLst>
-            <p14:sldId id="301"/>
-            <p14:sldId id="302"/>
-            <p14:sldId id="303"/>
-            <p14:sldId id="304"/>
-            <p14:sldId id="305"/>
-            <p14:sldId id="306"/>
-            <p14:sldId id="307"/>
+            <p14:sldId id="270"/>
+            <p14:sldId id="275"/>
+          </p14:sldIdLst>
+        </p14:section>
+        <p14:section name="Diagrammi delle Attività" id="{CBE3E966-F4A3-44C2-AFCF-28AFB5D6F6F9}">
+          <p14:sldIdLst>
+            <p14:sldId id="283"/>
+            <p14:sldId id="284"/>
+          </p14:sldIdLst>
+        </p14:section>
+        <p14:section name="Prototipo grafico" id="{E780F9A5-37C5-48FF-AE02-2985A4AE9384}">
+          <p14:sldIdLst>
+            <p14:sldId id="272"/>
+            <p14:sldId id="276"/>
+            <p14:sldId id="279"/>
+            <p14:sldId id="277"/>
+            <p14:sldId id="278"/>
+            <p14:sldId id="280"/>
+            <p14:sldId id="281"/>
+            <p14:sldId id="282"/>
+          </p14:sldIdLst>
+        </p14:section>
+        <p14:section name="Consuntivo" id="{4B5ACF17-8ACC-4077-A4BF-9871FAE06CA9}">
+          <p14:sldIdLst>
+            <p14:sldId id="285"/>
           </p14:sldIdLst>
         </p14:section>
       </p14:sectionLst>
@@ -483,7 +434,7 @@
     </p:spTree>
     <p:extLst>
       <p:ext uri="{BB962C8B-B14F-4D97-AF65-F5344CB8AC3E}">
-        <p14:creationId xmlns:p14="http://schemas.microsoft.com/office/powerpoint/2010/main" xmlns="" val="1382979574"/>
+        <p14:creationId xmlns:p14="http://schemas.microsoft.com/office/powerpoint/2010/main" val="1382979574"/>
       </p:ext>
     </p:extLst>
   </p:cSld>
@@ -658,7 +609,7 @@
     </p:spTree>
     <p:extLst>
       <p:ext uri="{BB962C8B-B14F-4D97-AF65-F5344CB8AC3E}">
-        <p14:creationId xmlns:p14="http://schemas.microsoft.com/office/powerpoint/2010/main" xmlns="" val="4174330178"/>
+        <p14:creationId xmlns:p14="http://schemas.microsoft.com/office/powerpoint/2010/main" val="4174330178"/>
       </p:ext>
     </p:extLst>
   </p:cSld>
@@ -14320,7 +14271,7 @@
         </p:spPr>
         <p:txBody>
           <a:bodyPr>
-            <a:normAutofit/>
+            <a:normAutofit fontScale="90000"/>
           </a:bodyPr>
           <a:lstStyle/>
           <a:p>
@@ -14361,7 +14312,15 @@
                   <a:schemeClr val="tx1"/>
                 </a:solidFill>
               </a:rPr>
-              <a:t>Revisione dei Requisiti</a:t>
+              <a:t>Revisione </a:t>
+            </a:r>
+            <a:r>
+              <a:rPr lang="it-IT" sz="2800" dirty="0" smtClean="0">
+                <a:solidFill>
+                  <a:schemeClr val="tx1"/>
+                </a:solidFill>
+              </a:rPr>
+              <a:t>di Progettazione</a:t>
             </a:r>
             <a:endParaRPr lang="it-IT" dirty="0">
               <a:solidFill>
@@ -14430,7 +14389,7 @@
           <a:blip r:embed="rId3" cstate="print">
             <a:extLst>
               <a:ext uri="{28A0092B-C50C-407E-A947-70E740481C1C}">
-                <a14:useLocalDpi xmlns:a14="http://schemas.microsoft.com/office/drawing/2010/main" xmlns="" val="0"/>
+                <a14:useLocalDpi xmlns:a14="http://schemas.microsoft.com/office/drawing/2010/main" val="0"/>
               </a:ext>
             </a:extLst>
           </a:blip>
@@ -14451,7 +14410,7 @@
     </p:spTree>
     <p:extLst>
       <p:ext uri="{BB962C8B-B14F-4D97-AF65-F5344CB8AC3E}">
-        <p14:creationId xmlns:p14="http://schemas.microsoft.com/office/powerpoint/2010/main" xmlns="" val="3567273252"/>
+        <p14:creationId xmlns:p14="http://schemas.microsoft.com/office/powerpoint/2010/main" val="3567273252"/>
       </p:ext>
     </p:extLst>
   </p:cSld>
@@ -14497,7 +14456,7 @@
           <a:blip r:embed="rId2" cstate="print">
             <a:extLst>
               <a:ext uri="{28A0092B-C50C-407E-A947-70E740481C1C}">
-                <a14:useLocalDpi xmlns:a14="http://schemas.microsoft.com/office/drawing/2010/main" xmlns="" val="0"/>
+                <a14:useLocalDpi xmlns:a14="http://schemas.microsoft.com/office/drawing/2010/main" val="0"/>
               </a:ext>
             </a:extLst>
           </a:blip>
@@ -14597,7 +14556,7 @@
     </p:spTree>
     <p:extLst>
       <p:ext uri="{BB962C8B-B14F-4D97-AF65-F5344CB8AC3E}">
-        <p14:creationId xmlns:p14="http://schemas.microsoft.com/office/powerpoint/2010/main" xmlns="" val="2537002"/>
+        <p14:creationId xmlns:p14="http://schemas.microsoft.com/office/powerpoint/2010/main" val="2537002"/>
       </p:ext>
     </p:extLst>
   </p:cSld>
@@ -14721,7 +14680,7 @@
     </p:spTree>
     <p:extLst>
       <p:ext uri="{BB962C8B-B14F-4D97-AF65-F5344CB8AC3E}">
-        <p14:creationId xmlns:p14="http://schemas.microsoft.com/office/powerpoint/2010/main" xmlns="" val="200703652"/>
+        <p14:creationId xmlns:p14="http://schemas.microsoft.com/office/powerpoint/2010/main" val="200703652"/>
       </p:ext>
     </p:extLst>
   </p:cSld>
@@ -14845,7 +14804,7 @@
     </p:spTree>
     <p:extLst>
       <p:ext uri="{BB962C8B-B14F-4D97-AF65-F5344CB8AC3E}">
-        <p14:creationId xmlns:p14="http://schemas.microsoft.com/office/powerpoint/2010/main" xmlns="" val="200703652"/>
+        <p14:creationId xmlns:p14="http://schemas.microsoft.com/office/powerpoint/2010/main" val="200703652"/>
       </p:ext>
     </p:extLst>
   </p:cSld>
@@ -14993,7 +14952,7 @@
     </p:spTree>
     <p:extLst>
       <p:ext uri="{BB962C8B-B14F-4D97-AF65-F5344CB8AC3E}">
-        <p14:creationId xmlns:p14="http://schemas.microsoft.com/office/powerpoint/2010/main" xmlns="" val="200703652"/>
+        <p14:creationId xmlns:p14="http://schemas.microsoft.com/office/powerpoint/2010/main" val="200703652"/>
       </p:ext>
     </p:extLst>
   </p:cSld>
@@ -15165,7 +15124,7 @@
     </p:spTree>
     <p:extLst>
       <p:ext uri="{BB962C8B-B14F-4D97-AF65-F5344CB8AC3E}">
-        <p14:creationId xmlns:p14="http://schemas.microsoft.com/office/powerpoint/2010/main" xmlns="" val="200703652"/>
+        <p14:creationId xmlns:p14="http://schemas.microsoft.com/office/powerpoint/2010/main" val="200703652"/>
       </p:ext>
     </p:extLst>
   </p:cSld>
@@ -15289,7 +15248,7 @@
     </p:spTree>
     <p:extLst>
       <p:ext uri="{BB962C8B-B14F-4D97-AF65-F5344CB8AC3E}">
-        <p14:creationId xmlns:p14="http://schemas.microsoft.com/office/powerpoint/2010/main" xmlns="" val="200703652"/>
+        <p14:creationId xmlns:p14="http://schemas.microsoft.com/office/powerpoint/2010/main" val="200703652"/>
       </p:ext>
     </p:extLst>
   </p:cSld>
@@ -15413,7 +15372,7 @@
     </p:spTree>
     <p:extLst>
       <p:ext uri="{BB962C8B-B14F-4D97-AF65-F5344CB8AC3E}">
-        <p14:creationId xmlns:p14="http://schemas.microsoft.com/office/powerpoint/2010/main" xmlns="" val="200703652"/>
+        <p14:creationId xmlns:p14="http://schemas.microsoft.com/office/powerpoint/2010/main" val="200703652"/>
       </p:ext>
     </p:extLst>
   </p:cSld>
@@ -15537,7 +15496,153 @@
     </p:spTree>
     <p:extLst>
       <p:ext uri="{BB962C8B-B14F-4D97-AF65-F5344CB8AC3E}">
-        <p14:creationId xmlns:p14="http://schemas.microsoft.com/office/powerpoint/2010/main" xmlns="" val="200703652"/>
+        <p14:creationId xmlns:p14="http://schemas.microsoft.com/office/powerpoint/2010/main" val="200703652"/>
+      </p:ext>
+    </p:extLst>
+  </p:cSld>
+  <p:clrMapOvr>
+    <a:masterClrMapping/>
+  </p:clrMapOvr>
+  <p:timing>
+    <p:tnLst>
+      <p:par>
+        <p:cTn id="1" dur="indefinite" restart="never" nodeType="tmRoot"/>
+      </p:par>
+    </p:tnLst>
+  </p:timing>
+</p:sld>
+</file>
+
+<file path=ppt/slides/slide18.xml><?xml version="1.0" encoding="utf-8"?>
+<p:sld xmlns:a="http://schemas.openxmlformats.org/drawingml/2006/main" xmlns:r="http://schemas.openxmlformats.org/officeDocument/2006/relationships" xmlns:p="http://schemas.openxmlformats.org/presentationml/2006/main">
+  <p:cSld>
+    <p:spTree>
+      <p:nvGrpSpPr>
+        <p:cNvPr id="1" name=""/>
+        <p:cNvGrpSpPr/>
+        <p:nvPr/>
+      </p:nvGrpSpPr>
+      <p:grpSpPr>
+        <a:xfrm>
+          <a:off x="0" y="0"/>
+          <a:ext cx="0" cy="0"/>
+          <a:chOff x="0" y="0"/>
+          <a:chExt cx="0" cy="0"/>
+        </a:xfrm>
+      </p:grpSpPr>
+      <p:pic>
+        <p:nvPicPr>
+          <p:cNvPr id="3" name="Immagine 2"/>
+          <p:cNvPicPr>
+            <a:picLocks noChangeAspect="1"/>
+          </p:cNvPicPr>
+          <p:nvPr/>
+        </p:nvPicPr>
+        <p:blipFill>
+          <a:blip r:embed="rId2" cstate="print">
+            <a:extLst>
+              <a:ext uri="{28A0092B-C50C-407E-A947-70E740481C1C}">
+                <a14:useLocalDpi xmlns:a14="http://schemas.microsoft.com/office/drawing/2010/main" val="0"/>
+              </a:ext>
+            </a:extLst>
+          </a:blip>
+          <a:stretch>
+            <a:fillRect/>
+          </a:stretch>
+        </p:blipFill>
+        <p:spPr>
+          <a:xfrm>
+            <a:off x="2750630" y="1268760"/>
+            <a:ext cx="3765586" cy="4581128"/>
+          </a:xfrm>
+          <a:prstGeom prst="rect">
+            <a:avLst/>
+          </a:prstGeom>
+        </p:spPr>
+      </p:pic>
+      <p:sp>
+        <p:nvSpPr>
+          <p:cNvPr id="2" name="Titolo 1"/>
+          <p:cNvSpPr>
+            <a:spLocks noGrp="1"/>
+          </p:cNvSpPr>
+          <p:nvPr>
+            <p:ph type="title"/>
+          </p:nvPr>
+        </p:nvSpPr>
+        <p:spPr>
+          <a:xfrm>
+            <a:off x="1043608" y="2996952"/>
+            <a:ext cx="7024744" cy="1143000"/>
+          </a:xfrm>
+        </p:spPr>
+        <p:txBody>
+          <a:bodyPr/>
+          <a:lstStyle/>
+          <a:p>
+            <a:pPr algn="ctr"/>
+            <a:r>
+              <a:rPr lang="it-IT" dirty="0" smtClean="0"/>
+              <a:t>8. Consuntivo</a:t>
+            </a:r>
+            <a:endParaRPr lang="it-IT" dirty="0"/>
+          </a:p>
+        </p:txBody>
+      </p:sp>
+      <p:sp>
+        <p:nvSpPr>
+          <p:cNvPr id="4" name="Segnaposto data 3"/>
+          <p:cNvSpPr>
+            <a:spLocks noGrp="1"/>
+          </p:cNvSpPr>
+          <p:nvPr>
+            <p:ph type="dt" sz="half" idx="10"/>
+          </p:nvPr>
+        </p:nvSpPr>
+        <p:spPr/>
+        <p:txBody>
+          <a:bodyPr/>
+          <a:lstStyle/>
+          <a:p>
+            <a:r>
+              <a:rPr lang="it-IT" smtClean="0"/>
+              <a:t>Progetto Gamification - Team Committed</a:t>
+            </a:r>
+            <a:endParaRPr lang="it-IT"/>
+          </a:p>
+        </p:txBody>
+      </p:sp>
+      <p:sp>
+        <p:nvSpPr>
+          <p:cNvPr id="7" name="Segnaposto numero diapositiva 6"/>
+          <p:cNvSpPr>
+            <a:spLocks noGrp="1"/>
+          </p:cNvSpPr>
+          <p:nvPr>
+            <p:ph type="sldNum" sz="quarter" idx="12"/>
+          </p:nvPr>
+        </p:nvSpPr>
+        <p:spPr/>
+        <p:txBody>
+          <a:bodyPr/>
+          <a:lstStyle/>
+          <a:p>
+            <a:fld id="{017EC607-BD11-4D4E-AC5F-155C854A0B9D}" type="slidenum">
+              <a:rPr lang="it-IT" smtClean="0"/>
+              <a:pPr/>
+              <a:t>18</a:t>
+            </a:fld>
+            <a:r>
+              <a:rPr lang="it-IT" dirty="0" smtClean="0"/>
+              <a:t> di 67</a:t>
+            </a:r>
+          </a:p>
+        </p:txBody>
+      </p:sp>
+    </p:spTree>
+    <p:extLst>
+      <p:ext uri="{BB962C8B-B14F-4D97-AF65-F5344CB8AC3E}">
+        <p14:creationId xmlns:p14="http://schemas.microsoft.com/office/powerpoint/2010/main" val="1165397648"/>
       </p:ext>
     </p:extLst>
   </p:cSld>
@@ -15583,7 +15688,7 @@
           <a:blip r:embed="rId2" cstate="print">
             <a:extLst>
               <a:ext uri="{28A0092B-C50C-407E-A947-70E740481C1C}">
-                <a14:useLocalDpi xmlns:a14="http://schemas.microsoft.com/office/drawing/2010/main" xmlns="" val="0"/>
+                <a14:useLocalDpi xmlns:a14="http://schemas.microsoft.com/office/drawing/2010/main" val="0"/>
               </a:ext>
             </a:extLst>
           </a:blip>
@@ -15687,7 +15792,7 @@
     </p:spTree>
     <p:extLst>
       <p:ext uri="{BB962C8B-B14F-4D97-AF65-F5344CB8AC3E}">
-        <p14:creationId xmlns:p14="http://schemas.microsoft.com/office/powerpoint/2010/main" xmlns="" val="2537002"/>
+        <p14:creationId xmlns:p14="http://schemas.microsoft.com/office/powerpoint/2010/main" val="2537002"/>
       </p:ext>
     </p:extLst>
   </p:cSld>
@@ -15811,7 +15916,7 @@
     </p:spTree>
     <p:extLst>
       <p:ext uri="{BB962C8B-B14F-4D97-AF65-F5344CB8AC3E}">
-        <p14:creationId xmlns:p14="http://schemas.microsoft.com/office/powerpoint/2010/main" xmlns="" val="200703652"/>
+        <p14:creationId xmlns:p14="http://schemas.microsoft.com/office/powerpoint/2010/main" val="200703652"/>
       </p:ext>
     </p:extLst>
   </p:cSld>
@@ -15857,7 +15962,7 @@
           <a:blip r:embed="rId2" cstate="print">
             <a:extLst>
               <a:ext uri="{28A0092B-C50C-407E-A947-70E740481C1C}">
-                <a14:useLocalDpi xmlns:a14="http://schemas.microsoft.com/office/drawing/2010/main" xmlns="" val="0"/>
+                <a14:useLocalDpi xmlns:a14="http://schemas.microsoft.com/office/drawing/2010/main" val="0"/>
               </a:ext>
             </a:extLst>
           </a:blip>
@@ -15965,7 +16070,7 @@
     </p:spTree>
     <p:extLst>
       <p:ext uri="{BB962C8B-B14F-4D97-AF65-F5344CB8AC3E}">
-        <p14:creationId xmlns:p14="http://schemas.microsoft.com/office/powerpoint/2010/main" xmlns="" val="2537002"/>
+        <p14:creationId xmlns:p14="http://schemas.microsoft.com/office/powerpoint/2010/main" val="2537002"/>
       </p:ext>
     </p:extLst>
   </p:cSld>
@@ -16089,7 +16194,7 @@
     </p:spTree>
     <p:extLst>
       <p:ext uri="{BB962C8B-B14F-4D97-AF65-F5344CB8AC3E}">
-        <p14:creationId xmlns:p14="http://schemas.microsoft.com/office/powerpoint/2010/main" xmlns="" val="200703652"/>
+        <p14:creationId xmlns:p14="http://schemas.microsoft.com/office/powerpoint/2010/main" val="200703652"/>
       </p:ext>
     </p:extLst>
   </p:cSld>
@@ -16135,7 +16240,7 @@
           <a:blip r:embed="rId2" cstate="print">
             <a:extLst>
               <a:ext uri="{28A0092B-C50C-407E-A947-70E740481C1C}">
-                <a14:useLocalDpi xmlns:a14="http://schemas.microsoft.com/office/drawing/2010/main" xmlns="" val="0"/>
+                <a14:useLocalDpi xmlns:a14="http://schemas.microsoft.com/office/drawing/2010/main" val="0"/>
               </a:ext>
             </a:extLst>
           </a:blip>
@@ -16243,7 +16348,7 @@
     </p:spTree>
     <p:extLst>
       <p:ext uri="{BB962C8B-B14F-4D97-AF65-F5344CB8AC3E}">
-        <p14:creationId xmlns:p14="http://schemas.microsoft.com/office/powerpoint/2010/main" xmlns="" val="2537002"/>
+        <p14:creationId xmlns:p14="http://schemas.microsoft.com/office/powerpoint/2010/main" val="2537002"/>
       </p:ext>
     </p:extLst>
   </p:cSld>
@@ -16367,7 +16472,7 @@
     </p:spTree>
     <p:extLst>
       <p:ext uri="{BB962C8B-B14F-4D97-AF65-F5344CB8AC3E}">
-        <p14:creationId xmlns:p14="http://schemas.microsoft.com/office/powerpoint/2010/main" xmlns="" val="200703652"/>
+        <p14:creationId xmlns:p14="http://schemas.microsoft.com/office/powerpoint/2010/main" val="200703652"/>
       </p:ext>
     </p:extLst>
   </p:cSld>
@@ -16413,7 +16518,7 @@
           <a:blip r:embed="rId2" cstate="print">
             <a:extLst>
               <a:ext uri="{28A0092B-C50C-407E-A947-70E740481C1C}">
-                <a14:useLocalDpi xmlns:a14="http://schemas.microsoft.com/office/drawing/2010/main" xmlns="" val="0"/>
+                <a14:useLocalDpi xmlns:a14="http://schemas.microsoft.com/office/drawing/2010/main" val="0"/>
               </a:ext>
             </a:extLst>
           </a:blip>
@@ -16454,11 +16559,7 @@
             <a:pPr algn="ctr"/>
             <a:r>
               <a:rPr lang="it-IT" dirty="0" smtClean="0"/>
-              <a:t>6</a:t>
-            </a:r>
-            <a:r>
-              <a:rPr lang="it-IT" dirty="0" smtClean="0"/>
-              <a:t>. Diagrammi delle Attività</a:t>
+              <a:t>6. Diagrammi delle Attività</a:t>
             </a:r>
             <a:endParaRPr lang="it-IT" dirty="0"/>
           </a:p>
@@ -16517,7 +16618,7 @@
     </p:spTree>
     <p:extLst>
       <p:ext uri="{BB962C8B-B14F-4D97-AF65-F5344CB8AC3E}">
-        <p14:creationId xmlns:p14="http://schemas.microsoft.com/office/powerpoint/2010/main" xmlns="" val="2537002"/>
+        <p14:creationId xmlns:p14="http://schemas.microsoft.com/office/powerpoint/2010/main" val="2537002"/>
       </p:ext>
     </p:extLst>
   </p:cSld>
@@ -16641,7 +16742,7 @@
     </p:spTree>
     <p:extLst>
       <p:ext uri="{BB962C8B-B14F-4D97-AF65-F5344CB8AC3E}">
-        <p14:creationId xmlns:p14="http://schemas.microsoft.com/office/powerpoint/2010/main" xmlns="" val="200703652"/>
+        <p14:creationId xmlns:p14="http://schemas.microsoft.com/office/powerpoint/2010/main" val="200703652"/>
       </p:ext>
     </p:extLst>
   </p:cSld>

</xml_diff>

<commit_message>
[Presentazione] Fatta la mia parte e già aggiunta alla presentazione + creato indice
</commit_message>
<xml_diff>
--- a/RP/Esterni/Presentazione/RP-Presentazione.pptx
+++ b/RP/Esterni/Presentazione/RP-Presentazione.pptx
@@ -5,27 +5,31 @@
     <p:sldMasterId id="2147483732" r:id="rId1"/>
   </p:sldMasterIdLst>
   <p:notesMasterIdLst>
-    <p:notesMasterId r:id="rId20"/>
+    <p:notesMasterId r:id="rId24"/>
   </p:notesMasterIdLst>
   <p:sldIdLst>
     <p:sldId id="256" r:id="rId2"/>
-    <p:sldId id="269" r:id="rId3"/>
-    <p:sldId id="274" r:id="rId4"/>
-    <p:sldId id="267" r:id="rId5"/>
-    <p:sldId id="258" r:id="rId6"/>
-    <p:sldId id="270" r:id="rId7"/>
-    <p:sldId id="275" r:id="rId8"/>
-    <p:sldId id="283" r:id="rId9"/>
-    <p:sldId id="284" r:id="rId10"/>
-    <p:sldId id="272" r:id="rId11"/>
-    <p:sldId id="276" r:id="rId12"/>
-    <p:sldId id="279" r:id="rId13"/>
-    <p:sldId id="277" r:id="rId14"/>
-    <p:sldId id="278" r:id="rId15"/>
-    <p:sldId id="280" r:id="rId16"/>
-    <p:sldId id="281" r:id="rId17"/>
-    <p:sldId id="282" r:id="rId18"/>
-    <p:sldId id="285" r:id="rId19"/>
+    <p:sldId id="289" r:id="rId3"/>
+    <p:sldId id="269" r:id="rId4"/>
+    <p:sldId id="274" r:id="rId5"/>
+    <p:sldId id="267" r:id="rId6"/>
+    <p:sldId id="258" r:id="rId7"/>
+    <p:sldId id="270" r:id="rId8"/>
+    <p:sldId id="275" r:id="rId9"/>
+    <p:sldId id="283" r:id="rId10"/>
+    <p:sldId id="284" r:id="rId11"/>
+    <p:sldId id="272" r:id="rId12"/>
+    <p:sldId id="276" r:id="rId13"/>
+    <p:sldId id="279" r:id="rId14"/>
+    <p:sldId id="277" r:id="rId15"/>
+    <p:sldId id="278" r:id="rId16"/>
+    <p:sldId id="280" r:id="rId17"/>
+    <p:sldId id="281" r:id="rId18"/>
+    <p:sldId id="282" r:id="rId19"/>
+    <p:sldId id="285" r:id="rId20"/>
+    <p:sldId id="286" r:id="rId21"/>
+    <p:sldId id="287" r:id="rId22"/>
+    <p:sldId id="288" r:id="rId23"/>
   </p:sldIdLst>
   <p:sldSz cx="9144000" cy="6858000" type="screen4x3"/>
   <p:notesSz cx="6858000" cy="9144000"/>
@@ -132,8 +136,10 @@
             <p14:sldId id="256"/>
           </p14:sldIdLst>
         </p14:section>
-        <p14:section name="Norme di Progetto" id="{971F0FE5-E1A9-4D70-B37A-4393ED988001}">
-          <p14:sldIdLst/>
+        <p14:section name="Indice" id="{971F0FE5-E1A9-4D70-B37A-4393ED988001}">
+          <p14:sldIdLst>
+            <p14:sldId id="289"/>
+          </p14:sldIdLst>
         </p14:section>
         <p14:section name="Back-end" id="{B1AC9BCB-654F-44A6-9A36-56CD55C0B211}">
           <p14:sldIdLst>
@@ -174,12 +180,494 @@
         <p14:section name="Consuntivo" id="{4B5ACF17-8ACC-4077-A4BF-9871FAE06CA9}">
           <p14:sldIdLst>
             <p14:sldId id="285"/>
+            <p14:sldId id="286"/>
+            <p14:sldId id="287"/>
+            <p14:sldId id="288"/>
           </p14:sldIdLst>
         </p14:section>
       </p14:sectionLst>
     </p:ext>
   </p:extLst>
 </p:presentation>
+</file>
+
+<file path=ppt/charts/chart1.xml><?xml version="1.0" encoding="utf-8"?>
+<c:chartSpace xmlns:c="http://schemas.openxmlformats.org/drawingml/2006/chart" xmlns:a="http://schemas.openxmlformats.org/drawingml/2006/main" xmlns:r="http://schemas.openxmlformats.org/officeDocument/2006/relationships">
+  <c:date1904 val="0"/>
+  <c:lang val="it-IT"/>
+  <c:roundedCorners val="0"/>
+  <mc:AlternateContent xmlns:mc="http://schemas.openxmlformats.org/markup-compatibility/2006">
+    <mc:Choice xmlns:c14="http://schemas.microsoft.com/office/drawing/2007/8/2/chart" Requires="c14">
+      <c14:style val="105"/>
+    </mc:Choice>
+    <mc:Fallback>
+      <c:style val="5"/>
+    </mc:Fallback>
+  </mc:AlternateContent>
+  <c:chart>
+    <c:autoTitleDeleted val="0"/>
+    <c:view3D>
+      <c:rotX val="15"/>
+      <c:rotY val="20"/>
+      <c:rAngAx val="1"/>
+    </c:view3D>
+    <c:floor>
+      <c:thickness val="0"/>
+    </c:floor>
+    <c:sideWall>
+      <c:thickness val="0"/>
+    </c:sideWall>
+    <c:backWall>
+      <c:thickness val="0"/>
+    </c:backWall>
+    <c:plotArea>
+      <c:layout/>
+      <c:bar3DChart>
+        <c:barDir val="bar"/>
+        <c:grouping val="clustered"/>
+        <c:varyColors val="0"/>
+        <c:ser>
+          <c:idx val="0"/>
+          <c:order val="0"/>
+          <c:tx>
+            <c:v>Preventivo</c:v>
+          </c:tx>
+          <c:invertIfNegative val="0"/>
+          <c:dLbls>
+            <c:showLegendKey val="0"/>
+            <c:showVal val="1"/>
+            <c:showCatName val="0"/>
+            <c:showSerName val="0"/>
+            <c:showPercent val="0"/>
+            <c:showBubbleSize val="0"/>
+            <c:showLeaderLines val="0"/>
+          </c:dLbls>
+          <c:cat>
+            <c:strRef>
+              <c:f>'2_PA'!$O$2:$O$6</c:f>
+              <c:strCache>
+                <c:ptCount val="5"/>
+                <c:pt idx="0">
+                  <c:v>Responsabile</c:v>
+                </c:pt>
+                <c:pt idx="1">
+                  <c:v>Amministratore</c:v>
+                </c:pt>
+                <c:pt idx="2">
+                  <c:v>Analista</c:v>
+                </c:pt>
+                <c:pt idx="3">
+                  <c:v>Verificatore</c:v>
+                </c:pt>
+                <c:pt idx="4">
+                  <c:v>Progettista</c:v>
+                </c:pt>
+              </c:strCache>
+            </c:strRef>
+          </c:cat>
+          <c:val>
+            <c:numRef>
+              <c:f>'2_PA'!$P$25:$P$29</c:f>
+              <c:numCache>
+                <c:formatCode>General</c:formatCode>
+                <c:ptCount val="5"/>
+                <c:pt idx="0">
+                  <c:v>17</c:v>
+                </c:pt>
+                <c:pt idx="1">
+                  <c:v>19</c:v>
+                </c:pt>
+                <c:pt idx="2">
+                  <c:v>30</c:v>
+                </c:pt>
+                <c:pt idx="3">
+                  <c:v>31</c:v>
+                </c:pt>
+                <c:pt idx="4">
+                  <c:v>96</c:v>
+                </c:pt>
+              </c:numCache>
+            </c:numRef>
+          </c:val>
+        </c:ser>
+        <c:ser>
+          <c:idx val="1"/>
+          <c:order val="1"/>
+          <c:tx>
+            <c:v>Consuntivo</c:v>
+          </c:tx>
+          <c:invertIfNegative val="0"/>
+          <c:dLbls>
+            <c:showLegendKey val="0"/>
+            <c:showVal val="1"/>
+            <c:showCatName val="0"/>
+            <c:showSerName val="0"/>
+            <c:showPercent val="0"/>
+            <c:showBubbleSize val="0"/>
+            <c:showLeaderLines val="0"/>
+          </c:dLbls>
+          <c:cat>
+            <c:strRef>
+              <c:f>'2_PA'!$O$2:$O$6</c:f>
+              <c:strCache>
+                <c:ptCount val="5"/>
+                <c:pt idx="0">
+                  <c:v>Responsabile</c:v>
+                </c:pt>
+                <c:pt idx="1">
+                  <c:v>Amministratore</c:v>
+                </c:pt>
+                <c:pt idx="2">
+                  <c:v>Analista</c:v>
+                </c:pt>
+                <c:pt idx="3">
+                  <c:v>Verificatore</c:v>
+                </c:pt>
+                <c:pt idx="4">
+                  <c:v>Progettista</c:v>
+                </c:pt>
+              </c:strCache>
+            </c:strRef>
+          </c:cat>
+          <c:val>
+            <c:numRef>
+              <c:f>'2_PA'!$P$2:$P$6</c:f>
+              <c:numCache>
+                <c:formatCode>General</c:formatCode>
+                <c:ptCount val="5"/>
+                <c:pt idx="0">
+                  <c:v>17</c:v>
+                </c:pt>
+                <c:pt idx="1">
+                  <c:v>19</c:v>
+                </c:pt>
+                <c:pt idx="2">
+                  <c:v>20</c:v>
+                </c:pt>
+                <c:pt idx="3">
+                  <c:v>31</c:v>
+                </c:pt>
+                <c:pt idx="4">
+                  <c:v>106</c:v>
+                </c:pt>
+              </c:numCache>
+            </c:numRef>
+          </c:val>
+        </c:ser>
+        <c:dLbls>
+          <c:showLegendKey val="0"/>
+          <c:showVal val="0"/>
+          <c:showCatName val="0"/>
+          <c:showSerName val="0"/>
+          <c:showPercent val="0"/>
+          <c:showBubbleSize val="0"/>
+        </c:dLbls>
+        <c:gapWidth val="150"/>
+        <c:shape val="box"/>
+        <c:axId val="45131648"/>
+        <c:axId val="45133184"/>
+        <c:axId val="0"/>
+      </c:bar3DChart>
+      <c:catAx>
+        <c:axId val="45131648"/>
+        <c:scaling>
+          <c:orientation val="minMax"/>
+        </c:scaling>
+        <c:delete val="0"/>
+        <c:axPos val="l"/>
+        <c:majorTickMark val="out"/>
+        <c:minorTickMark val="none"/>
+        <c:tickLblPos val="nextTo"/>
+        <c:crossAx val="45133184"/>
+        <c:crosses val="autoZero"/>
+        <c:auto val="1"/>
+        <c:lblAlgn val="ctr"/>
+        <c:lblOffset val="100"/>
+        <c:noMultiLvlLbl val="0"/>
+      </c:catAx>
+      <c:valAx>
+        <c:axId val="45133184"/>
+        <c:scaling>
+          <c:orientation val="minMax"/>
+        </c:scaling>
+        <c:delete val="0"/>
+        <c:axPos val="b"/>
+        <c:majorGridlines/>
+        <c:numFmt formatCode="General" sourceLinked="1"/>
+        <c:majorTickMark val="out"/>
+        <c:minorTickMark val="none"/>
+        <c:tickLblPos val="nextTo"/>
+        <c:crossAx val="45131648"/>
+        <c:crosses val="autoZero"/>
+        <c:crossBetween val="between"/>
+      </c:valAx>
+    </c:plotArea>
+    <c:legend>
+      <c:legendPos val="r"/>
+      <c:layout/>
+      <c:overlay val="0"/>
+    </c:legend>
+    <c:plotVisOnly val="1"/>
+    <c:dispBlanksAs val="gap"/>
+    <c:showDLblsOverMax val="0"/>
+  </c:chart>
+  <c:spPr>
+    <a:gradFill>
+      <a:gsLst>
+        <a:gs pos="0">
+          <a:schemeClr val="accent4"/>
+        </a:gs>
+        <a:gs pos="50000">
+          <a:schemeClr val="accent1">
+            <a:tint val="44500"/>
+            <a:satMod val="160000"/>
+          </a:schemeClr>
+        </a:gs>
+        <a:gs pos="100000">
+          <a:schemeClr val="accent1">
+            <a:tint val="23500"/>
+            <a:satMod val="160000"/>
+          </a:schemeClr>
+        </a:gs>
+      </a:gsLst>
+      <a:lin ang="5400000" scaled="0"/>
+    </a:gradFill>
+  </c:spPr>
+  <c:externalData r:id="rId1">
+    <c:autoUpdate val="0"/>
+  </c:externalData>
+</c:chartSpace>
+</file>
+
+<file path=ppt/charts/chart2.xml><?xml version="1.0" encoding="utf-8"?>
+<c:chartSpace xmlns:c="http://schemas.openxmlformats.org/drawingml/2006/chart" xmlns:a="http://schemas.openxmlformats.org/drawingml/2006/main" xmlns:r="http://schemas.openxmlformats.org/officeDocument/2006/relationships">
+  <c:date1904 val="0"/>
+  <c:lang val="it-IT"/>
+  <c:roundedCorners val="0"/>
+  <mc:AlternateContent xmlns:mc="http://schemas.openxmlformats.org/markup-compatibility/2006">
+    <mc:Choice xmlns:c14="http://schemas.microsoft.com/office/drawing/2007/8/2/chart" Requires="c14">
+      <c14:style val="102"/>
+    </mc:Choice>
+    <mc:Fallback>
+      <c:style val="2"/>
+    </mc:Fallback>
+  </mc:AlternateContent>
+  <c:chart>
+    <c:autoTitleDeleted val="0"/>
+    <c:view3D>
+      <c:rotX val="15"/>
+      <c:rotY val="20"/>
+      <c:rAngAx val="1"/>
+    </c:view3D>
+    <c:floor>
+      <c:thickness val="0"/>
+    </c:floor>
+    <c:sideWall>
+      <c:thickness val="0"/>
+    </c:sideWall>
+    <c:backWall>
+      <c:thickness val="0"/>
+    </c:backWall>
+    <c:plotArea>
+      <c:layout/>
+      <c:bar3DChart>
+        <c:barDir val="bar"/>
+        <c:grouping val="clustered"/>
+        <c:varyColors val="0"/>
+        <c:ser>
+          <c:idx val="0"/>
+          <c:order val="0"/>
+          <c:tx>
+            <c:v>Preventivo</c:v>
+          </c:tx>
+          <c:spPr>
+            <a:scene3d>
+              <a:camera prst="orthographicFront"/>
+              <a:lightRig rig="threePt" dir="t"/>
+            </a:scene3d>
+            <a:sp3d/>
+          </c:spPr>
+          <c:invertIfNegative val="0"/>
+          <c:dLbls>
+            <c:txPr>
+              <a:bodyPr/>
+              <a:lstStyle/>
+              <a:p>
+                <a:pPr>
+                  <a:defRPr u="none"/>
+                </a:pPr>
+                <a:endParaRPr lang="it-IT"/>
+              </a:p>
+            </c:txPr>
+            <c:showLegendKey val="0"/>
+            <c:showVal val="1"/>
+            <c:showCatName val="0"/>
+            <c:showSerName val="0"/>
+            <c:showPercent val="0"/>
+            <c:showBubbleSize val="0"/>
+            <c:showLeaderLines val="0"/>
+          </c:dLbls>
+          <c:cat>
+            <c:strLit>
+              <c:ptCount val="1"/>
+              <c:pt idx="0">
+                <c:v>Costo</c:v>
+              </c:pt>
+            </c:strLit>
+          </c:cat>
+          <c:val>
+            <c:numRef>
+              <c:f>'2_PA'!$Q$30</c:f>
+              <c:numCache>
+                <c:formatCode>"€"\ #,##0.00</c:formatCode>
+                <c:ptCount val="1"/>
+                <c:pt idx="0">
+                  <c:v>4217</c:v>
+                </c:pt>
+              </c:numCache>
+            </c:numRef>
+          </c:val>
+        </c:ser>
+        <c:ser>
+          <c:idx val="1"/>
+          <c:order val="1"/>
+          <c:tx>
+            <c:v>Consuntivo</c:v>
+          </c:tx>
+          <c:invertIfNegative val="0"/>
+          <c:dLbls>
+            <c:txPr>
+              <a:bodyPr/>
+              <a:lstStyle/>
+              <a:p>
+                <a:pPr>
+                  <a:defRPr u="none"/>
+                </a:pPr>
+                <a:endParaRPr lang="it-IT"/>
+              </a:p>
+            </c:txPr>
+            <c:showLegendKey val="0"/>
+            <c:showVal val="1"/>
+            <c:showCatName val="0"/>
+            <c:showSerName val="0"/>
+            <c:showPercent val="0"/>
+            <c:showBubbleSize val="0"/>
+            <c:showLeaderLines val="0"/>
+          </c:dLbls>
+          <c:cat>
+            <c:strLit>
+              <c:ptCount val="1"/>
+              <c:pt idx="0">
+                <c:v>Costo</c:v>
+              </c:pt>
+            </c:strLit>
+          </c:cat>
+          <c:val>
+            <c:numRef>
+              <c:f>'2_PA'!$Q$7</c:f>
+              <c:numCache>
+                <c:formatCode>"€"\ #,##0.00</c:formatCode>
+                <c:ptCount val="1"/>
+                <c:pt idx="0">
+                  <c:v>4187</c:v>
+                </c:pt>
+              </c:numCache>
+            </c:numRef>
+          </c:val>
+        </c:ser>
+        <c:dLbls>
+          <c:showLegendKey val="0"/>
+          <c:showVal val="0"/>
+          <c:showCatName val="0"/>
+          <c:showSerName val="0"/>
+          <c:showPercent val="0"/>
+          <c:showBubbleSize val="0"/>
+        </c:dLbls>
+        <c:gapWidth val="150"/>
+        <c:shape val="box"/>
+        <c:axId val="46625536"/>
+        <c:axId val="46627456"/>
+        <c:axId val="0"/>
+      </c:bar3DChart>
+      <c:catAx>
+        <c:axId val="46625536"/>
+        <c:scaling>
+          <c:orientation val="minMax"/>
+        </c:scaling>
+        <c:delete val="0"/>
+        <c:axPos val="l"/>
+        <c:majorTickMark val="out"/>
+        <c:minorTickMark val="none"/>
+        <c:tickLblPos val="nextTo"/>
+        <c:crossAx val="46627456"/>
+        <c:crosses val="autoZero"/>
+        <c:auto val="1"/>
+        <c:lblAlgn val="ctr"/>
+        <c:lblOffset val="100"/>
+        <c:noMultiLvlLbl val="0"/>
+      </c:catAx>
+      <c:valAx>
+        <c:axId val="46627456"/>
+        <c:scaling>
+          <c:orientation val="minMax"/>
+        </c:scaling>
+        <c:delete val="0"/>
+        <c:axPos val="b"/>
+        <c:majorGridlines/>
+        <c:numFmt formatCode="&quot;€&quot;\ #,##0.00" sourceLinked="1"/>
+        <c:majorTickMark val="out"/>
+        <c:minorTickMark val="none"/>
+        <c:tickLblPos val="nextTo"/>
+        <c:crossAx val="46625536"/>
+        <c:crosses val="autoZero"/>
+        <c:crossBetween val="between"/>
+      </c:valAx>
+    </c:plotArea>
+    <c:legend>
+      <c:legendPos val="r"/>
+      <c:layout/>
+      <c:overlay val="0"/>
+    </c:legend>
+    <c:plotVisOnly val="1"/>
+    <c:dispBlanksAs val="gap"/>
+    <c:showDLblsOverMax val="0"/>
+  </c:chart>
+  <c:spPr>
+    <a:gradFill>
+      <a:gsLst>
+        <a:gs pos="0">
+          <a:schemeClr val="accent4"/>
+        </a:gs>
+        <a:gs pos="50000">
+          <a:schemeClr val="accent1">
+            <a:tint val="44500"/>
+            <a:satMod val="160000"/>
+          </a:schemeClr>
+        </a:gs>
+        <a:gs pos="100000">
+          <a:schemeClr val="accent1">
+            <a:tint val="23500"/>
+            <a:satMod val="160000"/>
+          </a:schemeClr>
+        </a:gs>
+      </a:gsLst>
+      <a:lin ang="5400000" scaled="0"/>
+    </a:gradFill>
+  </c:spPr>
+  <c:txPr>
+    <a:bodyPr/>
+    <a:lstStyle/>
+    <a:p>
+      <a:pPr>
+        <a:defRPr u="sng"/>
+      </a:pPr>
+      <a:endParaRPr lang="it-IT"/>
+    </a:p>
+  </c:txPr>
+  <c:externalData r:id="rId1">
+    <c:autoUpdate val="0"/>
+  </c:externalData>
+</c:chartSpace>
 </file>
 
 <file path=ppt/notesMasters/notesMaster1.xml><?xml version="1.0" encoding="utf-8"?>
@@ -265,7 +753,7 @@
             <a:fld id="{6B71E980-16C9-4DBF-B0BF-5D16F9726465}" type="datetimeFigureOut">
               <a:rPr lang="it-IT" smtClean="0"/>
               <a:pPr/>
-              <a:t>02/02/2012</a:t>
+              <a:t>03/02/2012</a:t>
             </a:fld>
             <a:endParaRPr lang="it-IT"/>
           </a:p>
@@ -14312,15 +14800,7 @@
                   <a:schemeClr val="tx1"/>
                 </a:solidFill>
               </a:rPr>
-              <a:t>Revisione </a:t>
-            </a:r>
-            <a:r>
-              <a:rPr lang="it-IT" sz="2800" dirty="0" smtClean="0">
-                <a:solidFill>
-                  <a:schemeClr val="tx1"/>
-                </a:solidFill>
-              </a:rPr>
-              <a:t>di Progettazione</a:t>
+              <a:t>Revisione di Progettazione</a:t>
             </a:r>
             <a:endParaRPr lang="it-IT" dirty="0">
               <a:solidFill>
@@ -14444,6 +14924,130 @@
           <a:chExt cx="0" cy="0"/>
         </a:xfrm>
       </p:grpSpPr>
+      <p:sp>
+        <p:nvSpPr>
+          <p:cNvPr id="6" name="Segnaposto data 5"/>
+          <p:cNvSpPr>
+            <a:spLocks noGrp="1"/>
+          </p:cNvSpPr>
+          <p:nvPr>
+            <p:ph type="dt" sz="half" idx="10"/>
+          </p:nvPr>
+        </p:nvSpPr>
+        <p:spPr/>
+        <p:txBody>
+          <a:bodyPr/>
+          <a:lstStyle/>
+          <a:p>
+            <a:r>
+              <a:rPr lang="it-IT" dirty="0" smtClean="0"/>
+              <a:t>Progetto </a:t>
+            </a:r>
+            <a:r>
+              <a:rPr lang="it-IT" dirty="0" err="1" smtClean="0"/>
+              <a:t>Gamification</a:t>
+            </a:r>
+            <a:r>
+              <a:rPr lang="it-IT" dirty="0" smtClean="0"/>
+              <a:t> - Team </a:t>
+            </a:r>
+            <a:r>
+              <a:rPr lang="it-IT" dirty="0" err="1" smtClean="0"/>
+              <a:t>Committed</a:t>
+            </a:r>
+            <a:endParaRPr lang="it-IT" dirty="0"/>
+          </a:p>
+        </p:txBody>
+      </p:sp>
+      <p:sp>
+        <p:nvSpPr>
+          <p:cNvPr id="9" name="Segnaposto numero diapositiva 8"/>
+          <p:cNvSpPr>
+            <a:spLocks noGrp="1"/>
+          </p:cNvSpPr>
+          <p:nvPr>
+            <p:ph type="sldNum" sz="quarter" idx="12"/>
+          </p:nvPr>
+        </p:nvSpPr>
+        <p:spPr/>
+        <p:txBody>
+          <a:bodyPr/>
+          <a:lstStyle/>
+          <a:p>
+            <a:fld id="{017EC607-BD11-4D4E-AC5F-155C854A0B9D}" type="slidenum">
+              <a:rPr lang="it-IT" smtClean="0"/>
+              <a:pPr/>
+              <a:t>10</a:t>
+            </a:fld>
+            <a:r>
+              <a:rPr lang="it-IT" dirty="0" smtClean="0"/>
+              <a:t> di 67</a:t>
+            </a:r>
+            <a:endParaRPr lang="it-IT" dirty="0"/>
+          </a:p>
+        </p:txBody>
+      </p:sp>
+      <p:pic>
+        <p:nvPicPr>
+          <p:cNvPr id="7" name="Immagine 6" descr="attivita_generale.png"/>
+          <p:cNvPicPr>
+            <a:picLocks noChangeAspect="1"/>
+          </p:cNvPicPr>
+          <p:nvPr/>
+        </p:nvPicPr>
+        <p:blipFill>
+          <a:blip r:embed="rId2" cstate="print"/>
+          <a:stretch>
+            <a:fillRect/>
+          </a:stretch>
+        </p:blipFill>
+        <p:spPr>
+          <a:xfrm>
+            <a:off x="971600" y="1772816"/>
+            <a:ext cx="7439867" cy="2952328"/>
+          </a:xfrm>
+          <a:prstGeom prst="rect">
+            <a:avLst/>
+          </a:prstGeom>
+        </p:spPr>
+      </p:pic>
+    </p:spTree>
+    <p:extLst>
+      <p:ext uri="{BB962C8B-B14F-4D97-AF65-F5344CB8AC3E}">
+        <p14:creationId xmlns:p14="http://schemas.microsoft.com/office/powerpoint/2010/main" val="200703652"/>
+      </p:ext>
+    </p:extLst>
+  </p:cSld>
+  <p:clrMapOvr>
+    <a:masterClrMapping/>
+  </p:clrMapOvr>
+  <p:timing>
+    <p:tnLst>
+      <p:par>
+        <p:cTn id="1" dur="indefinite" restart="never" nodeType="tmRoot"/>
+      </p:par>
+    </p:tnLst>
+  </p:timing>
+</p:sld>
+</file>
+
+<file path=ppt/slides/slide11.xml><?xml version="1.0" encoding="utf-8"?>
+<p:sld xmlns:a="http://schemas.openxmlformats.org/drawingml/2006/main" xmlns:r="http://schemas.openxmlformats.org/officeDocument/2006/relationships" xmlns:p="http://schemas.openxmlformats.org/presentationml/2006/main">
+  <p:cSld>
+    <p:spTree>
+      <p:nvGrpSpPr>
+        <p:cNvPr id="1" name=""/>
+        <p:cNvGrpSpPr/>
+        <p:nvPr/>
+      </p:nvGrpSpPr>
+      <p:grpSpPr>
+        <a:xfrm>
+          <a:off x="0" y="0"/>
+          <a:ext cx="0" cy="0"/>
+          <a:chOff x="0" y="0"/>
+          <a:chExt cx="0" cy="0"/>
+        </a:xfrm>
+      </p:grpSpPr>
       <p:pic>
         <p:nvPicPr>
           <p:cNvPr id="3" name="Immagine 2"/>
@@ -14544,7 +15148,7 @@
             <a:fld id="{017EC607-BD11-4D4E-AC5F-155C854A0B9D}" type="slidenum">
               <a:rPr lang="it-IT" smtClean="0"/>
               <a:pPr/>
-              <a:t>10</a:t>
+              <a:t>11</a:t>
             </a:fld>
             <a:r>
               <a:rPr lang="it-IT" dirty="0" smtClean="0"/>
@@ -14557,130 +15161,6 @@
     <p:extLst>
       <p:ext uri="{BB962C8B-B14F-4D97-AF65-F5344CB8AC3E}">
         <p14:creationId xmlns:p14="http://schemas.microsoft.com/office/powerpoint/2010/main" val="2537002"/>
-      </p:ext>
-    </p:extLst>
-  </p:cSld>
-  <p:clrMapOvr>
-    <a:masterClrMapping/>
-  </p:clrMapOvr>
-  <p:timing>
-    <p:tnLst>
-      <p:par>
-        <p:cTn id="1" dur="indefinite" restart="never" nodeType="tmRoot"/>
-      </p:par>
-    </p:tnLst>
-  </p:timing>
-</p:sld>
-</file>
-
-<file path=ppt/slides/slide11.xml><?xml version="1.0" encoding="utf-8"?>
-<p:sld xmlns:a="http://schemas.openxmlformats.org/drawingml/2006/main" xmlns:r="http://schemas.openxmlformats.org/officeDocument/2006/relationships" xmlns:p="http://schemas.openxmlformats.org/presentationml/2006/main">
-  <p:cSld>
-    <p:spTree>
-      <p:nvGrpSpPr>
-        <p:cNvPr id="1" name=""/>
-        <p:cNvGrpSpPr/>
-        <p:nvPr/>
-      </p:nvGrpSpPr>
-      <p:grpSpPr>
-        <a:xfrm>
-          <a:off x="0" y="0"/>
-          <a:ext cx="0" cy="0"/>
-          <a:chOff x="0" y="0"/>
-          <a:chExt cx="0" cy="0"/>
-        </a:xfrm>
-      </p:grpSpPr>
-      <p:sp>
-        <p:nvSpPr>
-          <p:cNvPr id="6" name="Segnaposto data 5"/>
-          <p:cNvSpPr>
-            <a:spLocks noGrp="1"/>
-          </p:cNvSpPr>
-          <p:nvPr>
-            <p:ph type="dt" sz="half" idx="10"/>
-          </p:nvPr>
-        </p:nvSpPr>
-        <p:spPr/>
-        <p:txBody>
-          <a:bodyPr/>
-          <a:lstStyle/>
-          <a:p>
-            <a:r>
-              <a:rPr lang="it-IT" dirty="0" smtClean="0"/>
-              <a:t>Progetto </a:t>
-            </a:r>
-            <a:r>
-              <a:rPr lang="it-IT" dirty="0" err="1" smtClean="0"/>
-              <a:t>Gamification</a:t>
-            </a:r>
-            <a:r>
-              <a:rPr lang="it-IT" dirty="0" smtClean="0"/>
-              <a:t> - Team </a:t>
-            </a:r>
-            <a:r>
-              <a:rPr lang="it-IT" dirty="0" err="1" smtClean="0"/>
-              <a:t>Committed</a:t>
-            </a:r>
-            <a:endParaRPr lang="it-IT" dirty="0"/>
-          </a:p>
-        </p:txBody>
-      </p:sp>
-      <p:sp>
-        <p:nvSpPr>
-          <p:cNvPr id="9" name="Segnaposto numero diapositiva 8"/>
-          <p:cNvSpPr>
-            <a:spLocks noGrp="1"/>
-          </p:cNvSpPr>
-          <p:nvPr>
-            <p:ph type="sldNum" sz="quarter" idx="12"/>
-          </p:nvPr>
-        </p:nvSpPr>
-        <p:spPr/>
-        <p:txBody>
-          <a:bodyPr/>
-          <a:lstStyle/>
-          <a:p>
-            <a:fld id="{017EC607-BD11-4D4E-AC5F-155C854A0B9D}" type="slidenum">
-              <a:rPr lang="it-IT" smtClean="0"/>
-              <a:pPr/>
-              <a:t>11</a:t>
-            </a:fld>
-            <a:r>
-              <a:rPr lang="it-IT" dirty="0" smtClean="0"/>
-              <a:t> di 67</a:t>
-            </a:r>
-            <a:endParaRPr lang="it-IT" dirty="0"/>
-          </a:p>
-        </p:txBody>
-      </p:sp>
-      <p:pic>
-        <p:nvPicPr>
-          <p:cNvPr id="7" name="Immagine 6" descr="Gui-Desk-Login.jpg"/>
-          <p:cNvPicPr>
-            <a:picLocks noChangeAspect="1"/>
-          </p:cNvPicPr>
-          <p:nvPr/>
-        </p:nvPicPr>
-        <p:blipFill>
-          <a:blip r:embed="rId2" cstate="print"/>
-          <a:stretch>
-            <a:fillRect/>
-          </a:stretch>
-        </p:blipFill>
-        <p:spPr>
-          <a:xfrm>
-            <a:off x="2123728" y="1916832"/>
-            <a:ext cx="5040560" cy="3173328"/>
-          </a:xfrm>
-          <a:prstGeom prst="rect">
-            <a:avLst/>
-          </a:prstGeom>
-        </p:spPr>
-      </p:pic>
-    </p:spTree>
-    <p:extLst>
-      <p:ext uri="{BB962C8B-B14F-4D97-AF65-F5344CB8AC3E}">
-        <p14:creationId xmlns:p14="http://schemas.microsoft.com/office/powerpoint/2010/main" val="200703652"/>
       </p:ext>
     </p:extLst>
   </p:cSld>
@@ -14794,7 +15274,7 @@
         <p:spPr>
           <a:xfrm>
             <a:off x="2123728" y="1916832"/>
-            <a:ext cx="5040560" cy="3173327"/>
+            <a:ext cx="5040560" cy="3173328"/>
           </a:xfrm>
           <a:prstGeom prst="rect">
             <a:avLst/>
@@ -14892,6 +15372,130 @@
               <a:rPr lang="it-IT" smtClean="0"/>
               <a:pPr/>
               <a:t>13</a:t>
+            </a:fld>
+            <a:r>
+              <a:rPr lang="it-IT" dirty="0" smtClean="0"/>
+              <a:t> di 67</a:t>
+            </a:r>
+            <a:endParaRPr lang="it-IT" dirty="0"/>
+          </a:p>
+        </p:txBody>
+      </p:sp>
+      <p:pic>
+        <p:nvPicPr>
+          <p:cNvPr id="7" name="Immagine 6" descr="Gui-Desk-Login.jpg"/>
+          <p:cNvPicPr>
+            <a:picLocks noChangeAspect="1"/>
+          </p:cNvPicPr>
+          <p:nvPr/>
+        </p:nvPicPr>
+        <p:blipFill>
+          <a:blip r:embed="rId2" cstate="print"/>
+          <a:stretch>
+            <a:fillRect/>
+          </a:stretch>
+        </p:blipFill>
+        <p:spPr>
+          <a:xfrm>
+            <a:off x="2123728" y="1916832"/>
+            <a:ext cx="5040560" cy="3173327"/>
+          </a:xfrm>
+          <a:prstGeom prst="rect">
+            <a:avLst/>
+          </a:prstGeom>
+        </p:spPr>
+      </p:pic>
+    </p:spTree>
+    <p:extLst>
+      <p:ext uri="{BB962C8B-B14F-4D97-AF65-F5344CB8AC3E}">
+        <p14:creationId xmlns:p14="http://schemas.microsoft.com/office/powerpoint/2010/main" val="200703652"/>
+      </p:ext>
+    </p:extLst>
+  </p:cSld>
+  <p:clrMapOvr>
+    <a:masterClrMapping/>
+  </p:clrMapOvr>
+  <p:timing>
+    <p:tnLst>
+      <p:par>
+        <p:cTn id="1" dur="indefinite" restart="never" nodeType="tmRoot"/>
+      </p:par>
+    </p:tnLst>
+  </p:timing>
+</p:sld>
+</file>
+
+<file path=ppt/slides/slide14.xml><?xml version="1.0" encoding="utf-8"?>
+<p:sld xmlns:a="http://schemas.openxmlformats.org/drawingml/2006/main" xmlns:r="http://schemas.openxmlformats.org/officeDocument/2006/relationships" xmlns:p="http://schemas.openxmlformats.org/presentationml/2006/main">
+  <p:cSld>
+    <p:spTree>
+      <p:nvGrpSpPr>
+        <p:cNvPr id="1" name=""/>
+        <p:cNvGrpSpPr/>
+        <p:nvPr/>
+      </p:nvGrpSpPr>
+      <p:grpSpPr>
+        <a:xfrm>
+          <a:off x="0" y="0"/>
+          <a:ext cx="0" cy="0"/>
+          <a:chOff x="0" y="0"/>
+          <a:chExt cx="0" cy="0"/>
+        </a:xfrm>
+      </p:grpSpPr>
+      <p:sp>
+        <p:nvSpPr>
+          <p:cNvPr id="6" name="Segnaposto data 5"/>
+          <p:cNvSpPr>
+            <a:spLocks noGrp="1"/>
+          </p:cNvSpPr>
+          <p:nvPr>
+            <p:ph type="dt" sz="half" idx="10"/>
+          </p:nvPr>
+        </p:nvSpPr>
+        <p:spPr/>
+        <p:txBody>
+          <a:bodyPr/>
+          <a:lstStyle/>
+          <a:p>
+            <a:r>
+              <a:rPr lang="it-IT" dirty="0" smtClean="0"/>
+              <a:t>Progetto </a:t>
+            </a:r>
+            <a:r>
+              <a:rPr lang="it-IT" dirty="0" err="1" smtClean="0"/>
+              <a:t>Gamification</a:t>
+            </a:r>
+            <a:r>
+              <a:rPr lang="it-IT" dirty="0" smtClean="0"/>
+              <a:t> - Team </a:t>
+            </a:r>
+            <a:r>
+              <a:rPr lang="it-IT" dirty="0" err="1" smtClean="0"/>
+              <a:t>Committed</a:t>
+            </a:r>
+            <a:endParaRPr lang="it-IT" dirty="0"/>
+          </a:p>
+        </p:txBody>
+      </p:sp>
+      <p:sp>
+        <p:nvSpPr>
+          <p:cNvPr id="9" name="Segnaposto numero diapositiva 8"/>
+          <p:cNvSpPr>
+            <a:spLocks noGrp="1"/>
+          </p:cNvSpPr>
+          <p:nvPr>
+            <p:ph type="sldNum" sz="quarter" idx="12"/>
+          </p:nvPr>
+        </p:nvSpPr>
+        <p:spPr/>
+        <p:txBody>
+          <a:bodyPr/>
+          <a:lstStyle/>
+          <a:p>
+            <a:fld id="{017EC607-BD11-4D4E-AC5F-155C854A0B9D}" type="slidenum">
+              <a:rPr lang="it-IT" smtClean="0"/>
+              <a:pPr/>
+              <a:t>14</a:t>
             </a:fld>
             <a:r>
               <a:rPr lang="it-IT" dirty="0" smtClean="0"/>
@@ -14969,7 +15573,7 @@
 </p:sld>
 </file>
 
-<file path=ppt/slides/slide14.xml><?xml version="1.0" encoding="utf-8"?>
+<file path=ppt/slides/slide15.xml><?xml version="1.0" encoding="utf-8"?>
 <p:sld xmlns:a="http://schemas.openxmlformats.org/drawingml/2006/main" xmlns:r="http://schemas.openxmlformats.org/officeDocument/2006/relationships" xmlns:p="http://schemas.openxmlformats.org/presentationml/2006/main">
   <p:cSld>
     <p:spTree>
@@ -15039,7 +15643,7 @@
             <a:fld id="{017EC607-BD11-4D4E-AC5F-155C854A0B9D}" type="slidenum">
               <a:rPr lang="it-IT" smtClean="0"/>
               <a:pPr/>
-              <a:t>14</a:t>
+              <a:t>15</a:t>
             </a:fld>
             <a:r>
               <a:rPr lang="it-IT" dirty="0" smtClean="0"/>
@@ -15141,130 +15745,6 @@
 </p:sld>
 </file>
 
-<file path=ppt/slides/slide15.xml><?xml version="1.0" encoding="utf-8"?>
-<p:sld xmlns:a="http://schemas.openxmlformats.org/drawingml/2006/main" xmlns:r="http://schemas.openxmlformats.org/officeDocument/2006/relationships" xmlns:p="http://schemas.openxmlformats.org/presentationml/2006/main">
-  <p:cSld>
-    <p:spTree>
-      <p:nvGrpSpPr>
-        <p:cNvPr id="1" name=""/>
-        <p:cNvGrpSpPr/>
-        <p:nvPr/>
-      </p:nvGrpSpPr>
-      <p:grpSpPr>
-        <a:xfrm>
-          <a:off x="0" y="0"/>
-          <a:ext cx="0" cy="0"/>
-          <a:chOff x="0" y="0"/>
-          <a:chExt cx="0" cy="0"/>
-        </a:xfrm>
-      </p:grpSpPr>
-      <p:sp>
-        <p:nvSpPr>
-          <p:cNvPr id="6" name="Segnaposto data 5"/>
-          <p:cNvSpPr>
-            <a:spLocks noGrp="1"/>
-          </p:cNvSpPr>
-          <p:nvPr>
-            <p:ph type="dt" sz="half" idx="10"/>
-          </p:nvPr>
-        </p:nvSpPr>
-        <p:spPr/>
-        <p:txBody>
-          <a:bodyPr/>
-          <a:lstStyle/>
-          <a:p>
-            <a:r>
-              <a:rPr lang="it-IT" dirty="0" smtClean="0"/>
-              <a:t>Progetto </a:t>
-            </a:r>
-            <a:r>
-              <a:rPr lang="it-IT" dirty="0" err="1" smtClean="0"/>
-              <a:t>Gamification</a:t>
-            </a:r>
-            <a:r>
-              <a:rPr lang="it-IT" dirty="0" smtClean="0"/>
-              <a:t> - Team </a:t>
-            </a:r>
-            <a:r>
-              <a:rPr lang="it-IT" dirty="0" err="1" smtClean="0"/>
-              <a:t>Committed</a:t>
-            </a:r>
-            <a:endParaRPr lang="it-IT" dirty="0"/>
-          </a:p>
-        </p:txBody>
-      </p:sp>
-      <p:sp>
-        <p:nvSpPr>
-          <p:cNvPr id="9" name="Segnaposto numero diapositiva 8"/>
-          <p:cNvSpPr>
-            <a:spLocks noGrp="1"/>
-          </p:cNvSpPr>
-          <p:nvPr>
-            <p:ph type="sldNum" sz="quarter" idx="12"/>
-          </p:nvPr>
-        </p:nvSpPr>
-        <p:spPr/>
-        <p:txBody>
-          <a:bodyPr/>
-          <a:lstStyle/>
-          <a:p>
-            <a:fld id="{017EC607-BD11-4D4E-AC5F-155C854A0B9D}" type="slidenum">
-              <a:rPr lang="it-IT" smtClean="0"/>
-              <a:pPr/>
-              <a:t>15</a:t>
-            </a:fld>
-            <a:r>
-              <a:rPr lang="it-IT" dirty="0" smtClean="0"/>
-              <a:t> di 67</a:t>
-            </a:r>
-            <a:endParaRPr lang="it-IT" dirty="0"/>
-          </a:p>
-        </p:txBody>
-      </p:sp>
-      <p:pic>
-        <p:nvPicPr>
-          <p:cNvPr id="5" name="Immagine 4" descr="Gui-web-GestioneDomande-Insert.jpg"/>
-          <p:cNvPicPr>
-            <a:picLocks noChangeAspect="1"/>
-          </p:cNvPicPr>
-          <p:nvPr/>
-        </p:nvPicPr>
-        <p:blipFill>
-          <a:blip r:embed="rId2" cstate="print"/>
-          <a:stretch>
-            <a:fillRect/>
-          </a:stretch>
-        </p:blipFill>
-        <p:spPr>
-          <a:xfrm>
-            <a:off x="683568" y="1052736"/>
-            <a:ext cx="7812360" cy="4861024"/>
-          </a:xfrm>
-          <a:prstGeom prst="rect">
-            <a:avLst/>
-          </a:prstGeom>
-        </p:spPr>
-      </p:pic>
-    </p:spTree>
-    <p:extLst>
-      <p:ext uri="{BB962C8B-B14F-4D97-AF65-F5344CB8AC3E}">
-        <p14:creationId xmlns:p14="http://schemas.microsoft.com/office/powerpoint/2010/main" val="200703652"/>
-      </p:ext>
-    </p:extLst>
-  </p:cSld>
-  <p:clrMapOvr>
-    <a:masterClrMapping/>
-  </p:clrMapOvr>
-  <p:timing>
-    <p:tnLst>
-      <p:par>
-        <p:cTn id="1" dur="indefinite" restart="never" nodeType="tmRoot"/>
-      </p:par>
-    </p:tnLst>
-  </p:timing>
-</p:sld>
-</file>
-
 <file path=ppt/slides/slide16.xml><?xml version="1.0" encoding="utf-8"?>
 <p:sld xmlns:a="http://schemas.openxmlformats.org/drawingml/2006/main" xmlns:r="http://schemas.openxmlformats.org/officeDocument/2006/relationships" xmlns:p="http://schemas.openxmlformats.org/presentationml/2006/main">
   <p:cSld>
@@ -15530,68 +16010,9 @@
           <a:chExt cx="0" cy="0"/>
         </a:xfrm>
       </p:grpSpPr>
-      <p:pic>
-        <p:nvPicPr>
-          <p:cNvPr id="3" name="Immagine 2"/>
-          <p:cNvPicPr>
-            <a:picLocks noChangeAspect="1"/>
-          </p:cNvPicPr>
-          <p:nvPr/>
-        </p:nvPicPr>
-        <p:blipFill>
-          <a:blip r:embed="rId2" cstate="print">
-            <a:extLst>
-              <a:ext uri="{28A0092B-C50C-407E-A947-70E740481C1C}">
-                <a14:useLocalDpi xmlns:a14="http://schemas.microsoft.com/office/drawing/2010/main" val="0"/>
-              </a:ext>
-            </a:extLst>
-          </a:blip>
-          <a:stretch>
-            <a:fillRect/>
-          </a:stretch>
-        </p:blipFill>
-        <p:spPr>
-          <a:xfrm>
-            <a:off x="2750630" y="1268760"/>
-            <a:ext cx="3765586" cy="4581128"/>
-          </a:xfrm>
-          <a:prstGeom prst="rect">
-            <a:avLst/>
-          </a:prstGeom>
-        </p:spPr>
-      </p:pic>
       <p:sp>
         <p:nvSpPr>
-          <p:cNvPr id="2" name="Titolo 1"/>
-          <p:cNvSpPr>
-            <a:spLocks noGrp="1"/>
-          </p:cNvSpPr>
-          <p:nvPr>
-            <p:ph type="title"/>
-          </p:nvPr>
-        </p:nvSpPr>
-        <p:spPr>
-          <a:xfrm>
-            <a:off x="1043608" y="2996952"/>
-            <a:ext cx="7024744" cy="1143000"/>
-          </a:xfrm>
-        </p:spPr>
-        <p:txBody>
-          <a:bodyPr/>
-          <a:lstStyle/>
-          <a:p>
-            <a:pPr algn="ctr"/>
-            <a:r>
-              <a:rPr lang="it-IT" dirty="0" smtClean="0"/>
-              <a:t>8. Consuntivo</a:t>
-            </a:r>
-            <a:endParaRPr lang="it-IT" dirty="0"/>
-          </a:p>
-        </p:txBody>
-      </p:sp>
-      <p:sp>
-        <p:nvSpPr>
-          <p:cNvPr id="4" name="Segnaposto data 3"/>
+          <p:cNvPr id="6" name="Segnaposto data 5"/>
           <p:cNvSpPr>
             <a:spLocks noGrp="1"/>
           </p:cNvSpPr>
@@ -15605,16 +16026,28 @@
           <a:lstStyle/>
           <a:p>
             <a:r>
-              <a:rPr lang="it-IT" smtClean="0"/>
-              <a:t>Progetto Gamification - Team Committed</a:t>
+              <a:rPr lang="it-IT" dirty="0" smtClean="0"/>
+              <a:t>Progetto </a:t>
             </a:r>
-            <a:endParaRPr lang="it-IT"/>
+            <a:r>
+              <a:rPr lang="it-IT" dirty="0" err="1" smtClean="0"/>
+              <a:t>Gamification</a:t>
+            </a:r>
+            <a:r>
+              <a:rPr lang="it-IT" dirty="0" smtClean="0"/>
+              <a:t> - Team </a:t>
+            </a:r>
+            <a:r>
+              <a:rPr lang="it-IT" dirty="0" err="1" smtClean="0"/>
+              <a:t>Committed</a:t>
+            </a:r>
+            <a:endParaRPr lang="it-IT" dirty="0"/>
           </a:p>
         </p:txBody>
       </p:sp>
       <p:sp>
         <p:nvSpPr>
-          <p:cNvPr id="7" name="Segnaposto numero diapositiva 6"/>
+          <p:cNvPr id="9" name="Segnaposto numero diapositiva 8"/>
           <p:cNvSpPr>
             <a:spLocks noGrp="1"/>
           </p:cNvSpPr>
@@ -15636,13 +16069,38 @@
               <a:rPr lang="it-IT" dirty="0" smtClean="0"/>
               <a:t> di 67</a:t>
             </a:r>
+            <a:endParaRPr lang="it-IT" dirty="0"/>
           </a:p>
         </p:txBody>
       </p:sp>
+      <p:pic>
+        <p:nvPicPr>
+          <p:cNvPr id="5" name="Immagine 4" descr="Gui-web-GestioneDomande-Insert.jpg"/>
+          <p:cNvPicPr>
+            <a:picLocks noChangeAspect="1"/>
+          </p:cNvPicPr>
+          <p:nvPr/>
+        </p:nvPicPr>
+        <p:blipFill>
+          <a:blip r:embed="rId2" cstate="print"/>
+          <a:stretch>
+            <a:fillRect/>
+          </a:stretch>
+        </p:blipFill>
+        <p:spPr>
+          <a:xfrm>
+            <a:off x="683568" y="1052736"/>
+            <a:ext cx="7812360" cy="4861024"/>
+          </a:xfrm>
+          <a:prstGeom prst="rect">
+            <a:avLst/>
+          </a:prstGeom>
+        </p:spPr>
+      </p:pic>
     </p:spTree>
     <p:extLst>
       <p:ext uri="{BB962C8B-B14F-4D97-AF65-F5344CB8AC3E}">
-        <p14:creationId xmlns:p14="http://schemas.microsoft.com/office/powerpoint/2010/main" val="1165397648"/>
+        <p14:creationId xmlns:p14="http://schemas.microsoft.com/office/powerpoint/2010/main" val="200703652"/>
       </p:ext>
     </p:extLst>
   </p:cSld>
@@ -15659,7 +16117,7 @@
 </p:sld>
 </file>
 
-<file path=ppt/slides/slide2.xml><?xml version="1.0" encoding="utf-8"?>
+<file path=ppt/slides/slide19.xml><?xml version="1.0" encoding="utf-8"?>
 <p:sld xmlns:a="http://schemas.openxmlformats.org/drawingml/2006/main" xmlns:r="http://schemas.openxmlformats.org/officeDocument/2006/relationships" xmlns:p="http://schemas.openxmlformats.org/presentationml/2006/main">
   <p:cSld>
     <p:spTree>
@@ -15729,11 +16187,7 @@
             <a:pPr algn="ctr"/>
             <a:r>
               <a:rPr lang="it-IT" dirty="0" smtClean="0"/>
-              <a:t>2. </a:t>
-            </a:r>
-            <a:r>
-              <a:rPr lang="it-IT" dirty="0" err="1" smtClean="0"/>
-              <a:t>Back-End</a:t>
+              <a:t>8. Consuntivo</a:t>
             </a:r>
             <a:endParaRPr lang="it-IT" dirty="0"/>
           </a:p>
@@ -15780,7 +16234,7 @@
             <a:fld id="{017EC607-BD11-4D4E-AC5F-155C854A0B9D}" type="slidenum">
               <a:rPr lang="it-IT" smtClean="0"/>
               <a:pPr/>
-              <a:t>2</a:t>
+              <a:t>19</a:t>
             </a:fld>
             <a:r>
               <a:rPr lang="it-IT" dirty="0" smtClean="0"/>
@@ -15792,7 +16246,7 @@
     </p:spTree>
     <p:extLst>
       <p:ext uri="{BB962C8B-B14F-4D97-AF65-F5344CB8AC3E}">
-        <p14:creationId xmlns:p14="http://schemas.microsoft.com/office/powerpoint/2010/main" val="2537002"/>
+        <p14:creationId xmlns:p14="http://schemas.microsoft.com/office/powerpoint/2010/main" val="1165397648"/>
       </p:ext>
     </p:extLst>
   </p:cSld>
@@ -15809,7 +16263,7 @@
 </p:sld>
 </file>
 
-<file path=ppt/slides/slide3.xml><?xml version="1.0" encoding="utf-8"?>
+<file path=ppt/slides/slide2.xml><?xml version="1.0" encoding="utf-8"?>
 <p:sld xmlns:a="http://schemas.openxmlformats.org/drawingml/2006/main" xmlns:r="http://schemas.openxmlformats.org/officeDocument/2006/relationships" xmlns:p="http://schemas.openxmlformats.org/presentationml/2006/main">
   <p:cSld>
     <p:spTree>
@@ -15828,7 +16282,129 @@
       </p:grpSpPr>
       <p:sp>
         <p:nvSpPr>
-          <p:cNvPr id="6" name="Segnaposto data 5"/>
+          <p:cNvPr id="2" name="Titolo 1"/>
+          <p:cNvSpPr>
+            <a:spLocks noGrp="1"/>
+          </p:cNvSpPr>
+          <p:nvPr>
+            <p:ph type="title"/>
+          </p:nvPr>
+        </p:nvSpPr>
+        <p:spPr/>
+        <p:txBody>
+          <a:bodyPr/>
+          <a:lstStyle/>
+          <a:p>
+            <a:r>
+              <a:rPr lang="it-IT" dirty="0" smtClean="0"/>
+              <a:t>Indice</a:t>
+            </a:r>
+            <a:endParaRPr lang="it-IT" dirty="0"/>
+          </a:p>
+        </p:txBody>
+      </p:sp>
+      <p:sp>
+        <p:nvSpPr>
+          <p:cNvPr id="3" name="Segnaposto contenuto 2"/>
+          <p:cNvSpPr>
+            <a:spLocks noGrp="1"/>
+          </p:cNvSpPr>
+          <p:nvPr>
+            <p:ph idx="1"/>
+          </p:nvPr>
+        </p:nvSpPr>
+        <p:spPr/>
+        <p:txBody>
+          <a:bodyPr/>
+          <a:lstStyle/>
+          <a:p>
+            <a:pPr marL="525780" indent="-457200">
+              <a:buFont typeface="+mj-lt"/>
+              <a:buAutoNum type="arabicPeriod"/>
+            </a:pPr>
+            <a:r>
+              <a:rPr lang="it-IT" dirty="0" smtClean="0"/>
+              <a:t>Architettura generale</a:t>
+            </a:r>
+          </a:p>
+          <a:p>
+            <a:pPr marL="525780" indent="-457200">
+              <a:buFont typeface="+mj-lt"/>
+              <a:buAutoNum type="arabicPeriod"/>
+            </a:pPr>
+            <a:r>
+              <a:rPr lang="it-IT" dirty="0" smtClean="0"/>
+              <a:t>Back-end</a:t>
+            </a:r>
+          </a:p>
+          <a:p>
+            <a:pPr marL="525780" indent="-457200">
+              <a:buFont typeface="+mj-lt"/>
+              <a:buAutoNum type="arabicPeriod"/>
+            </a:pPr>
+            <a:r>
+              <a:rPr lang="it-IT" dirty="0" smtClean="0"/>
+              <a:t>Front-end Web</a:t>
+            </a:r>
+          </a:p>
+          <a:p>
+            <a:pPr marL="525780" indent="-457200">
+              <a:buFont typeface="+mj-lt"/>
+              <a:buAutoNum type="arabicPeriod"/>
+            </a:pPr>
+            <a:r>
+              <a:rPr lang="it-IT" dirty="0" smtClean="0"/>
+              <a:t>Front-end Mobile</a:t>
+            </a:r>
+          </a:p>
+          <a:p>
+            <a:pPr marL="525780" indent="-457200">
+              <a:buFont typeface="+mj-lt"/>
+              <a:buAutoNum type="arabicPeriod"/>
+            </a:pPr>
+            <a:r>
+              <a:rPr lang="it-IT" dirty="0" smtClean="0"/>
+              <a:t>Diagramma delle Attività</a:t>
+            </a:r>
+          </a:p>
+          <a:p>
+            <a:pPr marL="525780" indent="-457200">
+              <a:buFont typeface="+mj-lt"/>
+              <a:buAutoNum type="arabicPeriod"/>
+            </a:pPr>
+            <a:r>
+              <a:rPr lang="it-IT" dirty="0" smtClean="0"/>
+              <a:t>Prototipi di interfaccia</a:t>
+            </a:r>
+          </a:p>
+          <a:p>
+            <a:pPr marL="525780" indent="-457200">
+              <a:buFont typeface="+mj-lt"/>
+              <a:buAutoNum type="arabicPeriod"/>
+            </a:pPr>
+            <a:r>
+              <a:rPr lang="it-IT" dirty="0" smtClean="0"/>
+              <a:t>Consuntivo</a:t>
+            </a:r>
+          </a:p>
+          <a:p>
+            <a:pPr marL="68580" indent="0">
+              <a:buNone/>
+            </a:pPr>
+            <a:endParaRPr lang="it-IT" dirty="0" smtClean="0"/>
+          </a:p>
+          <a:p>
+            <a:pPr marL="525780" indent="-457200">
+              <a:buFont typeface="+mj-lt"/>
+              <a:buAutoNum type="arabicPeriod"/>
+            </a:pPr>
+            <a:endParaRPr lang="it-IT" dirty="0"/>
+          </a:p>
+        </p:txBody>
+      </p:sp>
+      <p:sp>
+        <p:nvSpPr>
+          <p:cNvPr id="4" name="Segnaposto data 3"/>
           <p:cNvSpPr>
             <a:spLocks noGrp="1"/>
           </p:cNvSpPr>
@@ -15842,28 +16418,16 @@
           <a:lstStyle/>
           <a:p>
             <a:r>
-              <a:rPr lang="it-IT" dirty="0" smtClean="0"/>
-              <a:t>Progetto </a:t>
+              <a:rPr lang="it-IT" smtClean="0"/>
+              <a:t>Progetto Gamification - Team Committed</a:t>
             </a:r>
-            <a:r>
-              <a:rPr lang="it-IT" dirty="0" err="1" smtClean="0"/>
-              <a:t>Gamification</a:t>
-            </a:r>
-            <a:r>
-              <a:rPr lang="it-IT" dirty="0" smtClean="0"/>
-              <a:t> - Team </a:t>
-            </a:r>
-            <a:r>
-              <a:rPr lang="it-IT" dirty="0" err="1" smtClean="0"/>
-              <a:t>Committed</a:t>
-            </a:r>
-            <a:endParaRPr lang="it-IT" dirty="0"/>
+            <a:endParaRPr lang="it-IT"/>
           </a:p>
         </p:txBody>
       </p:sp>
       <p:sp>
         <p:nvSpPr>
-          <p:cNvPr id="9" name="Segnaposto numero diapositiva 8"/>
+          <p:cNvPr id="5" name="Segnaposto numero diapositiva 4"/>
           <p:cNvSpPr>
             <a:spLocks noGrp="1"/>
           </p:cNvSpPr>
@@ -15879,61 +16443,346 @@
             <a:fld id="{017EC607-BD11-4D4E-AC5F-155C854A0B9D}" type="slidenum">
               <a:rPr lang="it-IT" smtClean="0"/>
               <a:pPr/>
-              <a:t>3</a:t>
+              <a:t>2</a:t>
             </a:fld>
-            <a:r>
-              <a:rPr lang="it-IT" dirty="0" smtClean="0"/>
-              <a:t> di 67</a:t>
-            </a:r>
-            <a:endParaRPr lang="it-IT" dirty="0"/>
+            <a:endParaRPr lang="it-IT"/>
           </a:p>
         </p:txBody>
       </p:sp>
-      <p:pic>
-        <p:nvPicPr>
-          <p:cNvPr id="5" name="Immagine 4" descr="BackEnd.png"/>
-          <p:cNvPicPr>
-            <a:picLocks noChangeAspect="1"/>
-          </p:cNvPicPr>
-          <p:nvPr/>
-        </p:nvPicPr>
-        <p:blipFill>
-          <a:blip r:embed="rId2" cstate="print"/>
-          <a:stretch>
-            <a:fillRect/>
-          </a:stretch>
-        </p:blipFill>
-        <p:spPr>
-          <a:xfrm>
-            <a:off x="2339752" y="692696"/>
-            <a:ext cx="4418852" cy="5776071"/>
-          </a:xfrm>
-          <a:prstGeom prst="rect">
-            <a:avLst/>
-          </a:prstGeom>
-        </p:spPr>
-      </p:pic>
     </p:spTree>
     <p:extLst>
       <p:ext uri="{BB962C8B-B14F-4D97-AF65-F5344CB8AC3E}">
-        <p14:creationId xmlns:p14="http://schemas.microsoft.com/office/powerpoint/2010/main" val="200703652"/>
+        <p14:creationId xmlns:p14="http://schemas.microsoft.com/office/powerpoint/2010/main" val="476818001"/>
       </p:ext>
     </p:extLst>
   </p:cSld>
   <p:clrMapOvr>
     <a:masterClrMapping/>
   </p:clrMapOvr>
-  <p:timing>
-    <p:tnLst>
-      <p:par>
-        <p:cTn id="1" dur="indefinite" restart="never" nodeType="tmRoot"/>
-      </p:par>
-    </p:tnLst>
-  </p:timing>
 </p:sld>
 </file>
 
-<file path=ppt/slides/slide4.xml><?xml version="1.0" encoding="utf-8"?>
+<file path=ppt/slides/slide20.xml><?xml version="1.0" encoding="utf-8"?>
+<p:sld xmlns:a="http://schemas.openxmlformats.org/drawingml/2006/main" xmlns:r="http://schemas.openxmlformats.org/officeDocument/2006/relationships" xmlns:p="http://schemas.openxmlformats.org/presentationml/2006/main">
+  <p:cSld>
+    <p:spTree>
+      <p:nvGrpSpPr>
+        <p:cNvPr id="1" name=""/>
+        <p:cNvGrpSpPr/>
+        <p:nvPr/>
+      </p:nvGrpSpPr>
+      <p:grpSpPr>
+        <a:xfrm>
+          <a:off x="0" y="0"/>
+          <a:ext cx="0" cy="0"/>
+          <a:chOff x="0" y="0"/>
+          <a:chExt cx="0" cy="0"/>
+        </a:xfrm>
+      </p:grpSpPr>
+      <p:sp>
+        <p:nvSpPr>
+          <p:cNvPr id="3" name="Segnaposto data 2"/>
+          <p:cNvSpPr>
+            <a:spLocks noGrp="1"/>
+          </p:cNvSpPr>
+          <p:nvPr>
+            <p:ph type="dt" sz="half" idx="10"/>
+          </p:nvPr>
+        </p:nvSpPr>
+        <p:spPr/>
+        <p:txBody>
+          <a:bodyPr/>
+          <a:lstStyle/>
+          <a:p>
+            <a:r>
+              <a:rPr lang="it-IT" smtClean="0"/>
+              <a:t>Progetto Gamification - Team Committed</a:t>
+            </a:r>
+            <a:endParaRPr lang="it-IT"/>
+          </a:p>
+        </p:txBody>
+      </p:sp>
+      <p:sp>
+        <p:nvSpPr>
+          <p:cNvPr id="4" name="Segnaposto numero diapositiva 3"/>
+          <p:cNvSpPr>
+            <a:spLocks noGrp="1"/>
+          </p:cNvSpPr>
+          <p:nvPr>
+            <p:ph type="sldNum" sz="quarter" idx="12"/>
+          </p:nvPr>
+        </p:nvSpPr>
+        <p:spPr/>
+        <p:txBody>
+          <a:bodyPr/>
+          <a:lstStyle/>
+          <a:p>
+            <a:fld id="{017EC607-BD11-4D4E-AC5F-155C854A0B9D}" type="slidenum">
+              <a:rPr lang="it-IT" smtClean="0"/>
+              <a:pPr/>
+              <a:t>20</a:t>
+            </a:fld>
+            <a:endParaRPr lang="it-IT"/>
+          </a:p>
+        </p:txBody>
+      </p:sp>
+      <p:graphicFrame>
+        <p:nvGraphicFramePr>
+          <p:cNvPr id="5" name="Grafico 4"/>
+          <p:cNvGraphicFramePr>
+            <a:graphicFrameLocks/>
+          </p:cNvGraphicFramePr>
+          <p:nvPr>
+            <p:extLst>
+              <p:ext uri="{D42A27DB-BD31-4B8C-83A1-F6EECF244321}">
+                <p14:modId xmlns:p14="http://schemas.microsoft.com/office/powerpoint/2010/main" val="118375365"/>
+              </p:ext>
+            </p:extLst>
+          </p:nvPr>
+        </p:nvGraphicFramePr>
+        <p:xfrm>
+          <a:off x="1043608" y="1196752"/>
+          <a:ext cx="7128792" cy="4896544"/>
+        </p:xfrm>
+        <a:graphic>
+          <a:graphicData uri="http://schemas.openxmlformats.org/drawingml/2006/chart">
+            <c:chart xmlns:c="http://schemas.openxmlformats.org/drawingml/2006/chart" xmlns:r="http://schemas.openxmlformats.org/officeDocument/2006/relationships" r:id="rId2"/>
+          </a:graphicData>
+        </a:graphic>
+      </p:graphicFrame>
+    </p:spTree>
+    <p:extLst>
+      <p:ext uri="{BB962C8B-B14F-4D97-AF65-F5344CB8AC3E}">
+        <p14:creationId xmlns:p14="http://schemas.microsoft.com/office/powerpoint/2010/main" val="4169274934"/>
+      </p:ext>
+    </p:extLst>
+  </p:cSld>
+  <p:clrMapOvr>
+    <a:masterClrMapping/>
+  </p:clrMapOvr>
+</p:sld>
+</file>
+
+<file path=ppt/slides/slide21.xml><?xml version="1.0" encoding="utf-8"?>
+<p:sld xmlns:a="http://schemas.openxmlformats.org/drawingml/2006/main" xmlns:r="http://schemas.openxmlformats.org/officeDocument/2006/relationships" xmlns:p="http://schemas.openxmlformats.org/presentationml/2006/main">
+  <p:cSld>
+    <p:spTree>
+      <p:nvGrpSpPr>
+        <p:cNvPr id="1" name=""/>
+        <p:cNvGrpSpPr/>
+        <p:nvPr/>
+      </p:nvGrpSpPr>
+      <p:grpSpPr>
+        <a:xfrm>
+          <a:off x="0" y="0"/>
+          <a:ext cx="0" cy="0"/>
+          <a:chOff x="0" y="0"/>
+          <a:chExt cx="0" cy="0"/>
+        </a:xfrm>
+      </p:grpSpPr>
+      <p:sp>
+        <p:nvSpPr>
+          <p:cNvPr id="3" name="Segnaposto data 2"/>
+          <p:cNvSpPr>
+            <a:spLocks noGrp="1"/>
+          </p:cNvSpPr>
+          <p:nvPr>
+            <p:ph type="dt" sz="half" idx="10"/>
+          </p:nvPr>
+        </p:nvSpPr>
+        <p:spPr/>
+        <p:txBody>
+          <a:bodyPr/>
+          <a:lstStyle/>
+          <a:p>
+            <a:r>
+              <a:rPr lang="it-IT" smtClean="0"/>
+              <a:t>Progetto Gamification - Team Committed</a:t>
+            </a:r>
+            <a:endParaRPr lang="it-IT"/>
+          </a:p>
+        </p:txBody>
+      </p:sp>
+      <p:sp>
+        <p:nvSpPr>
+          <p:cNvPr id="4" name="Segnaposto numero diapositiva 3"/>
+          <p:cNvSpPr>
+            <a:spLocks noGrp="1"/>
+          </p:cNvSpPr>
+          <p:nvPr>
+            <p:ph type="sldNum" sz="quarter" idx="12"/>
+          </p:nvPr>
+        </p:nvSpPr>
+        <p:spPr/>
+        <p:txBody>
+          <a:bodyPr/>
+          <a:lstStyle/>
+          <a:p>
+            <a:fld id="{017EC607-BD11-4D4E-AC5F-155C854A0B9D}" type="slidenum">
+              <a:rPr lang="it-IT" smtClean="0"/>
+              <a:pPr/>
+              <a:t>21</a:t>
+            </a:fld>
+            <a:endParaRPr lang="it-IT"/>
+          </a:p>
+        </p:txBody>
+      </p:sp>
+      <p:graphicFrame>
+        <p:nvGraphicFramePr>
+          <p:cNvPr id="5" name="Grafico 4"/>
+          <p:cNvGraphicFramePr>
+            <a:graphicFrameLocks/>
+          </p:cNvGraphicFramePr>
+          <p:nvPr>
+            <p:extLst>
+              <p:ext uri="{D42A27DB-BD31-4B8C-83A1-F6EECF244321}">
+                <p14:modId xmlns:p14="http://schemas.microsoft.com/office/powerpoint/2010/main" val="67701067"/>
+              </p:ext>
+            </p:extLst>
+          </p:nvPr>
+        </p:nvGraphicFramePr>
+        <p:xfrm>
+          <a:off x="899592" y="1340768"/>
+          <a:ext cx="7272808" cy="4680520"/>
+        </p:xfrm>
+        <a:graphic>
+          <a:graphicData uri="http://schemas.openxmlformats.org/drawingml/2006/chart">
+            <c:chart xmlns:c="http://schemas.openxmlformats.org/drawingml/2006/chart" xmlns:r="http://schemas.openxmlformats.org/officeDocument/2006/relationships" r:id="rId2"/>
+          </a:graphicData>
+        </a:graphic>
+      </p:graphicFrame>
+    </p:spTree>
+    <p:extLst>
+      <p:ext uri="{BB962C8B-B14F-4D97-AF65-F5344CB8AC3E}">
+        <p14:creationId xmlns:p14="http://schemas.microsoft.com/office/powerpoint/2010/main" val="1166079948"/>
+      </p:ext>
+    </p:extLst>
+  </p:cSld>
+  <p:clrMapOvr>
+    <a:masterClrMapping/>
+  </p:clrMapOvr>
+</p:sld>
+</file>
+
+<file path=ppt/slides/slide22.xml><?xml version="1.0" encoding="utf-8"?>
+<p:sld xmlns:a="http://schemas.openxmlformats.org/drawingml/2006/main" xmlns:r="http://schemas.openxmlformats.org/officeDocument/2006/relationships" xmlns:p="http://schemas.openxmlformats.org/presentationml/2006/main">
+  <p:cSld>
+    <p:spTree>
+      <p:nvGrpSpPr>
+        <p:cNvPr id="1" name=""/>
+        <p:cNvGrpSpPr/>
+        <p:nvPr/>
+      </p:nvGrpSpPr>
+      <p:grpSpPr>
+        <a:xfrm>
+          <a:off x="0" y="0"/>
+          <a:ext cx="0" cy="0"/>
+          <a:chOff x="0" y="0"/>
+          <a:chExt cx="0" cy="0"/>
+        </a:xfrm>
+      </p:grpSpPr>
+      <p:sp>
+        <p:nvSpPr>
+          <p:cNvPr id="3" name="Segnaposto data 2"/>
+          <p:cNvSpPr>
+            <a:spLocks noGrp="1"/>
+          </p:cNvSpPr>
+          <p:nvPr>
+            <p:ph type="dt" sz="half" idx="10"/>
+          </p:nvPr>
+        </p:nvSpPr>
+        <p:spPr/>
+        <p:txBody>
+          <a:bodyPr/>
+          <a:lstStyle/>
+          <a:p>
+            <a:r>
+              <a:rPr lang="it-IT" smtClean="0"/>
+              <a:t>Progetto Gamification - Team Committed</a:t>
+            </a:r>
+            <a:endParaRPr lang="it-IT"/>
+          </a:p>
+        </p:txBody>
+      </p:sp>
+      <p:sp>
+        <p:nvSpPr>
+          <p:cNvPr id="4" name="Segnaposto numero diapositiva 3"/>
+          <p:cNvSpPr>
+            <a:spLocks noGrp="1"/>
+          </p:cNvSpPr>
+          <p:nvPr>
+            <p:ph type="sldNum" sz="quarter" idx="12"/>
+          </p:nvPr>
+        </p:nvSpPr>
+        <p:spPr/>
+        <p:txBody>
+          <a:bodyPr/>
+          <a:lstStyle/>
+          <a:p>
+            <a:fld id="{017EC607-BD11-4D4E-AC5F-155C854A0B9D}" type="slidenum">
+              <a:rPr lang="it-IT" smtClean="0"/>
+              <a:pPr/>
+              <a:t>22</a:t>
+            </a:fld>
+            <a:endParaRPr lang="it-IT"/>
+          </a:p>
+        </p:txBody>
+      </p:sp>
+      <p:pic>
+        <p:nvPicPr>
+          <p:cNvPr id="1026" name="Picture 2" descr="C:\Users\Jack Thomas J. Storn\Università\Team-Committed---Documenti\RP\Esterni\Presentazione\img\ruolo-ore.jpg"/>
+          <p:cNvPicPr>
+            <a:picLocks noChangeAspect="1" noChangeArrowheads="1"/>
+          </p:cNvPicPr>
+          <p:nvPr/>
+        </p:nvPicPr>
+        <p:blipFill>
+          <a:blip r:embed="rId2">
+            <a:extLst>
+              <a:ext uri="{28A0092B-C50C-407E-A947-70E740481C1C}">
+                <a14:useLocalDpi xmlns:a14="http://schemas.microsoft.com/office/drawing/2010/main" val="0"/>
+              </a:ext>
+            </a:extLst>
+          </a:blip>
+          <a:srcRect/>
+          <a:stretch>
+            <a:fillRect/>
+          </a:stretch>
+        </p:blipFill>
+        <p:spPr bwMode="auto">
+          <a:xfrm>
+            <a:off x="683568" y="2636912"/>
+            <a:ext cx="7862748" cy="2160240"/>
+          </a:xfrm>
+          <a:prstGeom prst="rect">
+            <a:avLst/>
+          </a:prstGeom>
+          <a:noFill/>
+          <a:extLst>
+            <a:ext uri="{909E8E84-426E-40DD-AFC4-6F175D3DCCD1}">
+              <a14:hiddenFill xmlns:a14="http://schemas.microsoft.com/office/drawing/2010/main">
+                <a:solidFill>
+                  <a:srgbClr val="FFFFFF"/>
+                </a:solidFill>
+              </a14:hiddenFill>
+            </a:ext>
+          </a:extLst>
+        </p:spPr>
+      </p:pic>
+    </p:spTree>
+    <p:extLst>
+      <p:ext uri="{BB962C8B-B14F-4D97-AF65-F5344CB8AC3E}">
+        <p14:creationId xmlns:p14="http://schemas.microsoft.com/office/powerpoint/2010/main" val="1388921341"/>
+      </p:ext>
+    </p:extLst>
+  </p:cSld>
+  <p:clrMapOvr>
+    <a:masterClrMapping/>
+  </p:clrMapOvr>
+</p:sld>
+</file>
+
+<file path=ppt/slides/slide3.xml><?xml version="1.0" encoding="utf-8"?>
 <p:sld xmlns:a="http://schemas.openxmlformats.org/drawingml/2006/main" xmlns:r="http://schemas.openxmlformats.org/officeDocument/2006/relationships" xmlns:p="http://schemas.openxmlformats.org/presentationml/2006/main">
   <p:cSld>
     <p:spTree>
@@ -16003,15 +16852,11 @@
             <a:pPr algn="ctr"/>
             <a:r>
               <a:rPr lang="it-IT" dirty="0" smtClean="0"/>
-              <a:t>4. </a:t>
+              <a:t>2. </a:t>
             </a:r>
             <a:r>
               <a:rPr lang="it-IT" dirty="0" err="1" smtClean="0"/>
-              <a:t>Front-End</a:t>
-            </a:r>
-            <a:r>
-              <a:rPr lang="it-IT" dirty="0" smtClean="0"/>
-              <a:t> web</a:t>
+              <a:t>Back-End</a:t>
             </a:r>
             <a:endParaRPr lang="it-IT" dirty="0"/>
           </a:p>
@@ -16058,7 +16903,7 @@
             <a:fld id="{017EC607-BD11-4D4E-AC5F-155C854A0B9D}" type="slidenum">
               <a:rPr lang="it-IT" smtClean="0"/>
               <a:pPr/>
-              <a:t>4</a:t>
+              <a:t>3</a:t>
             </a:fld>
             <a:r>
               <a:rPr lang="it-IT" dirty="0" smtClean="0"/>
@@ -16087,7 +16932,7 @@
 </p:sld>
 </file>
 
-<file path=ppt/slides/slide5.xml><?xml version="1.0" encoding="utf-8"?>
+<file path=ppt/slides/slide4.xml><?xml version="1.0" encoding="utf-8"?>
 <p:sld xmlns:a="http://schemas.openxmlformats.org/drawingml/2006/main" xmlns:r="http://schemas.openxmlformats.org/officeDocument/2006/relationships" xmlns:p="http://schemas.openxmlformats.org/presentationml/2006/main">
   <p:cSld>
     <p:spTree>
@@ -16157,7 +17002,7 @@
             <a:fld id="{017EC607-BD11-4D4E-AC5F-155C854A0B9D}" type="slidenum">
               <a:rPr lang="it-IT" smtClean="0"/>
               <a:pPr/>
-              <a:t>5</a:t>
+              <a:t>4</a:t>
             </a:fld>
             <a:r>
               <a:rPr lang="it-IT" dirty="0" smtClean="0"/>
@@ -16169,7 +17014,7 @@
       </p:sp>
       <p:pic>
         <p:nvPicPr>
-          <p:cNvPr id="11" name="Immagine 10" descr="frontEndWeb.png"/>
+          <p:cNvPr id="5" name="Immagine 4" descr="BackEnd.png"/>
           <p:cNvPicPr>
             <a:picLocks noChangeAspect="1"/>
           </p:cNvPicPr>
@@ -16183,8 +17028,8 @@
         </p:blipFill>
         <p:spPr>
           <a:xfrm>
-            <a:off x="2051720" y="692696"/>
-            <a:ext cx="5020413" cy="5760640"/>
+            <a:off x="2339752" y="692696"/>
+            <a:ext cx="4418852" cy="5776071"/>
           </a:xfrm>
           <a:prstGeom prst="rect">
             <a:avLst/>
@@ -16211,7 +17056,7 @@
 </p:sld>
 </file>
 
-<file path=ppt/slides/slide6.xml><?xml version="1.0" encoding="utf-8"?>
+<file path=ppt/slides/slide5.xml><?xml version="1.0" encoding="utf-8"?>
 <p:sld xmlns:a="http://schemas.openxmlformats.org/drawingml/2006/main" xmlns:r="http://schemas.openxmlformats.org/officeDocument/2006/relationships" xmlns:p="http://schemas.openxmlformats.org/presentationml/2006/main">
   <p:cSld>
     <p:spTree>
@@ -16281,7 +17126,7 @@
             <a:pPr algn="ctr"/>
             <a:r>
               <a:rPr lang="it-IT" dirty="0" smtClean="0"/>
-              <a:t>5. </a:t>
+              <a:t>4. </a:t>
             </a:r>
             <a:r>
               <a:rPr lang="it-IT" dirty="0" err="1" smtClean="0"/>
@@ -16289,7 +17134,7 @@
             </a:r>
             <a:r>
               <a:rPr lang="it-IT" dirty="0" smtClean="0"/>
-              <a:t> Mobile</a:t>
+              <a:t> web</a:t>
             </a:r>
             <a:endParaRPr lang="it-IT" dirty="0"/>
           </a:p>
@@ -16336,7 +17181,7 @@
             <a:fld id="{017EC607-BD11-4D4E-AC5F-155C854A0B9D}" type="slidenum">
               <a:rPr lang="it-IT" smtClean="0"/>
               <a:pPr/>
-              <a:t>6</a:t>
+              <a:t>5</a:t>
             </a:fld>
             <a:r>
               <a:rPr lang="it-IT" dirty="0" smtClean="0"/>
@@ -16365,7 +17210,7 @@
 </p:sld>
 </file>
 
-<file path=ppt/slides/slide7.xml><?xml version="1.0" encoding="utf-8"?>
+<file path=ppt/slides/slide6.xml><?xml version="1.0" encoding="utf-8"?>
 <p:sld xmlns:a="http://schemas.openxmlformats.org/drawingml/2006/main" xmlns:r="http://schemas.openxmlformats.org/officeDocument/2006/relationships" xmlns:p="http://schemas.openxmlformats.org/presentationml/2006/main">
   <p:cSld>
     <p:spTree>
@@ -16435,7 +17280,7 @@
             <a:fld id="{017EC607-BD11-4D4E-AC5F-155C854A0B9D}" type="slidenum">
               <a:rPr lang="it-IT" smtClean="0"/>
               <a:pPr/>
-              <a:t>7</a:t>
+              <a:t>6</a:t>
             </a:fld>
             <a:r>
               <a:rPr lang="it-IT" dirty="0" smtClean="0"/>
@@ -16447,7 +17292,7 @@
       </p:sp>
       <p:pic>
         <p:nvPicPr>
-          <p:cNvPr id="5" name="Immagine 4" descr="frontEndMobile.png"/>
+          <p:cNvPr id="11" name="Immagine 10" descr="frontEndWeb.png"/>
           <p:cNvPicPr>
             <a:picLocks noChangeAspect="1"/>
           </p:cNvPicPr>
@@ -16461,8 +17306,8 @@
         </p:blipFill>
         <p:spPr>
           <a:xfrm>
-            <a:off x="2411760" y="692696"/>
-            <a:ext cx="4328268" cy="5797109"/>
+            <a:off x="2051720" y="692696"/>
+            <a:ext cx="5020413" cy="5760640"/>
           </a:xfrm>
           <a:prstGeom prst="rect">
             <a:avLst/>
@@ -16489,7 +17334,7 @@
 </p:sld>
 </file>
 
-<file path=ppt/slides/slide8.xml><?xml version="1.0" encoding="utf-8"?>
+<file path=ppt/slides/slide7.xml><?xml version="1.0" encoding="utf-8"?>
 <p:sld xmlns:a="http://schemas.openxmlformats.org/drawingml/2006/main" xmlns:r="http://schemas.openxmlformats.org/officeDocument/2006/relationships" xmlns:p="http://schemas.openxmlformats.org/presentationml/2006/main">
   <p:cSld>
     <p:spTree>
@@ -16559,7 +17404,15 @@
             <a:pPr algn="ctr"/>
             <a:r>
               <a:rPr lang="it-IT" dirty="0" smtClean="0"/>
-              <a:t>6. Diagrammi delle Attività</a:t>
+              <a:t>5. </a:t>
+            </a:r>
+            <a:r>
+              <a:rPr lang="it-IT" dirty="0" err="1" smtClean="0"/>
+              <a:t>Front-End</a:t>
+            </a:r>
+            <a:r>
+              <a:rPr lang="it-IT" dirty="0" smtClean="0"/>
+              <a:t> Mobile</a:t>
             </a:r>
             <a:endParaRPr lang="it-IT" dirty="0"/>
           </a:p>
@@ -16606,19 +17459,143 @@
             <a:fld id="{017EC607-BD11-4D4E-AC5F-155C854A0B9D}" type="slidenum">
               <a:rPr lang="it-IT" smtClean="0"/>
               <a:pPr/>
+              <a:t>7</a:t>
+            </a:fld>
+            <a:r>
+              <a:rPr lang="it-IT" dirty="0" smtClean="0"/>
+              <a:t> di 67</a:t>
+            </a:r>
+          </a:p>
+        </p:txBody>
+      </p:sp>
+    </p:spTree>
+    <p:extLst>
+      <p:ext uri="{BB962C8B-B14F-4D97-AF65-F5344CB8AC3E}">
+        <p14:creationId xmlns:p14="http://schemas.microsoft.com/office/powerpoint/2010/main" val="2537002"/>
+      </p:ext>
+    </p:extLst>
+  </p:cSld>
+  <p:clrMapOvr>
+    <a:masterClrMapping/>
+  </p:clrMapOvr>
+  <p:timing>
+    <p:tnLst>
+      <p:par>
+        <p:cTn id="1" dur="indefinite" restart="never" nodeType="tmRoot"/>
+      </p:par>
+    </p:tnLst>
+  </p:timing>
+</p:sld>
+</file>
+
+<file path=ppt/slides/slide8.xml><?xml version="1.0" encoding="utf-8"?>
+<p:sld xmlns:a="http://schemas.openxmlformats.org/drawingml/2006/main" xmlns:r="http://schemas.openxmlformats.org/officeDocument/2006/relationships" xmlns:p="http://schemas.openxmlformats.org/presentationml/2006/main">
+  <p:cSld>
+    <p:spTree>
+      <p:nvGrpSpPr>
+        <p:cNvPr id="1" name=""/>
+        <p:cNvGrpSpPr/>
+        <p:nvPr/>
+      </p:nvGrpSpPr>
+      <p:grpSpPr>
+        <a:xfrm>
+          <a:off x="0" y="0"/>
+          <a:ext cx="0" cy="0"/>
+          <a:chOff x="0" y="0"/>
+          <a:chExt cx="0" cy="0"/>
+        </a:xfrm>
+      </p:grpSpPr>
+      <p:sp>
+        <p:nvSpPr>
+          <p:cNvPr id="6" name="Segnaposto data 5"/>
+          <p:cNvSpPr>
+            <a:spLocks noGrp="1"/>
+          </p:cNvSpPr>
+          <p:nvPr>
+            <p:ph type="dt" sz="half" idx="10"/>
+          </p:nvPr>
+        </p:nvSpPr>
+        <p:spPr/>
+        <p:txBody>
+          <a:bodyPr/>
+          <a:lstStyle/>
+          <a:p>
+            <a:r>
+              <a:rPr lang="it-IT" dirty="0" smtClean="0"/>
+              <a:t>Progetto </a:t>
+            </a:r>
+            <a:r>
+              <a:rPr lang="it-IT" dirty="0" err="1" smtClean="0"/>
+              <a:t>Gamification</a:t>
+            </a:r>
+            <a:r>
+              <a:rPr lang="it-IT" dirty="0" smtClean="0"/>
+              <a:t> - Team </a:t>
+            </a:r>
+            <a:r>
+              <a:rPr lang="it-IT" dirty="0" err="1" smtClean="0"/>
+              <a:t>Committed</a:t>
+            </a:r>
+            <a:endParaRPr lang="it-IT" dirty="0"/>
+          </a:p>
+        </p:txBody>
+      </p:sp>
+      <p:sp>
+        <p:nvSpPr>
+          <p:cNvPr id="9" name="Segnaposto numero diapositiva 8"/>
+          <p:cNvSpPr>
+            <a:spLocks noGrp="1"/>
+          </p:cNvSpPr>
+          <p:nvPr>
+            <p:ph type="sldNum" sz="quarter" idx="12"/>
+          </p:nvPr>
+        </p:nvSpPr>
+        <p:spPr/>
+        <p:txBody>
+          <a:bodyPr/>
+          <a:lstStyle/>
+          <a:p>
+            <a:fld id="{017EC607-BD11-4D4E-AC5F-155C854A0B9D}" type="slidenum">
+              <a:rPr lang="it-IT" smtClean="0"/>
+              <a:pPr/>
               <a:t>8</a:t>
             </a:fld>
             <a:r>
               <a:rPr lang="it-IT" dirty="0" smtClean="0"/>
               <a:t> di 67</a:t>
             </a:r>
+            <a:endParaRPr lang="it-IT" dirty="0"/>
           </a:p>
         </p:txBody>
       </p:sp>
+      <p:pic>
+        <p:nvPicPr>
+          <p:cNvPr id="5" name="Immagine 4" descr="frontEndMobile.png"/>
+          <p:cNvPicPr>
+            <a:picLocks noChangeAspect="1"/>
+          </p:cNvPicPr>
+          <p:nvPr/>
+        </p:nvPicPr>
+        <p:blipFill>
+          <a:blip r:embed="rId2" cstate="print"/>
+          <a:stretch>
+            <a:fillRect/>
+          </a:stretch>
+        </p:blipFill>
+        <p:spPr>
+          <a:xfrm>
+            <a:off x="2411760" y="692696"/>
+            <a:ext cx="4328268" cy="5797109"/>
+          </a:xfrm>
+          <a:prstGeom prst="rect">
+            <a:avLst/>
+          </a:prstGeom>
+        </p:spPr>
+      </p:pic>
     </p:spTree>
     <p:extLst>
       <p:ext uri="{BB962C8B-B14F-4D97-AF65-F5344CB8AC3E}">
-        <p14:creationId xmlns:p14="http://schemas.microsoft.com/office/powerpoint/2010/main" val="2537002"/>
+        <p14:creationId xmlns:p14="http://schemas.microsoft.com/office/powerpoint/2010/main" val="200703652"/>
       </p:ext>
     </p:extLst>
   </p:cSld>
@@ -16652,9 +17629,68 @@
           <a:chExt cx="0" cy="0"/>
         </a:xfrm>
       </p:grpSpPr>
+      <p:pic>
+        <p:nvPicPr>
+          <p:cNvPr id="3" name="Immagine 2"/>
+          <p:cNvPicPr>
+            <a:picLocks noChangeAspect="1"/>
+          </p:cNvPicPr>
+          <p:nvPr/>
+        </p:nvPicPr>
+        <p:blipFill>
+          <a:blip r:embed="rId2" cstate="print">
+            <a:extLst>
+              <a:ext uri="{28A0092B-C50C-407E-A947-70E740481C1C}">
+                <a14:useLocalDpi xmlns:a14="http://schemas.microsoft.com/office/drawing/2010/main" val="0"/>
+              </a:ext>
+            </a:extLst>
+          </a:blip>
+          <a:stretch>
+            <a:fillRect/>
+          </a:stretch>
+        </p:blipFill>
+        <p:spPr>
+          <a:xfrm>
+            <a:off x="2750630" y="1268760"/>
+            <a:ext cx="3765586" cy="4581128"/>
+          </a:xfrm>
+          <a:prstGeom prst="rect">
+            <a:avLst/>
+          </a:prstGeom>
+        </p:spPr>
+      </p:pic>
       <p:sp>
         <p:nvSpPr>
-          <p:cNvPr id="6" name="Segnaposto data 5"/>
+          <p:cNvPr id="2" name="Titolo 1"/>
+          <p:cNvSpPr>
+            <a:spLocks noGrp="1"/>
+          </p:cNvSpPr>
+          <p:nvPr>
+            <p:ph type="title"/>
+          </p:nvPr>
+        </p:nvSpPr>
+        <p:spPr>
+          <a:xfrm>
+            <a:off x="1043608" y="2996952"/>
+            <a:ext cx="7024744" cy="1143000"/>
+          </a:xfrm>
+        </p:spPr>
+        <p:txBody>
+          <a:bodyPr/>
+          <a:lstStyle/>
+          <a:p>
+            <a:pPr algn="ctr"/>
+            <a:r>
+              <a:rPr lang="it-IT" dirty="0" smtClean="0"/>
+              <a:t>6. Diagrammi delle Attività</a:t>
+            </a:r>
+            <a:endParaRPr lang="it-IT" dirty="0"/>
+          </a:p>
+        </p:txBody>
+      </p:sp>
+      <p:sp>
+        <p:nvSpPr>
+          <p:cNvPr id="4" name="Segnaposto data 3"/>
           <p:cNvSpPr>
             <a:spLocks noGrp="1"/>
           </p:cNvSpPr>
@@ -16668,28 +17704,16 @@
           <a:lstStyle/>
           <a:p>
             <a:r>
-              <a:rPr lang="it-IT" dirty="0" smtClean="0"/>
-              <a:t>Progetto </a:t>
+              <a:rPr lang="it-IT" smtClean="0"/>
+              <a:t>Progetto Gamification - Team Committed</a:t>
             </a:r>
-            <a:r>
-              <a:rPr lang="it-IT" dirty="0" err="1" smtClean="0"/>
-              <a:t>Gamification</a:t>
-            </a:r>
-            <a:r>
-              <a:rPr lang="it-IT" dirty="0" smtClean="0"/>
-              <a:t> - Team </a:t>
-            </a:r>
-            <a:r>
-              <a:rPr lang="it-IT" dirty="0" err="1" smtClean="0"/>
-              <a:t>Committed</a:t>
-            </a:r>
-            <a:endParaRPr lang="it-IT" dirty="0"/>
+            <a:endParaRPr lang="it-IT"/>
           </a:p>
         </p:txBody>
       </p:sp>
       <p:sp>
         <p:nvSpPr>
-          <p:cNvPr id="9" name="Segnaposto numero diapositiva 8"/>
+          <p:cNvPr id="7" name="Segnaposto numero diapositiva 6"/>
           <p:cNvSpPr>
             <a:spLocks noGrp="1"/>
           </p:cNvSpPr>
@@ -16711,38 +17735,13 @@
               <a:rPr lang="it-IT" dirty="0" smtClean="0"/>
               <a:t> di 67</a:t>
             </a:r>
-            <a:endParaRPr lang="it-IT" dirty="0"/>
           </a:p>
         </p:txBody>
       </p:sp>
-      <p:pic>
-        <p:nvPicPr>
-          <p:cNvPr id="7" name="Immagine 6" descr="attivita_generale.png"/>
-          <p:cNvPicPr>
-            <a:picLocks noChangeAspect="1"/>
-          </p:cNvPicPr>
-          <p:nvPr/>
-        </p:nvPicPr>
-        <p:blipFill>
-          <a:blip r:embed="rId2" cstate="print"/>
-          <a:stretch>
-            <a:fillRect/>
-          </a:stretch>
-        </p:blipFill>
-        <p:spPr>
-          <a:xfrm>
-            <a:off x="971600" y="1772816"/>
-            <a:ext cx="7439867" cy="2952328"/>
-          </a:xfrm>
-          <a:prstGeom prst="rect">
-            <a:avLst/>
-          </a:prstGeom>
-        </p:spPr>
-      </p:pic>
     </p:spTree>
     <p:extLst>
       <p:ext uri="{BB962C8B-B14F-4D97-AF65-F5344CB8AC3E}">
-        <p14:creationId xmlns:p14="http://schemas.microsoft.com/office/powerpoint/2010/main" val="200703652"/>
+        <p14:creationId xmlns:p14="http://schemas.microsoft.com/office/powerpoint/2010/main" val="2537002"/>
       </p:ext>
     </p:extLst>
   </p:cSld>

</xml_diff>

<commit_message>
[Presentazione] Modifica mia immagine per migliorarla. Ora è più grande, quindi meno sgranata
</commit_message>
<xml_diff>
--- a/RP/Esterni/Presentazione/RP-Presentazione.pptx
+++ b/RP/Esterni/Presentazione/RP-Presentazione.pptx
@@ -5,34 +5,38 @@
     <p:sldMasterId id="2147483732" r:id="rId1"/>
   </p:sldMasterIdLst>
   <p:notesMasterIdLst>
-    <p:notesMasterId r:id="rId24"/>
+    <p:notesMasterId r:id="rId25"/>
   </p:notesMasterIdLst>
   <p:sldIdLst>
     <p:sldId id="256" r:id="rId2"/>
     <p:sldId id="289" r:id="rId3"/>
-    <p:sldId id="269" r:id="rId4"/>
-    <p:sldId id="274" r:id="rId5"/>
-    <p:sldId id="267" r:id="rId6"/>
-    <p:sldId id="258" r:id="rId7"/>
-    <p:sldId id="270" r:id="rId8"/>
-    <p:sldId id="275" r:id="rId9"/>
-    <p:sldId id="283" r:id="rId10"/>
-    <p:sldId id="284" r:id="rId11"/>
-    <p:sldId id="272" r:id="rId12"/>
-    <p:sldId id="276" r:id="rId13"/>
-    <p:sldId id="279" r:id="rId14"/>
-    <p:sldId id="277" r:id="rId15"/>
-    <p:sldId id="278" r:id="rId16"/>
-    <p:sldId id="280" r:id="rId17"/>
-    <p:sldId id="281" r:id="rId18"/>
-    <p:sldId id="282" r:id="rId19"/>
-    <p:sldId id="285" r:id="rId20"/>
-    <p:sldId id="286" r:id="rId21"/>
-    <p:sldId id="287" r:id="rId22"/>
-    <p:sldId id="288" r:id="rId23"/>
+    <p:sldId id="291" r:id="rId4"/>
+    <p:sldId id="269" r:id="rId5"/>
+    <p:sldId id="274" r:id="rId6"/>
+    <p:sldId id="267" r:id="rId7"/>
+    <p:sldId id="258" r:id="rId8"/>
+    <p:sldId id="270" r:id="rId9"/>
+    <p:sldId id="275" r:id="rId10"/>
+    <p:sldId id="283" r:id="rId11"/>
+    <p:sldId id="284" r:id="rId12"/>
+    <p:sldId id="272" r:id="rId13"/>
+    <p:sldId id="276" r:id="rId14"/>
+    <p:sldId id="279" r:id="rId15"/>
+    <p:sldId id="277" r:id="rId16"/>
+    <p:sldId id="278" r:id="rId17"/>
+    <p:sldId id="280" r:id="rId18"/>
+    <p:sldId id="281" r:id="rId19"/>
+    <p:sldId id="282" r:id="rId20"/>
+    <p:sldId id="285" r:id="rId21"/>
+    <p:sldId id="286" r:id="rId22"/>
+    <p:sldId id="287" r:id="rId23"/>
+    <p:sldId id="288" r:id="rId24"/>
   </p:sldIdLst>
   <p:sldSz cx="9144000" cy="6858000" type="screen4x3"/>
   <p:notesSz cx="6858000" cy="9144000"/>
+  <p:custDataLst>
+    <p:tags r:id="rId26"/>
+  </p:custDataLst>
   <p:defaultTextStyle>
     <a:defPPr>
       <a:defRPr lang="it-IT"/>
@@ -134,11 +138,12 @@
         <p14:section name="Presentazione" id="{34E9BEB9-075B-4CFE-8BA4-B412D906568B}">
           <p14:sldIdLst>
             <p14:sldId id="256"/>
+            <p14:sldId id="289"/>
           </p14:sldIdLst>
         </p14:section>
-        <p14:section name="Indice" id="{971F0FE5-E1A9-4D70-B37A-4393ED988001}">
+        <p14:section name="Architettura generale" id="{6F4A72FC-0B7C-4C83-9D15-857EBA731DD5}">
           <p14:sldIdLst>
-            <p14:sldId id="289"/>
+            <p14:sldId id="291"/>
           </p14:sldIdLst>
         </p14:section>
         <p14:section name="Back-end" id="{B1AC9BCB-654F-44A6-9A36-56CD55C0B211}">
@@ -364,12 +369,12 @@
         </c:dLbls>
         <c:gapWidth val="150"/>
         <c:shape val="box"/>
-        <c:axId val="45131648"/>
-        <c:axId val="45133184"/>
+        <c:axId val="91047040"/>
+        <c:axId val="91048576"/>
         <c:axId val="0"/>
       </c:bar3DChart>
       <c:catAx>
-        <c:axId val="45131648"/>
+        <c:axId val="91047040"/>
         <c:scaling>
           <c:orientation val="minMax"/>
         </c:scaling>
@@ -378,7 +383,7 @@
         <c:majorTickMark val="out"/>
         <c:minorTickMark val="none"/>
         <c:tickLblPos val="nextTo"/>
-        <c:crossAx val="45133184"/>
+        <c:crossAx val="91048576"/>
         <c:crosses val="autoZero"/>
         <c:auto val="1"/>
         <c:lblAlgn val="ctr"/>
@@ -386,7 +391,7 @@
         <c:noMultiLvlLbl val="0"/>
       </c:catAx>
       <c:valAx>
-        <c:axId val="45133184"/>
+        <c:axId val="91048576"/>
         <c:scaling>
           <c:orientation val="minMax"/>
         </c:scaling>
@@ -397,7 +402,7 @@
         <c:majorTickMark val="out"/>
         <c:minorTickMark val="none"/>
         <c:tickLblPos val="nextTo"/>
-        <c:crossAx val="45131648"/>
+        <c:crossAx val="91047040"/>
         <c:crosses val="autoZero"/>
         <c:crossBetween val="between"/>
       </c:valAx>
@@ -585,12 +590,12 @@
         </c:dLbls>
         <c:gapWidth val="150"/>
         <c:shape val="box"/>
-        <c:axId val="46625536"/>
-        <c:axId val="46627456"/>
+        <c:axId val="91362816"/>
+        <c:axId val="91364352"/>
         <c:axId val="0"/>
       </c:bar3DChart>
       <c:catAx>
-        <c:axId val="46625536"/>
+        <c:axId val="91362816"/>
         <c:scaling>
           <c:orientation val="minMax"/>
         </c:scaling>
@@ -599,7 +604,7 @@
         <c:majorTickMark val="out"/>
         <c:minorTickMark val="none"/>
         <c:tickLblPos val="nextTo"/>
-        <c:crossAx val="46627456"/>
+        <c:crossAx val="91364352"/>
         <c:crosses val="autoZero"/>
         <c:auto val="1"/>
         <c:lblAlgn val="ctr"/>
@@ -607,7 +612,7 @@
         <c:noMultiLvlLbl val="0"/>
       </c:catAx>
       <c:valAx>
-        <c:axId val="46627456"/>
+        <c:axId val="91364352"/>
         <c:scaling>
           <c:orientation val="minMax"/>
         </c:scaling>
@@ -618,7 +623,7 @@
         <c:majorTickMark val="out"/>
         <c:minorTickMark val="none"/>
         <c:tickLblPos val="nextTo"/>
-        <c:crossAx val="46625536"/>
+        <c:crossAx val="91362816"/>
         <c:crosses val="autoZero"/>
         <c:crossBetween val="between"/>
       </c:valAx>
@@ -14924,6 +14929,152 @@
           <a:chExt cx="0" cy="0"/>
         </a:xfrm>
       </p:grpSpPr>
+      <p:pic>
+        <p:nvPicPr>
+          <p:cNvPr id="3" name="Immagine 2"/>
+          <p:cNvPicPr>
+            <a:picLocks noChangeAspect="1"/>
+          </p:cNvPicPr>
+          <p:nvPr/>
+        </p:nvPicPr>
+        <p:blipFill>
+          <a:blip r:embed="rId2" cstate="print">
+            <a:extLst>
+              <a:ext uri="{28A0092B-C50C-407E-A947-70E740481C1C}">
+                <a14:useLocalDpi xmlns:a14="http://schemas.microsoft.com/office/drawing/2010/main" val="0"/>
+              </a:ext>
+            </a:extLst>
+          </a:blip>
+          <a:stretch>
+            <a:fillRect/>
+          </a:stretch>
+        </p:blipFill>
+        <p:spPr>
+          <a:xfrm>
+            <a:off x="2750630" y="1268760"/>
+            <a:ext cx="3765586" cy="4581128"/>
+          </a:xfrm>
+          <a:prstGeom prst="rect">
+            <a:avLst/>
+          </a:prstGeom>
+        </p:spPr>
+      </p:pic>
+      <p:sp>
+        <p:nvSpPr>
+          <p:cNvPr id="2" name="Titolo 1"/>
+          <p:cNvSpPr>
+            <a:spLocks noGrp="1"/>
+          </p:cNvSpPr>
+          <p:nvPr>
+            <p:ph type="title"/>
+          </p:nvPr>
+        </p:nvSpPr>
+        <p:spPr>
+          <a:xfrm>
+            <a:off x="1043608" y="2996952"/>
+            <a:ext cx="7024744" cy="1143000"/>
+          </a:xfrm>
+        </p:spPr>
+        <p:txBody>
+          <a:bodyPr/>
+          <a:lstStyle/>
+          <a:p>
+            <a:pPr algn="ctr"/>
+            <a:r>
+              <a:rPr lang="it-IT" dirty="0" smtClean="0"/>
+              <a:t>6. Diagrammi delle Attività</a:t>
+            </a:r>
+            <a:endParaRPr lang="it-IT" dirty="0"/>
+          </a:p>
+        </p:txBody>
+      </p:sp>
+      <p:sp>
+        <p:nvSpPr>
+          <p:cNvPr id="4" name="Segnaposto data 3"/>
+          <p:cNvSpPr>
+            <a:spLocks noGrp="1"/>
+          </p:cNvSpPr>
+          <p:nvPr>
+            <p:ph type="dt" sz="half" idx="10"/>
+          </p:nvPr>
+        </p:nvSpPr>
+        <p:spPr/>
+        <p:txBody>
+          <a:bodyPr/>
+          <a:lstStyle/>
+          <a:p>
+            <a:r>
+              <a:rPr lang="it-IT" smtClean="0"/>
+              <a:t>Progetto Gamification - Team Committed</a:t>
+            </a:r>
+            <a:endParaRPr lang="it-IT"/>
+          </a:p>
+        </p:txBody>
+      </p:sp>
+      <p:sp>
+        <p:nvSpPr>
+          <p:cNvPr id="7" name="Segnaposto numero diapositiva 6"/>
+          <p:cNvSpPr>
+            <a:spLocks noGrp="1"/>
+          </p:cNvSpPr>
+          <p:nvPr>
+            <p:ph type="sldNum" sz="quarter" idx="12"/>
+          </p:nvPr>
+        </p:nvSpPr>
+        <p:spPr/>
+        <p:txBody>
+          <a:bodyPr/>
+          <a:lstStyle/>
+          <a:p>
+            <a:fld id="{017EC607-BD11-4D4E-AC5F-155C854A0B9D}" type="slidenum">
+              <a:rPr lang="it-IT" smtClean="0"/>
+              <a:pPr/>
+              <a:t>10</a:t>
+            </a:fld>
+            <a:r>
+              <a:rPr lang="it-IT" dirty="0" smtClean="0"/>
+              <a:t> di 67</a:t>
+            </a:r>
+          </a:p>
+        </p:txBody>
+      </p:sp>
+    </p:spTree>
+    <p:extLst>
+      <p:ext uri="{BB962C8B-B14F-4D97-AF65-F5344CB8AC3E}">
+        <p14:creationId xmlns:p14="http://schemas.microsoft.com/office/powerpoint/2010/main" val="2537002"/>
+      </p:ext>
+    </p:extLst>
+  </p:cSld>
+  <p:clrMapOvr>
+    <a:masterClrMapping/>
+  </p:clrMapOvr>
+  <p:timing>
+    <p:tnLst>
+      <p:par>
+        <p:cTn id="1" dur="indefinite" restart="never" nodeType="tmRoot"/>
+      </p:par>
+    </p:tnLst>
+  </p:timing>
+</p:sld>
+</file>
+
+<file path=ppt/slides/slide11.xml><?xml version="1.0" encoding="utf-8"?>
+<p:sld xmlns:a="http://schemas.openxmlformats.org/drawingml/2006/main" xmlns:r="http://schemas.openxmlformats.org/officeDocument/2006/relationships" xmlns:p="http://schemas.openxmlformats.org/presentationml/2006/main">
+  <p:cSld>
+    <p:spTree>
+      <p:nvGrpSpPr>
+        <p:cNvPr id="1" name=""/>
+        <p:cNvGrpSpPr/>
+        <p:nvPr/>
+      </p:nvGrpSpPr>
+      <p:grpSpPr>
+        <a:xfrm>
+          <a:off x="0" y="0"/>
+          <a:ext cx="0" cy="0"/>
+          <a:chOff x="0" y="0"/>
+          <a:chExt cx="0" cy="0"/>
+        </a:xfrm>
+      </p:grpSpPr>
       <p:sp>
         <p:nvSpPr>
           <p:cNvPr id="6" name="Segnaposto data 5"/>
@@ -14977,7 +15128,7 @@
             <a:fld id="{017EC607-BD11-4D4E-AC5F-155C854A0B9D}" type="slidenum">
               <a:rPr lang="it-IT" smtClean="0"/>
               <a:pPr/>
-              <a:t>10</a:t>
+              <a:t>11</a:t>
             </a:fld>
             <a:r>
               <a:rPr lang="it-IT" dirty="0" smtClean="0"/>
@@ -15031,7 +15182,7 @@
 </p:sld>
 </file>
 
-<file path=ppt/slides/slide11.xml><?xml version="1.0" encoding="utf-8"?>
+<file path=ppt/slides/slide12.xml><?xml version="1.0" encoding="utf-8"?>
 <p:sld xmlns:a="http://schemas.openxmlformats.org/drawingml/2006/main" xmlns:r="http://schemas.openxmlformats.org/officeDocument/2006/relationships" xmlns:p="http://schemas.openxmlformats.org/presentationml/2006/main">
   <p:cSld>
     <p:spTree>
@@ -15148,7 +15299,7 @@
             <a:fld id="{017EC607-BD11-4D4E-AC5F-155C854A0B9D}" type="slidenum">
               <a:rPr lang="it-IT" smtClean="0"/>
               <a:pPr/>
-              <a:t>11</a:t>
+              <a:t>12</a:t>
             </a:fld>
             <a:r>
               <a:rPr lang="it-IT" dirty="0" smtClean="0"/>
@@ -15161,130 +15312,6 @@
     <p:extLst>
       <p:ext uri="{BB962C8B-B14F-4D97-AF65-F5344CB8AC3E}">
         <p14:creationId xmlns:p14="http://schemas.microsoft.com/office/powerpoint/2010/main" val="2537002"/>
-      </p:ext>
-    </p:extLst>
-  </p:cSld>
-  <p:clrMapOvr>
-    <a:masterClrMapping/>
-  </p:clrMapOvr>
-  <p:timing>
-    <p:tnLst>
-      <p:par>
-        <p:cTn id="1" dur="indefinite" restart="never" nodeType="tmRoot"/>
-      </p:par>
-    </p:tnLst>
-  </p:timing>
-</p:sld>
-</file>
-
-<file path=ppt/slides/slide12.xml><?xml version="1.0" encoding="utf-8"?>
-<p:sld xmlns:a="http://schemas.openxmlformats.org/drawingml/2006/main" xmlns:r="http://schemas.openxmlformats.org/officeDocument/2006/relationships" xmlns:p="http://schemas.openxmlformats.org/presentationml/2006/main">
-  <p:cSld>
-    <p:spTree>
-      <p:nvGrpSpPr>
-        <p:cNvPr id="1" name=""/>
-        <p:cNvGrpSpPr/>
-        <p:nvPr/>
-      </p:nvGrpSpPr>
-      <p:grpSpPr>
-        <a:xfrm>
-          <a:off x="0" y="0"/>
-          <a:ext cx="0" cy="0"/>
-          <a:chOff x="0" y="0"/>
-          <a:chExt cx="0" cy="0"/>
-        </a:xfrm>
-      </p:grpSpPr>
-      <p:sp>
-        <p:nvSpPr>
-          <p:cNvPr id="6" name="Segnaposto data 5"/>
-          <p:cNvSpPr>
-            <a:spLocks noGrp="1"/>
-          </p:cNvSpPr>
-          <p:nvPr>
-            <p:ph type="dt" sz="half" idx="10"/>
-          </p:nvPr>
-        </p:nvSpPr>
-        <p:spPr/>
-        <p:txBody>
-          <a:bodyPr/>
-          <a:lstStyle/>
-          <a:p>
-            <a:r>
-              <a:rPr lang="it-IT" dirty="0" smtClean="0"/>
-              <a:t>Progetto </a:t>
-            </a:r>
-            <a:r>
-              <a:rPr lang="it-IT" dirty="0" err="1" smtClean="0"/>
-              <a:t>Gamification</a:t>
-            </a:r>
-            <a:r>
-              <a:rPr lang="it-IT" dirty="0" smtClean="0"/>
-              <a:t> - Team </a:t>
-            </a:r>
-            <a:r>
-              <a:rPr lang="it-IT" dirty="0" err="1" smtClean="0"/>
-              <a:t>Committed</a:t>
-            </a:r>
-            <a:endParaRPr lang="it-IT" dirty="0"/>
-          </a:p>
-        </p:txBody>
-      </p:sp>
-      <p:sp>
-        <p:nvSpPr>
-          <p:cNvPr id="9" name="Segnaposto numero diapositiva 8"/>
-          <p:cNvSpPr>
-            <a:spLocks noGrp="1"/>
-          </p:cNvSpPr>
-          <p:nvPr>
-            <p:ph type="sldNum" sz="quarter" idx="12"/>
-          </p:nvPr>
-        </p:nvSpPr>
-        <p:spPr/>
-        <p:txBody>
-          <a:bodyPr/>
-          <a:lstStyle/>
-          <a:p>
-            <a:fld id="{017EC607-BD11-4D4E-AC5F-155C854A0B9D}" type="slidenum">
-              <a:rPr lang="it-IT" smtClean="0"/>
-              <a:pPr/>
-              <a:t>12</a:t>
-            </a:fld>
-            <a:r>
-              <a:rPr lang="it-IT" dirty="0" smtClean="0"/>
-              <a:t> di 67</a:t>
-            </a:r>
-            <a:endParaRPr lang="it-IT" dirty="0"/>
-          </a:p>
-        </p:txBody>
-      </p:sp>
-      <p:pic>
-        <p:nvPicPr>
-          <p:cNvPr id="7" name="Immagine 6" descr="Gui-Desk-Login.jpg"/>
-          <p:cNvPicPr>
-            <a:picLocks noChangeAspect="1"/>
-          </p:cNvPicPr>
-          <p:nvPr/>
-        </p:nvPicPr>
-        <p:blipFill>
-          <a:blip r:embed="rId2" cstate="print"/>
-          <a:stretch>
-            <a:fillRect/>
-          </a:stretch>
-        </p:blipFill>
-        <p:spPr>
-          <a:xfrm>
-            <a:off x="2123728" y="1916832"/>
-            <a:ext cx="5040560" cy="3173328"/>
-          </a:xfrm>
-          <a:prstGeom prst="rect">
-            <a:avLst/>
-          </a:prstGeom>
-        </p:spPr>
-      </p:pic>
-    </p:spTree>
-    <p:extLst>
-      <p:ext uri="{BB962C8B-B14F-4D97-AF65-F5344CB8AC3E}">
-        <p14:creationId xmlns:p14="http://schemas.microsoft.com/office/powerpoint/2010/main" val="200703652"/>
       </p:ext>
     </p:extLst>
   </p:cSld>
@@ -15398,7 +15425,7 @@
         <p:spPr>
           <a:xfrm>
             <a:off x="2123728" y="1916832"/>
-            <a:ext cx="5040560" cy="3173327"/>
+            <a:ext cx="5040560" cy="3173328"/>
           </a:xfrm>
           <a:prstGeom prst="rect">
             <a:avLst/>
@@ -15496,6 +15523,130 @@
               <a:rPr lang="it-IT" smtClean="0"/>
               <a:pPr/>
               <a:t>14</a:t>
+            </a:fld>
+            <a:r>
+              <a:rPr lang="it-IT" dirty="0" smtClean="0"/>
+              <a:t> di 67</a:t>
+            </a:r>
+            <a:endParaRPr lang="it-IT" dirty="0"/>
+          </a:p>
+        </p:txBody>
+      </p:sp>
+      <p:pic>
+        <p:nvPicPr>
+          <p:cNvPr id="7" name="Immagine 6" descr="Gui-Desk-Login.jpg"/>
+          <p:cNvPicPr>
+            <a:picLocks noChangeAspect="1"/>
+          </p:cNvPicPr>
+          <p:nvPr/>
+        </p:nvPicPr>
+        <p:blipFill>
+          <a:blip r:embed="rId2" cstate="print"/>
+          <a:stretch>
+            <a:fillRect/>
+          </a:stretch>
+        </p:blipFill>
+        <p:spPr>
+          <a:xfrm>
+            <a:off x="2123728" y="1916832"/>
+            <a:ext cx="5040560" cy="3173327"/>
+          </a:xfrm>
+          <a:prstGeom prst="rect">
+            <a:avLst/>
+          </a:prstGeom>
+        </p:spPr>
+      </p:pic>
+    </p:spTree>
+    <p:extLst>
+      <p:ext uri="{BB962C8B-B14F-4D97-AF65-F5344CB8AC3E}">
+        <p14:creationId xmlns:p14="http://schemas.microsoft.com/office/powerpoint/2010/main" val="200703652"/>
+      </p:ext>
+    </p:extLst>
+  </p:cSld>
+  <p:clrMapOvr>
+    <a:masterClrMapping/>
+  </p:clrMapOvr>
+  <p:timing>
+    <p:tnLst>
+      <p:par>
+        <p:cTn id="1" dur="indefinite" restart="never" nodeType="tmRoot"/>
+      </p:par>
+    </p:tnLst>
+  </p:timing>
+</p:sld>
+</file>
+
+<file path=ppt/slides/slide15.xml><?xml version="1.0" encoding="utf-8"?>
+<p:sld xmlns:a="http://schemas.openxmlformats.org/drawingml/2006/main" xmlns:r="http://schemas.openxmlformats.org/officeDocument/2006/relationships" xmlns:p="http://schemas.openxmlformats.org/presentationml/2006/main">
+  <p:cSld>
+    <p:spTree>
+      <p:nvGrpSpPr>
+        <p:cNvPr id="1" name=""/>
+        <p:cNvGrpSpPr/>
+        <p:nvPr/>
+      </p:nvGrpSpPr>
+      <p:grpSpPr>
+        <a:xfrm>
+          <a:off x="0" y="0"/>
+          <a:ext cx="0" cy="0"/>
+          <a:chOff x="0" y="0"/>
+          <a:chExt cx="0" cy="0"/>
+        </a:xfrm>
+      </p:grpSpPr>
+      <p:sp>
+        <p:nvSpPr>
+          <p:cNvPr id="6" name="Segnaposto data 5"/>
+          <p:cNvSpPr>
+            <a:spLocks noGrp="1"/>
+          </p:cNvSpPr>
+          <p:nvPr>
+            <p:ph type="dt" sz="half" idx="10"/>
+          </p:nvPr>
+        </p:nvSpPr>
+        <p:spPr/>
+        <p:txBody>
+          <a:bodyPr/>
+          <a:lstStyle/>
+          <a:p>
+            <a:r>
+              <a:rPr lang="it-IT" dirty="0" smtClean="0"/>
+              <a:t>Progetto </a:t>
+            </a:r>
+            <a:r>
+              <a:rPr lang="it-IT" dirty="0" err="1" smtClean="0"/>
+              <a:t>Gamification</a:t>
+            </a:r>
+            <a:r>
+              <a:rPr lang="it-IT" dirty="0" smtClean="0"/>
+              <a:t> - Team </a:t>
+            </a:r>
+            <a:r>
+              <a:rPr lang="it-IT" dirty="0" err="1" smtClean="0"/>
+              <a:t>Committed</a:t>
+            </a:r>
+            <a:endParaRPr lang="it-IT" dirty="0"/>
+          </a:p>
+        </p:txBody>
+      </p:sp>
+      <p:sp>
+        <p:nvSpPr>
+          <p:cNvPr id="9" name="Segnaposto numero diapositiva 8"/>
+          <p:cNvSpPr>
+            <a:spLocks noGrp="1"/>
+          </p:cNvSpPr>
+          <p:nvPr>
+            <p:ph type="sldNum" sz="quarter" idx="12"/>
+          </p:nvPr>
+        </p:nvSpPr>
+        <p:spPr/>
+        <p:txBody>
+          <a:bodyPr/>
+          <a:lstStyle/>
+          <a:p>
+            <a:fld id="{017EC607-BD11-4D4E-AC5F-155C854A0B9D}" type="slidenum">
+              <a:rPr lang="it-IT" smtClean="0"/>
+              <a:pPr/>
+              <a:t>15</a:t>
             </a:fld>
             <a:r>
               <a:rPr lang="it-IT" dirty="0" smtClean="0"/>
@@ -15573,7 +15724,7 @@
 </p:sld>
 </file>
 
-<file path=ppt/slides/slide15.xml><?xml version="1.0" encoding="utf-8"?>
+<file path=ppt/slides/slide16.xml><?xml version="1.0" encoding="utf-8"?>
 <p:sld xmlns:a="http://schemas.openxmlformats.org/drawingml/2006/main" xmlns:r="http://schemas.openxmlformats.org/officeDocument/2006/relationships" xmlns:p="http://schemas.openxmlformats.org/presentationml/2006/main">
   <p:cSld>
     <p:spTree>
@@ -15643,7 +15794,7 @@
             <a:fld id="{017EC607-BD11-4D4E-AC5F-155C854A0B9D}" type="slidenum">
               <a:rPr lang="it-IT" smtClean="0"/>
               <a:pPr/>
-              <a:t>15</a:t>
+              <a:t>16</a:t>
             </a:fld>
             <a:r>
               <a:rPr lang="it-IT" dirty="0" smtClean="0"/>
@@ -15745,130 +15896,6 @@
 </p:sld>
 </file>
 
-<file path=ppt/slides/slide16.xml><?xml version="1.0" encoding="utf-8"?>
-<p:sld xmlns:a="http://schemas.openxmlformats.org/drawingml/2006/main" xmlns:r="http://schemas.openxmlformats.org/officeDocument/2006/relationships" xmlns:p="http://schemas.openxmlformats.org/presentationml/2006/main">
-  <p:cSld>
-    <p:spTree>
-      <p:nvGrpSpPr>
-        <p:cNvPr id="1" name=""/>
-        <p:cNvGrpSpPr/>
-        <p:nvPr/>
-      </p:nvGrpSpPr>
-      <p:grpSpPr>
-        <a:xfrm>
-          <a:off x="0" y="0"/>
-          <a:ext cx="0" cy="0"/>
-          <a:chOff x="0" y="0"/>
-          <a:chExt cx="0" cy="0"/>
-        </a:xfrm>
-      </p:grpSpPr>
-      <p:sp>
-        <p:nvSpPr>
-          <p:cNvPr id="6" name="Segnaposto data 5"/>
-          <p:cNvSpPr>
-            <a:spLocks noGrp="1"/>
-          </p:cNvSpPr>
-          <p:nvPr>
-            <p:ph type="dt" sz="half" idx="10"/>
-          </p:nvPr>
-        </p:nvSpPr>
-        <p:spPr/>
-        <p:txBody>
-          <a:bodyPr/>
-          <a:lstStyle/>
-          <a:p>
-            <a:r>
-              <a:rPr lang="it-IT" dirty="0" smtClean="0"/>
-              <a:t>Progetto </a:t>
-            </a:r>
-            <a:r>
-              <a:rPr lang="it-IT" dirty="0" err="1" smtClean="0"/>
-              <a:t>Gamification</a:t>
-            </a:r>
-            <a:r>
-              <a:rPr lang="it-IT" dirty="0" smtClean="0"/>
-              <a:t> - Team </a:t>
-            </a:r>
-            <a:r>
-              <a:rPr lang="it-IT" dirty="0" err="1" smtClean="0"/>
-              <a:t>Committed</a:t>
-            </a:r>
-            <a:endParaRPr lang="it-IT" dirty="0"/>
-          </a:p>
-        </p:txBody>
-      </p:sp>
-      <p:sp>
-        <p:nvSpPr>
-          <p:cNvPr id="9" name="Segnaposto numero diapositiva 8"/>
-          <p:cNvSpPr>
-            <a:spLocks noGrp="1"/>
-          </p:cNvSpPr>
-          <p:nvPr>
-            <p:ph type="sldNum" sz="quarter" idx="12"/>
-          </p:nvPr>
-        </p:nvSpPr>
-        <p:spPr/>
-        <p:txBody>
-          <a:bodyPr/>
-          <a:lstStyle/>
-          <a:p>
-            <a:fld id="{017EC607-BD11-4D4E-AC5F-155C854A0B9D}" type="slidenum">
-              <a:rPr lang="it-IT" smtClean="0"/>
-              <a:pPr/>
-              <a:t>16</a:t>
-            </a:fld>
-            <a:r>
-              <a:rPr lang="it-IT" dirty="0" smtClean="0"/>
-              <a:t> di 67</a:t>
-            </a:r>
-            <a:endParaRPr lang="it-IT" dirty="0"/>
-          </a:p>
-        </p:txBody>
-      </p:sp>
-      <p:pic>
-        <p:nvPicPr>
-          <p:cNvPr id="5" name="Immagine 4" descr="Gui-web-GestioneDomande-Insert.jpg"/>
-          <p:cNvPicPr>
-            <a:picLocks noChangeAspect="1"/>
-          </p:cNvPicPr>
-          <p:nvPr/>
-        </p:nvPicPr>
-        <p:blipFill>
-          <a:blip r:embed="rId2" cstate="print"/>
-          <a:stretch>
-            <a:fillRect/>
-          </a:stretch>
-        </p:blipFill>
-        <p:spPr>
-          <a:xfrm>
-            <a:off x="683568" y="1052736"/>
-            <a:ext cx="7812360" cy="4861024"/>
-          </a:xfrm>
-          <a:prstGeom prst="rect">
-            <a:avLst/>
-          </a:prstGeom>
-        </p:spPr>
-      </p:pic>
-    </p:spTree>
-    <p:extLst>
-      <p:ext uri="{BB962C8B-B14F-4D97-AF65-F5344CB8AC3E}">
-        <p14:creationId xmlns:p14="http://schemas.microsoft.com/office/powerpoint/2010/main" val="200703652"/>
-      </p:ext>
-    </p:extLst>
-  </p:cSld>
-  <p:clrMapOvr>
-    <a:masterClrMapping/>
-  </p:clrMapOvr>
-  <p:timing>
-    <p:tnLst>
-      <p:par>
-        <p:cTn id="1" dur="indefinite" restart="never" nodeType="tmRoot"/>
-      </p:par>
-    </p:tnLst>
-  </p:timing>
-</p:sld>
-</file>
-
 <file path=ppt/slides/slide17.xml><?xml version="1.0" encoding="utf-8"?>
 <p:sld xmlns:a="http://schemas.openxmlformats.org/drawingml/2006/main" xmlns:r="http://schemas.openxmlformats.org/officeDocument/2006/relationships" xmlns:p="http://schemas.openxmlformats.org/presentationml/2006/main">
   <p:cSld>
@@ -16134,6 +16161,359 @@
           <a:chExt cx="0" cy="0"/>
         </a:xfrm>
       </p:grpSpPr>
+      <p:sp>
+        <p:nvSpPr>
+          <p:cNvPr id="6" name="Segnaposto data 5"/>
+          <p:cNvSpPr>
+            <a:spLocks noGrp="1"/>
+          </p:cNvSpPr>
+          <p:nvPr>
+            <p:ph type="dt" sz="half" idx="10"/>
+          </p:nvPr>
+        </p:nvSpPr>
+        <p:spPr/>
+        <p:txBody>
+          <a:bodyPr/>
+          <a:lstStyle/>
+          <a:p>
+            <a:r>
+              <a:rPr lang="it-IT" dirty="0" smtClean="0"/>
+              <a:t>Progetto </a:t>
+            </a:r>
+            <a:r>
+              <a:rPr lang="it-IT" dirty="0" err="1" smtClean="0"/>
+              <a:t>Gamification</a:t>
+            </a:r>
+            <a:r>
+              <a:rPr lang="it-IT" dirty="0" smtClean="0"/>
+              <a:t> - Team </a:t>
+            </a:r>
+            <a:r>
+              <a:rPr lang="it-IT" dirty="0" err="1" smtClean="0"/>
+              <a:t>Committed</a:t>
+            </a:r>
+            <a:endParaRPr lang="it-IT" dirty="0"/>
+          </a:p>
+        </p:txBody>
+      </p:sp>
+      <p:sp>
+        <p:nvSpPr>
+          <p:cNvPr id="9" name="Segnaposto numero diapositiva 8"/>
+          <p:cNvSpPr>
+            <a:spLocks noGrp="1"/>
+          </p:cNvSpPr>
+          <p:nvPr>
+            <p:ph type="sldNum" sz="quarter" idx="12"/>
+          </p:nvPr>
+        </p:nvSpPr>
+        <p:spPr/>
+        <p:txBody>
+          <a:bodyPr/>
+          <a:lstStyle/>
+          <a:p>
+            <a:fld id="{017EC607-BD11-4D4E-AC5F-155C854A0B9D}" type="slidenum">
+              <a:rPr lang="it-IT" smtClean="0"/>
+              <a:pPr/>
+              <a:t>19</a:t>
+            </a:fld>
+            <a:r>
+              <a:rPr lang="it-IT" dirty="0" smtClean="0"/>
+              <a:t> di 67</a:t>
+            </a:r>
+            <a:endParaRPr lang="it-IT" dirty="0"/>
+          </a:p>
+        </p:txBody>
+      </p:sp>
+      <p:pic>
+        <p:nvPicPr>
+          <p:cNvPr id="5" name="Immagine 4" descr="Gui-web-GestioneDomande-Insert.jpg"/>
+          <p:cNvPicPr>
+            <a:picLocks noChangeAspect="1"/>
+          </p:cNvPicPr>
+          <p:nvPr/>
+        </p:nvPicPr>
+        <p:blipFill>
+          <a:blip r:embed="rId2" cstate="print"/>
+          <a:stretch>
+            <a:fillRect/>
+          </a:stretch>
+        </p:blipFill>
+        <p:spPr>
+          <a:xfrm>
+            <a:off x="683568" y="1052736"/>
+            <a:ext cx="7812360" cy="4861024"/>
+          </a:xfrm>
+          <a:prstGeom prst="rect">
+            <a:avLst/>
+          </a:prstGeom>
+        </p:spPr>
+      </p:pic>
+    </p:spTree>
+    <p:extLst>
+      <p:ext uri="{BB962C8B-B14F-4D97-AF65-F5344CB8AC3E}">
+        <p14:creationId xmlns:p14="http://schemas.microsoft.com/office/powerpoint/2010/main" val="200703652"/>
+      </p:ext>
+    </p:extLst>
+  </p:cSld>
+  <p:clrMapOvr>
+    <a:masterClrMapping/>
+  </p:clrMapOvr>
+  <p:timing>
+    <p:tnLst>
+      <p:par>
+        <p:cTn id="1" dur="indefinite" restart="never" nodeType="tmRoot"/>
+      </p:par>
+    </p:tnLst>
+  </p:timing>
+</p:sld>
+</file>
+
+<file path=ppt/slides/slide2.xml><?xml version="1.0" encoding="utf-8"?>
+<p:sld xmlns:a="http://schemas.openxmlformats.org/drawingml/2006/main" xmlns:r="http://schemas.openxmlformats.org/officeDocument/2006/relationships" xmlns:p="http://schemas.openxmlformats.org/presentationml/2006/main">
+  <p:cSld>
+    <p:spTree>
+      <p:nvGrpSpPr>
+        <p:cNvPr id="1" name=""/>
+        <p:cNvGrpSpPr/>
+        <p:nvPr/>
+      </p:nvGrpSpPr>
+      <p:grpSpPr>
+        <a:xfrm>
+          <a:off x="0" y="0"/>
+          <a:ext cx="0" cy="0"/>
+          <a:chOff x="0" y="0"/>
+          <a:chExt cx="0" cy="0"/>
+        </a:xfrm>
+      </p:grpSpPr>
+      <p:pic>
+        <p:nvPicPr>
+          <p:cNvPr id="6" name="Immagine 5"/>
+          <p:cNvPicPr>
+            <a:picLocks noChangeAspect="1"/>
+          </p:cNvPicPr>
+          <p:nvPr/>
+        </p:nvPicPr>
+        <p:blipFill>
+          <a:blip r:embed="rId2" cstate="print">
+            <a:extLst>
+              <a:ext uri="{28A0092B-C50C-407E-A947-70E740481C1C}">
+                <a14:useLocalDpi xmlns:a14="http://schemas.microsoft.com/office/drawing/2010/main" val="0"/>
+              </a:ext>
+            </a:extLst>
+          </a:blip>
+          <a:stretch>
+            <a:fillRect/>
+          </a:stretch>
+        </p:blipFill>
+        <p:spPr>
+          <a:xfrm>
+            <a:off x="2750630" y="1268760"/>
+            <a:ext cx="3765586" cy="4581128"/>
+          </a:xfrm>
+          <a:prstGeom prst="rect">
+            <a:avLst/>
+          </a:prstGeom>
+        </p:spPr>
+      </p:pic>
+      <p:sp>
+        <p:nvSpPr>
+          <p:cNvPr id="2" name="Titolo 1"/>
+          <p:cNvSpPr>
+            <a:spLocks noGrp="1"/>
+          </p:cNvSpPr>
+          <p:nvPr>
+            <p:ph type="title"/>
+          </p:nvPr>
+        </p:nvSpPr>
+        <p:spPr/>
+        <p:txBody>
+          <a:bodyPr/>
+          <a:lstStyle/>
+          <a:p>
+            <a:r>
+              <a:rPr lang="it-IT" dirty="0" smtClean="0"/>
+              <a:t>Indice</a:t>
+            </a:r>
+            <a:endParaRPr lang="it-IT" dirty="0"/>
+          </a:p>
+        </p:txBody>
+      </p:sp>
+      <p:sp>
+        <p:nvSpPr>
+          <p:cNvPr id="3" name="Segnaposto contenuto 2"/>
+          <p:cNvSpPr>
+            <a:spLocks noGrp="1"/>
+          </p:cNvSpPr>
+          <p:nvPr>
+            <p:ph idx="1"/>
+          </p:nvPr>
+        </p:nvSpPr>
+        <p:spPr/>
+        <p:txBody>
+          <a:bodyPr/>
+          <a:lstStyle/>
+          <a:p>
+            <a:pPr marL="525780" indent="-457200">
+              <a:buFont typeface="+mj-lt"/>
+              <a:buAutoNum type="arabicPeriod"/>
+            </a:pPr>
+            <a:r>
+              <a:rPr lang="it-IT" dirty="0" smtClean="0"/>
+              <a:t>Architettura generale</a:t>
+            </a:r>
+          </a:p>
+          <a:p>
+            <a:pPr marL="525780" indent="-457200">
+              <a:buFont typeface="+mj-lt"/>
+              <a:buAutoNum type="arabicPeriod"/>
+            </a:pPr>
+            <a:r>
+              <a:rPr lang="it-IT" dirty="0" smtClean="0"/>
+              <a:t>Back-end</a:t>
+            </a:r>
+          </a:p>
+          <a:p>
+            <a:pPr marL="525780" indent="-457200">
+              <a:buFont typeface="+mj-lt"/>
+              <a:buAutoNum type="arabicPeriod"/>
+            </a:pPr>
+            <a:r>
+              <a:rPr lang="it-IT" dirty="0" smtClean="0"/>
+              <a:t>Front-end Web</a:t>
+            </a:r>
+          </a:p>
+          <a:p>
+            <a:pPr marL="525780" indent="-457200">
+              <a:buFont typeface="+mj-lt"/>
+              <a:buAutoNum type="arabicPeriod"/>
+            </a:pPr>
+            <a:r>
+              <a:rPr lang="it-IT" dirty="0" smtClean="0"/>
+              <a:t>Front-end Mobile</a:t>
+            </a:r>
+          </a:p>
+          <a:p>
+            <a:pPr marL="525780" indent="-457200">
+              <a:buFont typeface="+mj-lt"/>
+              <a:buAutoNum type="arabicPeriod"/>
+            </a:pPr>
+            <a:r>
+              <a:rPr lang="it-IT" dirty="0" smtClean="0"/>
+              <a:t>Diagramma delle Attività</a:t>
+            </a:r>
+          </a:p>
+          <a:p>
+            <a:pPr marL="525780" indent="-457200">
+              <a:buFont typeface="+mj-lt"/>
+              <a:buAutoNum type="arabicPeriod"/>
+            </a:pPr>
+            <a:r>
+              <a:rPr lang="it-IT" dirty="0" smtClean="0"/>
+              <a:t>Prototipi di interfaccia</a:t>
+            </a:r>
+          </a:p>
+          <a:p>
+            <a:pPr marL="525780" indent="-457200">
+              <a:buFont typeface="+mj-lt"/>
+              <a:buAutoNum type="arabicPeriod"/>
+            </a:pPr>
+            <a:r>
+              <a:rPr lang="it-IT" dirty="0" smtClean="0"/>
+              <a:t>Consuntivo</a:t>
+            </a:r>
+          </a:p>
+          <a:p>
+            <a:pPr marL="68580" indent="0">
+              <a:buNone/>
+            </a:pPr>
+            <a:endParaRPr lang="it-IT" dirty="0" smtClean="0"/>
+          </a:p>
+          <a:p>
+            <a:pPr marL="525780" indent="-457200">
+              <a:buFont typeface="+mj-lt"/>
+              <a:buAutoNum type="arabicPeriod"/>
+            </a:pPr>
+            <a:endParaRPr lang="it-IT" dirty="0"/>
+          </a:p>
+        </p:txBody>
+      </p:sp>
+      <p:sp>
+        <p:nvSpPr>
+          <p:cNvPr id="4" name="Segnaposto data 3"/>
+          <p:cNvSpPr>
+            <a:spLocks noGrp="1"/>
+          </p:cNvSpPr>
+          <p:nvPr>
+            <p:ph type="dt" sz="half" idx="10"/>
+          </p:nvPr>
+        </p:nvSpPr>
+        <p:spPr/>
+        <p:txBody>
+          <a:bodyPr/>
+          <a:lstStyle/>
+          <a:p>
+            <a:r>
+              <a:rPr lang="it-IT" smtClean="0"/>
+              <a:t>Progetto Gamification - Team Committed</a:t>
+            </a:r>
+            <a:endParaRPr lang="it-IT"/>
+          </a:p>
+        </p:txBody>
+      </p:sp>
+      <p:sp>
+        <p:nvSpPr>
+          <p:cNvPr id="5" name="Segnaposto numero diapositiva 4"/>
+          <p:cNvSpPr>
+            <a:spLocks noGrp="1"/>
+          </p:cNvSpPr>
+          <p:nvPr>
+            <p:ph type="sldNum" sz="quarter" idx="12"/>
+          </p:nvPr>
+        </p:nvSpPr>
+        <p:spPr/>
+        <p:txBody>
+          <a:bodyPr/>
+          <a:lstStyle/>
+          <a:p>
+            <a:fld id="{017EC607-BD11-4D4E-AC5F-155C854A0B9D}" type="slidenum">
+              <a:rPr lang="it-IT" smtClean="0"/>
+              <a:pPr/>
+              <a:t>2</a:t>
+            </a:fld>
+            <a:endParaRPr lang="it-IT"/>
+          </a:p>
+        </p:txBody>
+      </p:sp>
+    </p:spTree>
+    <p:extLst>
+      <p:ext uri="{BB962C8B-B14F-4D97-AF65-F5344CB8AC3E}">
+        <p14:creationId xmlns:p14="http://schemas.microsoft.com/office/powerpoint/2010/main" val="476818001"/>
+      </p:ext>
+    </p:extLst>
+  </p:cSld>
+  <p:clrMapOvr>
+    <a:masterClrMapping/>
+  </p:clrMapOvr>
+</p:sld>
+</file>
+
+<file path=ppt/slides/slide20.xml><?xml version="1.0" encoding="utf-8"?>
+<p:sld xmlns:a="http://schemas.openxmlformats.org/drawingml/2006/main" xmlns:r="http://schemas.openxmlformats.org/officeDocument/2006/relationships" xmlns:p="http://schemas.openxmlformats.org/presentationml/2006/main">
+  <p:cSld>
+    <p:spTree>
+      <p:nvGrpSpPr>
+        <p:cNvPr id="1" name=""/>
+        <p:cNvGrpSpPr/>
+        <p:nvPr/>
+      </p:nvGrpSpPr>
+      <p:grpSpPr>
+        <a:xfrm>
+          <a:off x="0" y="0"/>
+          <a:ext cx="0" cy="0"/>
+          <a:chOff x="0" y="0"/>
+          <a:chExt cx="0" cy="0"/>
+        </a:xfrm>
+      </p:grpSpPr>
       <p:pic>
         <p:nvPicPr>
           <p:cNvPr id="3" name="Immagine 2"/>
@@ -16234,7 +16614,7 @@
             <a:fld id="{017EC607-BD11-4D4E-AC5F-155C854A0B9D}" type="slidenum">
               <a:rPr lang="it-IT" smtClean="0"/>
               <a:pPr/>
-              <a:t>19</a:t>
+              <a:t>20</a:t>
             </a:fld>
             <a:r>
               <a:rPr lang="it-IT" dirty="0" smtClean="0"/>
@@ -16263,7 +16643,7 @@
 </p:sld>
 </file>
 
-<file path=ppt/slides/slide2.xml><?xml version="1.0" encoding="utf-8"?>
+<file path=ppt/slides/slide21.xml><?xml version="1.0" encoding="utf-8"?>
 <p:sld xmlns:a="http://schemas.openxmlformats.org/drawingml/2006/main" xmlns:r="http://schemas.openxmlformats.org/officeDocument/2006/relationships" xmlns:p="http://schemas.openxmlformats.org/presentationml/2006/main">
   <p:cSld>
     <p:spTree>
@@ -16280,205 +16660,36 @@
           <a:chExt cx="0" cy="0"/>
         </a:xfrm>
       </p:grpSpPr>
-      <p:sp>
-        <p:nvSpPr>
-          <p:cNvPr id="2" name="Titolo 1"/>
-          <p:cNvSpPr>
-            <a:spLocks noGrp="1"/>
-          </p:cNvSpPr>
-          <p:nvPr>
-            <p:ph type="title"/>
-          </p:nvPr>
-        </p:nvSpPr>
-        <p:spPr/>
-        <p:txBody>
-          <a:bodyPr/>
-          <a:lstStyle/>
-          <a:p>
-            <a:r>
-              <a:rPr lang="it-IT" dirty="0" smtClean="0"/>
-              <a:t>Indice</a:t>
-            </a:r>
-            <a:endParaRPr lang="it-IT" dirty="0"/>
-          </a:p>
-        </p:txBody>
-      </p:sp>
-      <p:sp>
-        <p:nvSpPr>
-          <p:cNvPr id="3" name="Segnaposto contenuto 2"/>
-          <p:cNvSpPr>
-            <a:spLocks noGrp="1"/>
-          </p:cNvSpPr>
-          <p:nvPr>
-            <p:ph idx="1"/>
-          </p:nvPr>
-        </p:nvSpPr>
-        <p:spPr/>
-        <p:txBody>
-          <a:bodyPr/>
-          <a:lstStyle/>
-          <a:p>
-            <a:pPr marL="525780" indent="-457200">
-              <a:buFont typeface="+mj-lt"/>
-              <a:buAutoNum type="arabicPeriod"/>
-            </a:pPr>
-            <a:r>
-              <a:rPr lang="it-IT" dirty="0" smtClean="0"/>
-              <a:t>Architettura generale</a:t>
-            </a:r>
-          </a:p>
-          <a:p>
-            <a:pPr marL="525780" indent="-457200">
-              <a:buFont typeface="+mj-lt"/>
-              <a:buAutoNum type="arabicPeriod"/>
-            </a:pPr>
-            <a:r>
-              <a:rPr lang="it-IT" dirty="0" smtClean="0"/>
-              <a:t>Back-end</a:t>
-            </a:r>
-          </a:p>
-          <a:p>
-            <a:pPr marL="525780" indent="-457200">
-              <a:buFont typeface="+mj-lt"/>
-              <a:buAutoNum type="arabicPeriod"/>
-            </a:pPr>
-            <a:r>
-              <a:rPr lang="it-IT" dirty="0" smtClean="0"/>
-              <a:t>Front-end Web</a:t>
-            </a:r>
-          </a:p>
-          <a:p>
-            <a:pPr marL="525780" indent="-457200">
-              <a:buFont typeface="+mj-lt"/>
-              <a:buAutoNum type="arabicPeriod"/>
-            </a:pPr>
-            <a:r>
-              <a:rPr lang="it-IT" dirty="0" smtClean="0"/>
-              <a:t>Front-end Mobile</a:t>
-            </a:r>
-          </a:p>
-          <a:p>
-            <a:pPr marL="525780" indent="-457200">
-              <a:buFont typeface="+mj-lt"/>
-              <a:buAutoNum type="arabicPeriod"/>
-            </a:pPr>
-            <a:r>
-              <a:rPr lang="it-IT" dirty="0" smtClean="0"/>
-              <a:t>Diagramma delle Attività</a:t>
-            </a:r>
-          </a:p>
-          <a:p>
-            <a:pPr marL="525780" indent="-457200">
-              <a:buFont typeface="+mj-lt"/>
-              <a:buAutoNum type="arabicPeriod"/>
-            </a:pPr>
-            <a:r>
-              <a:rPr lang="it-IT" dirty="0" smtClean="0"/>
-              <a:t>Prototipi di interfaccia</a:t>
-            </a:r>
-          </a:p>
-          <a:p>
-            <a:pPr marL="525780" indent="-457200">
-              <a:buFont typeface="+mj-lt"/>
-              <a:buAutoNum type="arabicPeriod"/>
-            </a:pPr>
-            <a:r>
-              <a:rPr lang="it-IT" dirty="0" smtClean="0"/>
-              <a:t>Consuntivo</a:t>
-            </a:r>
-          </a:p>
-          <a:p>
-            <a:pPr marL="68580" indent="0">
-              <a:buNone/>
-            </a:pPr>
-            <a:endParaRPr lang="it-IT" dirty="0" smtClean="0"/>
-          </a:p>
-          <a:p>
-            <a:pPr marL="525780" indent="-457200">
-              <a:buFont typeface="+mj-lt"/>
-              <a:buAutoNum type="arabicPeriod"/>
-            </a:pPr>
-            <a:endParaRPr lang="it-IT" dirty="0"/>
-          </a:p>
-        </p:txBody>
-      </p:sp>
-      <p:sp>
-        <p:nvSpPr>
-          <p:cNvPr id="4" name="Segnaposto data 3"/>
-          <p:cNvSpPr>
-            <a:spLocks noGrp="1"/>
-          </p:cNvSpPr>
-          <p:nvPr>
-            <p:ph type="dt" sz="half" idx="10"/>
-          </p:nvPr>
-        </p:nvSpPr>
-        <p:spPr/>
-        <p:txBody>
-          <a:bodyPr/>
-          <a:lstStyle/>
-          <a:p>
-            <a:r>
-              <a:rPr lang="it-IT" smtClean="0"/>
-              <a:t>Progetto Gamification - Team Committed</a:t>
-            </a:r>
-            <a:endParaRPr lang="it-IT"/>
-          </a:p>
-        </p:txBody>
-      </p:sp>
-      <p:sp>
-        <p:nvSpPr>
-          <p:cNvPr id="5" name="Segnaposto numero diapositiva 4"/>
-          <p:cNvSpPr>
-            <a:spLocks noGrp="1"/>
-          </p:cNvSpPr>
-          <p:nvPr>
-            <p:ph type="sldNum" sz="quarter" idx="12"/>
-          </p:nvPr>
-        </p:nvSpPr>
-        <p:spPr/>
-        <p:txBody>
-          <a:bodyPr/>
-          <a:lstStyle/>
-          <a:p>
-            <a:fld id="{017EC607-BD11-4D4E-AC5F-155C854A0B9D}" type="slidenum">
-              <a:rPr lang="it-IT" smtClean="0"/>
-              <a:pPr/>
-              <a:t>2</a:t>
-            </a:fld>
-            <a:endParaRPr lang="it-IT"/>
-          </a:p>
-        </p:txBody>
-      </p:sp>
-    </p:spTree>
-    <p:extLst>
-      <p:ext uri="{BB962C8B-B14F-4D97-AF65-F5344CB8AC3E}">
-        <p14:creationId xmlns:p14="http://schemas.microsoft.com/office/powerpoint/2010/main" val="476818001"/>
-      </p:ext>
-    </p:extLst>
-  </p:cSld>
-  <p:clrMapOvr>
-    <a:masterClrMapping/>
-  </p:clrMapOvr>
-</p:sld>
-</file>
-
-<file path=ppt/slides/slide20.xml><?xml version="1.0" encoding="utf-8"?>
-<p:sld xmlns:a="http://schemas.openxmlformats.org/drawingml/2006/main" xmlns:r="http://schemas.openxmlformats.org/officeDocument/2006/relationships" xmlns:p="http://schemas.openxmlformats.org/presentationml/2006/main">
-  <p:cSld>
-    <p:spTree>
-      <p:nvGrpSpPr>
-        <p:cNvPr id="1" name=""/>
-        <p:cNvGrpSpPr/>
-        <p:nvPr/>
-      </p:nvGrpSpPr>
-      <p:grpSpPr>
-        <a:xfrm>
-          <a:off x="0" y="0"/>
-          <a:ext cx="0" cy="0"/>
-          <a:chOff x="0" y="0"/>
-          <a:chExt cx="0" cy="0"/>
-        </a:xfrm>
-      </p:grpSpPr>
+      <p:pic>
+        <p:nvPicPr>
+          <p:cNvPr id="6" name="Immagine 5"/>
+          <p:cNvPicPr>
+            <a:picLocks noChangeAspect="1"/>
+          </p:cNvPicPr>
+          <p:nvPr/>
+        </p:nvPicPr>
+        <p:blipFill>
+          <a:blip r:embed="rId2" cstate="print">
+            <a:extLst>
+              <a:ext uri="{28A0092B-C50C-407E-A947-70E740481C1C}">
+                <a14:useLocalDpi xmlns:a14="http://schemas.microsoft.com/office/drawing/2010/main" val="0"/>
+              </a:ext>
+            </a:extLst>
+          </a:blip>
+          <a:stretch>
+            <a:fillRect/>
+          </a:stretch>
+        </p:blipFill>
+        <p:spPr>
+          <a:xfrm>
+            <a:off x="2750630" y="1268760"/>
+            <a:ext cx="3765586" cy="4581128"/>
+          </a:xfrm>
+          <a:prstGeom prst="rect">
+            <a:avLst/>
+          </a:prstGeom>
+        </p:spPr>
+      </p:pic>
       <p:sp>
         <p:nvSpPr>
           <p:cNvPr id="3" name="Segnaposto data 2"/>
@@ -16520,7 +16731,7 @@
             <a:fld id="{017EC607-BD11-4D4E-AC5F-155C854A0B9D}" type="slidenum">
               <a:rPr lang="it-IT" smtClean="0"/>
               <a:pPr/>
-              <a:t>20</a:t>
+              <a:t>21</a:t>
             </a:fld>
             <a:endParaRPr lang="it-IT"/>
           </a:p>
@@ -16546,7 +16757,7 @@
         </p:xfrm>
         <a:graphic>
           <a:graphicData uri="http://schemas.openxmlformats.org/drawingml/2006/chart">
-            <c:chart xmlns:c="http://schemas.openxmlformats.org/drawingml/2006/chart" xmlns:r="http://schemas.openxmlformats.org/officeDocument/2006/relationships" r:id="rId2"/>
+            <c:chart xmlns:c="http://schemas.openxmlformats.org/drawingml/2006/chart" xmlns:r="http://schemas.openxmlformats.org/officeDocument/2006/relationships" r:id="rId3"/>
           </a:graphicData>
         </a:graphic>
       </p:graphicFrame>
@@ -16554,107 +16765,6 @@
     <p:extLst>
       <p:ext uri="{BB962C8B-B14F-4D97-AF65-F5344CB8AC3E}">
         <p14:creationId xmlns:p14="http://schemas.microsoft.com/office/powerpoint/2010/main" val="4169274934"/>
-      </p:ext>
-    </p:extLst>
-  </p:cSld>
-  <p:clrMapOvr>
-    <a:masterClrMapping/>
-  </p:clrMapOvr>
-</p:sld>
-</file>
-
-<file path=ppt/slides/slide21.xml><?xml version="1.0" encoding="utf-8"?>
-<p:sld xmlns:a="http://schemas.openxmlformats.org/drawingml/2006/main" xmlns:r="http://schemas.openxmlformats.org/officeDocument/2006/relationships" xmlns:p="http://schemas.openxmlformats.org/presentationml/2006/main">
-  <p:cSld>
-    <p:spTree>
-      <p:nvGrpSpPr>
-        <p:cNvPr id="1" name=""/>
-        <p:cNvGrpSpPr/>
-        <p:nvPr/>
-      </p:nvGrpSpPr>
-      <p:grpSpPr>
-        <a:xfrm>
-          <a:off x="0" y="0"/>
-          <a:ext cx="0" cy="0"/>
-          <a:chOff x="0" y="0"/>
-          <a:chExt cx="0" cy="0"/>
-        </a:xfrm>
-      </p:grpSpPr>
-      <p:sp>
-        <p:nvSpPr>
-          <p:cNvPr id="3" name="Segnaposto data 2"/>
-          <p:cNvSpPr>
-            <a:spLocks noGrp="1"/>
-          </p:cNvSpPr>
-          <p:nvPr>
-            <p:ph type="dt" sz="half" idx="10"/>
-          </p:nvPr>
-        </p:nvSpPr>
-        <p:spPr/>
-        <p:txBody>
-          <a:bodyPr/>
-          <a:lstStyle/>
-          <a:p>
-            <a:r>
-              <a:rPr lang="it-IT" smtClean="0"/>
-              <a:t>Progetto Gamification - Team Committed</a:t>
-            </a:r>
-            <a:endParaRPr lang="it-IT"/>
-          </a:p>
-        </p:txBody>
-      </p:sp>
-      <p:sp>
-        <p:nvSpPr>
-          <p:cNvPr id="4" name="Segnaposto numero diapositiva 3"/>
-          <p:cNvSpPr>
-            <a:spLocks noGrp="1"/>
-          </p:cNvSpPr>
-          <p:nvPr>
-            <p:ph type="sldNum" sz="quarter" idx="12"/>
-          </p:nvPr>
-        </p:nvSpPr>
-        <p:spPr/>
-        <p:txBody>
-          <a:bodyPr/>
-          <a:lstStyle/>
-          <a:p>
-            <a:fld id="{017EC607-BD11-4D4E-AC5F-155C854A0B9D}" type="slidenum">
-              <a:rPr lang="it-IT" smtClean="0"/>
-              <a:pPr/>
-              <a:t>21</a:t>
-            </a:fld>
-            <a:endParaRPr lang="it-IT"/>
-          </a:p>
-        </p:txBody>
-      </p:sp>
-      <p:graphicFrame>
-        <p:nvGraphicFramePr>
-          <p:cNvPr id="5" name="Grafico 4"/>
-          <p:cNvGraphicFramePr>
-            <a:graphicFrameLocks/>
-          </p:cNvGraphicFramePr>
-          <p:nvPr>
-            <p:extLst>
-              <p:ext uri="{D42A27DB-BD31-4B8C-83A1-F6EECF244321}">
-                <p14:modId xmlns:p14="http://schemas.microsoft.com/office/powerpoint/2010/main" val="67701067"/>
-              </p:ext>
-            </p:extLst>
-          </p:nvPr>
-        </p:nvGraphicFramePr>
-        <p:xfrm>
-          <a:off x="899592" y="1340768"/>
-          <a:ext cx="7272808" cy="4680520"/>
-        </p:xfrm>
-        <a:graphic>
-          <a:graphicData uri="http://schemas.openxmlformats.org/drawingml/2006/chart">
-            <c:chart xmlns:c="http://schemas.openxmlformats.org/drawingml/2006/chart" xmlns:r="http://schemas.openxmlformats.org/officeDocument/2006/relationships" r:id="rId2"/>
-          </a:graphicData>
-        </a:graphic>
-      </p:graphicFrame>
-    </p:spTree>
-    <p:extLst>
-      <p:ext uri="{BB962C8B-B14F-4D97-AF65-F5344CB8AC3E}">
-        <p14:creationId xmlns:p14="http://schemas.microsoft.com/office/powerpoint/2010/main" val="1166079948"/>
       </p:ext>
     </p:extLst>
   </p:cSld>
@@ -16681,6 +16791,36 @@
           <a:chExt cx="0" cy="0"/>
         </a:xfrm>
       </p:grpSpPr>
+      <p:pic>
+        <p:nvPicPr>
+          <p:cNvPr id="6" name="Immagine 5"/>
+          <p:cNvPicPr>
+            <a:picLocks noChangeAspect="1"/>
+          </p:cNvPicPr>
+          <p:nvPr/>
+        </p:nvPicPr>
+        <p:blipFill>
+          <a:blip r:embed="rId2" cstate="print">
+            <a:extLst>
+              <a:ext uri="{28A0092B-C50C-407E-A947-70E740481C1C}">
+                <a14:useLocalDpi xmlns:a14="http://schemas.microsoft.com/office/drawing/2010/main" val="0"/>
+              </a:ext>
+            </a:extLst>
+          </a:blip>
+          <a:stretch>
+            <a:fillRect/>
+          </a:stretch>
+        </p:blipFill>
+        <p:spPr>
+          <a:xfrm>
+            <a:off x="2750630" y="1268760"/>
+            <a:ext cx="3765586" cy="4581128"/>
+          </a:xfrm>
+          <a:prstGeom prst="rect">
+            <a:avLst/>
+          </a:prstGeom>
+        </p:spPr>
+      </p:pic>
       <p:sp>
         <p:nvSpPr>
           <p:cNvPr id="3" name="Segnaposto data 2"/>
@@ -16728,16 +16868,147 @@
           </a:p>
         </p:txBody>
       </p:sp>
+      <p:graphicFrame>
+        <p:nvGraphicFramePr>
+          <p:cNvPr id="5" name="Grafico 4"/>
+          <p:cNvGraphicFramePr>
+            <a:graphicFrameLocks/>
+          </p:cNvGraphicFramePr>
+          <p:nvPr>
+            <p:extLst>
+              <p:ext uri="{D42A27DB-BD31-4B8C-83A1-F6EECF244321}">
+                <p14:modId xmlns:p14="http://schemas.microsoft.com/office/powerpoint/2010/main" val="67701067"/>
+              </p:ext>
+            </p:extLst>
+          </p:nvPr>
+        </p:nvGraphicFramePr>
+        <p:xfrm>
+          <a:off x="899592" y="1340768"/>
+          <a:ext cx="7272808" cy="4680520"/>
+        </p:xfrm>
+        <a:graphic>
+          <a:graphicData uri="http://schemas.openxmlformats.org/drawingml/2006/chart">
+            <c:chart xmlns:c="http://schemas.openxmlformats.org/drawingml/2006/chart" xmlns:r="http://schemas.openxmlformats.org/officeDocument/2006/relationships" r:id="rId3"/>
+          </a:graphicData>
+        </a:graphic>
+      </p:graphicFrame>
+    </p:spTree>
+    <p:extLst>
+      <p:ext uri="{BB962C8B-B14F-4D97-AF65-F5344CB8AC3E}">
+        <p14:creationId xmlns:p14="http://schemas.microsoft.com/office/powerpoint/2010/main" val="1166079948"/>
+      </p:ext>
+    </p:extLst>
+  </p:cSld>
+  <p:clrMapOvr>
+    <a:masterClrMapping/>
+  </p:clrMapOvr>
+</p:sld>
+</file>
+
+<file path=ppt/slides/slide23.xml><?xml version="1.0" encoding="utf-8"?>
+<p:sld xmlns:a="http://schemas.openxmlformats.org/drawingml/2006/main" xmlns:r="http://schemas.openxmlformats.org/officeDocument/2006/relationships" xmlns:p="http://schemas.openxmlformats.org/presentationml/2006/main">
+  <p:cSld>
+    <p:spTree>
+      <p:nvGrpSpPr>
+        <p:cNvPr id="1" name=""/>
+        <p:cNvGrpSpPr/>
+        <p:nvPr/>
+      </p:nvGrpSpPr>
+      <p:grpSpPr>
+        <a:xfrm>
+          <a:off x="0" y="0"/>
+          <a:ext cx="0" cy="0"/>
+          <a:chOff x="0" y="0"/>
+          <a:chExt cx="0" cy="0"/>
+        </a:xfrm>
+      </p:grpSpPr>
       <p:pic>
         <p:nvPicPr>
-          <p:cNvPr id="1026" name="Picture 2" descr="C:\Users\Jack Thomas J. Storn\Università\Team-Committed---Documenti\RP\Esterni\Presentazione\img\ruolo-ore.jpg"/>
+          <p:cNvPr id="5" name="Immagine 4"/>
+          <p:cNvPicPr>
+            <a:picLocks noChangeAspect="1"/>
+          </p:cNvPicPr>
+          <p:nvPr/>
+        </p:nvPicPr>
+        <p:blipFill>
+          <a:blip r:embed="rId2" cstate="print">
+            <a:extLst>
+              <a:ext uri="{28A0092B-C50C-407E-A947-70E740481C1C}">
+                <a14:useLocalDpi xmlns:a14="http://schemas.microsoft.com/office/drawing/2010/main" val="0"/>
+              </a:ext>
+            </a:extLst>
+          </a:blip>
+          <a:stretch>
+            <a:fillRect/>
+          </a:stretch>
+        </p:blipFill>
+        <p:spPr>
+          <a:xfrm>
+            <a:off x="2750630" y="1268760"/>
+            <a:ext cx="3765586" cy="4581128"/>
+          </a:xfrm>
+          <a:prstGeom prst="rect">
+            <a:avLst/>
+          </a:prstGeom>
+        </p:spPr>
+      </p:pic>
+      <p:sp>
+        <p:nvSpPr>
+          <p:cNvPr id="3" name="Segnaposto data 2"/>
+          <p:cNvSpPr>
+            <a:spLocks noGrp="1"/>
+          </p:cNvSpPr>
+          <p:nvPr>
+            <p:ph type="dt" sz="half" idx="10"/>
+          </p:nvPr>
+        </p:nvSpPr>
+        <p:spPr/>
+        <p:txBody>
+          <a:bodyPr/>
+          <a:lstStyle/>
+          <a:p>
+            <a:r>
+              <a:rPr lang="it-IT" smtClean="0"/>
+              <a:t>Progetto Gamification - Team Committed</a:t>
+            </a:r>
+            <a:endParaRPr lang="it-IT"/>
+          </a:p>
+        </p:txBody>
+      </p:sp>
+      <p:sp>
+        <p:nvSpPr>
+          <p:cNvPr id="4" name="Segnaposto numero diapositiva 3"/>
+          <p:cNvSpPr>
+            <a:spLocks noGrp="1"/>
+          </p:cNvSpPr>
+          <p:nvPr>
+            <p:ph type="sldNum" sz="quarter" idx="12"/>
+          </p:nvPr>
+        </p:nvSpPr>
+        <p:spPr/>
+        <p:txBody>
+          <a:bodyPr/>
+          <a:lstStyle/>
+          <a:p>
+            <a:fld id="{017EC607-BD11-4D4E-AC5F-155C854A0B9D}" type="slidenum">
+              <a:rPr lang="it-IT" smtClean="0"/>
+              <a:pPr/>
+              <a:t>23</a:t>
+            </a:fld>
+            <a:endParaRPr lang="it-IT"/>
+          </a:p>
+        </p:txBody>
+      </p:sp>
+      <p:pic>
+        <p:nvPicPr>
+          <p:cNvPr id="1027" name="Picture 3" descr="C:\Users\Jack Thomas J. Storn\Università\Team-Committed---Documenti\RP\Esterni\Presentazione\img\ruolo-ore.jpg"/>
           <p:cNvPicPr>
             <a:picLocks noChangeAspect="1" noChangeArrowheads="1"/>
           </p:cNvPicPr>
           <p:nvPr/>
         </p:nvPicPr>
         <p:blipFill>
-          <a:blip r:embed="rId2">
+          <a:blip r:embed="rId3">
             <a:extLst>
               <a:ext uri="{28A0092B-C50C-407E-A947-70E740481C1C}">
                 <a14:useLocalDpi xmlns:a14="http://schemas.microsoft.com/office/drawing/2010/main" val="0"/>
@@ -16751,8 +17022,8 @@
         </p:blipFill>
         <p:spPr bwMode="auto">
           <a:xfrm>
-            <a:off x="683568" y="2636912"/>
-            <a:ext cx="7862748" cy="2160240"/>
+            <a:off x="803827" y="2521606"/>
+            <a:ext cx="7659191" cy="2075435"/>
           </a:xfrm>
           <a:prstGeom prst="rect">
             <a:avLst/>
@@ -16779,6 +17050,13 @@
   <p:clrMapOvr>
     <a:masterClrMapping/>
   </p:clrMapOvr>
+  <p:timing>
+    <p:tnLst>
+      <p:par>
+        <p:cTn id="1" dur="indefinite" restart="never" nodeType="tmRoot"/>
+      </p:par>
+    </p:tnLst>
+  </p:timing>
 </p:sld>
 </file>
 
@@ -16846,17 +17124,19 @@
           </a:xfrm>
         </p:spPr>
         <p:txBody>
-          <a:bodyPr/>
+          <a:bodyPr>
+            <a:normAutofit/>
+          </a:bodyPr>
           <a:lstStyle/>
           <a:p>
             <a:pPr algn="ctr"/>
             <a:r>
-              <a:rPr lang="it-IT" dirty="0" smtClean="0"/>
-              <a:t>2. </a:t>
+              <a:rPr lang="it-IT" dirty="0"/>
+              <a:t>1</a:t>
             </a:r>
             <a:r>
-              <a:rPr lang="it-IT" dirty="0" err="1" smtClean="0"/>
-              <a:t>Back-End</a:t>
+              <a:rPr lang="it-IT" dirty="0" smtClean="0"/>
+              <a:t>. Architettura generale</a:t>
             </a:r>
             <a:endParaRPr lang="it-IT" dirty="0"/>
           </a:p>
@@ -16915,7 +17195,7 @@
     </p:spTree>
     <p:extLst>
       <p:ext uri="{BB962C8B-B14F-4D97-AF65-F5344CB8AC3E}">
-        <p14:creationId xmlns:p14="http://schemas.microsoft.com/office/powerpoint/2010/main" val="2537002"/>
+        <p14:creationId xmlns:p14="http://schemas.microsoft.com/office/powerpoint/2010/main" val="318276201"/>
       </p:ext>
     </p:extLst>
   </p:cSld>
@@ -16933,130 +17213,6 @@
 </file>
 
 <file path=ppt/slides/slide4.xml><?xml version="1.0" encoding="utf-8"?>
-<p:sld xmlns:a="http://schemas.openxmlformats.org/drawingml/2006/main" xmlns:r="http://schemas.openxmlformats.org/officeDocument/2006/relationships" xmlns:p="http://schemas.openxmlformats.org/presentationml/2006/main">
-  <p:cSld>
-    <p:spTree>
-      <p:nvGrpSpPr>
-        <p:cNvPr id="1" name=""/>
-        <p:cNvGrpSpPr/>
-        <p:nvPr/>
-      </p:nvGrpSpPr>
-      <p:grpSpPr>
-        <a:xfrm>
-          <a:off x="0" y="0"/>
-          <a:ext cx="0" cy="0"/>
-          <a:chOff x="0" y="0"/>
-          <a:chExt cx="0" cy="0"/>
-        </a:xfrm>
-      </p:grpSpPr>
-      <p:sp>
-        <p:nvSpPr>
-          <p:cNvPr id="6" name="Segnaposto data 5"/>
-          <p:cNvSpPr>
-            <a:spLocks noGrp="1"/>
-          </p:cNvSpPr>
-          <p:nvPr>
-            <p:ph type="dt" sz="half" idx="10"/>
-          </p:nvPr>
-        </p:nvSpPr>
-        <p:spPr/>
-        <p:txBody>
-          <a:bodyPr/>
-          <a:lstStyle/>
-          <a:p>
-            <a:r>
-              <a:rPr lang="it-IT" dirty="0" smtClean="0"/>
-              <a:t>Progetto </a:t>
-            </a:r>
-            <a:r>
-              <a:rPr lang="it-IT" dirty="0" err="1" smtClean="0"/>
-              <a:t>Gamification</a:t>
-            </a:r>
-            <a:r>
-              <a:rPr lang="it-IT" dirty="0" smtClean="0"/>
-              <a:t> - Team </a:t>
-            </a:r>
-            <a:r>
-              <a:rPr lang="it-IT" dirty="0" err="1" smtClean="0"/>
-              <a:t>Committed</a:t>
-            </a:r>
-            <a:endParaRPr lang="it-IT" dirty="0"/>
-          </a:p>
-        </p:txBody>
-      </p:sp>
-      <p:sp>
-        <p:nvSpPr>
-          <p:cNvPr id="9" name="Segnaposto numero diapositiva 8"/>
-          <p:cNvSpPr>
-            <a:spLocks noGrp="1"/>
-          </p:cNvSpPr>
-          <p:nvPr>
-            <p:ph type="sldNum" sz="quarter" idx="12"/>
-          </p:nvPr>
-        </p:nvSpPr>
-        <p:spPr/>
-        <p:txBody>
-          <a:bodyPr/>
-          <a:lstStyle/>
-          <a:p>
-            <a:fld id="{017EC607-BD11-4D4E-AC5F-155C854A0B9D}" type="slidenum">
-              <a:rPr lang="it-IT" smtClean="0"/>
-              <a:pPr/>
-              <a:t>4</a:t>
-            </a:fld>
-            <a:r>
-              <a:rPr lang="it-IT" dirty="0" smtClean="0"/>
-              <a:t> di 67</a:t>
-            </a:r>
-            <a:endParaRPr lang="it-IT" dirty="0"/>
-          </a:p>
-        </p:txBody>
-      </p:sp>
-      <p:pic>
-        <p:nvPicPr>
-          <p:cNvPr id="5" name="Immagine 4" descr="BackEnd.png"/>
-          <p:cNvPicPr>
-            <a:picLocks noChangeAspect="1"/>
-          </p:cNvPicPr>
-          <p:nvPr/>
-        </p:nvPicPr>
-        <p:blipFill>
-          <a:blip r:embed="rId2" cstate="print"/>
-          <a:stretch>
-            <a:fillRect/>
-          </a:stretch>
-        </p:blipFill>
-        <p:spPr>
-          <a:xfrm>
-            <a:off x="2339752" y="692696"/>
-            <a:ext cx="4418852" cy="5776071"/>
-          </a:xfrm>
-          <a:prstGeom prst="rect">
-            <a:avLst/>
-          </a:prstGeom>
-        </p:spPr>
-      </p:pic>
-    </p:spTree>
-    <p:extLst>
-      <p:ext uri="{BB962C8B-B14F-4D97-AF65-F5344CB8AC3E}">
-        <p14:creationId xmlns:p14="http://schemas.microsoft.com/office/powerpoint/2010/main" val="200703652"/>
-      </p:ext>
-    </p:extLst>
-  </p:cSld>
-  <p:clrMapOvr>
-    <a:masterClrMapping/>
-  </p:clrMapOvr>
-  <p:timing>
-    <p:tnLst>
-      <p:par>
-        <p:cTn id="1" dur="indefinite" restart="never" nodeType="tmRoot"/>
-      </p:par>
-    </p:tnLst>
-  </p:timing>
-</p:sld>
-</file>
-
-<file path=ppt/slides/slide5.xml><?xml version="1.0" encoding="utf-8"?>
 <p:sld xmlns:a="http://schemas.openxmlformats.org/drawingml/2006/main" xmlns:r="http://schemas.openxmlformats.org/officeDocument/2006/relationships" xmlns:p="http://schemas.openxmlformats.org/presentationml/2006/main">
   <p:cSld>
     <p:spTree>
@@ -17126,15 +17282,11 @@
             <a:pPr algn="ctr"/>
             <a:r>
               <a:rPr lang="it-IT" dirty="0" smtClean="0"/>
-              <a:t>4. </a:t>
+              <a:t>2. </a:t>
             </a:r>
             <a:r>
               <a:rPr lang="it-IT" dirty="0" err="1" smtClean="0"/>
-              <a:t>Front-End</a:t>
-            </a:r>
-            <a:r>
-              <a:rPr lang="it-IT" dirty="0" smtClean="0"/>
-              <a:t> web</a:t>
+              <a:t>Back-End</a:t>
             </a:r>
             <a:endParaRPr lang="it-IT" dirty="0"/>
           </a:p>
@@ -17181,7 +17333,7 @@
             <a:fld id="{017EC607-BD11-4D4E-AC5F-155C854A0B9D}" type="slidenum">
               <a:rPr lang="it-IT" smtClean="0"/>
               <a:pPr/>
-              <a:t>5</a:t>
+              <a:t>4</a:t>
             </a:fld>
             <a:r>
               <a:rPr lang="it-IT" dirty="0" smtClean="0"/>
@@ -17210,7 +17362,7 @@
 </p:sld>
 </file>
 
-<file path=ppt/slides/slide6.xml><?xml version="1.0" encoding="utf-8"?>
+<file path=ppt/slides/slide5.xml><?xml version="1.0" encoding="utf-8"?>
 <p:sld xmlns:a="http://schemas.openxmlformats.org/drawingml/2006/main" xmlns:r="http://schemas.openxmlformats.org/officeDocument/2006/relationships" xmlns:p="http://schemas.openxmlformats.org/presentationml/2006/main">
   <p:cSld>
     <p:spTree>
@@ -17280,7 +17432,7 @@
             <a:fld id="{017EC607-BD11-4D4E-AC5F-155C854A0B9D}" type="slidenum">
               <a:rPr lang="it-IT" smtClean="0"/>
               <a:pPr/>
-              <a:t>6</a:t>
+              <a:t>5</a:t>
             </a:fld>
             <a:r>
               <a:rPr lang="it-IT" dirty="0" smtClean="0"/>
@@ -17292,7 +17444,7 @@
       </p:sp>
       <p:pic>
         <p:nvPicPr>
-          <p:cNvPr id="11" name="Immagine 10" descr="frontEndWeb.png"/>
+          <p:cNvPr id="5" name="Immagine 4" descr="BackEnd.png"/>
           <p:cNvPicPr>
             <a:picLocks noChangeAspect="1"/>
           </p:cNvPicPr>
@@ -17306,8 +17458,8 @@
         </p:blipFill>
         <p:spPr>
           <a:xfrm>
-            <a:off x="2051720" y="692696"/>
-            <a:ext cx="5020413" cy="5760640"/>
+            <a:off x="2339752" y="692696"/>
+            <a:ext cx="4418852" cy="5776071"/>
           </a:xfrm>
           <a:prstGeom prst="rect">
             <a:avLst/>
@@ -17334,7 +17486,7 @@
 </p:sld>
 </file>
 
-<file path=ppt/slides/slide7.xml><?xml version="1.0" encoding="utf-8"?>
+<file path=ppt/slides/slide6.xml><?xml version="1.0" encoding="utf-8"?>
 <p:sld xmlns:a="http://schemas.openxmlformats.org/drawingml/2006/main" xmlns:r="http://schemas.openxmlformats.org/officeDocument/2006/relationships" xmlns:p="http://schemas.openxmlformats.org/presentationml/2006/main">
   <p:cSld>
     <p:spTree>
@@ -17404,7 +17556,7 @@
             <a:pPr algn="ctr"/>
             <a:r>
               <a:rPr lang="it-IT" dirty="0" smtClean="0"/>
-              <a:t>5. </a:t>
+              <a:t>4. </a:t>
             </a:r>
             <a:r>
               <a:rPr lang="it-IT" dirty="0" err="1" smtClean="0"/>
@@ -17412,7 +17564,7 @@
             </a:r>
             <a:r>
               <a:rPr lang="it-IT" dirty="0" smtClean="0"/>
-              <a:t> Mobile</a:t>
+              <a:t> web</a:t>
             </a:r>
             <a:endParaRPr lang="it-IT" dirty="0"/>
           </a:p>
@@ -17459,7 +17611,7 @@
             <a:fld id="{017EC607-BD11-4D4E-AC5F-155C854A0B9D}" type="slidenum">
               <a:rPr lang="it-IT" smtClean="0"/>
               <a:pPr/>
-              <a:t>7</a:t>
+              <a:t>6</a:t>
             </a:fld>
             <a:r>
               <a:rPr lang="it-IT" dirty="0" smtClean="0"/>
@@ -17488,7 +17640,7 @@
 </p:sld>
 </file>
 
-<file path=ppt/slides/slide8.xml><?xml version="1.0" encoding="utf-8"?>
+<file path=ppt/slides/slide7.xml><?xml version="1.0" encoding="utf-8"?>
 <p:sld xmlns:a="http://schemas.openxmlformats.org/drawingml/2006/main" xmlns:r="http://schemas.openxmlformats.org/officeDocument/2006/relationships" xmlns:p="http://schemas.openxmlformats.org/presentationml/2006/main">
   <p:cSld>
     <p:spTree>
@@ -17558,7 +17710,7 @@
             <a:fld id="{017EC607-BD11-4D4E-AC5F-155C854A0B9D}" type="slidenum">
               <a:rPr lang="it-IT" smtClean="0"/>
               <a:pPr/>
-              <a:t>8</a:t>
+              <a:t>7</a:t>
             </a:fld>
             <a:r>
               <a:rPr lang="it-IT" dirty="0" smtClean="0"/>
@@ -17570,7 +17722,7 @@
       </p:sp>
       <p:pic>
         <p:nvPicPr>
-          <p:cNvPr id="5" name="Immagine 4" descr="frontEndMobile.png"/>
+          <p:cNvPr id="11" name="Immagine 10" descr="frontEndWeb.png"/>
           <p:cNvPicPr>
             <a:picLocks noChangeAspect="1"/>
           </p:cNvPicPr>
@@ -17584,8 +17736,8 @@
         </p:blipFill>
         <p:spPr>
           <a:xfrm>
-            <a:off x="2411760" y="692696"/>
-            <a:ext cx="4328268" cy="5797109"/>
+            <a:off x="2051720" y="692696"/>
+            <a:ext cx="5020413" cy="5760640"/>
           </a:xfrm>
           <a:prstGeom prst="rect">
             <a:avLst/>
@@ -17612,7 +17764,7 @@
 </p:sld>
 </file>
 
-<file path=ppt/slides/slide9.xml><?xml version="1.0" encoding="utf-8"?>
+<file path=ppt/slides/slide8.xml><?xml version="1.0" encoding="utf-8"?>
 <p:sld xmlns:a="http://schemas.openxmlformats.org/drawingml/2006/main" xmlns:r="http://schemas.openxmlformats.org/officeDocument/2006/relationships" xmlns:p="http://schemas.openxmlformats.org/presentationml/2006/main">
   <p:cSld>
     <p:spTree>
@@ -17682,7 +17834,15 @@
             <a:pPr algn="ctr"/>
             <a:r>
               <a:rPr lang="it-IT" dirty="0" smtClean="0"/>
-              <a:t>6. Diagrammi delle Attività</a:t>
+              <a:t>5. </a:t>
+            </a:r>
+            <a:r>
+              <a:rPr lang="it-IT" dirty="0" err="1" smtClean="0"/>
+              <a:t>Front-End</a:t>
+            </a:r>
+            <a:r>
+              <a:rPr lang="it-IT" dirty="0" smtClean="0"/>
+              <a:t> Mobile</a:t>
             </a:r>
             <a:endParaRPr lang="it-IT" dirty="0"/>
           </a:p>
@@ -17729,7 +17889,7 @@
             <a:fld id="{017EC607-BD11-4D4E-AC5F-155C854A0B9D}" type="slidenum">
               <a:rPr lang="it-IT" smtClean="0"/>
               <a:pPr/>
-              <a:t>9</a:t>
+              <a:t>8</a:t>
             </a:fld>
             <a:r>
               <a:rPr lang="it-IT" dirty="0" smtClean="0"/>
@@ -17756,6 +17916,136 @@
     </p:tnLst>
   </p:timing>
 </p:sld>
+</file>
+
+<file path=ppt/slides/slide9.xml><?xml version="1.0" encoding="utf-8"?>
+<p:sld xmlns:a="http://schemas.openxmlformats.org/drawingml/2006/main" xmlns:r="http://schemas.openxmlformats.org/officeDocument/2006/relationships" xmlns:p="http://schemas.openxmlformats.org/presentationml/2006/main">
+  <p:cSld>
+    <p:spTree>
+      <p:nvGrpSpPr>
+        <p:cNvPr id="1" name=""/>
+        <p:cNvGrpSpPr/>
+        <p:nvPr/>
+      </p:nvGrpSpPr>
+      <p:grpSpPr>
+        <a:xfrm>
+          <a:off x="0" y="0"/>
+          <a:ext cx="0" cy="0"/>
+          <a:chOff x="0" y="0"/>
+          <a:chExt cx="0" cy="0"/>
+        </a:xfrm>
+      </p:grpSpPr>
+      <p:sp>
+        <p:nvSpPr>
+          <p:cNvPr id="6" name="Segnaposto data 5"/>
+          <p:cNvSpPr>
+            <a:spLocks noGrp="1"/>
+          </p:cNvSpPr>
+          <p:nvPr>
+            <p:ph type="dt" sz="half" idx="10"/>
+          </p:nvPr>
+        </p:nvSpPr>
+        <p:spPr/>
+        <p:txBody>
+          <a:bodyPr/>
+          <a:lstStyle/>
+          <a:p>
+            <a:r>
+              <a:rPr lang="it-IT" dirty="0" smtClean="0"/>
+              <a:t>Progetto </a:t>
+            </a:r>
+            <a:r>
+              <a:rPr lang="it-IT" dirty="0" err="1" smtClean="0"/>
+              <a:t>Gamification</a:t>
+            </a:r>
+            <a:r>
+              <a:rPr lang="it-IT" dirty="0" smtClean="0"/>
+              <a:t> - Team </a:t>
+            </a:r>
+            <a:r>
+              <a:rPr lang="it-IT" dirty="0" err="1" smtClean="0"/>
+              <a:t>Committed</a:t>
+            </a:r>
+            <a:endParaRPr lang="it-IT" dirty="0"/>
+          </a:p>
+        </p:txBody>
+      </p:sp>
+      <p:sp>
+        <p:nvSpPr>
+          <p:cNvPr id="9" name="Segnaposto numero diapositiva 8"/>
+          <p:cNvSpPr>
+            <a:spLocks noGrp="1"/>
+          </p:cNvSpPr>
+          <p:nvPr>
+            <p:ph type="sldNum" sz="quarter" idx="12"/>
+          </p:nvPr>
+        </p:nvSpPr>
+        <p:spPr/>
+        <p:txBody>
+          <a:bodyPr/>
+          <a:lstStyle/>
+          <a:p>
+            <a:fld id="{017EC607-BD11-4D4E-AC5F-155C854A0B9D}" type="slidenum">
+              <a:rPr lang="it-IT" smtClean="0"/>
+              <a:pPr/>
+              <a:t>9</a:t>
+            </a:fld>
+            <a:r>
+              <a:rPr lang="it-IT" dirty="0" smtClean="0"/>
+              <a:t> di 67</a:t>
+            </a:r>
+            <a:endParaRPr lang="it-IT" dirty="0"/>
+          </a:p>
+        </p:txBody>
+      </p:sp>
+      <p:pic>
+        <p:nvPicPr>
+          <p:cNvPr id="5" name="Immagine 4" descr="frontEndMobile.png"/>
+          <p:cNvPicPr>
+            <a:picLocks noChangeAspect="1"/>
+          </p:cNvPicPr>
+          <p:nvPr/>
+        </p:nvPicPr>
+        <p:blipFill>
+          <a:blip r:embed="rId2" cstate="print"/>
+          <a:stretch>
+            <a:fillRect/>
+          </a:stretch>
+        </p:blipFill>
+        <p:spPr>
+          <a:xfrm>
+            <a:off x="2411760" y="692696"/>
+            <a:ext cx="4328268" cy="5797109"/>
+          </a:xfrm>
+          <a:prstGeom prst="rect">
+            <a:avLst/>
+          </a:prstGeom>
+        </p:spPr>
+      </p:pic>
+    </p:spTree>
+    <p:extLst>
+      <p:ext uri="{BB962C8B-B14F-4D97-AF65-F5344CB8AC3E}">
+        <p14:creationId xmlns:p14="http://schemas.microsoft.com/office/powerpoint/2010/main" val="200703652"/>
+      </p:ext>
+    </p:extLst>
+  </p:cSld>
+  <p:clrMapOvr>
+    <a:masterClrMapping/>
+  </p:clrMapOvr>
+  <p:timing>
+    <p:tnLst>
+      <p:par>
+        <p:cTn id="1" dur="indefinite" restart="never" nodeType="tmRoot"/>
+      </p:par>
+    </p:tnLst>
+  </p:timing>
+</p:sld>
+</file>
+
+<file path=ppt/tags/tag1.xml><?xml version="1.0" encoding="utf-8"?>
+<p:tagLst xmlns:a="http://schemas.openxmlformats.org/drawingml/2006/main" xmlns:r="http://schemas.openxmlformats.org/officeDocument/2006/relationships" xmlns:p="http://schemas.openxmlformats.org/presentationml/2006/main">
+  <p:tag name="FIRSTJACK20THOMAS20J2E20STORN@9SHLINNFUVWZY5H8" val="4416"/>
+</p:tagLst>
 </file>
 
 <file path=ppt/theme/theme1.xml><?xml version="1.0" encoding="utf-8"?>

</xml_diff>

<commit_message>
[Presentazione] inserita parte di jack
</commit_message>
<xml_diff>
--- a/RP/Esterni/Presentazione/RP-Presentazione.pptx
+++ b/RP/Esterni/Presentazione/RP-Presentazione.pptx
@@ -5,37 +5,40 @@
     <p:sldMasterId id="2147483732" r:id="rId1"/>
   </p:sldMasterIdLst>
   <p:notesMasterIdLst>
-    <p:notesMasterId r:id="rId25"/>
+    <p:notesMasterId r:id="rId28"/>
   </p:notesMasterIdLst>
   <p:sldIdLst>
     <p:sldId id="256" r:id="rId2"/>
     <p:sldId id="289" r:id="rId3"/>
     <p:sldId id="291" r:id="rId4"/>
-    <p:sldId id="269" r:id="rId5"/>
-    <p:sldId id="274" r:id="rId6"/>
-    <p:sldId id="267" r:id="rId7"/>
-    <p:sldId id="258" r:id="rId8"/>
-    <p:sldId id="270" r:id="rId9"/>
-    <p:sldId id="275" r:id="rId10"/>
-    <p:sldId id="283" r:id="rId11"/>
-    <p:sldId id="284" r:id="rId12"/>
-    <p:sldId id="272" r:id="rId13"/>
-    <p:sldId id="276" r:id="rId14"/>
-    <p:sldId id="279" r:id="rId15"/>
-    <p:sldId id="277" r:id="rId16"/>
-    <p:sldId id="278" r:id="rId17"/>
-    <p:sldId id="280" r:id="rId18"/>
-    <p:sldId id="281" r:id="rId19"/>
-    <p:sldId id="282" r:id="rId20"/>
-    <p:sldId id="285" r:id="rId21"/>
-    <p:sldId id="286" r:id="rId22"/>
-    <p:sldId id="287" r:id="rId23"/>
-    <p:sldId id="288" r:id="rId24"/>
+    <p:sldId id="292" r:id="rId5"/>
+    <p:sldId id="269" r:id="rId6"/>
+    <p:sldId id="274" r:id="rId7"/>
+    <p:sldId id="294" r:id="rId8"/>
+    <p:sldId id="295" r:id="rId9"/>
+    <p:sldId id="267" r:id="rId10"/>
+    <p:sldId id="258" r:id="rId11"/>
+    <p:sldId id="270" r:id="rId12"/>
+    <p:sldId id="275" r:id="rId13"/>
+    <p:sldId id="283" r:id="rId14"/>
+    <p:sldId id="284" r:id="rId15"/>
+    <p:sldId id="272" r:id="rId16"/>
+    <p:sldId id="276" r:id="rId17"/>
+    <p:sldId id="279" r:id="rId18"/>
+    <p:sldId id="277" r:id="rId19"/>
+    <p:sldId id="278" r:id="rId20"/>
+    <p:sldId id="280" r:id="rId21"/>
+    <p:sldId id="281" r:id="rId22"/>
+    <p:sldId id="282" r:id="rId23"/>
+    <p:sldId id="285" r:id="rId24"/>
+    <p:sldId id="286" r:id="rId25"/>
+    <p:sldId id="287" r:id="rId26"/>
+    <p:sldId id="288" r:id="rId27"/>
   </p:sldIdLst>
   <p:sldSz cx="9144000" cy="6858000" type="screen4x3"/>
   <p:notesSz cx="6858000" cy="9144000"/>
   <p:custDataLst>
-    <p:tags r:id="rId26"/>
+    <p:tags r:id="rId29"/>
   </p:custDataLst>
   <p:defaultTextStyle>
     <a:defPPr>
@@ -144,12 +147,19 @@
         <p14:section name="Architettura generale" id="{6F4A72FC-0B7C-4C83-9D15-857EBA731DD5}">
           <p14:sldIdLst>
             <p14:sldId id="291"/>
+            <p14:sldId id="292"/>
           </p14:sldIdLst>
         </p14:section>
         <p14:section name="Back-end" id="{B1AC9BCB-654F-44A6-9A36-56CD55C0B211}">
           <p14:sldIdLst>
             <p14:sldId id="269"/>
             <p14:sldId id="274"/>
+          </p14:sldIdLst>
+        </p14:section>
+        <p14:section name="Front-end Desktop" id="{0361C737-8258-45B7-B1BE-870846A54225}">
+          <p14:sldIdLst>
+            <p14:sldId id="294"/>
+            <p14:sldId id="295"/>
           </p14:sldIdLst>
         </p14:section>
         <p14:section name="Front-end Web" id="{6219A79B-3513-4FC7-8C97-BF4EC9505F50}">
@@ -369,12 +379,12 @@
         </c:dLbls>
         <c:gapWidth val="150"/>
         <c:shape val="box"/>
-        <c:axId val="91047040"/>
-        <c:axId val="91048576"/>
+        <c:axId val="65418368"/>
+        <c:axId val="65419904"/>
         <c:axId val="0"/>
       </c:bar3DChart>
       <c:catAx>
-        <c:axId val="91047040"/>
+        <c:axId val="65418368"/>
         <c:scaling>
           <c:orientation val="minMax"/>
         </c:scaling>
@@ -383,7 +393,7 @@
         <c:majorTickMark val="out"/>
         <c:minorTickMark val="none"/>
         <c:tickLblPos val="nextTo"/>
-        <c:crossAx val="91048576"/>
+        <c:crossAx val="65419904"/>
         <c:crosses val="autoZero"/>
         <c:auto val="1"/>
         <c:lblAlgn val="ctr"/>
@@ -391,7 +401,7 @@
         <c:noMultiLvlLbl val="0"/>
       </c:catAx>
       <c:valAx>
-        <c:axId val="91048576"/>
+        <c:axId val="65419904"/>
         <c:scaling>
           <c:orientation val="minMax"/>
         </c:scaling>
@@ -402,7 +412,7 @@
         <c:majorTickMark val="out"/>
         <c:minorTickMark val="none"/>
         <c:tickLblPos val="nextTo"/>
-        <c:crossAx val="91047040"/>
+        <c:crossAx val="65418368"/>
         <c:crosses val="autoZero"/>
         <c:crossBetween val="between"/>
       </c:valAx>
@@ -590,12 +600,12 @@
         </c:dLbls>
         <c:gapWidth val="150"/>
         <c:shape val="box"/>
-        <c:axId val="91362816"/>
-        <c:axId val="91364352"/>
+        <c:axId val="65472000"/>
+        <c:axId val="65473536"/>
         <c:axId val="0"/>
       </c:bar3DChart>
       <c:catAx>
-        <c:axId val="91362816"/>
+        <c:axId val="65472000"/>
         <c:scaling>
           <c:orientation val="minMax"/>
         </c:scaling>
@@ -604,7 +614,7 @@
         <c:majorTickMark val="out"/>
         <c:minorTickMark val="none"/>
         <c:tickLblPos val="nextTo"/>
-        <c:crossAx val="91364352"/>
+        <c:crossAx val="65473536"/>
         <c:crosses val="autoZero"/>
         <c:auto val="1"/>
         <c:lblAlgn val="ctr"/>
@@ -612,7 +622,7 @@
         <c:noMultiLvlLbl val="0"/>
       </c:catAx>
       <c:valAx>
-        <c:axId val="91364352"/>
+        <c:axId val="65473536"/>
         <c:scaling>
           <c:orientation val="minMax"/>
         </c:scaling>
@@ -623,7 +633,7 @@
         <c:majorTickMark val="out"/>
         <c:minorTickMark val="none"/>
         <c:tickLblPos val="nextTo"/>
-        <c:crossAx val="91362816"/>
+        <c:crossAx val="65472000"/>
         <c:crosses val="autoZero"/>
         <c:crossBetween val="between"/>
       </c:valAx>
@@ -758,7 +768,7 @@
             <a:fld id="{6B71E980-16C9-4DBF-B0BF-5D16F9726465}" type="datetimeFigureOut">
               <a:rPr lang="it-IT" smtClean="0"/>
               <a:pPr/>
-              <a:t>03/02/2012</a:t>
+              <a:t>06/02/2012</a:t>
             </a:fld>
             <a:endParaRPr lang="it-IT"/>
           </a:p>
@@ -14929,152 +14939,6 @@
           <a:chExt cx="0" cy="0"/>
         </a:xfrm>
       </p:grpSpPr>
-      <p:pic>
-        <p:nvPicPr>
-          <p:cNvPr id="3" name="Immagine 2"/>
-          <p:cNvPicPr>
-            <a:picLocks noChangeAspect="1"/>
-          </p:cNvPicPr>
-          <p:nvPr/>
-        </p:nvPicPr>
-        <p:blipFill>
-          <a:blip r:embed="rId2" cstate="print">
-            <a:extLst>
-              <a:ext uri="{28A0092B-C50C-407E-A947-70E740481C1C}">
-                <a14:useLocalDpi xmlns:a14="http://schemas.microsoft.com/office/drawing/2010/main" val="0"/>
-              </a:ext>
-            </a:extLst>
-          </a:blip>
-          <a:stretch>
-            <a:fillRect/>
-          </a:stretch>
-        </p:blipFill>
-        <p:spPr>
-          <a:xfrm>
-            <a:off x="2750630" y="1268760"/>
-            <a:ext cx="3765586" cy="4581128"/>
-          </a:xfrm>
-          <a:prstGeom prst="rect">
-            <a:avLst/>
-          </a:prstGeom>
-        </p:spPr>
-      </p:pic>
-      <p:sp>
-        <p:nvSpPr>
-          <p:cNvPr id="2" name="Titolo 1"/>
-          <p:cNvSpPr>
-            <a:spLocks noGrp="1"/>
-          </p:cNvSpPr>
-          <p:nvPr>
-            <p:ph type="title"/>
-          </p:nvPr>
-        </p:nvSpPr>
-        <p:spPr>
-          <a:xfrm>
-            <a:off x="1043608" y="2996952"/>
-            <a:ext cx="7024744" cy="1143000"/>
-          </a:xfrm>
-        </p:spPr>
-        <p:txBody>
-          <a:bodyPr/>
-          <a:lstStyle/>
-          <a:p>
-            <a:pPr algn="ctr"/>
-            <a:r>
-              <a:rPr lang="it-IT" dirty="0" smtClean="0"/>
-              <a:t>6. Diagrammi delle Attività</a:t>
-            </a:r>
-            <a:endParaRPr lang="it-IT" dirty="0"/>
-          </a:p>
-        </p:txBody>
-      </p:sp>
-      <p:sp>
-        <p:nvSpPr>
-          <p:cNvPr id="4" name="Segnaposto data 3"/>
-          <p:cNvSpPr>
-            <a:spLocks noGrp="1"/>
-          </p:cNvSpPr>
-          <p:nvPr>
-            <p:ph type="dt" sz="half" idx="10"/>
-          </p:nvPr>
-        </p:nvSpPr>
-        <p:spPr/>
-        <p:txBody>
-          <a:bodyPr/>
-          <a:lstStyle/>
-          <a:p>
-            <a:r>
-              <a:rPr lang="it-IT" smtClean="0"/>
-              <a:t>Progetto Gamification - Team Committed</a:t>
-            </a:r>
-            <a:endParaRPr lang="it-IT"/>
-          </a:p>
-        </p:txBody>
-      </p:sp>
-      <p:sp>
-        <p:nvSpPr>
-          <p:cNvPr id="7" name="Segnaposto numero diapositiva 6"/>
-          <p:cNvSpPr>
-            <a:spLocks noGrp="1"/>
-          </p:cNvSpPr>
-          <p:nvPr>
-            <p:ph type="sldNum" sz="quarter" idx="12"/>
-          </p:nvPr>
-        </p:nvSpPr>
-        <p:spPr/>
-        <p:txBody>
-          <a:bodyPr/>
-          <a:lstStyle/>
-          <a:p>
-            <a:fld id="{017EC607-BD11-4D4E-AC5F-155C854A0B9D}" type="slidenum">
-              <a:rPr lang="it-IT" smtClean="0"/>
-              <a:pPr/>
-              <a:t>10</a:t>
-            </a:fld>
-            <a:r>
-              <a:rPr lang="it-IT" dirty="0" smtClean="0"/>
-              <a:t> di 67</a:t>
-            </a:r>
-          </a:p>
-        </p:txBody>
-      </p:sp>
-    </p:spTree>
-    <p:extLst>
-      <p:ext uri="{BB962C8B-B14F-4D97-AF65-F5344CB8AC3E}">
-        <p14:creationId xmlns:p14="http://schemas.microsoft.com/office/powerpoint/2010/main" val="2537002"/>
-      </p:ext>
-    </p:extLst>
-  </p:cSld>
-  <p:clrMapOvr>
-    <a:masterClrMapping/>
-  </p:clrMapOvr>
-  <p:timing>
-    <p:tnLst>
-      <p:par>
-        <p:cTn id="1" dur="indefinite" restart="never" nodeType="tmRoot"/>
-      </p:par>
-    </p:tnLst>
-  </p:timing>
-</p:sld>
-</file>
-
-<file path=ppt/slides/slide11.xml><?xml version="1.0" encoding="utf-8"?>
-<p:sld xmlns:a="http://schemas.openxmlformats.org/drawingml/2006/main" xmlns:r="http://schemas.openxmlformats.org/officeDocument/2006/relationships" xmlns:p="http://schemas.openxmlformats.org/presentationml/2006/main">
-  <p:cSld>
-    <p:spTree>
-      <p:nvGrpSpPr>
-        <p:cNvPr id="1" name=""/>
-        <p:cNvGrpSpPr/>
-        <p:nvPr/>
-      </p:nvGrpSpPr>
-      <p:grpSpPr>
-        <a:xfrm>
-          <a:off x="0" y="0"/>
-          <a:ext cx="0" cy="0"/>
-          <a:chOff x="0" y="0"/>
-          <a:chExt cx="0" cy="0"/>
-        </a:xfrm>
-      </p:grpSpPr>
       <p:sp>
         <p:nvSpPr>
           <p:cNvPr id="6" name="Segnaposto data 5"/>
@@ -15128,11 +14992,11 @@
             <a:fld id="{017EC607-BD11-4D4E-AC5F-155C854A0B9D}" type="slidenum">
               <a:rPr lang="it-IT" smtClean="0"/>
               <a:pPr/>
-              <a:t>11</a:t>
+              <a:t>10</a:t>
             </a:fld>
             <a:r>
               <a:rPr lang="it-IT" dirty="0" smtClean="0"/>
-              <a:t> di 67</a:t>
+              <a:t> di 24</a:t>
             </a:r>
             <a:endParaRPr lang="it-IT" dirty="0"/>
           </a:p>
@@ -15140,7 +15004,7 @@
       </p:sp>
       <p:pic>
         <p:nvPicPr>
-          <p:cNvPr id="7" name="Immagine 6" descr="attivita_generale.png"/>
+          <p:cNvPr id="11" name="Immagine 10" descr="frontEndWeb.png"/>
           <p:cNvPicPr>
             <a:picLocks noChangeAspect="1"/>
           </p:cNvPicPr>
@@ -15154,8 +15018,8 @@
         </p:blipFill>
         <p:spPr>
           <a:xfrm>
-            <a:off x="971600" y="1772816"/>
-            <a:ext cx="7439867" cy="2952328"/>
+            <a:off x="2051720" y="692696"/>
+            <a:ext cx="5020413" cy="5760640"/>
           </a:xfrm>
           <a:prstGeom prst="rect">
             <a:avLst/>
@@ -15182,7 +15046,7 @@
 </p:sld>
 </file>
 
-<file path=ppt/slides/slide12.xml><?xml version="1.0" encoding="utf-8"?>
+<file path=ppt/slides/slide11.xml><?xml version="1.0" encoding="utf-8"?>
 <p:sld xmlns:a="http://schemas.openxmlformats.org/drawingml/2006/main" xmlns:r="http://schemas.openxmlformats.org/officeDocument/2006/relationships" xmlns:p="http://schemas.openxmlformats.org/presentationml/2006/main">
   <p:cSld>
     <p:spTree>
@@ -15252,7 +15116,15 @@
             <a:pPr algn="ctr"/>
             <a:r>
               <a:rPr lang="it-IT" dirty="0" smtClean="0"/>
-              <a:t>7. Prototipi di Interfaccia</a:t>
+              <a:t>5. </a:t>
+            </a:r>
+            <a:r>
+              <a:rPr lang="it-IT" dirty="0" err="1" smtClean="0"/>
+              <a:t>Front-End</a:t>
+            </a:r>
+            <a:r>
+              <a:rPr lang="it-IT" dirty="0" smtClean="0"/>
+              <a:t> Mobile</a:t>
             </a:r>
             <a:endParaRPr lang="it-IT" dirty="0"/>
           </a:p>
@@ -15299,11 +15171,11 @@
             <a:fld id="{017EC607-BD11-4D4E-AC5F-155C854A0B9D}" type="slidenum">
               <a:rPr lang="it-IT" smtClean="0"/>
               <a:pPr/>
-              <a:t>12</a:t>
+              <a:t>11</a:t>
             </a:fld>
             <a:r>
               <a:rPr lang="it-IT" dirty="0" smtClean="0"/>
-              <a:t> di 67</a:t>
+              <a:t> di 24</a:t>
             </a:r>
           </a:p>
         </p:txBody>
@@ -15312,6 +15184,130 @@
     <p:extLst>
       <p:ext uri="{BB962C8B-B14F-4D97-AF65-F5344CB8AC3E}">
         <p14:creationId xmlns:p14="http://schemas.microsoft.com/office/powerpoint/2010/main" val="2537002"/>
+      </p:ext>
+    </p:extLst>
+  </p:cSld>
+  <p:clrMapOvr>
+    <a:masterClrMapping/>
+  </p:clrMapOvr>
+  <p:timing>
+    <p:tnLst>
+      <p:par>
+        <p:cTn id="1" dur="indefinite" restart="never" nodeType="tmRoot"/>
+      </p:par>
+    </p:tnLst>
+  </p:timing>
+</p:sld>
+</file>
+
+<file path=ppt/slides/slide12.xml><?xml version="1.0" encoding="utf-8"?>
+<p:sld xmlns:a="http://schemas.openxmlformats.org/drawingml/2006/main" xmlns:r="http://schemas.openxmlformats.org/officeDocument/2006/relationships" xmlns:p="http://schemas.openxmlformats.org/presentationml/2006/main">
+  <p:cSld>
+    <p:spTree>
+      <p:nvGrpSpPr>
+        <p:cNvPr id="1" name=""/>
+        <p:cNvGrpSpPr/>
+        <p:nvPr/>
+      </p:nvGrpSpPr>
+      <p:grpSpPr>
+        <a:xfrm>
+          <a:off x="0" y="0"/>
+          <a:ext cx="0" cy="0"/>
+          <a:chOff x="0" y="0"/>
+          <a:chExt cx="0" cy="0"/>
+        </a:xfrm>
+      </p:grpSpPr>
+      <p:sp>
+        <p:nvSpPr>
+          <p:cNvPr id="6" name="Segnaposto data 5"/>
+          <p:cNvSpPr>
+            <a:spLocks noGrp="1"/>
+          </p:cNvSpPr>
+          <p:nvPr>
+            <p:ph type="dt" sz="half" idx="10"/>
+          </p:nvPr>
+        </p:nvSpPr>
+        <p:spPr/>
+        <p:txBody>
+          <a:bodyPr/>
+          <a:lstStyle/>
+          <a:p>
+            <a:r>
+              <a:rPr lang="it-IT" dirty="0" smtClean="0"/>
+              <a:t>Progetto </a:t>
+            </a:r>
+            <a:r>
+              <a:rPr lang="it-IT" dirty="0" err="1" smtClean="0"/>
+              <a:t>Gamification</a:t>
+            </a:r>
+            <a:r>
+              <a:rPr lang="it-IT" dirty="0" smtClean="0"/>
+              <a:t> - Team </a:t>
+            </a:r>
+            <a:r>
+              <a:rPr lang="it-IT" dirty="0" err="1" smtClean="0"/>
+              <a:t>Committed</a:t>
+            </a:r>
+            <a:endParaRPr lang="it-IT" dirty="0"/>
+          </a:p>
+        </p:txBody>
+      </p:sp>
+      <p:sp>
+        <p:nvSpPr>
+          <p:cNvPr id="9" name="Segnaposto numero diapositiva 8"/>
+          <p:cNvSpPr>
+            <a:spLocks noGrp="1"/>
+          </p:cNvSpPr>
+          <p:nvPr>
+            <p:ph type="sldNum" sz="quarter" idx="12"/>
+          </p:nvPr>
+        </p:nvSpPr>
+        <p:spPr/>
+        <p:txBody>
+          <a:bodyPr/>
+          <a:lstStyle/>
+          <a:p>
+            <a:fld id="{017EC607-BD11-4D4E-AC5F-155C854A0B9D}" type="slidenum">
+              <a:rPr lang="it-IT" smtClean="0"/>
+              <a:pPr/>
+              <a:t>12</a:t>
+            </a:fld>
+            <a:r>
+              <a:rPr lang="it-IT" dirty="0" smtClean="0"/>
+              <a:t> di 24</a:t>
+            </a:r>
+            <a:endParaRPr lang="it-IT" dirty="0"/>
+          </a:p>
+        </p:txBody>
+      </p:sp>
+      <p:pic>
+        <p:nvPicPr>
+          <p:cNvPr id="5" name="Immagine 4" descr="frontEndMobile.png"/>
+          <p:cNvPicPr>
+            <a:picLocks noChangeAspect="1"/>
+          </p:cNvPicPr>
+          <p:nvPr/>
+        </p:nvPicPr>
+        <p:blipFill>
+          <a:blip r:embed="rId2" cstate="print"/>
+          <a:stretch>
+            <a:fillRect/>
+          </a:stretch>
+        </p:blipFill>
+        <p:spPr>
+          <a:xfrm>
+            <a:off x="2411760" y="692696"/>
+            <a:ext cx="4328268" cy="5797109"/>
+          </a:xfrm>
+          <a:prstGeom prst="rect">
+            <a:avLst/>
+          </a:prstGeom>
+        </p:spPr>
+      </p:pic>
+    </p:spTree>
+    <p:extLst>
+      <p:ext uri="{BB962C8B-B14F-4D97-AF65-F5344CB8AC3E}">
+        <p14:creationId xmlns:p14="http://schemas.microsoft.com/office/powerpoint/2010/main" val="200703652"/>
       </p:ext>
     </p:extLst>
   </p:cSld>
@@ -15345,9 +15341,68 @@
           <a:chExt cx="0" cy="0"/>
         </a:xfrm>
       </p:grpSpPr>
+      <p:pic>
+        <p:nvPicPr>
+          <p:cNvPr id="3" name="Immagine 2"/>
+          <p:cNvPicPr>
+            <a:picLocks noChangeAspect="1"/>
+          </p:cNvPicPr>
+          <p:nvPr/>
+        </p:nvPicPr>
+        <p:blipFill>
+          <a:blip r:embed="rId2" cstate="print">
+            <a:extLst>
+              <a:ext uri="{28A0092B-C50C-407E-A947-70E740481C1C}">
+                <a14:useLocalDpi xmlns:a14="http://schemas.microsoft.com/office/drawing/2010/main" val="0"/>
+              </a:ext>
+            </a:extLst>
+          </a:blip>
+          <a:stretch>
+            <a:fillRect/>
+          </a:stretch>
+        </p:blipFill>
+        <p:spPr>
+          <a:xfrm>
+            <a:off x="2750630" y="1268760"/>
+            <a:ext cx="3765586" cy="4581128"/>
+          </a:xfrm>
+          <a:prstGeom prst="rect">
+            <a:avLst/>
+          </a:prstGeom>
+        </p:spPr>
+      </p:pic>
       <p:sp>
         <p:nvSpPr>
-          <p:cNvPr id="6" name="Segnaposto data 5"/>
+          <p:cNvPr id="2" name="Titolo 1"/>
+          <p:cNvSpPr>
+            <a:spLocks noGrp="1"/>
+          </p:cNvSpPr>
+          <p:nvPr>
+            <p:ph type="title"/>
+          </p:nvPr>
+        </p:nvSpPr>
+        <p:spPr>
+          <a:xfrm>
+            <a:off x="1043608" y="2996952"/>
+            <a:ext cx="7024744" cy="1143000"/>
+          </a:xfrm>
+        </p:spPr>
+        <p:txBody>
+          <a:bodyPr/>
+          <a:lstStyle/>
+          <a:p>
+            <a:pPr algn="ctr"/>
+            <a:r>
+              <a:rPr lang="it-IT" dirty="0" smtClean="0"/>
+              <a:t>6. Diagrammi delle Attività</a:t>
+            </a:r>
+            <a:endParaRPr lang="it-IT" dirty="0"/>
+          </a:p>
+        </p:txBody>
+      </p:sp>
+      <p:sp>
+        <p:nvSpPr>
+          <p:cNvPr id="4" name="Segnaposto data 3"/>
           <p:cNvSpPr>
             <a:spLocks noGrp="1"/>
           </p:cNvSpPr>
@@ -15361,28 +15416,16 @@
           <a:lstStyle/>
           <a:p>
             <a:r>
-              <a:rPr lang="it-IT" dirty="0" smtClean="0"/>
-              <a:t>Progetto </a:t>
-            </a:r>
-            <a:r>
-              <a:rPr lang="it-IT" dirty="0" err="1" smtClean="0"/>
-              <a:t>Gamification</a:t>
-            </a:r>
-            <a:r>
-              <a:rPr lang="it-IT" dirty="0" smtClean="0"/>
-              <a:t> - Team </a:t>
-            </a:r>
-            <a:r>
-              <a:rPr lang="it-IT" dirty="0" err="1" smtClean="0"/>
-              <a:t>Committed</a:t>
-            </a:r>
-            <a:endParaRPr lang="it-IT" dirty="0"/>
+              <a:rPr lang="it-IT" smtClean="0"/>
+              <a:t>Progetto Gamification - Team Committed</a:t>
+            </a:r>
+            <a:endParaRPr lang="it-IT"/>
           </a:p>
         </p:txBody>
       </p:sp>
       <p:sp>
         <p:nvSpPr>
-          <p:cNvPr id="9" name="Segnaposto numero diapositiva 8"/>
+          <p:cNvPr id="7" name="Segnaposto numero diapositiva 6"/>
           <p:cNvSpPr>
             <a:spLocks noGrp="1"/>
           </p:cNvSpPr>
@@ -15402,40 +15445,15 @@
             </a:fld>
             <a:r>
               <a:rPr lang="it-IT" dirty="0" smtClean="0"/>
-              <a:t> di 67</a:t>
-            </a:r>
-            <a:endParaRPr lang="it-IT" dirty="0"/>
+              <a:t> di 24</a:t>
+            </a:r>
           </a:p>
         </p:txBody>
       </p:sp>
-      <p:pic>
-        <p:nvPicPr>
-          <p:cNvPr id="7" name="Immagine 6" descr="Gui-Desk-Login.jpg"/>
-          <p:cNvPicPr>
-            <a:picLocks noChangeAspect="1"/>
-          </p:cNvPicPr>
-          <p:nvPr/>
-        </p:nvPicPr>
-        <p:blipFill>
-          <a:blip r:embed="rId2" cstate="print"/>
-          <a:stretch>
-            <a:fillRect/>
-          </a:stretch>
-        </p:blipFill>
-        <p:spPr>
-          <a:xfrm>
-            <a:off x="2123728" y="1916832"/>
-            <a:ext cx="5040560" cy="3173328"/>
-          </a:xfrm>
-          <a:prstGeom prst="rect">
-            <a:avLst/>
-          </a:prstGeom>
-        </p:spPr>
-      </p:pic>
     </p:spTree>
     <p:extLst>
       <p:ext uri="{BB962C8B-B14F-4D97-AF65-F5344CB8AC3E}">
-        <p14:creationId xmlns:p14="http://schemas.microsoft.com/office/powerpoint/2010/main" val="200703652"/>
+        <p14:creationId xmlns:p14="http://schemas.microsoft.com/office/powerpoint/2010/main" val="2537002"/>
       </p:ext>
     </p:extLst>
   </p:cSld>
@@ -15526,7 +15544,401 @@
             </a:fld>
             <a:r>
               <a:rPr lang="it-IT" dirty="0" smtClean="0"/>
-              <a:t> di 67</a:t>
+              <a:t> di 24</a:t>
+            </a:r>
+            <a:endParaRPr lang="it-IT" dirty="0"/>
+          </a:p>
+        </p:txBody>
+      </p:sp>
+      <p:pic>
+        <p:nvPicPr>
+          <p:cNvPr id="7" name="Immagine 6" descr="attivita_generale.png"/>
+          <p:cNvPicPr>
+            <a:picLocks noChangeAspect="1"/>
+          </p:cNvPicPr>
+          <p:nvPr/>
+        </p:nvPicPr>
+        <p:blipFill>
+          <a:blip r:embed="rId2" cstate="print"/>
+          <a:stretch>
+            <a:fillRect/>
+          </a:stretch>
+        </p:blipFill>
+        <p:spPr>
+          <a:xfrm>
+            <a:off x="971600" y="1772816"/>
+            <a:ext cx="7439867" cy="2952328"/>
+          </a:xfrm>
+          <a:prstGeom prst="rect">
+            <a:avLst/>
+          </a:prstGeom>
+        </p:spPr>
+      </p:pic>
+    </p:spTree>
+    <p:extLst>
+      <p:ext uri="{BB962C8B-B14F-4D97-AF65-F5344CB8AC3E}">
+        <p14:creationId xmlns:p14="http://schemas.microsoft.com/office/powerpoint/2010/main" val="200703652"/>
+      </p:ext>
+    </p:extLst>
+  </p:cSld>
+  <p:clrMapOvr>
+    <a:masterClrMapping/>
+  </p:clrMapOvr>
+  <p:timing>
+    <p:tnLst>
+      <p:par>
+        <p:cTn id="1" dur="indefinite" restart="never" nodeType="tmRoot"/>
+      </p:par>
+    </p:tnLst>
+  </p:timing>
+</p:sld>
+</file>
+
+<file path=ppt/slides/slide15.xml><?xml version="1.0" encoding="utf-8"?>
+<p:sld xmlns:a="http://schemas.openxmlformats.org/drawingml/2006/main" xmlns:r="http://schemas.openxmlformats.org/officeDocument/2006/relationships" xmlns:p="http://schemas.openxmlformats.org/presentationml/2006/main">
+  <p:cSld>
+    <p:spTree>
+      <p:nvGrpSpPr>
+        <p:cNvPr id="1" name=""/>
+        <p:cNvGrpSpPr/>
+        <p:nvPr/>
+      </p:nvGrpSpPr>
+      <p:grpSpPr>
+        <a:xfrm>
+          <a:off x="0" y="0"/>
+          <a:ext cx="0" cy="0"/>
+          <a:chOff x="0" y="0"/>
+          <a:chExt cx="0" cy="0"/>
+        </a:xfrm>
+      </p:grpSpPr>
+      <p:pic>
+        <p:nvPicPr>
+          <p:cNvPr id="3" name="Immagine 2"/>
+          <p:cNvPicPr>
+            <a:picLocks noChangeAspect="1"/>
+          </p:cNvPicPr>
+          <p:nvPr/>
+        </p:nvPicPr>
+        <p:blipFill>
+          <a:blip r:embed="rId2" cstate="print">
+            <a:extLst>
+              <a:ext uri="{28A0092B-C50C-407E-A947-70E740481C1C}">
+                <a14:useLocalDpi xmlns:a14="http://schemas.microsoft.com/office/drawing/2010/main" val="0"/>
+              </a:ext>
+            </a:extLst>
+          </a:blip>
+          <a:stretch>
+            <a:fillRect/>
+          </a:stretch>
+        </p:blipFill>
+        <p:spPr>
+          <a:xfrm>
+            <a:off x="2750630" y="1268760"/>
+            <a:ext cx="3765586" cy="4581128"/>
+          </a:xfrm>
+          <a:prstGeom prst="rect">
+            <a:avLst/>
+          </a:prstGeom>
+        </p:spPr>
+      </p:pic>
+      <p:sp>
+        <p:nvSpPr>
+          <p:cNvPr id="2" name="Titolo 1"/>
+          <p:cNvSpPr>
+            <a:spLocks noGrp="1"/>
+          </p:cNvSpPr>
+          <p:nvPr>
+            <p:ph type="title"/>
+          </p:nvPr>
+        </p:nvSpPr>
+        <p:spPr>
+          <a:xfrm>
+            <a:off x="1043608" y="2996952"/>
+            <a:ext cx="7024744" cy="1143000"/>
+          </a:xfrm>
+        </p:spPr>
+        <p:txBody>
+          <a:bodyPr/>
+          <a:lstStyle/>
+          <a:p>
+            <a:pPr algn="ctr"/>
+            <a:r>
+              <a:rPr lang="it-IT" dirty="0" smtClean="0"/>
+              <a:t>7. Prototipi di Interfaccia</a:t>
+            </a:r>
+            <a:endParaRPr lang="it-IT" dirty="0"/>
+          </a:p>
+        </p:txBody>
+      </p:sp>
+      <p:sp>
+        <p:nvSpPr>
+          <p:cNvPr id="4" name="Segnaposto data 3"/>
+          <p:cNvSpPr>
+            <a:spLocks noGrp="1"/>
+          </p:cNvSpPr>
+          <p:nvPr>
+            <p:ph type="dt" sz="half" idx="10"/>
+          </p:nvPr>
+        </p:nvSpPr>
+        <p:spPr/>
+        <p:txBody>
+          <a:bodyPr/>
+          <a:lstStyle/>
+          <a:p>
+            <a:r>
+              <a:rPr lang="it-IT" smtClean="0"/>
+              <a:t>Progetto Gamification - Team Committed</a:t>
+            </a:r>
+            <a:endParaRPr lang="it-IT"/>
+          </a:p>
+        </p:txBody>
+      </p:sp>
+      <p:sp>
+        <p:nvSpPr>
+          <p:cNvPr id="7" name="Segnaposto numero diapositiva 6"/>
+          <p:cNvSpPr>
+            <a:spLocks noGrp="1"/>
+          </p:cNvSpPr>
+          <p:nvPr>
+            <p:ph type="sldNum" sz="quarter" idx="12"/>
+          </p:nvPr>
+        </p:nvSpPr>
+        <p:spPr/>
+        <p:txBody>
+          <a:bodyPr/>
+          <a:lstStyle/>
+          <a:p>
+            <a:fld id="{017EC607-BD11-4D4E-AC5F-155C854A0B9D}" type="slidenum">
+              <a:rPr lang="it-IT" smtClean="0"/>
+              <a:pPr/>
+              <a:t>15</a:t>
+            </a:fld>
+            <a:r>
+              <a:rPr lang="it-IT" dirty="0" smtClean="0"/>
+              <a:t> di 24</a:t>
+            </a:r>
+          </a:p>
+        </p:txBody>
+      </p:sp>
+    </p:spTree>
+    <p:extLst>
+      <p:ext uri="{BB962C8B-B14F-4D97-AF65-F5344CB8AC3E}">
+        <p14:creationId xmlns:p14="http://schemas.microsoft.com/office/powerpoint/2010/main" val="2537002"/>
+      </p:ext>
+    </p:extLst>
+  </p:cSld>
+  <p:clrMapOvr>
+    <a:masterClrMapping/>
+  </p:clrMapOvr>
+  <p:timing>
+    <p:tnLst>
+      <p:par>
+        <p:cTn id="1" dur="indefinite" restart="never" nodeType="tmRoot"/>
+      </p:par>
+    </p:tnLst>
+  </p:timing>
+</p:sld>
+</file>
+
+<file path=ppt/slides/slide16.xml><?xml version="1.0" encoding="utf-8"?>
+<p:sld xmlns:a="http://schemas.openxmlformats.org/drawingml/2006/main" xmlns:r="http://schemas.openxmlformats.org/officeDocument/2006/relationships" xmlns:p="http://schemas.openxmlformats.org/presentationml/2006/main">
+  <p:cSld>
+    <p:spTree>
+      <p:nvGrpSpPr>
+        <p:cNvPr id="1" name=""/>
+        <p:cNvGrpSpPr/>
+        <p:nvPr/>
+      </p:nvGrpSpPr>
+      <p:grpSpPr>
+        <a:xfrm>
+          <a:off x="0" y="0"/>
+          <a:ext cx="0" cy="0"/>
+          <a:chOff x="0" y="0"/>
+          <a:chExt cx="0" cy="0"/>
+        </a:xfrm>
+      </p:grpSpPr>
+      <p:sp>
+        <p:nvSpPr>
+          <p:cNvPr id="6" name="Segnaposto data 5"/>
+          <p:cNvSpPr>
+            <a:spLocks noGrp="1"/>
+          </p:cNvSpPr>
+          <p:nvPr>
+            <p:ph type="dt" sz="half" idx="10"/>
+          </p:nvPr>
+        </p:nvSpPr>
+        <p:spPr/>
+        <p:txBody>
+          <a:bodyPr/>
+          <a:lstStyle/>
+          <a:p>
+            <a:r>
+              <a:rPr lang="it-IT" dirty="0" smtClean="0"/>
+              <a:t>Progetto </a:t>
+            </a:r>
+            <a:r>
+              <a:rPr lang="it-IT" dirty="0" err="1" smtClean="0"/>
+              <a:t>Gamification</a:t>
+            </a:r>
+            <a:r>
+              <a:rPr lang="it-IT" dirty="0" smtClean="0"/>
+              <a:t> - Team </a:t>
+            </a:r>
+            <a:r>
+              <a:rPr lang="it-IT" dirty="0" err="1" smtClean="0"/>
+              <a:t>Committed</a:t>
+            </a:r>
+            <a:endParaRPr lang="it-IT" dirty="0"/>
+          </a:p>
+        </p:txBody>
+      </p:sp>
+      <p:sp>
+        <p:nvSpPr>
+          <p:cNvPr id="9" name="Segnaposto numero diapositiva 8"/>
+          <p:cNvSpPr>
+            <a:spLocks noGrp="1"/>
+          </p:cNvSpPr>
+          <p:nvPr>
+            <p:ph type="sldNum" sz="quarter" idx="12"/>
+          </p:nvPr>
+        </p:nvSpPr>
+        <p:spPr/>
+        <p:txBody>
+          <a:bodyPr/>
+          <a:lstStyle/>
+          <a:p>
+            <a:fld id="{017EC607-BD11-4D4E-AC5F-155C854A0B9D}" type="slidenum">
+              <a:rPr lang="it-IT" smtClean="0"/>
+              <a:pPr/>
+              <a:t>16</a:t>
+            </a:fld>
+            <a:r>
+              <a:rPr lang="it-IT" dirty="0" smtClean="0"/>
+              <a:t> di 24</a:t>
+            </a:r>
+            <a:endParaRPr lang="it-IT" dirty="0"/>
+          </a:p>
+        </p:txBody>
+      </p:sp>
+      <p:pic>
+        <p:nvPicPr>
+          <p:cNvPr id="7" name="Immagine 6" descr="Gui-Desk-Login.jpg"/>
+          <p:cNvPicPr>
+            <a:picLocks noChangeAspect="1"/>
+          </p:cNvPicPr>
+          <p:nvPr/>
+        </p:nvPicPr>
+        <p:blipFill>
+          <a:blip r:embed="rId2" cstate="print"/>
+          <a:stretch>
+            <a:fillRect/>
+          </a:stretch>
+        </p:blipFill>
+        <p:spPr>
+          <a:xfrm>
+            <a:off x="2123728" y="1916832"/>
+            <a:ext cx="5040560" cy="3173328"/>
+          </a:xfrm>
+          <a:prstGeom prst="rect">
+            <a:avLst/>
+          </a:prstGeom>
+        </p:spPr>
+      </p:pic>
+    </p:spTree>
+    <p:extLst>
+      <p:ext uri="{BB962C8B-B14F-4D97-AF65-F5344CB8AC3E}">
+        <p14:creationId xmlns:p14="http://schemas.microsoft.com/office/powerpoint/2010/main" val="200703652"/>
+      </p:ext>
+    </p:extLst>
+  </p:cSld>
+  <p:clrMapOvr>
+    <a:masterClrMapping/>
+  </p:clrMapOvr>
+  <p:timing>
+    <p:tnLst>
+      <p:par>
+        <p:cTn id="1" dur="indefinite" restart="never" nodeType="tmRoot"/>
+      </p:par>
+    </p:tnLst>
+  </p:timing>
+</p:sld>
+</file>
+
+<file path=ppt/slides/slide17.xml><?xml version="1.0" encoding="utf-8"?>
+<p:sld xmlns:a="http://schemas.openxmlformats.org/drawingml/2006/main" xmlns:r="http://schemas.openxmlformats.org/officeDocument/2006/relationships" xmlns:p="http://schemas.openxmlformats.org/presentationml/2006/main">
+  <p:cSld>
+    <p:spTree>
+      <p:nvGrpSpPr>
+        <p:cNvPr id="1" name=""/>
+        <p:cNvGrpSpPr/>
+        <p:nvPr/>
+      </p:nvGrpSpPr>
+      <p:grpSpPr>
+        <a:xfrm>
+          <a:off x="0" y="0"/>
+          <a:ext cx="0" cy="0"/>
+          <a:chOff x="0" y="0"/>
+          <a:chExt cx="0" cy="0"/>
+        </a:xfrm>
+      </p:grpSpPr>
+      <p:sp>
+        <p:nvSpPr>
+          <p:cNvPr id="6" name="Segnaposto data 5"/>
+          <p:cNvSpPr>
+            <a:spLocks noGrp="1"/>
+          </p:cNvSpPr>
+          <p:nvPr>
+            <p:ph type="dt" sz="half" idx="10"/>
+          </p:nvPr>
+        </p:nvSpPr>
+        <p:spPr/>
+        <p:txBody>
+          <a:bodyPr/>
+          <a:lstStyle/>
+          <a:p>
+            <a:r>
+              <a:rPr lang="it-IT" dirty="0" smtClean="0"/>
+              <a:t>Progetto </a:t>
+            </a:r>
+            <a:r>
+              <a:rPr lang="it-IT" dirty="0" err="1" smtClean="0"/>
+              <a:t>Gamification</a:t>
+            </a:r>
+            <a:r>
+              <a:rPr lang="it-IT" dirty="0" smtClean="0"/>
+              <a:t> - Team </a:t>
+            </a:r>
+            <a:r>
+              <a:rPr lang="it-IT" dirty="0" err="1" smtClean="0"/>
+              <a:t>Committed</a:t>
+            </a:r>
+            <a:endParaRPr lang="it-IT" dirty="0"/>
+          </a:p>
+        </p:txBody>
+      </p:sp>
+      <p:sp>
+        <p:nvSpPr>
+          <p:cNvPr id="9" name="Segnaposto numero diapositiva 8"/>
+          <p:cNvSpPr>
+            <a:spLocks noGrp="1"/>
+          </p:cNvSpPr>
+          <p:nvPr>
+            <p:ph type="sldNum" sz="quarter" idx="12"/>
+          </p:nvPr>
+        </p:nvSpPr>
+        <p:spPr/>
+        <p:txBody>
+          <a:bodyPr/>
+          <a:lstStyle/>
+          <a:p>
+            <a:fld id="{017EC607-BD11-4D4E-AC5F-155C854A0B9D}" type="slidenum">
+              <a:rPr lang="it-IT" smtClean="0"/>
+              <a:pPr/>
+              <a:t>17</a:t>
+            </a:fld>
+            <a:r>
+              <a:rPr lang="it-IT" dirty="0" smtClean="0"/>
+              <a:t> di 24</a:t>
             </a:r>
             <a:endParaRPr lang="it-IT" dirty="0"/>
           </a:p>
@@ -15576,7 +15988,7 @@
 </p:sld>
 </file>
 
-<file path=ppt/slides/slide15.xml><?xml version="1.0" encoding="utf-8"?>
+<file path=ppt/slides/slide18.xml><?xml version="1.0" encoding="utf-8"?>
 <p:sld xmlns:a="http://schemas.openxmlformats.org/drawingml/2006/main" xmlns:r="http://schemas.openxmlformats.org/officeDocument/2006/relationships" xmlns:p="http://schemas.openxmlformats.org/presentationml/2006/main">
   <p:cSld>
     <p:spTree>
@@ -15646,11 +16058,11 @@
             <a:fld id="{017EC607-BD11-4D4E-AC5F-155C854A0B9D}" type="slidenum">
               <a:rPr lang="it-IT" smtClean="0"/>
               <a:pPr/>
-              <a:t>15</a:t>
+              <a:t>18</a:t>
             </a:fld>
             <a:r>
               <a:rPr lang="it-IT" dirty="0" smtClean="0"/>
-              <a:t> di 67</a:t>
+              <a:t> di 24</a:t>
             </a:r>
             <a:endParaRPr lang="it-IT" dirty="0"/>
           </a:p>
@@ -15724,7 +16136,7 @@
 </p:sld>
 </file>
 
-<file path=ppt/slides/slide16.xml><?xml version="1.0" encoding="utf-8"?>
+<file path=ppt/slides/slide19.xml><?xml version="1.0" encoding="utf-8"?>
 <p:sld xmlns:a="http://schemas.openxmlformats.org/drawingml/2006/main" xmlns:r="http://schemas.openxmlformats.org/officeDocument/2006/relationships" xmlns:p="http://schemas.openxmlformats.org/presentationml/2006/main">
   <p:cSld>
     <p:spTree>
@@ -15794,11 +16206,11 @@
             <a:fld id="{017EC607-BD11-4D4E-AC5F-155C854A0B9D}" type="slidenum">
               <a:rPr lang="it-IT" smtClean="0"/>
               <a:pPr/>
-              <a:t>16</a:t>
+              <a:t>19</a:t>
             </a:fld>
             <a:r>
               <a:rPr lang="it-IT" dirty="0" smtClean="0"/>
-              <a:t> di 67</a:t>
+              <a:t> di 24</a:t>
             </a:r>
             <a:endParaRPr lang="it-IT" dirty="0"/>
           </a:p>
@@ -15896,378 +16308,6 @@
 </p:sld>
 </file>
 
-<file path=ppt/slides/slide17.xml><?xml version="1.0" encoding="utf-8"?>
-<p:sld xmlns:a="http://schemas.openxmlformats.org/drawingml/2006/main" xmlns:r="http://schemas.openxmlformats.org/officeDocument/2006/relationships" xmlns:p="http://schemas.openxmlformats.org/presentationml/2006/main">
-  <p:cSld>
-    <p:spTree>
-      <p:nvGrpSpPr>
-        <p:cNvPr id="1" name=""/>
-        <p:cNvGrpSpPr/>
-        <p:nvPr/>
-      </p:nvGrpSpPr>
-      <p:grpSpPr>
-        <a:xfrm>
-          <a:off x="0" y="0"/>
-          <a:ext cx="0" cy="0"/>
-          <a:chOff x="0" y="0"/>
-          <a:chExt cx="0" cy="0"/>
-        </a:xfrm>
-      </p:grpSpPr>
-      <p:sp>
-        <p:nvSpPr>
-          <p:cNvPr id="6" name="Segnaposto data 5"/>
-          <p:cNvSpPr>
-            <a:spLocks noGrp="1"/>
-          </p:cNvSpPr>
-          <p:nvPr>
-            <p:ph type="dt" sz="half" idx="10"/>
-          </p:nvPr>
-        </p:nvSpPr>
-        <p:spPr/>
-        <p:txBody>
-          <a:bodyPr/>
-          <a:lstStyle/>
-          <a:p>
-            <a:r>
-              <a:rPr lang="it-IT" dirty="0" smtClean="0"/>
-              <a:t>Progetto </a:t>
-            </a:r>
-            <a:r>
-              <a:rPr lang="it-IT" dirty="0" err="1" smtClean="0"/>
-              <a:t>Gamification</a:t>
-            </a:r>
-            <a:r>
-              <a:rPr lang="it-IT" dirty="0" smtClean="0"/>
-              <a:t> - Team </a:t>
-            </a:r>
-            <a:r>
-              <a:rPr lang="it-IT" dirty="0" err="1" smtClean="0"/>
-              <a:t>Committed</a:t>
-            </a:r>
-            <a:endParaRPr lang="it-IT" dirty="0"/>
-          </a:p>
-        </p:txBody>
-      </p:sp>
-      <p:sp>
-        <p:nvSpPr>
-          <p:cNvPr id="9" name="Segnaposto numero diapositiva 8"/>
-          <p:cNvSpPr>
-            <a:spLocks noGrp="1"/>
-          </p:cNvSpPr>
-          <p:nvPr>
-            <p:ph type="sldNum" sz="quarter" idx="12"/>
-          </p:nvPr>
-        </p:nvSpPr>
-        <p:spPr/>
-        <p:txBody>
-          <a:bodyPr/>
-          <a:lstStyle/>
-          <a:p>
-            <a:fld id="{017EC607-BD11-4D4E-AC5F-155C854A0B9D}" type="slidenum">
-              <a:rPr lang="it-IT" smtClean="0"/>
-              <a:pPr/>
-              <a:t>17</a:t>
-            </a:fld>
-            <a:r>
-              <a:rPr lang="it-IT" dirty="0" smtClean="0"/>
-              <a:t> di 67</a:t>
-            </a:r>
-            <a:endParaRPr lang="it-IT" dirty="0"/>
-          </a:p>
-        </p:txBody>
-      </p:sp>
-      <p:pic>
-        <p:nvPicPr>
-          <p:cNvPr id="5" name="Immagine 4" descr="Gui-web-GestioneDomande-Insert.jpg"/>
-          <p:cNvPicPr>
-            <a:picLocks noChangeAspect="1"/>
-          </p:cNvPicPr>
-          <p:nvPr/>
-        </p:nvPicPr>
-        <p:blipFill>
-          <a:blip r:embed="rId2" cstate="print"/>
-          <a:stretch>
-            <a:fillRect/>
-          </a:stretch>
-        </p:blipFill>
-        <p:spPr>
-          <a:xfrm>
-            <a:off x="683568" y="1052736"/>
-            <a:ext cx="7812360" cy="4861024"/>
-          </a:xfrm>
-          <a:prstGeom prst="rect">
-            <a:avLst/>
-          </a:prstGeom>
-        </p:spPr>
-      </p:pic>
-    </p:spTree>
-    <p:extLst>
-      <p:ext uri="{BB962C8B-B14F-4D97-AF65-F5344CB8AC3E}">
-        <p14:creationId xmlns:p14="http://schemas.microsoft.com/office/powerpoint/2010/main" val="200703652"/>
-      </p:ext>
-    </p:extLst>
-  </p:cSld>
-  <p:clrMapOvr>
-    <a:masterClrMapping/>
-  </p:clrMapOvr>
-  <p:timing>
-    <p:tnLst>
-      <p:par>
-        <p:cTn id="1" dur="indefinite" restart="never" nodeType="tmRoot"/>
-      </p:par>
-    </p:tnLst>
-  </p:timing>
-</p:sld>
-</file>
-
-<file path=ppt/slides/slide18.xml><?xml version="1.0" encoding="utf-8"?>
-<p:sld xmlns:a="http://schemas.openxmlformats.org/drawingml/2006/main" xmlns:r="http://schemas.openxmlformats.org/officeDocument/2006/relationships" xmlns:p="http://schemas.openxmlformats.org/presentationml/2006/main">
-  <p:cSld>
-    <p:spTree>
-      <p:nvGrpSpPr>
-        <p:cNvPr id="1" name=""/>
-        <p:cNvGrpSpPr/>
-        <p:nvPr/>
-      </p:nvGrpSpPr>
-      <p:grpSpPr>
-        <a:xfrm>
-          <a:off x="0" y="0"/>
-          <a:ext cx="0" cy="0"/>
-          <a:chOff x="0" y="0"/>
-          <a:chExt cx="0" cy="0"/>
-        </a:xfrm>
-      </p:grpSpPr>
-      <p:sp>
-        <p:nvSpPr>
-          <p:cNvPr id="6" name="Segnaposto data 5"/>
-          <p:cNvSpPr>
-            <a:spLocks noGrp="1"/>
-          </p:cNvSpPr>
-          <p:nvPr>
-            <p:ph type="dt" sz="half" idx="10"/>
-          </p:nvPr>
-        </p:nvSpPr>
-        <p:spPr/>
-        <p:txBody>
-          <a:bodyPr/>
-          <a:lstStyle/>
-          <a:p>
-            <a:r>
-              <a:rPr lang="it-IT" dirty="0" smtClean="0"/>
-              <a:t>Progetto </a:t>
-            </a:r>
-            <a:r>
-              <a:rPr lang="it-IT" dirty="0" err="1" smtClean="0"/>
-              <a:t>Gamification</a:t>
-            </a:r>
-            <a:r>
-              <a:rPr lang="it-IT" dirty="0" smtClean="0"/>
-              <a:t> - Team </a:t>
-            </a:r>
-            <a:r>
-              <a:rPr lang="it-IT" dirty="0" err="1" smtClean="0"/>
-              <a:t>Committed</a:t>
-            </a:r>
-            <a:endParaRPr lang="it-IT" dirty="0"/>
-          </a:p>
-        </p:txBody>
-      </p:sp>
-      <p:sp>
-        <p:nvSpPr>
-          <p:cNvPr id="9" name="Segnaposto numero diapositiva 8"/>
-          <p:cNvSpPr>
-            <a:spLocks noGrp="1"/>
-          </p:cNvSpPr>
-          <p:nvPr>
-            <p:ph type="sldNum" sz="quarter" idx="12"/>
-          </p:nvPr>
-        </p:nvSpPr>
-        <p:spPr/>
-        <p:txBody>
-          <a:bodyPr/>
-          <a:lstStyle/>
-          <a:p>
-            <a:fld id="{017EC607-BD11-4D4E-AC5F-155C854A0B9D}" type="slidenum">
-              <a:rPr lang="it-IT" smtClean="0"/>
-              <a:pPr/>
-              <a:t>18</a:t>
-            </a:fld>
-            <a:r>
-              <a:rPr lang="it-IT" dirty="0" smtClean="0"/>
-              <a:t> di 67</a:t>
-            </a:r>
-            <a:endParaRPr lang="it-IT" dirty="0"/>
-          </a:p>
-        </p:txBody>
-      </p:sp>
-      <p:pic>
-        <p:nvPicPr>
-          <p:cNvPr id="5" name="Immagine 4" descr="Gui-web-GestioneDomande-Insert.jpg"/>
-          <p:cNvPicPr>
-            <a:picLocks noChangeAspect="1"/>
-          </p:cNvPicPr>
-          <p:nvPr/>
-        </p:nvPicPr>
-        <p:blipFill>
-          <a:blip r:embed="rId2" cstate="print"/>
-          <a:stretch>
-            <a:fillRect/>
-          </a:stretch>
-        </p:blipFill>
-        <p:spPr>
-          <a:xfrm>
-            <a:off x="683568" y="1052736"/>
-            <a:ext cx="7812360" cy="4861024"/>
-          </a:xfrm>
-          <a:prstGeom prst="rect">
-            <a:avLst/>
-          </a:prstGeom>
-        </p:spPr>
-      </p:pic>
-    </p:spTree>
-    <p:extLst>
-      <p:ext uri="{BB962C8B-B14F-4D97-AF65-F5344CB8AC3E}">
-        <p14:creationId xmlns:p14="http://schemas.microsoft.com/office/powerpoint/2010/main" val="200703652"/>
-      </p:ext>
-    </p:extLst>
-  </p:cSld>
-  <p:clrMapOvr>
-    <a:masterClrMapping/>
-  </p:clrMapOvr>
-  <p:timing>
-    <p:tnLst>
-      <p:par>
-        <p:cTn id="1" dur="indefinite" restart="never" nodeType="tmRoot"/>
-      </p:par>
-    </p:tnLst>
-  </p:timing>
-</p:sld>
-</file>
-
-<file path=ppt/slides/slide19.xml><?xml version="1.0" encoding="utf-8"?>
-<p:sld xmlns:a="http://schemas.openxmlformats.org/drawingml/2006/main" xmlns:r="http://schemas.openxmlformats.org/officeDocument/2006/relationships" xmlns:p="http://schemas.openxmlformats.org/presentationml/2006/main">
-  <p:cSld>
-    <p:spTree>
-      <p:nvGrpSpPr>
-        <p:cNvPr id="1" name=""/>
-        <p:cNvGrpSpPr/>
-        <p:nvPr/>
-      </p:nvGrpSpPr>
-      <p:grpSpPr>
-        <a:xfrm>
-          <a:off x="0" y="0"/>
-          <a:ext cx="0" cy="0"/>
-          <a:chOff x="0" y="0"/>
-          <a:chExt cx="0" cy="0"/>
-        </a:xfrm>
-      </p:grpSpPr>
-      <p:sp>
-        <p:nvSpPr>
-          <p:cNvPr id="6" name="Segnaposto data 5"/>
-          <p:cNvSpPr>
-            <a:spLocks noGrp="1"/>
-          </p:cNvSpPr>
-          <p:nvPr>
-            <p:ph type="dt" sz="half" idx="10"/>
-          </p:nvPr>
-        </p:nvSpPr>
-        <p:spPr/>
-        <p:txBody>
-          <a:bodyPr/>
-          <a:lstStyle/>
-          <a:p>
-            <a:r>
-              <a:rPr lang="it-IT" dirty="0" smtClean="0"/>
-              <a:t>Progetto </a:t>
-            </a:r>
-            <a:r>
-              <a:rPr lang="it-IT" dirty="0" err="1" smtClean="0"/>
-              <a:t>Gamification</a:t>
-            </a:r>
-            <a:r>
-              <a:rPr lang="it-IT" dirty="0" smtClean="0"/>
-              <a:t> - Team </a:t>
-            </a:r>
-            <a:r>
-              <a:rPr lang="it-IT" dirty="0" err="1" smtClean="0"/>
-              <a:t>Committed</a:t>
-            </a:r>
-            <a:endParaRPr lang="it-IT" dirty="0"/>
-          </a:p>
-        </p:txBody>
-      </p:sp>
-      <p:sp>
-        <p:nvSpPr>
-          <p:cNvPr id="9" name="Segnaposto numero diapositiva 8"/>
-          <p:cNvSpPr>
-            <a:spLocks noGrp="1"/>
-          </p:cNvSpPr>
-          <p:nvPr>
-            <p:ph type="sldNum" sz="quarter" idx="12"/>
-          </p:nvPr>
-        </p:nvSpPr>
-        <p:spPr/>
-        <p:txBody>
-          <a:bodyPr/>
-          <a:lstStyle/>
-          <a:p>
-            <a:fld id="{017EC607-BD11-4D4E-AC5F-155C854A0B9D}" type="slidenum">
-              <a:rPr lang="it-IT" smtClean="0"/>
-              <a:pPr/>
-              <a:t>19</a:t>
-            </a:fld>
-            <a:r>
-              <a:rPr lang="it-IT" dirty="0" smtClean="0"/>
-              <a:t> di 67</a:t>
-            </a:r>
-            <a:endParaRPr lang="it-IT" dirty="0"/>
-          </a:p>
-        </p:txBody>
-      </p:sp>
-      <p:pic>
-        <p:nvPicPr>
-          <p:cNvPr id="5" name="Immagine 4" descr="Gui-web-GestioneDomande-Insert.jpg"/>
-          <p:cNvPicPr>
-            <a:picLocks noChangeAspect="1"/>
-          </p:cNvPicPr>
-          <p:nvPr/>
-        </p:nvPicPr>
-        <p:blipFill>
-          <a:blip r:embed="rId2" cstate="print"/>
-          <a:stretch>
-            <a:fillRect/>
-          </a:stretch>
-        </p:blipFill>
-        <p:spPr>
-          <a:xfrm>
-            <a:off x="683568" y="1052736"/>
-            <a:ext cx="7812360" cy="4861024"/>
-          </a:xfrm>
-          <a:prstGeom prst="rect">
-            <a:avLst/>
-          </a:prstGeom>
-        </p:spPr>
-      </p:pic>
-    </p:spTree>
-    <p:extLst>
-      <p:ext uri="{BB962C8B-B14F-4D97-AF65-F5344CB8AC3E}">
-        <p14:creationId xmlns:p14="http://schemas.microsoft.com/office/powerpoint/2010/main" val="200703652"/>
-      </p:ext>
-    </p:extLst>
-  </p:cSld>
-  <p:clrMapOvr>
-    <a:masterClrMapping/>
-  </p:clrMapOvr>
-  <p:timing>
-    <p:tnLst>
-      <p:par>
-        <p:cTn id="1" dur="indefinite" restart="never" nodeType="tmRoot"/>
-      </p:par>
-    </p:tnLst>
-  </p:timing>
-</p:sld>
-</file>
-
 <file path=ppt/slides/slide2.xml><?xml version="1.0" encoding="utf-8"?>
 <p:sld xmlns:a="http://schemas.openxmlformats.org/drawingml/2006/main" xmlns:r="http://schemas.openxmlformats.org/officeDocument/2006/relationships" xmlns:p="http://schemas.openxmlformats.org/presentationml/2006/main">
   <p:cSld>
@@ -16350,7 +16390,9 @@
         </p:nvSpPr>
         <p:spPr/>
         <p:txBody>
-          <a:bodyPr/>
+          <a:bodyPr>
+            <a:normAutofit lnSpcReduction="10000"/>
+          </a:bodyPr>
           <a:lstStyle/>
           <a:p>
             <a:pPr marL="525780" indent="-457200">
@@ -16379,8 +16421,24 @@
             </a:pPr>
             <a:r>
               <a:rPr lang="it-IT" dirty="0" smtClean="0"/>
-              <a:t>Front-end Web</a:t>
-            </a:r>
+              <a:t>Front-end Desktop</a:t>
+            </a:r>
+            <a:endParaRPr lang="it-IT" dirty="0" smtClean="0"/>
+          </a:p>
+          <a:p>
+            <a:pPr marL="525780" indent="-457200">
+              <a:buFont typeface="+mj-lt"/>
+              <a:buAutoNum type="arabicPeriod"/>
+            </a:pPr>
+            <a:r>
+              <a:rPr lang="it-IT" dirty="0" smtClean="0"/>
+              <a:t>Front-end </a:t>
+            </a:r>
+            <a:r>
+              <a:rPr lang="it-IT" dirty="0" smtClean="0"/>
+              <a:t>Web</a:t>
+            </a:r>
+            <a:endParaRPr lang="it-IT" dirty="0" smtClean="0"/>
           </a:p>
           <a:p>
             <a:pPr marL="525780" indent="-457200">
@@ -16480,7 +16538,10 @@
               <a:pPr/>
               <a:t>2</a:t>
             </a:fld>
-            <a:endParaRPr lang="it-IT"/>
+            <a:r>
+              <a:rPr lang="it-IT" dirty="0" smtClean="0"/>
+              <a:t> di 24</a:t>
+            </a:r>
           </a:p>
         </p:txBody>
       </p:sp>
@@ -16494,10 +16555,389 @@
   <p:clrMapOvr>
     <a:masterClrMapping/>
   </p:clrMapOvr>
+  <p:timing>
+    <p:tnLst>
+      <p:par>
+        <p:cTn id="1" dur="indefinite" restart="never" nodeType="tmRoot"/>
+      </p:par>
+    </p:tnLst>
+  </p:timing>
 </p:sld>
 </file>
 
 <file path=ppt/slides/slide20.xml><?xml version="1.0" encoding="utf-8"?>
+<p:sld xmlns:a="http://schemas.openxmlformats.org/drawingml/2006/main" xmlns:r="http://schemas.openxmlformats.org/officeDocument/2006/relationships" xmlns:p="http://schemas.openxmlformats.org/presentationml/2006/main">
+  <p:cSld>
+    <p:spTree>
+      <p:nvGrpSpPr>
+        <p:cNvPr id="1" name=""/>
+        <p:cNvGrpSpPr/>
+        <p:nvPr/>
+      </p:nvGrpSpPr>
+      <p:grpSpPr>
+        <a:xfrm>
+          <a:off x="0" y="0"/>
+          <a:ext cx="0" cy="0"/>
+          <a:chOff x="0" y="0"/>
+          <a:chExt cx="0" cy="0"/>
+        </a:xfrm>
+      </p:grpSpPr>
+      <p:sp>
+        <p:nvSpPr>
+          <p:cNvPr id="6" name="Segnaposto data 5"/>
+          <p:cNvSpPr>
+            <a:spLocks noGrp="1"/>
+          </p:cNvSpPr>
+          <p:nvPr>
+            <p:ph type="dt" sz="half" idx="10"/>
+          </p:nvPr>
+        </p:nvSpPr>
+        <p:spPr/>
+        <p:txBody>
+          <a:bodyPr/>
+          <a:lstStyle/>
+          <a:p>
+            <a:r>
+              <a:rPr lang="it-IT" dirty="0" smtClean="0"/>
+              <a:t>Progetto </a:t>
+            </a:r>
+            <a:r>
+              <a:rPr lang="it-IT" dirty="0" err="1" smtClean="0"/>
+              <a:t>Gamification</a:t>
+            </a:r>
+            <a:r>
+              <a:rPr lang="it-IT" dirty="0" smtClean="0"/>
+              <a:t> - Team </a:t>
+            </a:r>
+            <a:r>
+              <a:rPr lang="it-IT" dirty="0" err="1" smtClean="0"/>
+              <a:t>Committed</a:t>
+            </a:r>
+            <a:endParaRPr lang="it-IT" dirty="0"/>
+          </a:p>
+        </p:txBody>
+      </p:sp>
+      <p:sp>
+        <p:nvSpPr>
+          <p:cNvPr id="9" name="Segnaposto numero diapositiva 8"/>
+          <p:cNvSpPr>
+            <a:spLocks noGrp="1"/>
+          </p:cNvSpPr>
+          <p:nvPr>
+            <p:ph type="sldNum" sz="quarter" idx="12"/>
+          </p:nvPr>
+        </p:nvSpPr>
+        <p:spPr/>
+        <p:txBody>
+          <a:bodyPr/>
+          <a:lstStyle/>
+          <a:p>
+            <a:fld id="{017EC607-BD11-4D4E-AC5F-155C854A0B9D}" type="slidenum">
+              <a:rPr lang="it-IT" smtClean="0"/>
+              <a:pPr/>
+              <a:t>20</a:t>
+            </a:fld>
+            <a:r>
+              <a:rPr lang="it-IT" dirty="0" smtClean="0"/>
+              <a:t> di 24</a:t>
+            </a:r>
+            <a:endParaRPr lang="it-IT" dirty="0"/>
+          </a:p>
+        </p:txBody>
+      </p:sp>
+      <p:pic>
+        <p:nvPicPr>
+          <p:cNvPr id="5" name="Immagine 4" descr="Gui-web-GestioneDomande-Insert.jpg"/>
+          <p:cNvPicPr>
+            <a:picLocks noChangeAspect="1"/>
+          </p:cNvPicPr>
+          <p:nvPr/>
+        </p:nvPicPr>
+        <p:blipFill>
+          <a:blip r:embed="rId2" cstate="print"/>
+          <a:stretch>
+            <a:fillRect/>
+          </a:stretch>
+        </p:blipFill>
+        <p:spPr>
+          <a:xfrm>
+            <a:off x="683568" y="1052736"/>
+            <a:ext cx="7812360" cy="4861024"/>
+          </a:xfrm>
+          <a:prstGeom prst="rect">
+            <a:avLst/>
+          </a:prstGeom>
+        </p:spPr>
+      </p:pic>
+    </p:spTree>
+    <p:extLst>
+      <p:ext uri="{BB962C8B-B14F-4D97-AF65-F5344CB8AC3E}">
+        <p14:creationId xmlns:p14="http://schemas.microsoft.com/office/powerpoint/2010/main" val="200703652"/>
+      </p:ext>
+    </p:extLst>
+  </p:cSld>
+  <p:clrMapOvr>
+    <a:masterClrMapping/>
+  </p:clrMapOvr>
+  <p:timing>
+    <p:tnLst>
+      <p:par>
+        <p:cTn id="1" dur="indefinite" restart="never" nodeType="tmRoot"/>
+      </p:par>
+    </p:tnLst>
+  </p:timing>
+</p:sld>
+</file>
+
+<file path=ppt/slides/slide21.xml><?xml version="1.0" encoding="utf-8"?>
+<p:sld xmlns:a="http://schemas.openxmlformats.org/drawingml/2006/main" xmlns:r="http://schemas.openxmlformats.org/officeDocument/2006/relationships" xmlns:p="http://schemas.openxmlformats.org/presentationml/2006/main">
+  <p:cSld>
+    <p:spTree>
+      <p:nvGrpSpPr>
+        <p:cNvPr id="1" name=""/>
+        <p:cNvGrpSpPr/>
+        <p:nvPr/>
+      </p:nvGrpSpPr>
+      <p:grpSpPr>
+        <a:xfrm>
+          <a:off x="0" y="0"/>
+          <a:ext cx="0" cy="0"/>
+          <a:chOff x="0" y="0"/>
+          <a:chExt cx="0" cy="0"/>
+        </a:xfrm>
+      </p:grpSpPr>
+      <p:sp>
+        <p:nvSpPr>
+          <p:cNvPr id="6" name="Segnaposto data 5"/>
+          <p:cNvSpPr>
+            <a:spLocks noGrp="1"/>
+          </p:cNvSpPr>
+          <p:nvPr>
+            <p:ph type="dt" sz="half" idx="10"/>
+          </p:nvPr>
+        </p:nvSpPr>
+        <p:spPr/>
+        <p:txBody>
+          <a:bodyPr/>
+          <a:lstStyle/>
+          <a:p>
+            <a:r>
+              <a:rPr lang="it-IT" dirty="0" smtClean="0"/>
+              <a:t>Progetto </a:t>
+            </a:r>
+            <a:r>
+              <a:rPr lang="it-IT" dirty="0" err="1" smtClean="0"/>
+              <a:t>Gamification</a:t>
+            </a:r>
+            <a:r>
+              <a:rPr lang="it-IT" dirty="0" smtClean="0"/>
+              <a:t> - Team </a:t>
+            </a:r>
+            <a:r>
+              <a:rPr lang="it-IT" dirty="0" err="1" smtClean="0"/>
+              <a:t>Committed</a:t>
+            </a:r>
+            <a:endParaRPr lang="it-IT" dirty="0"/>
+          </a:p>
+        </p:txBody>
+      </p:sp>
+      <p:sp>
+        <p:nvSpPr>
+          <p:cNvPr id="9" name="Segnaposto numero diapositiva 8"/>
+          <p:cNvSpPr>
+            <a:spLocks noGrp="1"/>
+          </p:cNvSpPr>
+          <p:nvPr>
+            <p:ph type="sldNum" sz="quarter" idx="12"/>
+          </p:nvPr>
+        </p:nvSpPr>
+        <p:spPr/>
+        <p:txBody>
+          <a:bodyPr/>
+          <a:lstStyle/>
+          <a:p>
+            <a:fld id="{017EC607-BD11-4D4E-AC5F-155C854A0B9D}" type="slidenum">
+              <a:rPr lang="it-IT" smtClean="0"/>
+              <a:pPr/>
+              <a:t>21</a:t>
+            </a:fld>
+            <a:r>
+              <a:rPr lang="it-IT" dirty="0" smtClean="0"/>
+              <a:t> di 24</a:t>
+            </a:r>
+            <a:endParaRPr lang="it-IT" dirty="0"/>
+          </a:p>
+        </p:txBody>
+      </p:sp>
+      <p:pic>
+        <p:nvPicPr>
+          <p:cNvPr id="5" name="Immagine 4" descr="Gui-web-GestioneDomande-Insert.jpg"/>
+          <p:cNvPicPr>
+            <a:picLocks noChangeAspect="1"/>
+          </p:cNvPicPr>
+          <p:nvPr/>
+        </p:nvPicPr>
+        <p:blipFill>
+          <a:blip r:embed="rId2" cstate="print"/>
+          <a:stretch>
+            <a:fillRect/>
+          </a:stretch>
+        </p:blipFill>
+        <p:spPr>
+          <a:xfrm>
+            <a:off x="683568" y="1052736"/>
+            <a:ext cx="7812360" cy="4861024"/>
+          </a:xfrm>
+          <a:prstGeom prst="rect">
+            <a:avLst/>
+          </a:prstGeom>
+        </p:spPr>
+      </p:pic>
+    </p:spTree>
+    <p:extLst>
+      <p:ext uri="{BB962C8B-B14F-4D97-AF65-F5344CB8AC3E}">
+        <p14:creationId xmlns:p14="http://schemas.microsoft.com/office/powerpoint/2010/main" val="200703652"/>
+      </p:ext>
+    </p:extLst>
+  </p:cSld>
+  <p:clrMapOvr>
+    <a:masterClrMapping/>
+  </p:clrMapOvr>
+  <p:timing>
+    <p:tnLst>
+      <p:par>
+        <p:cTn id="1" dur="indefinite" restart="never" nodeType="tmRoot"/>
+      </p:par>
+    </p:tnLst>
+  </p:timing>
+</p:sld>
+</file>
+
+<file path=ppt/slides/slide22.xml><?xml version="1.0" encoding="utf-8"?>
+<p:sld xmlns:a="http://schemas.openxmlformats.org/drawingml/2006/main" xmlns:r="http://schemas.openxmlformats.org/officeDocument/2006/relationships" xmlns:p="http://schemas.openxmlformats.org/presentationml/2006/main">
+  <p:cSld>
+    <p:spTree>
+      <p:nvGrpSpPr>
+        <p:cNvPr id="1" name=""/>
+        <p:cNvGrpSpPr/>
+        <p:nvPr/>
+      </p:nvGrpSpPr>
+      <p:grpSpPr>
+        <a:xfrm>
+          <a:off x="0" y="0"/>
+          <a:ext cx="0" cy="0"/>
+          <a:chOff x="0" y="0"/>
+          <a:chExt cx="0" cy="0"/>
+        </a:xfrm>
+      </p:grpSpPr>
+      <p:sp>
+        <p:nvSpPr>
+          <p:cNvPr id="6" name="Segnaposto data 5"/>
+          <p:cNvSpPr>
+            <a:spLocks noGrp="1"/>
+          </p:cNvSpPr>
+          <p:nvPr>
+            <p:ph type="dt" sz="half" idx="10"/>
+          </p:nvPr>
+        </p:nvSpPr>
+        <p:spPr/>
+        <p:txBody>
+          <a:bodyPr/>
+          <a:lstStyle/>
+          <a:p>
+            <a:r>
+              <a:rPr lang="it-IT" dirty="0" smtClean="0"/>
+              <a:t>Progetto </a:t>
+            </a:r>
+            <a:r>
+              <a:rPr lang="it-IT" dirty="0" err="1" smtClean="0"/>
+              <a:t>Gamification</a:t>
+            </a:r>
+            <a:r>
+              <a:rPr lang="it-IT" dirty="0" smtClean="0"/>
+              <a:t> - Team </a:t>
+            </a:r>
+            <a:r>
+              <a:rPr lang="it-IT" dirty="0" err="1" smtClean="0"/>
+              <a:t>Committed</a:t>
+            </a:r>
+            <a:endParaRPr lang="it-IT" dirty="0"/>
+          </a:p>
+        </p:txBody>
+      </p:sp>
+      <p:sp>
+        <p:nvSpPr>
+          <p:cNvPr id="9" name="Segnaposto numero diapositiva 8"/>
+          <p:cNvSpPr>
+            <a:spLocks noGrp="1"/>
+          </p:cNvSpPr>
+          <p:nvPr>
+            <p:ph type="sldNum" sz="quarter" idx="12"/>
+          </p:nvPr>
+        </p:nvSpPr>
+        <p:spPr/>
+        <p:txBody>
+          <a:bodyPr/>
+          <a:lstStyle/>
+          <a:p>
+            <a:fld id="{017EC607-BD11-4D4E-AC5F-155C854A0B9D}" type="slidenum">
+              <a:rPr lang="it-IT" smtClean="0"/>
+              <a:pPr/>
+              <a:t>22</a:t>
+            </a:fld>
+            <a:r>
+              <a:rPr lang="it-IT" dirty="0" smtClean="0"/>
+              <a:t> di 24</a:t>
+            </a:r>
+            <a:endParaRPr lang="it-IT" dirty="0"/>
+          </a:p>
+        </p:txBody>
+      </p:sp>
+      <p:pic>
+        <p:nvPicPr>
+          <p:cNvPr id="5" name="Immagine 4" descr="Gui-web-GestioneDomande-Insert.jpg"/>
+          <p:cNvPicPr>
+            <a:picLocks noChangeAspect="1"/>
+          </p:cNvPicPr>
+          <p:nvPr/>
+        </p:nvPicPr>
+        <p:blipFill>
+          <a:blip r:embed="rId2" cstate="print"/>
+          <a:stretch>
+            <a:fillRect/>
+          </a:stretch>
+        </p:blipFill>
+        <p:spPr>
+          <a:xfrm>
+            <a:off x="683568" y="1052736"/>
+            <a:ext cx="7812360" cy="4861024"/>
+          </a:xfrm>
+          <a:prstGeom prst="rect">
+            <a:avLst/>
+          </a:prstGeom>
+        </p:spPr>
+      </p:pic>
+    </p:spTree>
+    <p:extLst>
+      <p:ext uri="{BB962C8B-B14F-4D97-AF65-F5344CB8AC3E}">
+        <p14:creationId xmlns:p14="http://schemas.microsoft.com/office/powerpoint/2010/main" val="200703652"/>
+      </p:ext>
+    </p:extLst>
+  </p:cSld>
+  <p:clrMapOvr>
+    <a:masterClrMapping/>
+  </p:clrMapOvr>
+  <p:timing>
+    <p:tnLst>
+      <p:par>
+        <p:cTn id="1" dur="indefinite" restart="never" nodeType="tmRoot"/>
+      </p:par>
+    </p:tnLst>
+  </p:timing>
+</p:sld>
+</file>
+
+<file path=ppt/slides/slide23.xml><?xml version="1.0" encoding="utf-8"?>
 <p:sld xmlns:a="http://schemas.openxmlformats.org/drawingml/2006/main" xmlns:r="http://schemas.openxmlformats.org/officeDocument/2006/relationships" xmlns:p="http://schemas.openxmlformats.org/presentationml/2006/main">
   <p:cSld>
     <p:spTree>
@@ -16614,11 +17054,11 @@
             <a:fld id="{017EC607-BD11-4D4E-AC5F-155C854A0B9D}" type="slidenum">
               <a:rPr lang="it-IT" smtClean="0"/>
               <a:pPr/>
-              <a:t>20</a:t>
+              <a:t>23</a:t>
             </a:fld>
             <a:r>
               <a:rPr lang="it-IT" dirty="0" smtClean="0"/>
-              <a:t> di 67</a:t>
+              <a:t> di 24</a:t>
             </a:r>
           </a:p>
         </p:txBody>
@@ -16643,7 +17083,7 @@
 </p:sld>
 </file>
 
-<file path=ppt/slides/slide21.xml><?xml version="1.0" encoding="utf-8"?>
+<file path=ppt/slides/slide24.xml><?xml version="1.0" encoding="utf-8"?>
 <p:sld xmlns:a="http://schemas.openxmlformats.org/drawingml/2006/main" xmlns:r="http://schemas.openxmlformats.org/officeDocument/2006/relationships" xmlns:p="http://schemas.openxmlformats.org/presentationml/2006/main">
   <p:cSld>
     <p:spTree>
@@ -16729,11 +17169,19 @@
           <a:lstStyle/>
           <a:p>
             <a:fld id="{017EC607-BD11-4D4E-AC5F-155C854A0B9D}" type="slidenum">
-              <a:rPr lang="it-IT" smtClean="0"/>
+              <a:rPr lang="it-IT"/>
               <a:pPr/>
-              <a:t>21</a:t>
+              <a:t>24</a:t>
             </a:fld>
-            <a:endParaRPr lang="it-IT"/>
+            <a:r>
+              <a:rPr lang="it-IT" dirty="0"/>
+              <a:t> di </a:t>
+            </a:r>
+            <a:r>
+              <a:rPr lang="it-IT" dirty="0" smtClean="0"/>
+              <a:t>24</a:t>
+            </a:r>
+            <a:endParaRPr lang="it-IT" dirty="0"/>
           </a:p>
         </p:txBody>
       </p:sp>
@@ -16771,10 +17219,17 @@
   <p:clrMapOvr>
     <a:masterClrMapping/>
   </p:clrMapOvr>
+  <p:timing>
+    <p:tnLst>
+      <p:par>
+        <p:cTn id="1" dur="indefinite" restart="never" nodeType="tmRoot"/>
+      </p:par>
+    </p:tnLst>
+  </p:timing>
 </p:sld>
 </file>
 
-<file path=ppt/slides/slide22.xml><?xml version="1.0" encoding="utf-8"?>
+<file path=ppt/slides/slide25.xml><?xml version="1.0" encoding="utf-8"?>
 <p:sld xmlns:a="http://schemas.openxmlformats.org/drawingml/2006/main" xmlns:r="http://schemas.openxmlformats.org/officeDocument/2006/relationships" xmlns:p="http://schemas.openxmlformats.org/presentationml/2006/main">
   <p:cSld>
     <p:spTree>
@@ -16862,9 +17317,17 @@
             <a:fld id="{017EC607-BD11-4D4E-AC5F-155C854A0B9D}" type="slidenum">
               <a:rPr lang="it-IT" smtClean="0"/>
               <a:pPr/>
-              <a:t>22</a:t>
+              <a:t>25</a:t>
             </a:fld>
-            <a:endParaRPr lang="it-IT"/>
+            <a:r>
+              <a:rPr lang="it-IT" dirty="0"/>
+              <a:t> </a:t>
+            </a:r>
+            <a:r>
+              <a:rPr lang="it-IT" dirty="0" smtClean="0"/>
+              <a:t>di 24</a:t>
+            </a:r>
+            <a:endParaRPr lang="it-IT" dirty="0"/>
           </a:p>
         </p:txBody>
       </p:sp>
@@ -16902,10 +17365,17 @@
   <p:clrMapOvr>
     <a:masterClrMapping/>
   </p:clrMapOvr>
+  <p:timing>
+    <p:tnLst>
+      <p:par>
+        <p:cTn id="1" dur="indefinite" restart="never" nodeType="tmRoot"/>
+      </p:par>
+    </p:tnLst>
+  </p:timing>
 </p:sld>
 </file>
 
-<file path=ppt/slides/slide23.xml><?xml version="1.0" encoding="utf-8"?>
+<file path=ppt/slides/slide26.xml><?xml version="1.0" encoding="utf-8"?>
 <p:sld xmlns:a="http://schemas.openxmlformats.org/drawingml/2006/main" xmlns:r="http://schemas.openxmlformats.org/officeDocument/2006/relationships" xmlns:p="http://schemas.openxmlformats.org/presentationml/2006/main">
   <p:cSld>
     <p:spTree>
@@ -16993,9 +17463,17 @@
             <a:fld id="{017EC607-BD11-4D4E-AC5F-155C854A0B9D}" type="slidenum">
               <a:rPr lang="it-IT" smtClean="0"/>
               <a:pPr/>
-              <a:t>23</a:t>
+              <a:t>26</a:t>
             </a:fld>
-            <a:endParaRPr lang="it-IT"/>
+            <a:r>
+              <a:rPr lang="it-IT" dirty="0"/>
+              <a:t> </a:t>
+            </a:r>
+            <a:r>
+              <a:rPr lang="it-IT" dirty="0" smtClean="0"/>
+              <a:t>di 24</a:t>
+            </a:r>
+            <a:endParaRPr lang="it-IT" dirty="0"/>
           </a:p>
         </p:txBody>
       </p:sp>
@@ -17187,7 +17665,7 @@
             </a:fld>
             <a:r>
               <a:rPr lang="it-IT" dirty="0" smtClean="0"/>
-              <a:t> di 67</a:t>
+              <a:t> di 24</a:t>
             </a:r>
           </a:p>
         </p:txBody>
@@ -17213,6 +17691,136 @@
 </file>
 
 <file path=ppt/slides/slide4.xml><?xml version="1.0" encoding="utf-8"?>
+<p:sld xmlns:a="http://schemas.openxmlformats.org/drawingml/2006/main" xmlns:r="http://schemas.openxmlformats.org/officeDocument/2006/relationships" xmlns:p="http://schemas.openxmlformats.org/presentationml/2006/main">
+  <p:cSld>
+    <p:spTree>
+      <p:nvGrpSpPr>
+        <p:cNvPr id="1" name=""/>
+        <p:cNvGrpSpPr/>
+        <p:nvPr/>
+      </p:nvGrpSpPr>
+      <p:grpSpPr>
+        <a:xfrm>
+          <a:off x="0" y="0"/>
+          <a:ext cx="0" cy="0"/>
+          <a:chOff x="0" y="0"/>
+          <a:chExt cx="0" cy="0"/>
+        </a:xfrm>
+      </p:grpSpPr>
+      <p:sp>
+        <p:nvSpPr>
+          <p:cNvPr id="6" name="Segnaposto data 5"/>
+          <p:cNvSpPr>
+            <a:spLocks noGrp="1"/>
+          </p:cNvSpPr>
+          <p:nvPr>
+            <p:ph type="dt" sz="half" idx="10"/>
+          </p:nvPr>
+        </p:nvSpPr>
+        <p:spPr/>
+        <p:txBody>
+          <a:bodyPr/>
+          <a:lstStyle/>
+          <a:p>
+            <a:r>
+              <a:rPr lang="it-IT" dirty="0" smtClean="0"/>
+              <a:t>Progetto </a:t>
+            </a:r>
+            <a:r>
+              <a:rPr lang="it-IT" dirty="0" err="1" smtClean="0"/>
+              <a:t>Gamification</a:t>
+            </a:r>
+            <a:r>
+              <a:rPr lang="it-IT" dirty="0" smtClean="0"/>
+              <a:t> - Team </a:t>
+            </a:r>
+            <a:r>
+              <a:rPr lang="it-IT" dirty="0" err="1" smtClean="0"/>
+              <a:t>Committed</a:t>
+            </a:r>
+            <a:endParaRPr lang="it-IT" dirty="0"/>
+          </a:p>
+        </p:txBody>
+      </p:sp>
+      <p:sp>
+        <p:nvSpPr>
+          <p:cNvPr id="9" name="Segnaposto numero diapositiva 8"/>
+          <p:cNvSpPr>
+            <a:spLocks noGrp="1"/>
+          </p:cNvSpPr>
+          <p:nvPr>
+            <p:ph type="sldNum" sz="quarter" idx="12"/>
+          </p:nvPr>
+        </p:nvSpPr>
+        <p:spPr/>
+        <p:txBody>
+          <a:bodyPr/>
+          <a:lstStyle/>
+          <a:p>
+            <a:fld id="{017EC607-BD11-4D4E-AC5F-155C854A0B9D}" type="slidenum">
+              <a:rPr lang="it-IT" smtClean="0"/>
+              <a:pPr/>
+              <a:t>4</a:t>
+            </a:fld>
+            <a:r>
+              <a:rPr lang="it-IT" dirty="0" smtClean="0"/>
+              <a:t> di 67</a:t>
+            </a:r>
+            <a:endParaRPr lang="it-IT" dirty="0"/>
+          </a:p>
+        </p:txBody>
+      </p:sp>
+      <p:pic>
+        <p:nvPicPr>
+          <p:cNvPr id="3" name="Picture 2" descr="architettura generale.jpg"/>
+          <p:cNvPicPr>
+            <a:picLocks noChangeAspect="1"/>
+          </p:cNvPicPr>
+          <p:nvPr/>
+        </p:nvPicPr>
+        <p:blipFill>
+          <a:blip r:embed="rId2">
+            <a:extLst>
+              <a:ext uri="{28A0092B-C50C-407E-A947-70E740481C1C}">
+                <a14:useLocalDpi xmlns:a14="http://schemas.microsoft.com/office/drawing/2010/main" val="0"/>
+              </a:ext>
+            </a:extLst>
+          </a:blip>
+          <a:stretch>
+            <a:fillRect/>
+          </a:stretch>
+        </p:blipFill>
+        <p:spPr>
+          <a:xfrm>
+            <a:off x="2339752" y="1052736"/>
+            <a:ext cx="4861854" cy="5328592"/>
+          </a:xfrm>
+          <a:prstGeom prst="rect">
+            <a:avLst/>
+          </a:prstGeom>
+        </p:spPr>
+      </p:pic>
+    </p:spTree>
+    <p:extLst>
+      <p:ext uri="{BB962C8B-B14F-4D97-AF65-F5344CB8AC3E}">
+        <p14:creationId xmlns:p14="http://schemas.microsoft.com/office/powerpoint/2010/main" val="829312757"/>
+      </p:ext>
+    </p:extLst>
+  </p:cSld>
+  <p:clrMapOvr>
+    <a:masterClrMapping/>
+  </p:clrMapOvr>
+  <p:timing>
+    <p:tnLst>
+      <p:par>
+        <p:cTn id="1" dur="indefinite" restart="never" nodeType="tmRoot"/>
+      </p:par>
+    </p:tnLst>
+  </p:timing>
+</p:sld>
+</file>
+
+<file path=ppt/slides/slide5.xml><?xml version="1.0" encoding="utf-8"?>
 <p:sld xmlns:a="http://schemas.openxmlformats.org/drawingml/2006/main" xmlns:r="http://schemas.openxmlformats.org/officeDocument/2006/relationships" xmlns:p="http://schemas.openxmlformats.org/presentationml/2006/main">
   <p:cSld>
     <p:spTree>
@@ -17333,11 +17941,11 @@
             <a:fld id="{017EC607-BD11-4D4E-AC5F-155C854A0B9D}" type="slidenum">
               <a:rPr lang="it-IT" smtClean="0"/>
               <a:pPr/>
-              <a:t>4</a:t>
+              <a:t>5</a:t>
             </a:fld>
             <a:r>
               <a:rPr lang="it-IT" dirty="0" smtClean="0"/>
-              <a:t> di 67</a:t>
+              <a:t> di 24</a:t>
             </a:r>
           </a:p>
         </p:txBody>
@@ -17362,7 +17970,7 @@
 </p:sld>
 </file>
 
-<file path=ppt/slides/slide5.xml><?xml version="1.0" encoding="utf-8"?>
+<file path=ppt/slides/slide6.xml><?xml version="1.0" encoding="utf-8"?>
 <p:sld xmlns:a="http://schemas.openxmlformats.org/drawingml/2006/main" xmlns:r="http://schemas.openxmlformats.org/officeDocument/2006/relationships" xmlns:p="http://schemas.openxmlformats.org/presentationml/2006/main">
   <p:cSld>
     <p:spTree>
@@ -17432,11 +18040,11 @@
             <a:fld id="{017EC607-BD11-4D4E-AC5F-155C854A0B9D}" type="slidenum">
               <a:rPr lang="it-IT" smtClean="0"/>
               <a:pPr/>
-              <a:t>5</a:t>
+              <a:t>6</a:t>
             </a:fld>
             <a:r>
               <a:rPr lang="it-IT" dirty="0" smtClean="0"/>
-              <a:t> di 67</a:t>
+              <a:t> di 24</a:t>
             </a:r>
             <a:endParaRPr lang="it-IT" dirty="0"/>
           </a:p>
@@ -17486,7 +18094,285 @@
 </p:sld>
 </file>
 
-<file path=ppt/slides/slide6.xml><?xml version="1.0" encoding="utf-8"?>
+<file path=ppt/slides/slide7.xml><?xml version="1.0" encoding="utf-8"?>
+<p:sld xmlns:a="http://schemas.openxmlformats.org/drawingml/2006/main" xmlns:r="http://schemas.openxmlformats.org/officeDocument/2006/relationships" xmlns:p="http://schemas.openxmlformats.org/presentationml/2006/main">
+  <p:cSld>
+    <p:spTree>
+      <p:nvGrpSpPr>
+        <p:cNvPr id="1" name=""/>
+        <p:cNvGrpSpPr/>
+        <p:nvPr/>
+      </p:nvGrpSpPr>
+      <p:grpSpPr>
+        <a:xfrm>
+          <a:off x="0" y="0"/>
+          <a:ext cx="0" cy="0"/>
+          <a:chOff x="0" y="0"/>
+          <a:chExt cx="0" cy="0"/>
+        </a:xfrm>
+      </p:grpSpPr>
+      <p:pic>
+        <p:nvPicPr>
+          <p:cNvPr id="3" name="Immagine 2"/>
+          <p:cNvPicPr>
+            <a:picLocks noChangeAspect="1"/>
+          </p:cNvPicPr>
+          <p:nvPr/>
+        </p:nvPicPr>
+        <p:blipFill>
+          <a:blip r:embed="rId2" cstate="print">
+            <a:extLst>
+              <a:ext uri="{28A0092B-C50C-407E-A947-70E740481C1C}">
+                <a14:useLocalDpi xmlns:a14="http://schemas.microsoft.com/office/drawing/2010/main" val="0"/>
+              </a:ext>
+            </a:extLst>
+          </a:blip>
+          <a:stretch>
+            <a:fillRect/>
+          </a:stretch>
+        </p:blipFill>
+        <p:spPr>
+          <a:xfrm>
+            <a:off x="2750630" y="1268760"/>
+            <a:ext cx="3765586" cy="4581128"/>
+          </a:xfrm>
+          <a:prstGeom prst="rect">
+            <a:avLst/>
+          </a:prstGeom>
+        </p:spPr>
+      </p:pic>
+      <p:sp>
+        <p:nvSpPr>
+          <p:cNvPr id="2" name="Titolo 1"/>
+          <p:cNvSpPr>
+            <a:spLocks noGrp="1"/>
+          </p:cNvSpPr>
+          <p:nvPr>
+            <p:ph type="title"/>
+          </p:nvPr>
+        </p:nvSpPr>
+        <p:spPr>
+          <a:xfrm>
+            <a:off x="1043608" y="2996952"/>
+            <a:ext cx="7024744" cy="1143000"/>
+          </a:xfrm>
+        </p:spPr>
+        <p:txBody>
+          <a:bodyPr>
+            <a:normAutofit/>
+          </a:bodyPr>
+          <a:lstStyle/>
+          <a:p>
+            <a:pPr algn="ctr"/>
+            <a:r>
+              <a:rPr lang="it-IT" dirty="0" smtClean="0"/>
+              <a:t>3. Front-End Desktop</a:t>
+            </a:r>
+            <a:endParaRPr lang="it-IT" dirty="0"/>
+          </a:p>
+        </p:txBody>
+      </p:sp>
+      <p:sp>
+        <p:nvSpPr>
+          <p:cNvPr id="4" name="Segnaposto data 3"/>
+          <p:cNvSpPr>
+            <a:spLocks noGrp="1"/>
+          </p:cNvSpPr>
+          <p:nvPr>
+            <p:ph type="dt" sz="half" idx="10"/>
+          </p:nvPr>
+        </p:nvSpPr>
+        <p:spPr/>
+        <p:txBody>
+          <a:bodyPr/>
+          <a:lstStyle/>
+          <a:p>
+            <a:r>
+              <a:rPr lang="it-IT" smtClean="0"/>
+              <a:t>Progetto Gamification - Team Committed</a:t>
+            </a:r>
+            <a:endParaRPr lang="it-IT"/>
+          </a:p>
+        </p:txBody>
+      </p:sp>
+      <p:sp>
+        <p:nvSpPr>
+          <p:cNvPr id="7" name="Segnaposto numero diapositiva 6"/>
+          <p:cNvSpPr>
+            <a:spLocks noGrp="1"/>
+          </p:cNvSpPr>
+          <p:nvPr>
+            <p:ph type="sldNum" sz="quarter" idx="12"/>
+          </p:nvPr>
+        </p:nvSpPr>
+        <p:spPr/>
+        <p:txBody>
+          <a:bodyPr/>
+          <a:lstStyle/>
+          <a:p>
+            <a:fld id="{017EC607-BD11-4D4E-AC5F-155C854A0B9D}" type="slidenum">
+              <a:rPr lang="it-IT" smtClean="0"/>
+              <a:pPr/>
+              <a:t>7</a:t>
+            </a:fld>
+            <a:r>
+              <a:rPr lang="it-IT" dirty="0" smtClean="0"/>
+              <a:t> di 67</a:t>
+            </a:r>
+          </a:p>
+        </p:txBody>
+      </p:sp>
+    </p:spTree>
+    <p:extLst>
+      <p:ext uri="{BB962C8B-B14F-4D97-AF65-F5344CB8AC3E}">
+        <p14:creationId xmlns:p14="http://schemas.microsoft.com/office/powerpoint/2010/main" val="2994835323"/>
+      </p:ext>
+    </p:extLst>
+  </p:cSld>
+  <p:clrMapOvr>
+    <a:masterClrMapping/>
+  </p:clrMapOvr>
+  <p:timing>
+    <p:tnLst>
+      <p:par>
+        <p:cTn id="1" dur="indefinite" restart="never" nodeType="tmRoot"/>
+      </p:par>
+    </p:tnLst>
+  </p:timing>
+</p:sld>
+</file>
+
+<file path=ppt/slides/slide8.xml><?xml version="1.0" encoding="utf-8"?>
+<p:sld xmlns:a="http://schemas.openxmlformats.org/drawingml/2006/main" xmlns:r="http://schemas.openxmlformats.org/officeDocument/2006/relationships" xmlns:p="http://schemas.openxmlformats.org/presentationml/2006/main">
+  <p:cSld>
+    <p:spTree>
+      <p:nvGrpSpPr>
+        <p:cNvPr id="1" name=""/>
+        <p:cNvGrpSpPr/>
+        <p:nvPr/>
+      </p:nvGrpSpPr>
+      <p:grpSpPr>
+        <a:xfrm>
+          <a:off x="0" y="0"/>
+          <a:ext cx="0" cy="0"/>
+          <a:chOff x="0" y="0"/>
+          <a:chExt cx="0" cy="0"/>
+        </a:xfrm>
+      </p:grpSpPr>
+      <p:sp>
+        <p:nvSpPr>
+          <p:cNvPr id="6" name="Segnaposto data 5"/>
+          <p:cNvSpPr>
+            <a:spLocks noGrp="1"/>
+          </p:cNvSpPr>
+          <p:nvPr>
+            <p:ph type="dt" sz="half" idx="10"/>
+          </p:nvPr>
+        </p:nvSpPr>
+        <p:spPr/>
+        <p:txBody>
+          <a:bodyPr/>
+          <a:lstStyle/>
+          <a:p>
+            <a:r>
+              <a:rPr lang="it-IT" dirty="0" smtClean="0"/>
+              <a:t>Progetto </a:t>
+            </a:r>
+            <a:r>
+              <a:rPr lang="it-IT" dirty="0" err="1" smtClean="0"/>
+              <a:t>Gamification</a:t>
+            </a:r>
+            <a:r>
+              <a:rPr lang="it-IT" dirty="0" smtClean="0"/>
+              <a:t> - Team </a:t>
+            </a:r>
+            <a:r>
+              <a:rPr lang="it-IT" dirty="0" err="1" smtClean="0"/>
+              <a:t>Committed</a:t>
+            </a:r>
+            <a:endParaRPr lang="it-IT" dirty="0"/>
+          </a:p>
+        </p:txBody>
+      </p:sp>
+      <p:sp>
+        <p:nvSpPr>
+          <p:cNvPr id="9" name="Segnaposto numero diapositiva 8"/>
+          <p:cNvSpPr>
+            <a:spLocks noGrp="1"/>
+          </p:cNvSpPr>
+          <p:nvPr>
+            <p:ph type="sldNum" sz="quarter" idx="12"/>
+          </p:nvPr>
+        </p:nvSpPr>
+        <p:spPr/>
+        <p:txBody>
+          <a:bodyPr/>
+          <a:lstStyle/>
+          <a:p>
+            <a:fld id="{017EC607-BD11-4D4E-AC5F-155C854A0B9D}" type="slidenum">
+              <a:rPr lang="it-IT" smtClean="0"/>
+              <a:pPr/>
+              <a:t>8</a:t>
+            </a:fld>
+            <a:r>
+              <a:rPr lang="it-IT" dirty="0" smtClean="0"/>
+              <a:t> di 67</a:t>
+            </a:r>
+            <a:endParaRPr lang="it-IT" dirty="0"/>
+          </a:p>
+        </p:txBody>
+      </p:sp>
+      <p:pic>
+        <p:nvPicPr>
+          <p:cNvPr id="7" name="Picture 6" descr="frontEndDesktop.png"/>
+          <p:cNvPicPr>
+            <a:picLocks noChangeAspect="1"/>
+          </p:cNvPicPr>
+          <p:nvPr/>
+        </p:nvPicPr>
+        <p:blipFill>
+          <a:blip r:embed="rId2">
+            <a:extLst>
+              <a:ext uri="{28A0092B-C50C-407E-A947-70E740481C1C}">
+                <a14:useLocalDpi xmlns:a14="http://schemas.microsoft.com/office/drawing/2010/main" val="0"/>
+              </a:ext>
+            </a:extLst>
+          </a:blip>
+          <a:stretch>
+            <a:fillRect/>
+          </a:stretch>
+        </p:blipFill>
+        <p:spPr>
+          <a:xfrm>
+            <a:off x="2411760" y="692696"/>
+            <a:ext cx="4392488" cy="5494603"/>
+          </a:xfrm>
+          <a:prstGeom prst="rect">
+            <a:avLst/>
+          </a:prstGeom>
+        </p:spPr>
+      </p:pic>
+    </p:spTree>
+    <p:extLst>
+      <p:ext uri="{BB962C8B-B14F-4D97-AF65-F5344CB8AC3E}">
+        <p14:creationId xmlns:p14="http://schemas.microsoft.com/office/powerpoint/2010/main" val="4216620894"/>
+      </p:ext>
+    </p:extLst>
+  </p:cSld>
+  <p:clrMapOvr>
+    <a:masterClrMapping/>
+  </p:clrMapOvr>
+  <p:timing>
+    <p:tnLst>
+      <p:par>
+        <p:cTn id="1" dur="indefinite" restart="never" nodeType="tmRoot"/>
+      </p:par>
+    </p:tnLst>
+  </p:timing>
+</p:sld>
+</file>
+
+<file path=ppt/slides/slide9.xml><?xml version="1.0" encoding="utf-8"?>
 <p:sld xmlns:a="http://schemas.openxmlformats.org/drawingml/2006/main" xmlns:r="http://schemas.openxmlformats.org/officeDocument/2006/relationships" xmlns:p="http://schemas.openxmlformats.org/presentationml/2006/main">
   <p:cSld>
     <p:spTree>
@@ -17611,11 +18497,11 @@
             <a:fld id="{017EC607-BD11-4D4E-AC5F-155C854A0B9D}" type="slidenum">
               <a:rPr lang="it-IT" smtClean="0"/>
               <a:pPr/>
-              <a:t>6</a:t>
+              <a:t>9</a:t>
             </a:fld>
             <a:r>
               <a:rPr lang="it-IT" dirty="0" smtClean="0"/>
-              <a:t> di 67</a:t>
+              <a:t> di 24</a:t>
             </a:r>
           </a:p>
         </p:txBody>
@@ -17624,408 +18510,6 @@
     <p:extLst>
       <p:ext uri="{BB962C8B-B14F-4D97-AF65-F5344CB8AC3E}">
         <p14:creationId xmlns:p14="http://schemas.microsoft.com/office/powerpoint/2010/main" val="2537002"/>
-      </p:ext>
-    </p:extLst>
-  </p:cSld>
-  <p:clrMapOvr>
-    <a:masterClrMapping/>
-  </p:clrMapOvr>
-  <p:timing>
-    <p:tnLst>
-      <p:par>
-        <p:cTn id="1" dur="indefinite" restart="never" nodeType="tmRoot"/>
-      </p:par>
-    </p:tnLst>
-  </p:timing>
-</p:sld>
-</file>
-
-<file path=ppt/slides/slide7.xml><?xml version="1.0" encoding="utf-8"?>
-<p:sld xmlns:a="http://schemas.openxmlformats.org/drawingml/2006/main" xmlns:r="http://schemas.openxmlformats.org/officeDocument/2006/relationships" xmlns:p="http://schemas.openxmlformats.org/presentationml/2006/main">
-  <p:cSld>
-    <p:spTree>
-      <p:nvGrpSpPr>
-        <p:cNvPr id="1" name=""/>
-        <p:cNvGrpSpPr/>
-        <p:nvPr/>
-      </p:nvGrpSpPr>
-      <p:grpSpPr>
-        <a:xfrm>
-          <a:off x="0" y="0"/>
-          <a:ext cx="0" cy="0"/>
-          <a:chOff x="0" y="0"/>
-          <a:chExt cx="0" cy="0"/>
-        </a:xfrm>
-      </p:grpSpPr>
-      <p:sp>
-        <p:nvSpPr>
-          <p:cNvPr id="6" name="Segnaposto data 5"/>
-          <p:cNvSpPr>
-            <a:spLocks noGrp="1"/>
-          </p:cNvSpPr>
-          <p:nvPr>
-            <p:ph type="dt" sz="half" idx="10"/>
-          </p:nvPr>
-        </p:nvSpPr>
-        <p:spPr/>
-        <p:txBody>
-          <a:bodyPr/>
-          <a:lstStyle/>
-          <a:p>
-            <a:r>
-              <a:rPr lang="it-IT" dirty="0" smtClean="0"/>
-              <a:t>Progetto </a:t>
-            </a:r>
-            <a:r>
-              <a:rPr lang="it-IT" dirty="0" err="1" smtClean="0"/>
-              <a:t>Gamification</a:t>
-            </a:r>
-            <a:r>
-              <a:rPr lang="it-IT" dirty="0" smtClean="0"/>
-              <a:t> - Team </a:t>
-            </a:r>
-            <a:r>
-              <a:rPr lang="it-IT" dirty="0" err="1" smtClean="0"/>
-              <a:t>Committed</a:t>
-            </a:r>
-            <a:endParaRPr lang="it-IT" dirty="0"/>
-          </a:p>
-        </p:txBody>
-      </p:sp>
-      <p:sp>
-        <p:nvSpPr>
-          <p:cNvPr id="9" name="Segnaposto numero diapositiva 8"/>
-          <p:cNvSpPr>
-            <a:spLocks noGrp="1"/>
-          </p:cNvSpPr>
-          <p:nvPr>
-            <p:ph type="sldNum" sz="quarter" idx="12"/>
-          </p:nvPr>
-        </p:nvSpPr>
-        <p:spPr/>
-        <p:txBody>
-          <a:bodyPr/>
-          <a:lstStyle/>
-          <a:p>
-            <a:fld id="{017EC607-BD11-4D4E-AC5F-155C854A0B9D}" type="slidenum">
-              <a:rPr lang="it-IT" smtClean="0"/>
-              <a:pPr/>
-              <a:t>7</a:t>
-            </a:fld>
-            <a:r>
-              <a:rPr lang="it-IT" dirty="0" smtClean="0"/>
-              <a:t> di 67</a:t>
-            </a:r>
-            <a:endParaRPr lang="it-IT" dirty="0"/>
-          </a:p>
-        </p:txBody>
-      </p:sp>
-      <p:pic>
-        <p:nvPicPr>
-          <p:cNvPr id="11" name="Immagine 10" descr="frontEndWeb.png"/>
-          <p:cNvPicPr>
-            <a:picLocks noChangeAspect="1"/>
-          </p:cNvPicPr>
-          <p:nvPr/>
-        </p:nvPicPr>
-        <p:blipFill>
-          <a:blip r:embed="rId2" cstate="print"/>
-          <a:stretch>
-            <a:fillRect/>
-          </a:stretch>
-        </p:blipFill>
-        <p:spPr>
-          <a:xfrm>
-            <a:off x="2051720" y="692696"/>
-            <a:ext cx="5020413" cy="5760640"/>
-          </a:xfrm>
-          <a:prstGeom prst="rect">
-            <a:avLst/>
-          </a:prstGeom>
-        </p:spPr>
-      </p:pic>
-    </p:spTree>
-    <p:extLst>
-      <p:ext uri="{BB962C8B-B14F-4D97-AF65-F5344CB8AC3E}">
-        <p14:creationId xmlns:p14="http://schemas.microsoft.com/office/powerpoint/2010/main" val="200703652"/>
-      </p:ext>
-    </p:extLst>
-  </p:cSld>
-  <p:clrMapOvr>
-    <a:masterClrMapping/>
-  </p:clrMapOvr>
-  <p:timing>
-    <p:tnLst>
-      <p:par>
-        <p:cTn id="1" dur="indefinite" restart="never" nodeType="tmRoot"/>
-      </p:par>
-    </p:tnLst>
-  </p:timing>
-</p:sld>
-</file>
-
-<file path=ppt/slides/slide8.xml><?xml version="1.0" encoding="utf-8"?>
-<p:sld xmlns:a="http://schemas.openxmlformats.org/drawingml/2006/main" xmlns:r="http://schemas.openxmlformats.org/officeDocument/2006/relationships" xmlns:p="http://schemas.openxmlformats.org/presentationml/2006/main">
-  <p:cSld>
-    <p:spTree>
-      <p:nvGrpSpPr>
-        <p:cNvPr id="1" name=""/>
-        <p:cNvGrpSpPr/>
-        <p:nvPr/>
-      </p:nvGrpSpPr>
-      <p:grpSpPr>
-        <a:xfrm>
-          <a:off x="0" y="0"/>
-          <a:ext cx="0" cy="0"/>
-          <a:chOff x="0" y="0"/>
-          <a:chExt cx="0" cy="0"/>
-        </a:xfrm>
-      </p:grpSpPr>
-      <p:pic>
-        <p:nvPicPr>
-          <p:cNvPr id="3" name="Immagine 2"/>
-          <p:cNvPicPr>
-            <a:picLocks noChangeAspect="1"/>
-          </p:cNvPicPr>
-          <p:nvPr/>
-        </p:nvPicPr>
-        <p:blipFill>
-          <a:blip r:embed="rId2" cstate="print">
-            <a:extLst>
-              <a:ext uri="{28A0092B-C50C-407E-A947-70E740481C1C}">
-                <a14:useLocalDpi xmlns:a14="http://schemas.microsoft.com/office/drawing/2010/main" val="0"/>
-              </a:ext>
-            </a:extLst>
-          </a:blip>
-          <a:stretch>
-            <a:fillRect/>
-          </a:stretch>
-        </p:blipFill>
-        <p:spPr>
-          <a:xfrm>
-            <a:off x="2750630" y="1268760"/>
-            <a:ext cx="3765586" cy="4581128"/>
-          </a:xfrm>
-          <a:prstGeom prst="rect">
-            <a:avLst/>
-          </a:prstGeom>
-        </p:spPr>
-      </p:pic>
-      <p:sp>
-        <p:nvSpPr>
-          <p:cNvPr id="2" name="Titolo 1"/>
-          <p:cNvSpPr>
-            <a:spLocks noGrp="1"/>
-          </p:cNvSpPr>
-          <p:nvPr>
-            <p:ph type="title"/>
-          </p:nvPr>
-        </p:nvSpPr>
-        <p:spPr>
-          <a:xfrm>
-            <a:off x="1043608" y="2996952"/>
-            <a:ext cx="7024744" cy="1143000"/>
-          </a:xfrm>
-        </p:spPr>
-        <p:txBody>
-          <a:bodyPr/>
-          <a:lstStyle/>
-          <a:p>
-            <a:pPr algn="ctr"/>
-            <a:r>
-              <a:rPr lang="it-IT" dirty="0" smtClean="0"/>
-              <a:t>5. </a:t>
-            </a:r>
-            <a:r>
-              <a:rPr lang="it-IT" dirty="0" err="1" smtClean="0"/>
-              <a:t>Front-End</a:t>
-            </a:r>
-            <a:r>
-              <a:rPr lang="it-IT" dirty="0" smtClean="0"/>
-              <a:t> Mobile</a:t>
-            </a:r>
-            <a:endParaRPr lang="it-IT" dirty="0"/>
-          </a:p>
-        </p:txBody>
-      </p:sp>
-      <p:sp>
-        <p:nvSpPr>
-          <p:cNvPr id="4" name="Segnaposto data 3"/>
-          <p:cNvSpPr>
-            <a:spLocks noGrp="1"/>
-          </p:cNvSpPr>
-          <p:nvPr>
-            <p:ph type="dt" sz="half" idx="10"/>
-          </p:nvPr>
-        </p:nvSpPr>
-        <p:spPr/>
-        <p:txBody>
-          <a:bodyPr/>
-          <a:lstStyle/>
-          <a:p>
-            <a:r>
-              <a:rPr lang="it-IT" smtClean="0"/>
-              <a:t>Progetto Gamification - Team Committed</a:t>
-            </a:r>
-            <a:endParaRPr lang="it-IT"/>
-          </a:p>
-        </p:txBody>
-      </p:sp>
-      <p:sp>
-        <p:nvSpPr>
-          <p:cNvPr id="7" name="Segnaposto numero diapositiva 6"/>
-          <p:cNvSpPr>
-            <a:spLocks noGrp="1"/>
-          </p:cNvSpPr>
-          <p:nvPr>
-            <p:ph type="sldNum" sz="quarter" idx="12"/>
-          </p:nvPr>
-        </p:nvSpPr>
-        <p:spPr/>
-        <p:txBody>
-          <a:bodyPr/>
-          <a:lstStyle/>
-          <a:p>
-            <a:fld id="{017EC607-BD11-4D4E-AC5F-155C854A0B9D}" type="slidenum">
-              <a:rPr lang="it-IT" smtClean="0"/>
-              <a:pPr/>
-              <a:t>8</a:t>
-            </a:fld>
-            <a:r>
-              <a:rPr lang="it-IT" dirty="0" smtClean="0"/>
-              <a:t> di 67</a:t>
-            </a:r>
-          </a:p>
-        </p:txBody>
-      </p:sp>
-    </p:spTree>
-    <p:extLst>
-      <p:ext uri="{BB962C8B-B14F-4D97-AF65-F5344CB8AC3E}">
-        <p14:creationId xmlns:p14="http://schemas.microsoft.com/office/powerpoint/2010/main" val="2537002"/>
-      </p:ext>
-    </p:extLst>
-  </p:cSld>
-  <p:clrMapOvr>
-    <a:masterClrMapping/>
-  </p:clrMapOvr>
-  <p:timing>
-    <p:tnLst>
-      <p:par>
-        <p:cTn id="1" dur="indefinite" restart="never" nodeType="tmRoot"/>
-      </p:par>
-    </p:tnLst>
-  </p:timing>
-</p:sld>
-</file>
-
-<file path=ppt/slides/slide9.xml><?xml version="1.0" encoding="utf-8"?>
-<p:sld xmlns:a="http://schemas.openxmlformats.org/drawingml/2006/main" xmlns:r="http://schemas.openxmlformats.org/officeDocument/2006/relationships" xmlns:p="http://schemas.openxmlformats.org/presentationml/2006/main">
-  <p:cSld>
-    <p:spTree>
-      <p:nvGrpSpPr>
-        <p:cNvPr id="1" name=""/>
-        <p:cNvGrpSpPr/>
-        <p:nvPr/>
-      </p:nvGrpSpPr>
-      <p:grpSpPr>
-        <a:xfrm>
-          <a:off x="0" y="0"/>
-          <a:ext cx="0" cy="0"/>
-          <a:chOff x="0" y="0"/>
-          <a:chExt cx="0" cy="0"/>
-        </a:xfrm>
-      </p:grpSpPr>
-      <p:sp>
-        <p:nvSpPr>
-          <p:cNvPr id="6" name="Segnaposto data 5"/>
-          <p:cNvSpPr>
-            <a:spLocks noGrp="1"/>
-          </p:cNvSpPr>
-          <p:nvPr>
-            <p:ph type="dt" sz="half" idx="10"/>
-          </p:nvPr>
-        </p:nvSpPr>
-        <p:spPr/>
-        <p:txBody>
-          <a:bodyPr/>
-          <a:lstStyle/>
-          <a:p>
-            <a:r>
-              <a:rPr lang="it-IT" dirty="0" smtClean="0"/>
-              <a:t>Progetto </a:t>
-            </a:r>
-            <a:r>
-              <a:rPr lang="it-IT" dirty="0" err="1" smtClean="0"/>
-              <a:t>Gamification</a:t>
-            </a:r>
-            <a:r>
-              <a:rPr lang="it-IT" dirty="0" smtClean="0"/>
-              <a:t> - Team </a:t>
-            </a:r>
-            <a:r>
-              <a:rPr lang="it-IT" dirty="0" err="1" smtClean="0"/>
-              <a:t>Committed</a:t>
-            </a:r>
-            <a:endParaRPr lang="it-IT" dirty="0"/>
-          </a:p>
-        </p:txBody>
-      </p:sp>
-      <p:sp>
-        <p:nvSpPr>
-          <p:cNvPr id="9" name="Segnaposto numero diapositiva 8"/>
-          <p:cNvSpPr>
-            <a:spLocks noGrp="1"/>
-          </p:cNvSpPr>
-          <p:nvPr>
-            <p:ph type="sldNum" sz="quarter" idx="12"/>
-          </p:nvPr>
-        </p:nvSpPr>
-        <p:spPr/>
-        <p:txBody>
-          <a:bodyPr/>
-          <a:lstStyle/>
-          <a:p>
-            <a:fld id="{017EC607-BD11-4D4E-AC5F-155C854A0B9D}" type="slidenum">
-              <a:rPr lang="it-IT" smtClean="0"/>
-              <a:pPr/>
-              <a:t>9</a:t>
-            </a:fld>
-            <a:r>
-              <a:rPr lang="it-IT" dirty="0" smtClean="0"/>
-              <a:t> di 67</a:t>
-            </a:r>
-            <a:endParaRPr lang="it-IT" dirty="0"/>
-          </a:p>
-        </p:txBody>
-      </p:sp>
-      <p:pic>
-        <p:nvPicPr>
-          <p:cNvPr id="5" name="Immagine 4" descr="frontEndMobile.png"/>
-          <p:cNvPicPr>
-            <a:picLocks noChangeAspect="1"/>
-          </p:cNvPicPr>
-          <p:nvPr/>
-        </p:nvPicPr>
-        <p:blipFill>
-          <a:blip r:embed="rId2" cstate="print"/>
-          <a:stretch>
-            <a:fillRect/>
-          </a:stretch>
-        </p:blipFill>
-        <p:spPr>
-          <a:xfrm>
-            <a:off x="2411760" y="692696"/>
-            <a:ext cx="4328268" cy="5797109"/>
-          </a:xfrm>
-          <a:prstGeom prst="rect">
-            <a:avLst/>
-          </a:prstGeom>
-        </p:spPr>
-      </p:pic>
-    </p:spTree>
-    <p:extLst>
-      <p:ext uri="{BB962C8B-B14F-4D97-AF65-F5344CB8AC3E}">
-        <p14:creationId xmlns:p14="http://schemas.microsoft.com/office/powerpoint/2010/main" val="200703652"/>
       </p:ext>
     </p:extLst>
   </p:cSld>

</xml_diff>

<commit_message>
[Presentazione] Sistemate un paio di cose. Inserito il pdf della presentazione
</commit_message>
<xml_diff>
--- a/RP/Esterni/Presentazione/RP-Presentazione.pptx
+++ b/RP/Esterni/Presentazione/RP-Presentazione.pptx
@@ -5,40 +5,38 @@
     <p:sldMasterId id="2147483732" r:id="rId1"/>
   </p:sldMasterIdLst>
   <p:notesMasterIdLst>
-    <p:notesMasterId r:id="rId28"/>
+    <p:notesMasterId r:id="rId26"/>
   </p:notesMasterIdLst>
   <p:sldIdLst>
     <p:sldId id="256" r:id="rId2"/>
     <p:sldId id="289" r:id="rId3"/>
     <p:sldId id="291" r:id="rId4"/>
     <p:sldId id="292" r:id="rId5"/>
-    <p:sldId id="269" r:id="rId6"/>
-    <p:sldId id="274" r:id="rId7"/>
-    <p:sldId id="294" r:id="rId8"/>
-    <p:sldId id="295" r:id="rId9"/>
-    <p:sldId id="267" r:id="rId10"/>
-    <p:sldId id="258" r:id="rId11"/>
-    <p:sldId id="270" r:id="rId12"/>
-    <p:sldId id="275" r:id="rId13"/>
-    <p:sldId id="283" r:id="rId14"/>
-    <p:sldId id="284" r:id="rId15"/>
-    <p:sldId id="272" r:id="rId16"/>
-    <p:sldId id="276" r:id="rId17"/>
-    <p:sldId id="279" r:id="rId18"/>
+    <p:sldId id="296" r:id="rId6"/>
+    <p:sldId id="294" r:id="rId7"/>
+    <p:sldId id="295" r:id="rId8"/>
+    <p:sldId id="267" r:id="rId9"/>
+    <p:sldId id="258" r:id="rId10"/>
+    <p:sldId id="270" r:id="rId11"/>
+    <p:sldId id="275" r:id="rId12"/>
+    <p:sldId id="269" r:id="rId13"/>
+    <p:sldId id="274" r:id="rId14"/>
+    <p:sldId id="283" r:id="rId15"/>
+    <p:sldId id="284" r:id="rId16"/>
+    <p:sldId id="272" r:id="rId17"/>
+    <p:sldId id="276" r:id="rId18"/>
     <p:sldId id="277" r:id="rId19"/>
-    <p:sldId id="278" r:id="rId20"/>
-    <p:sldId id="280" r:id="rId21"/>
-    <p:sldId id="281" r:id="rId22"/>
-    <p:sldId id="282" r:id="rId23"/>
-    <p:sldId id="285" r:id="rId24"/>
-    <p:sldId id="286" r:id="rId25"/>
-    <p:sldId id="287" r:id="rId26"/>
-    <p:sldId id="288" r:id="rId27"/>
+    <p:sldId id="280" r:id="rId20"/>
+    <p:sldId id="282" r:id="rId21"/>
+    <p:sldId id="285" r:id="rId22"/>
+    <p:sldId id="286" r:id="rId23"/>
+    <p:sldId id="287" r:id="rId24"/>
+    <p:sldId id="288" r:id="rId25"/>
   </p:sldIdLst>
   <p:sldSz cx="9144000" cy="6858000" type="screen4x3"/>
   <p:notesSz cx="6858000" cy="9144000"/>
   <p:custDataLst>
-    <p:tags r:id="rId29"/>
+    <p:tags r:id="rId27"/>
   </p:custDataLst>
   <p:defaultTextStyle>
     <a:defPPr>
@@ -148,12 +146,7 @@
           <p14:sldIdLst>
             <p14:sldId id="291"/>
             <p14:sldId id="292"/>
-          </p14:sldIdLst>
-        </p14:section>
-        <p14:section name="Back-end" id="{B1AC9BCB-654F-44A6-9A36-56CD55C0B211}">
-          <p14:sldIdLst>
-            <p14:sldId id="269"/>
-            <p14:sldId id="274"/>
+            <p14:sldId id="296"/>
           </p14:sldIdLst>
         </p14:section>
         <p14:section name="Front-end Desktop" id="{0361C737-8258-45B7-B1BE-870846A54225}">
@@ -174,6 +167,12 @@
             <p14:sldId id="275"/>
           </p14:sldIdLst>
         </p14:section>
+        <p14:section name="Back-end" id="{B1AC9BCB-654F-44A6-9A36-56CD55C0B211}">
+          <p14:sldIdLst>
+            <p14:sldId id="269"/>
+            <p14:sldId id="274"/>
+          </p14:sldIdLst>
+        </p14:section>
         <p14:section name="Diagrammi delle Attività" id="{CBE3E966-F4A3-44C2-AFCF-28AFB5D6F6F9}">
           <p14:sldIdLst>
             <p14:sldId id="283"/>
@@ -184,11 +183,8 @@
           <p14:sldIdLst>
             <p14:sldId id="272"/>
             <p14:sldId id="276"/>
-            <p14:sldId id="279"/>
             <p14:sldId id="277"/>
-            <p14:sldId id="278"/>
             <p14:sldId id="280"/>
-            <p14:sldId id="281"/>
             <p14:sldId id="282"/>
           </p14:sldIdLst>
         </p14:section>
@@ -379,12 +375,12 @@
         </c:dLbls>
         <c:gapWidth val="150"/>
         <c:shape val="box"/>
-        <c:axId val="65418368"/>
-        <c:axId val="65419904"/>
+        <c:axId val="103741312"/>
+        <c:axId val="103742848"/>
         <c:axId val="0"/>
       </c:bar3DChart>
       <c:catAx>
-        <c:axId val="65418368"/>
+        <c:axId val="103741312"/>
         <c:scaling>
           <c:orientation val="minMax"/>
         </c:scaling>
@@ -393,7 +389,7 @@
         <c:majorTickMark val="out"/>
         <c:minorTickMark val="none"/>
         <c:tickLblPos val="nextTo"/>
-        <c:crossAx val="65419904"/>
+        <c:crossAx val="103742848"/>
         <c:crosses val="autoZero"/>
         <c:auto val="1"/>
         <c:lblAlgn val="ctr"/>
@@ -401,7 +397,7 @@
         <c:noMultiLvlLbl val="0"/>
       </c:catAx>
       <c:valAx>
-        <c:axId val="65419904"/>
+        <c:axId val="103742848"/>
         <c:scaling>
           <c:orientation val="minMax"/>
         </c:scaling>
@@ -412,7 +408,7 @@
         <c:majorTickMark val="out"/>
         <c:minorTickMark val="none"/>
         <c:tickLblPos val="nextTo"/>
-        <c:crossAx val="65418368"/>
+        <c:crossAx val="103741312"/>
         <c:crosses val="autoZero"/>
         <c:crossBetween val="between"/>
       </c:valAx>
@@ -504,6 +500,21 @@
           </c:spPr>
           <c:invertIfNegative val="0"/>
           <c:dLbls>
+            <c:dLbl>
+              <c:idx val="0"/>
+              <c:layout>
+                <c:manualLayout>
+                  <c:x val="4.1615226273235557E-2"/>
+                  <c:y val="-9.1225496017683858E-3"/>
+                </c:manualLayout>
+              </c:layout>
+              <c:showLegendKey val="0"/>
+              <c:showVal val="1"/>
+              <c:showCatName val="0"/>
+              <c:showSerName val="0"/>
+              <c:showPercent val="0"/>
+              <c:showBubbleSize val="0"/>
+            </c:dLbl>
             <c:txPr>
               <a:bodyPr/>
               <a:lstStyle/>
@@ -551,6 +562,21 @@
           </c:tx>
           <c:invertIfNegative val="0"/>
           <c:dLbls>
+            <c:dLbl>
+              <c:idx val="0"/>
+              <c:layout>
+                <c:manualLayout>
+                  <c:x val="4.1615226273235557E-2"/>
+                  <c:y val="6.0816997345122569E-3"/>
+                </c:manualLayout>
+              </c:layout>
+              <c:showLegendKey val="0"/>
+              <c:showVal val="1"/>
+              <c:showCatName val="0"/>
+              <c:showSerName val="0"/>
+              <c:showPercent val="0"/>
+              <c:showBubbleSize val="0"/>
+            </c:dLbl>
             <c:txPr>
               <a:bodyPr/>
               <a:lstStyle/>
@@ -600,12 +626,12 @@
         </c:dLbls>
         <c:gapWidth val="150"/>
         <c:shape val="box"/>
-        <c:axId val="65472000"/>
-        <c:axId val="65473536"/>
+        <c:axId val="121440512"/>
+        <c:axId val="121446400"/>
         <c:axId val="0"/>
       </c:bar3DChart>
       <c:catAx>
-        <c:axId val="65472000"/>
+        <c:axId val="121440512"/>
         <c:scaling>
           <c:orientation val="minMax"/>
         </c:scaling>
@@ -614,7 +640,7 @@
         <c:majorTickMark val="out"/>
         <c:minorTickMark val="none"/>
         <c:tickLblPos val="nextTo"/>
-        <c:crossAx val="65473536"/>
+        <c:crossAx val="121446400"/>
         <c:crosses val="autoZero"/>
         <c:auto val="1"/>
         <c:lblAlgn val="ctr"/>
@@ -622,7 +648,7 @@
         <c:noMultiLvlLbl val="0"/>
       </c:catAx>
       <c:valAx>
-        <c:axId val="65473536"/>
+        <c:axId val="121446400"/>
         <c:scaling>
           <c:orientation val="minMax"/>
         </c:scaling>
@@ -633,7 +659,7 @@
         <c:majorTickMark val="out"/>
         <c:minorTickMark val="none"/>
         <c:tickLblPos val="nextTo"/>
-        <c:crossAx val="65472000"/>
+        <c:crossAx val="121440512"/>
         <c:crosses val="autoZero"/>
         <c:crossBetween val="between"/>
       </c:valAx>
@@ -14939,6 +14965,164 @@
           <a:chExt cx="0" cy="0"/>
         </a:xfrm>
       </p:grpSpPr>
+      <p:pic>
+        <p:nvPicPr>
+          <p:cNvPr id="3" name="Immagine 2"/>
+          <p:cNvPicPr>
+            <a:picLocks noChangeAspect="1"/>
+          </p:cNvPicPr>
+          <p:nvPr/>
+        </p:nvPicPr>
+        <p:blipFill>
+          <a:blip r:embed="rId2" cstate="print">
+            <a:extLst>
+              <a:ext uri="{28A0092B-C50C-407E-A947-70E740481C1C}">
+                <a14:useLocalDpi xmlns:a14="http://schemas.microsoft.com/office/drawing/2010/main" val="0"/>
+              </a:ext>
+            </a:extLst>
+          </a:blip>
+          <a:stretch>
+            <a:fillRect/>
+          </a:stretch>
+        </p:blipFill>
+        <p:spPr>
+          <a:xfrm>
+            <a:off x="2750630" y="1268760"/>
+            <a:ext cx="3765586" cy="4581128"/>
+          </a:xfrm>
+          <a:prstGeom prst="rect">
+            <a:avLst/>
+          </a:prstGeom>
+        </p:spPr>
+      </p:pic>
+      <p:sp>
+        <p:nvSpPr>
+          <p:cNvPr id="2" name="Titolo 1"/>
+          <p:cNvSpPr>
+            <a:spLocks noGrp="1"/>
+          </p:cNvSpPr>
+          <p:nvPr>
+            <p:ph type="title"/>
+          </p:nvPr>
+        </p:nvSpPr>
+        <p:spPr>
+          <a:xfrm>
+            <a:off x="1043608" y="2996952"/>
+            <a:ext cx="7024744" cy="1143000"/>
+          </a:xfrm>
+        </p:spPr>
+        <p:txBody>
+          <a:bodyPr/>
+          <a:lstStyle/>
+          <a:p>
+            <a:pPr algn="ctr"/>
+            <a:r>
+              <a:rPr lang="it-IT" dirty="0"/>
+              <a:t>4</a:t>
+            </a:r>
+            <a:r>
+              <a:rPr lang="it-IT" dirty="0" smtClean="0"/>
+              <a:t>. </a:t>
+            </a:r>
+            <a:r>
+              <a:rPr lang="it-IT" dirty="0" err="1" smtClean="0"/>
+              <a:t>Front-End</a:t>
+            </a:r>
+            <a:r>
+              <a:rPr lang="it-IT" dirty="0" smtClean="0"/>
+              <a:t> Mobile</a:t>
+            </a:r>
+            <a:endParaRPr lang="it-IT" dirty="0"/>
+          </a:p>
+        </p:txBody>
+      </p:sp>
+      <p:sp>
+        <p:nvSpPr>
+          <p:cNvPr id="4" name="Segnaposto data 3"/>
+          <p:cNvSpPr>
+            <a:spLocks noGrp="1"/>
+          </p:cNvSpPr>
+          <p:nvPr>
+            <p:ph type="dt" sz="half" idx="10"/>
+          </p:nvPr>
+        </p:nvSpPr>
+        <p:spPr/>
+        <p:txBody>
+          <a:bodyPr/>
+          <a:lstStyle/>
+          <a:p>
+            <a:r>
+              <a:rPr lang="it-IT" smtClean="0"/>
+              <a:t>Progetto Gamification - Team Committed</a:t>
+            </a:r>
+            <a:endParaRPr lang="it-IT"/>
+          </a:p>
+        </p:txBody>
+      </p:sp>
+      <p:sp>
+        <p:nvSpPr>
+          <p:cNvPr id="7" name="Segnaposto numero diapositiva 6"/>
+          <p:cNvSpPr>
+            <a:spLocks noGrp="1"/>
+          </p:cNvSpPr>
+          <p:nvPr>
+            <p:ph type="sldNum" sz="quarter" idx="12"/>
+          </p:nvPr>
+        </p:nvSpPr>
+        <p:spPr/>
+        <p:txBody>
+          <a:bodyPr/>
+          <a:lstStyle/>
+          <a:p>
+            <a:fld id="{017EC607-BD11-4D4E-AC5F-155C854A0B9D}" type="slidenum">
+              <a:rPr lang="it-IT" smtClean="0"/>
+              <a:pPr/>
+              <a:t>10</a:t>
+            </a:fld>
+            <a:r>
+              <a:rPr lang="it-IT" dirty="0" smtClean="0"/>
+              <a:t> di 24</a:t>
+            </a:r>
+          </a:p>
+        </p:txBody>
+      </p:sp>
+    </p:spTree>
+    <p:extLst>
+      <p:ext uri="{BB962C8B-B14F-4D97-AF65-F5344CB8AC3E}">
+        <p14:creationId xmlns:p14="http://schemas.microsoft.com/office/powerpoint/2010/main" val="2537002"/>
+      </p:ext>
+    </p:extLst>
+  </p:cSld>
+  <p:clrMapOvr>
+    <a:masterClrMapping/>
+  </p:clrMapOvr>
+  <p:timing>
+    <p:tnLst>
+      <p:par>
+        <p:cTn id="1" dur="indefinite" restart="never" nodeType="tmRoot"/>
+      </p:par>
+    </p:tnLst>
+  </p:timing>
+</p:sld>
+</file>
+
+<file path=ppt/slides/slide11.xml><?xml version="1.0" encoding="utf-8"?>
+<p:sld xmlns:a="http://schemas.openxmlformats.org/drawingml/2006/main" xmlns:r="http://schemas.openxmlformats.org/officeDocument/2006/relationships" xmlns:p="http://schemas.openxmlformats.org/presentationml/2006/main">
+  <p:cSld>
+    <p:spTree>
+      <p:nvGrpSpPr>
+        <p:cNvPr id="1" name=""/>
+        <p:cNvGrpSpPr/>
+        <p:nvPr/>
+      </p:nvGrpSpPr>
+      <p:grpSpPr>
+        <a:xfrm>
+          <a:off x="0" y="0"/>
+          <a:ext cx="0" cy="0"/>
+          <a:chOff x="0" y="0"/>
+          <a:chExt cx="0" cy="0"/>
+        </a:xfrm>
+      </p:grpSpPr>
       <p:sp>
         <p:nvSpPr>
           <p:cNvPr id="6" name="Segnaposto data 5"/>
@@ -14992,7 +15176,7 @@
             <a:fld id="{017EC607-BD11-4D4E-AC5F-155C854A0B9D}" type="slidenum">
               <a:rPr lang="it-IT" smtClean="0"/>
               <a:pPr/>
-              <a:t>10</a:t>
+              <a:t>11</a:t>
             </a:fld>
             <a:r>
               <a:rPr lang="it-IT" dirty="0" smtClean="0"/>
@@ -15004,7 +15188,7 @@
       </p:sp>
       <p:pic>
         <p:nvPicPr>
-          <p:cNvPr id="11" name="Immagine 10" descr="frontEndWeb.png"/>
+          <p:cNvPr id="5" name="Immagine 4" descr="frontEndMobile.png"/>
           <p:cNvPicPr>
             <a:picLocks noChangeAspect="1"/>
           </p:cNvPicPr>
@@ -15018,8 +15202,8 @@
         </p:blipFill>
         <p:spPr>
           <a:xfrm>
-            <a:off x="2051720" y="692696"/>
-            <a:ext cx="5020413" cy="5760640"/>
+            <a:off x="2411760" y="692696"/>
+            <a:ext cx="4328268" cy="5797109"/>
           </a:xfrm>
           <a:prstGeom prst="rect">
             <a:avLst/>
@@ -15046,7 +15230,7 @@
 </p:sld>
 </file>
 
-<file path=ppt/slides/slide11.xml><?xml version="1.0" encoding="utf-8"?>
+<file path=ppt/slides/slide12.xml><?xml version="1.0" encoding="utf-8"?>
 <p:sld xmlns:a="http://schemas.openxmlformats.org/drawingml/2006/main" xmlns:r="http://schemas.openxmlformats.org/officeDocument/2006/relationships" xmlns:p="http://schemas.openxmlformats.org/presentationml/2006/main">
   <p:cSld>
     <p:spTree>
@@ -15115,16 +15299,16 @@
           <a:p>
             <a:pPr algn="ctr"/>
             <a:r>
+              <a:rPr lang="it-IT" dirty="0"/>
+              <a:t>5</a:t>
+            </a:r>
+            <a:r>
               <a:rPr lang="it-IT" dirty="0" smtClean="0"/>
-              <a:t>5. </a:t>
+              <a:t>. </a:t>
             </a:r>
             <a:r>
               <a:rPr lang="it-IT" dirty="0" err="1" smtClean="0"/>
-              <a:t>Front-End</a:t>
-            </a:r>
-            <a:r>
-              <a:rPr lang="it-IT" dirty="0" smtClean="0"/>
-              <a:t> Mobile</a:t>
+              <a:t>Back-End</a:t>
             </a:r>
             <a:endParaRPr lang="it-IT" dirty="0"/>
           </a:p>
@@ -15171,7 +15355,7 @@
             <a:fld id="{017EC607-BD11-4D4E-AC5F-155C854A0B9D}" type="slidenum">
               <a:rPr lang="it-IT" smtClean="0"/>
               <a:pPr/>
-              <a:t>11</a:t>
+              <a:t>12</a:t>
             </a:fld>
             <a:r>
               <a:rPr lang="it-IT" dirty="0" smtClean="0"/>
@@ -15200,7 +15384,7 @@
 </p:sld>
 </file>
 
-<file path=ppt/slides/slide12.xml><?xml version="1.0" encoding="utf-8"?>
+<file path=ppt/slides/slide13.xml><?xml version="1.0" encoding="utf-8"?>
 <p:sld xmlns:a="http://schemas.openxmlformats.org/drawingml/2006/main" xmlns:r="http://schemas.openxmlformats.org/officeDocument/2006/relationships" xmlns:p="http://schemas.openxmlformats.org/presentationml/2006/main">
   <p:cSld>
     <p:spTree>
@@ -15270,7 +15454,7 @@
             <a:fld id="{017EC607-BD11-4D4E-AC5F-155C854A0B9D}" type="slidenum">
               <a:rPr lang="it-IT" smtClean="0"/>
               <a:pPr/>
-              <a:t>12</a:t>
+              <a:t>13</a:t>
             </a:fld>
             <a:r>
               <a:rPr lang="it-IT" dirty="0" smtClean="0"/>
@@ -15282,7 +15466,7 @@
       </p:sp>
       <p:pic>
         <p:nvPicPr>
-          <p:cNvPr id="5" name="Immagine 4" descr="frontEndMobile.png"/>
+          <p:cNvPr id="5" name="Immagine 4" descr="BackEnd.png"/>
           <p:cNvPicPr>
             <a:picLocks noChangeAspect="1"/>
           </p:cNvPicPr>
@@ -15296,8 +15480,8 @@
         </p:blipFill>
         <p:spPr>
           <a:xfrm>
-            <a:off x="2411760" y="692696"/>
-            <a:ext cx="4328268" cy="5797109"/>
+            <a:off x="2339752" y="692696"/>
+            <a:ext cx="4418852" cy="5776071"/>
           </a:xfrm>
           <a:prstGeom prst="rect">
             <a:avLst/>
@@ -15324,7 +15508,7 @@
 </p:sld>
 </file>
 
-<file path=ppt/slides/slide13.xml><?xml version="1.0" encoding="utf-8"?>
+<file path=ppt/slides/slide14.xml><?xml version="1.0" encoding="utf-8"?>
 <p:sld xmlns:a="http://schemas.openxmlformats.org/drawingml/2006/main" xmlns:r="http://schemas.openxmlformats.org/officeDocument/2006/relationships" xmlns:p="http://schemas.openxmlformats.org/presentationml/2006/main">
   <p:cSld>
     <p:spTree>
@@ -15441,7 +15625,7 @@
             <a:fld id="{017EC607-BD11-4D4E-AC5F-155C854A0B9D}" type="slidenum">
               <a:rPr lang="it-IT" smtClean="0"/>
               <a:pPr/>
-              <a:t>13</a:t>
+              <a:t>14</a:t>
             </a:fld>
             <a:r>
               <a:rPr lang="it-IT" dirty="0" smtClean="0"/>
@@ -15470,7 +15654,7 @@
 </p:sld>
 </file>
 
-<file path=ppt/slides/slide14.xml><?xml version="1.0" encoding="utf-8"?>
+<file path=ppt/slides/slide15.xml><?xml version="1.0" encoding="utf-8"?>
 <p:sld xmlns:a="http://schemas.openxmlformats.org/drawingml/2006/main" xmlns:r="http://schemas.openxmlformats.org/officeDocument/2006/relationships" xmlns:p="http://schemas.openxmlformats.org/presentationml/2006/main">
   <p:cSld>
     <p:spTree>
@@ -15540,7 +15724,7 @@
             <a:fld id="{017EC607-BD11-4D4E-AC5F-155C854A0B9D}" type="slidenum">
               <a:rPr lang="it-IT" smtClean="0"/>
               <a:pPr/>
-              <a:t>14</a:t>
+              <a:t>15</a:t>
             </a:fld>
             <a:r>
               <a:rPr lang="it-IT" dirty="0" smtClean="0"/>
@@ -15594,7 +15778,7 @@
 </p:sld>
 </file>
 
-<file path=ppt/slides/slide15.xml><?xml version="1.0" encoding="utf-8"?>
+<file path=ppt/slides/slide16.xml><?xml version="1.0" encoding="utf-8"?>
 <p:sld xmlns:a="http://schemas.openxmlformats.org/drawingml/2006/main" xmlns:r="http://schemas.openxmlformats.org/officeDocument/2006/relationships" xmlns:p="http://schemas.openxmlformats.org/presentationml/2006/main">
   <p:cSld>
     <p:spTree>
@@ -15711,7 +15895,7 @@
             <a:fld id="{017EC607-BD11-4D4E-AC5F-155C854A0B9D}" type="slidenum">
               <a:rPr lang="it-IT" smtClean="0"/>
               <a:pPr/>
-              <a:t>15</a:t>
+              <a:t>16</a:t>
             </a:fld>
             <a:r>
               <a:rPr lang="it-IT" dirty="0" smtClean="0"/>
@@ -15724,130 +15908,6 @@
     <p:extLst>
       <p:ext uri="{BB962C8B-B14F-4D97-AF65-F5344CB8AC3E}">
         <p14:creationId xmlns:p14="http://schemas.microsoft.com/office/powerpoint/2010/main" val="2537002"/>
-      </p:ext>
-    </p:extLst>
-  </p:cSld>
-  <p:clrMapOvr>
-    <a:masterClrMapping/>
-  </p:clrMapOvr>
-  <p:timing>
-    <p:tnLst>
-      <p:par>
-        <p:cTn id="1" dur="indefinite" restart="never" nodeType="tmRoot"/>
-      </p:par>
-    </p:tnLst>
-  </p:timing>
-</p:sld>
-</file>
-
-<file path=ppt/slides/slide16.xml><?xml version="1.0" encoding="utf-8"?>
-<p:sld xmlns:a="http://schemas.openxmlformats.org/drawingml/2006/main" xmlns:r="http://schemas.openxmlformats.org/officeDocument/2006/relationships" xmlns:p="http://schemas.openxmlformats.org/presentationml/2006/main">
-  <p:cSld>
-    <p:spTree>
-      <p:nvGrpSpPr>
-        <p:cNvPr id="1" name=""/>
-        <p:cNvGrpSpPr/>
-        <p:nvPr/>
-      </p:nvGrpSpPr>
-      <p:grpSpPr>
-        <a:xfrm>
-          <a:off x="0" y="0"/>
-          <a:ext cx="0" cy="0"/>
-          <a:chOff x="0" y="0"/>
-          <a:chExt cx="0" cy="0"/>
-        </a:xfrm>
-      </p:grpSpPr>
-      <p:sp>
-        <p:nvSpPr>
-          <p:cNvPr id="6" name="Segnaposto data 5"/>
-          <p:cNvSpPr>
-            <a:spLocks noGrp="1"/>
-          </p:cNvSpPr>
-          <p:nvPr>
-            <p:ph type="dt" sz="half" idx="10"/>
-          </p:nvPr>
-        </p:nvSpPr>
-        <p:spPr/>
-        <p:txBody>
-          <a:bodyPr/>
-          <a:lstStyle/>
-          <a:p>
-            <a:r>
-              <a:rPr lang="it-IT" dirty="0" smtClean="0"/>
-              <a:t>Progetto </a:t>
-            </a:r>
-            <a:r>
-              <a:rPr lang="it-IT" dirty="0" err="1" smtClean="0"/>
-              <a:t>Gamification</a:t>
-            </a:r>
-            <a:r>
-              <a:rPr lang="it-IT" dirty="0" smtClean="0"/>
-              <a:t> - Team </a:t>
-            </a:r>
-            <a:r>
-              <a:rPr lang="it-IT" dirty="0" err="1" smtClean="0"/>
-              <a:t>Committed</a:t>
-            </a:r>
-            <a:endParaRPr lang="it-IT" dirty="0"/>
-          </a:p>
-        </p:txBody>
-      </p:sp>
-      <p:sp>
-        <p:nvSpPr>
-          <p:cNvPr id="9" name="Segnaposto numero diapositiva 8"/>
-          <p:cNvSpPr>
-            <a:spLocks noGrp="1"/>
-          </p:cNvSpPr>
-          <p:nvPr>
-            <p:ph type="sldNum" sz="quarter" idx="12"/>
-          </p:nvPr>
-        </p:nvSpPr>
-        <p:spPr/>
-        <p:txBody>
-          <a:bodyPr/>
-          <a:lstStyle/>
-          <a:p>
-            <a:fld id="{017EC607-BD11-4D4E-AC5F-155C854A0B9D}" type="slidenum">
-              <a:rPr lang="it-IT" smtClean="0"/>
-              <a:pPr/>
-              <a:t>16</a:t>
-            </a:fld>
-            <a:r>
-              <a:rPr lang="it-IT" dirty="0" smtClean="0"/>
-              <a:t> di 24</a:t>
-            </a:r>
-            <a:endParaRPr lang="it-IT" dirty="0"/>
-          </a:p>
-        </p:txBody>
-      </p:sp>
-      <p:pic>
-        <p:nvPicPr>
-          <p:cNvPr id="7" name="Immagine 6" descr="Gui-Desk-Login.jpg"/>
-          <p:cNvPicPr>
-            <a:picLocks noChangeAspect="1"/>
-          </p:cNvPicPr>
-          <p:nvPr/>
-        </p:nvPicPr>
-        <p:blipFill>
-          <a:blip r:embed="rId2" cstate="print"/>
-          <a:stretch>
-            <a:fillRect/>
-          </a:stretch>
-        </p:blipFill>
-        <p:spPr>
-          <a:xfrm>
-            <a:off x="2123728" y="1916832"/>
-            <a:ext cx="5040560" cy="3173328"/>
-          </a:xfrm>
-          <a:prstGeom prst="rect">
-            <a:avLst/>
-          </a:prstGeom>
-        </p:spPr>
-      </p:pic>
-    </p:spTree>
-    <p:extLst>
-      <p:ext uri="{BB962C8B-B14F-4D97-AF65-F5344CB8AC3E}">
-        <p14:creationId xmlns:p14="http://schemas.microsoft.com/office/powerpoint/2010/main" val="200703652"/>
       </p:ext>
     </p:extLst>
   </p:cSld>
@@ -15881,6 +15941,36 @@
           <a:chExt cx="0" cy="0"/>
         </a:xfrm>
       </p:grpSpPr>
+      <p:pic>
+        <p:nvPicPr>
+          <p:cNvPr id="8" name="Immagine 7"/>
+          <p:cNvPicPr>
+            <a:picLocks noChangeAspect="1"/>
+          </p:cNvPicPr>
+          <p:nvPr/>
+        </p:nvPicPr>
+        <p:blipFill>
+          <a:blip r:embed="rId2" cstate="print">
+            <a:extLst>
+              <a:ext uri="{28A0092B-C50C-407E-A947-70E740481C1C}">
+                <a14:useLocalDpi xmlns:a14="http://schemas.microsoft.com/office/drawing/2010/main" val="0"/>
+              </a:ext>
+            </a:extLst>
+          </a:blip>
+          <a:stretch>
+            <a:fillRect/>
+          </a:stretch>
+        </p:blipFill>
+        <p:spPr>
+          <a:xfrm>
+            <a:off x="2750630" y="1268760"/>
+            <a:ext cx="3765586" cy="4581128"/>
+          </a:xfrm>
+          <a:prstGeom prst="rect">
+            <a:avLst/>
+          </a:prstGeom>
+        </p:spPr>
+      </p:pic>
       <p:sp>
         <p:nvSpPr>
           <p:cNvPr id="6" name="Segnaposto data 5"/>
@@ -15953,15 +16043,39 @@
           <p:nvPr/>
         </p:nvPicPr>
         <p:blipFill>
-          <a:blip r:embed="rId2" cstate="print"/>
+          <a:blip r:embed="rId3" cstate="print"/>
           <a:stretch>
             <a:fillRect/>
           </a:stretch>
         </p:blipFill>
         <p:spPr>
           <a:xfrm>
-            <a:off x="2123728" y="1916832"/>
-            <a:ext cx="5040560" cy="3173327"/>
+            <a:off x="611560" y="2204864"/>
+            <a:ext cx="3774492" cy="2376264"/>
+          </a:xfrm>
+          <a:prstGeom prst="rect">
+            <a:avLst/>
+          </a:prstGeom>
+        </p:spPr>
+      </p:pic>
+      <p:pic>
+        <p:nvPicPr>
+          <p:cNvPr id="5" name="Immagine 4" descr="Gui-Desk-Login.jpg"/>
+          <p:cNvPicPr>
+            <a:picLocks noChangeAspect="1"/>
+          </p:cNvPicPr>
+          <p:nvPr/>
+        </p:nvPicPr>
+        <p:blipFill>
+          <a:blip r:embed="rId4" cstate="print"/>
+          <a:stretch>
+            <a:fillRect/>
+          </a:stretch>
+        </p:blipFill>
+        <p:spPr>
+          <a:xfrm>
+            <a:off x="4757947" y="2204864"/>
+            <a:ext cx="3774493" cy="2376264"/>
           </a:xfrm>
           <a:prstGeom prst="rect">
             <a:avLst/>
@@ -16005,6 +16119,36 @@
           <a:chExt cx="0" cy="0"/>
         </a:xfrm>
       </p:grpSpPr>
+      <p:pic>
+        <p:nvPicPr>
+          <p:cNvPr id="14" name="Immagine 13"/>
+          <p:cNvPicPr>
+            <a:picLocks noChangeAspect="1"/>
+          </p:cNvPicPr>
+          <p:nvPr/>
+        </p:nvPicPr>
+        <p:blipFill>
+          <a:blip r:embed="rId2" cstate="print">
+            <a:extLst>
+              <a:ext uri="{28A0092B-C50C-407E-A947-70E740481C1C}">
+                <a14:useLocalDpi xmlns:a14="http://schemas.microsoft.com/office/drawing/2010/main" val="0"/>
+              </a:ext>
+            </a:extLst>
+          </a:blip>
+          <a:stretch>
+            <a:fillRect/>
+          </a:stretch>
+        </p:blipFill>
+        <p:spPr>
+          <a:xfrm>
+            <a:off x="2750630" y="1268760"/>
+            <a:ext cx="3765586" cy="4581128"/>
+          </a:xfrm>
+          <a:prstGeom prst="rect">
+            <a:avLst/>
+          </a:prstGeom>
+        </p:spPr>
+      </p:pic>
       <p:sp>
         <p:nvSpPr>
           <p:cNvPr id="6" name="Segnaposto data 5"/>
@@ -16070,30 +16214,6 @@
       </p:sp>
       <p:pic>
         <p:nvPicPr>
-          <p:cNvPr id="7" name="Immagine 6" descr="Gui-Mob-Login.jpg"/>
-          <p:cNvPicPr>
-            <a:picLocks noChangeAspect="1"/>
-          </p:cNvPicPr>
-          <p:nvPr/>
-        </p:nvPicPr>
-        <p:blipFill>
-          <a:blip r:embed="rId2" cstate="print"/>
-          <a:stretch>
-            <a:fillRect/>
-          </a:stretch>
-        </p:blipFill>
-        <p:spPr>
-          <a:xfrm>
-            <a:off x="5004048" y="980728"/>
-            <a:ext cx="3384375" cy="5060746"/>
-          </a:xfrm>
-          <a:prstGeom prst="rect">
-            <a:avLst/>
-          </a:prstGeom>
-        </p:spPr>
-      </p:pic>
-      <p:pic>
-        <p:nvPicPr>
           <p:cNvPr id="8" name="Immagine 7" descr="Gui-Mob-Notifica.jpg"/>
           <p:cNvPicPr>
             <a:picLocks noChangeAspect="1"/>
@@ -16108,8 +16228,80 @@
         </p:blipFill>
         <p:spPr>
           <a:xfrm>
-            <a:off x="755576" y="908720"/>
-            <a:ext cx="3415928" cy="5123892"/>
+            <a:off x="1773072" y="676123"/>
+            <a:ext cx="1920213" cy="2880320"/>
+          </a:xfrm>
+          <a:prstGeom prst="rect">
+            <a:avLst/>
+          </a:prstGeom>
+        </p:spPr>
+      </p:pic>
+      <p:pic>
+        <p:nvPicPr>
+          <p:cNvPr id="11" name="Immagine 10" descr="Gui-Mob-Risposta.jpg"/>
+          <p:cNvPicPr>
+            <a:picLocks noChangeAspect="1"/>
+          </p:cNvPicPr>
+          <p:nvPr/>
+        </p:nvPicPr>
+        <p:blipFill>
+          <a:blip r:embed="rId4" cstate="print"/>
+          <a:stretch>
+            <a:fillRect/>
+          </a:stretch>
+        </p:blipFill>
+        <p:spPr>
+          <a:xfrm>
+            <a:off x="5443266" y="3595546"/>
+            <a:ext cx="1911147" cy="2857790"/>
+          </a:xfrm>
+          <a:prstGeom prst="rect">
+            <a:avLst/>
+          </a:prstGeom>
+        </p:spPr>
+      </p:pic>
+      <p:pic>
+        <p:nvPicPr>
+          <p:cNvPr id="13" name="Immagine 12" descr="Gui-Mob-Datiutente.jpg"/>
+          <p:cNvPicPr>
+            <a:picLocks noChangeAspect="1"/>
+          </p:cNvPicPr>
+          <p:nvPr/>
+        </p:nvPicPr>
+        <p:blipFill>
+          <a:blip r:embed="rId5" cstate="print"/>
+          <a:stretch>
+            <a:fillRect/>
+          </a:stretch>
+        </p:blipFill>
+        <p:spPr>
+          <a:xfrm>
+            <a:off x="1773072" y="3569398"/>
+            <a:ext cx="1928634" cy="2883938"/>
+          </a:xfrm>
+          <a:prstGeom prst="rect">
+            <a:avLst/>
+          </a:prstGeom>
+        </p:spPr>
+      </p:pic>
+      <p:pic>
+        <p:nvPicPr>
+          <p:cNvPr id="10" name="Immagine 9" descr="Gui-Mob-Statistiche.jpg"/>
+          <p:cNvPicPr>
+            <a:picLocks noChangeAspect="1"/>
+          </p:cNvPicPr>
+          <p:nvPr/>
+        </p:nvPicPr>
+        <p:blipFill>
+          <a:blip r:embed="rId6" cstate="print"/>
+          <a:stretch>
+            <a:fillRect/>
+          </a:stretch>
+        </p:blipFill>
+        <p:spPr>
+          <a:xfrm>
+            <a:off x="5443265" y="750711"/>
+            <a:ext cx="1911147" cy="2857789"/>
           </a:xfrm>
           <a:prstGeom prst="rect">
             <a:avLst/>
@@ -16153,6 +16345,36 @@
           <a:chExt cx="0" cy="0"/>
         </a:xfrm>
       </p:grpSpPr>
+      <p:pic>
+        <p:nvPicPr>
+          <p:cNvPr id="7" name="Immagine 6"/>
+          <p:cNvPicPr>
+            <a:picLocks noChangeAspect="1"/>
+          </p:cNvPicPr>
+          <p:nvPr/>
+        </p:nvPicPr>
+        <p:blipFill>
+          <a:blip r:embed="rId2" cstate="print">
+            <a:extLst>
+              <a:ext uri="{28A0092B-C50C-407E-A947-70E740481C1C}">
+                <a14:useLocalDpi xmlns:a14="http://schemas.microsoft.com/office/drawing/2010/main" val="0"/>
+              </a:ext>
+            </a:extLst>
+          </a:blip>
+          <a:stretch>
+            <a:fillRect/>
+          </a:stretch>
+        </p:blipFill>
+        <p:spPr>
+          <a:xfrm>
+            <a:off x="2750630" y="1268760"/>
+            <a:ext cx="3765586" cy="4581128"/>
+          </a:xfrm>
+          <a:prstGeom prst="rect">
+            <a:avLst/>
+          </a:prstGeom>
+        </p:spPr>
+      </p:pic>
       <p:sp>
         <p:nvSpPr>
           <p:cNvPr id="6" name="Segnaposto data 5"/>
@@ -16218,70 +16440,28 @@
       </p:sp>
       <p:pic>
         <p:nvPicPr>
-          <p:cNvPr id="7" name="Immagine 6" descr="Gui-Mob-Datiutente.jpg"/>
+          <p:cNvPr id="2" name="Immagine 1"/>
           <p:cNvPicPr>
             <a:picLocks noChangeAspect="1"/>
           </p:cNvPicPr>
           <p:nvPr/>
         </p:nvPicPr>
         <p:blipFill>
-          <a:blip r:embed="rId2" cstate="print"/>
+          <a:blip r:embed="rId3">
+            <a:extLst>
+              <a:ext uri="{28A0092B-C50C-407E-A947-70E740481C1C}">
+                <a14:useLocalDpi xmlns:a14="http://schemas.microsoft.com/office/drawing/2010/main" val="0"/>
+              </a:ext>
+            </a:extLst>
+          </a:blip>
           <a:stretch>
             <a:fillRect/>
           </a:stretch>
         </p:blipFill>
         <p:spPr>
           <a:xfrm>
-            <a:off x="611560" y="1556792"/>
-            <a:ext cx="2487573" cy="3719736"/>
-          </a:xfrm>
-          <a:prstGeom prst="rect">
-            <a:avLst/>
-          </a:prstGeom>
-        </p:spPr>
-      </p:pic>
-      <p:pic>
-        <p:nvPicPr>
-          <p:cNvPr id="8" name="Immagine 7" descr="Gui-Mob-Risposta.jpg"/>
-          <p:cNvPicPr>
-            <a:picLocks noChangeAspect="1"/>
-          </p:cNvPicPr>
-          <p:nvPr/>
-        </p:nvPicPr>
-        <p:blipFill>
-          <a:blip r:embed="rId3" cstate="print"/>
-          <a:stretch>
-            <a:fillRect/>
-          </a:stretch>
-        </p:blipFill>
-        <p:spPr>
-          <a:xfrm>
-            <a:off x="6084168" y="1556792"/>
-            <a:ext cx="2487573" cy="3719736"/>
-          </a:xfrm>
-          <a:prstGeom prst="rect">
-            <a:avLst/>
-          </a:prstGeom>
-        </p:spPr>
-      </p:pic>
-      <p:pic>
-        <p:nvPicPr>
-          <p:cNvPr id="10" name="Immagine 9" descr="Gui-Mob-Statistiche.jpg"/>
-          <p:cNvPicPr>
-            <a:picLocks noChangeAspect="1"/>
-          </p:cNvPicPr>
-          <p:nvPr/>
-        </p:nvPicPr>
-        <p:blipFill>
-          <a:blip r:embed="rId4" cstate="print"/>
-          <a:stretch>
-            <a:fillRect/>
-          </a:stretch>
-        </p:blipFill>
-        <p:spPr>
-          <a:xfrm>
-            <a:off x="3347864" y="1556792"/>
-            <a:ext cx="2487573" cy="3719736"/>
+            <a:off x="590987" y="1124744"/>
+            <a:ext cx="7869445" cy="4896544"/>
           </a:xfrm>
           <a:prstGeom prst="rect">
             <a:avLst/>
@@ -16411,7 +16591,11 @@
             </a:pPr>
             <a:r>
               <a:rPr lang="it-IT" dirty="0" smtClean="0"/>
-              <a:t>Back-end</a:t>
+              <a:t>Front-end </a:t>
+            </a:r>
+            <a:r>
+              <a:rPr lang="it-IT" dirty="0" smtClean="0"/>
+              <a:t>Desktop</a:t>
             </a:r>
           </a:p>
           <a:p>
@@ -16421,9 +16605,8 @@
             </a:pPr>
             <a:r>
               <a:rPr lang="it-IT" dirty="0" smtClean="0"/>
-              <a:t>Front-end Desktop</a:t>
-            </a:r>
-            <a:endParaRPr lang="it-IT" dirty="0" smtClean="0"/>
+              <a:t>Front-end Web</a:t>
+            </a:r>
           </a:p>
           <a:p>
             <a:pPr marL="525780" indent="-457200">
@@ -16432,13 +16615,8 @@
             </a:pPr>
             <a:r>
               <a:rPr lang="it-IT" dirty="0" smtClean="0"/>
-              <a:t>Front-end </a:t>
-            </a:r>
-            <a:r>
-              <a:rPr lang="it-IT" dirty="0" smtClean="0"/>
-              <a:t>Web</a:t>
-            </a:r>
-            <a:endParaRPr lang="it-IT" dirty="0" smtClean="0"/>
+              <a:t>Front-end Mobile</a:t>
+            </a:r>
           </a:p>
           <a:p>
             <a:pPr marL="525780" indent="-457200">
@@ -16447,8 +16625,9 @@
             </a:pPr>
             <a:r>
               <a:rPr lang="it-IT" dirty="0" smtClean="0"/>
-              <a:t>Front-end Mobile</a:t>
-            </a:r>
+              <a:t>Back-end</a:t>
+            </a:r>
+            <a:endParaRPr lang="it-IT" dirty="0" smtClean="0"/>
           </a:p>
           <a:p>
             <a:pPr marL="525780" indent="-457200">
@@ -16457,7 +16636,11 @@
             </a:pPr>
             <a:r>
               <a:rPr lang="it-IT" dirty="0" smtClean="0"/>
-              <a:t>Diagramma delle Attività</a:t>
+              <a:t>Diagramma </a:t>
+            </a:r>
+            <a:r>
+              <a:rPr lang="it-IT" dirty="0" smtClean="0"/>
+              <a:t>delle Attività</a:t>
             </a:r>
           </a:p>
           <a:p>
@@ -16582,6 +16765,36 @@
           <a:chExt cx="0" cy="0"/>
         </a:xfrm>
       </p:grpSpPr>
+      <p:pic>
+        <p:nvPicPr>
+          <p:cNvPr id="7" name="Immagine 6"/>
+          <p:cNvPicPr>
+            <a:picLocks noChangeAspect="1"/>
+          </p:cNvPicPr>
+          <p:nvPr/>
+        </p:nvPicPr>
+        <p:blipFill>
+          <a:blip r:embed="rId2" cstate="print">
+            <a:extLst>
+              <a:ext uri="{28A0092B-C50C-407E-A947-70E740481C1C}">
+                <a14:useLocalDpi xmlns:a14="http://schemas.microsoft.com/office/drawing/2010/main" val="0"/>
+              </a:ext>
+            </a:extLst>
+          </a:blip>
+          <a:stretch>
+            <a:fillRect/>
+          </a:stretch>
+        </p:blipFill>
+        <p:spPr>
+          <a:xfrm>
+            <a:off x="2750630" y="1268760"/>
+            <a:ext cx="3765586" cy="4581128"/>
+          </a:xfrm>
+          <a:prstGeom prst="rect">
+            <a:avLst/>
+          </a:prstGeom>
+        </p:spPr>
+      </p:pic>
       <p:sp>
         <p:nvSpPr>
           <p:cNvPr id="6" name="Segnaposto data 5"/>
@@ -16647,22 +16860,28 @@
       </p:sp>
       <p:pic>
         <p:nvPicPr>
-          <p:cNvPr id="5" name="Immagine 4" descr="Gui-web-GestioneDomande-Insert.jpg"/>
+          <p:cNvPr id="8" name="Immagine 7"/>
           <p:cNvPicPr>
             <a:picLocks noChangeAspect="1"/>
           </p:cNvPicPr>
           <p:nvPr/>
         </p:nvPicPr>
         <p:blipFill>
-          <a:blip r:embed="rId2" cstate="print"/>
+          <a:blip r:embed="rId3">
+            <a:extLst>
+              <a:ext uri="{28A0092B-C50C-407E-A947-70E740481C1C}">
+                <a14:useLocalDpi xmlns:a14="http://schemas.microsoft.com/office/drawing/2010/main" val="0"/>
+              </a:ext>
+            </a:extLst>
+          </a:blip>
           <a:stretch>
             <a:fillRect/>
           </a:stretch>
         </p:blipFill>
         <p:spPr>
           <a:xfrm>
-            <a:off x="683568" y="1052736"/>
-            <a:ext cx="7812360" cy="4861024"/>
+            <a:off x="590986" y="1160264"/>
+            <a:ext cx="7869445" cy="4861024"/>
           </a:xfrm>
           <a:prstGeom prst="rect">
             <a:avLst/>
@@ -16690,254 +16909,6 @@
 </file>
 
 <file path=ppt/slides/slide21.xml><?xml version="1.0" encoding="utf-8"?>
-<p:sld xmlns:a="http://schemas.openxmlformats.org/drawingml/2006/main" xmlns:r="http://schemas.openxmlformats.org/officeDocument/2006/relationships" xmlns:p="http://schemas.openxmlformats.org/presentationml/2006/main">
-  <p:cSld>
-    <p:spTree>
-      <p:nvGrpSpPr>
-        <p:cNvPr id="1" name=""/>
-        <p:cNvGrpSpPr/>
-        <p:nvPr/>
-      </p:nvGrpSpPr>
-      <p:grpSpPr>
-        <a:xfrm>
-          <a:off x="0" y="0"/>
-          <a:ext cx="0" cy="0"/>
-          <a:chOff x="0" y="0"/>
-          <a:chExt cx="0" cy="0"/>
-        </a:xfrm>
-      </p:grpSpPr>
-      <p:sp>
-        <p:nvSpPr>
-          <p:cNvPr id="6" name="Segnaposto data 5"/>
-          <p:cNvSpPr>
-            <a:spLocks noGrp="1"/>
-          </p:cNvSpPr>
-          <p:nvPr>
-            <p:ph type="dt" sz="half" idx="10"/>
-          </p:nvPr>
-        </p:nvSpPr>
-        <p:spPr/>
-        <p:txBody>
-          <a:bodyPr/>
-          <a:lstStyle/>
-          <a:p>
-            <a:r>
-              <a:rPr lang="it-IT" dirty="0" smtClean="0"/>
-              <a:t>Progetto </a:t>
-            </a:r>
-            <a:r>
-              <a:rPr lang="it-IT" dirty="0" err="1" smtClean="0"/>
-              <a:t>Gamification</a:t>
-            </a:r>
-            <a:r>
-              <a:rPr lang="it-IT" dirty="0" smtClean="0"/>
-              <a:t> - Team </a:t>
-            </a:r>
-            <a:r>
-              <a:rPr lang="it-IT" dirty="0" err="1" smtClean="0"/>
-              <a:t>Committed</a:t>
-            </a:r>
-            <a:endParaRPr lang="it-IT" dirty="0"/>
-          </a:p>
-        </p:txBody>
-      </p:sp>
-      <p:sp>
-        <p:nvSpPr>
-          <p:cNvPr id="9" name="Segnaposto numero diapositiva 8"/>
-          <p:cNvSpPr>
-            <a:spLocks noGrp="1"/>
-          </p:cNvSpPr>
-          <p:nvPr>
-            <p:ph type="sldNum" sz="quarter" idx="12"/>
-          </p:nvPr>
-        </p:nvSpPr>
-        <p:spPr/>
-        <p:txBody>
-          <a:bodyPr/>
-          <a:lstStyle/>
-          <a:p>
-            <a:fld id="{017EC607-BD11-4D4E-AC5F-155C854A0B9D}" type="slidenum">
-              <a:rPr lang="it-IT" smtClean="0"/>
-              <a:pPr/>
-              <a:t>21</a:t>
-            </a:fld>
-            <a:r>
-              <a:rPr lang="it-IT" dirty="0" smtClean="0"/>
-              <a:t> di 24</a:t>
-            </a:r>
-            <a:endParaRPr lang="it-IT" dirty="0"/>
-          </a:p>
-        </p:txBody>
-      </p:sp>
-      <p:pic>
-        <p:nvPicPr>
-          <p:cNvPr id="5" name="Immagine 4" descr="Gui-web-GestioneDomande-Insert.jpg"/>
-          <p:cNvPicPr>
-            <a:picLocks noChangeAspect="1"/>
-          </p:cNvPicPr>
-          <p:nvPr/>
-        </p:nvPicPr>
-        <p:blipFill>
-          <a:blip r:embed="rId2" cstate="print"/>
-          <a:stretch>
-            <a:fillRect/>
-          </a:stretch>
-        </p:blipFill>
-        <p:spPr>
-          <a:xfrm>
-            <a:off x="683568" y="1052736"/>
-            <a:ext cx="7812360" cy="4861024"/>
-          </a:xfrm>
-          <a:prstGeom prst="rect">
-            <a:avLst/>
-          </a:prstGeom>
-        </p:spPr>
-      </p:pic>
-    </p:spTree>
-    <p:extLst>
-      <p:ext uri="{BB962C8B-B14F-4D97-AF65-F5344CB8AC3E}">
-        <p14:creationId xmlns:p14="http://schemas.microsoft.com/office/powerpoint/2010/main" val="200703652"/>
-      </p:ext>
-    </p:extLst>
-  </p:cSld>
-  <p:clrMapOvr>
-    <a:masterClrMapping/>
-  </p:clrMapOvr>
-  <p:timing>
-    <p:tnLst>
-      <p:par>
-        <p:cTn id="1" dur="indefinite" restart="never" nodeType="tmRoot"/>
-      </p:par>
-    </p:tnLst>
-  </p:timing>
-</p:sld>
-</file>
-
-<file path=ppt/slides/slide22.xml><?xml version="1.0" encoding="utf-8"?>
-<p:sld xmlns:a="http://schemas.openxmlformats.org/drawingml/2006/main" xmlns:r="http://schemas.openxmlformats.org/officeDocument/2006/relationships" xmlns:p="http://schemas.openxmlformats.org/presentationml/2006/main">
-  <p:cSld>
-    <p:spTree>
-      <p:nvGrpSpPr>
-        <p:cNvPr id="1" name=""/>
-        <p:cNvGrpSpPr/>
-        <p:nvPr/>
-      </p:nvGrpSpPr>
-      <p:grpSpPr>
-        <a:xfrm>
-          <a:off x="0" y="0"/>
-          <a:ext cx="0" cy="0"/>
-          <a:chOff x="0" y="0"/>
-          <a:chExt cx="0" cy="0"/>
-        </a:xfrm>
-      </p:grpSpPr>
-      <p:sp>
-        <p:nvSpPr>
-          <p:cNvPr id="6" name="Segnaposto data 5"/>
-          <p:cNvSpPr>
-            <a:spLocks noGrp="1"/>
-          </p:cNvSpPr>
-          <p:nvPr>
-            <p:ph type="dt" sz="half" idx="10"/>
-          </p:nvPr>
-        </p:nvSpPr>
-        <p:spPr/>
-        <p:txBody>
-          <a:bodyPr/>
-          <a:lstStyle/>
-          <a:p>
-            <a:r>
-              <a:rPr lang="it-IT" dirty="0" smtClean="0"/>
-              <a:t>Progetto </a:t>
-            </a:r>
-            <a:r>
-              <a:rPr lang="it-IT" dirty="0" err="1" smtClean="0"/>
-              <a:t>Gamification</a:t>
-            </a:r>
-            <a:r>
-              <a:rPr lang="it-IT" dirty="0" smtClean="0"/>
-              <a:t> - Team </a:t>
-            </a:r>
-            <a:r>
-              <a:rPr lang="it-IT" dirty="0" err="1" smtClean="0"/>
-              <a:t>Committed</a:t>
-            </a:r>
-            <a:endParaRPr lang="it-IT" dirty="0"/>
-          </a:p>
-        </p:txBody>
-      </p:sp>
-      <p:sp>
-        <p:nvSpPr>
-          <p:cNvPr id="9" name="Segnaposto numero diapositiva 8"/>
-          <p:cNvSpPr>
-            <a:spLocks noGrp="1"/>
-          </p:cNvSpPr>
-          <p:nvPr>
-            <p:ph type="sldNum" sz="quarter" idx="12"/>
-          </p:nvPr>
-        </p:nvSpPr>
-        <p:spPr/>
-        <p:txBody>
-          <a:bodyPr/>
-          <a:lstStyle/>
-          <a:p>
-            <a:fld id="{017EC607-BD11-4D4E-AC5F-155C854A0B9D}" type="slidenum">
-              <a:rPr lang="it-IT" smtClean="0"/>
-              <a:pPr/>
-              <a:t>22</a:t>
-            </a:fld>
-            <a:r>
-              <a:rPr lang="it-IT" dirty="0" smtClean="0"/>
-              <a:t> di 24</a:t>
-            </a:r>
-            <a:endParaRPr lang="it-IT" dirty="0"/>
-          </a:p>
-        </p:txBody>
-      </p:sp>
-      <p:pic>
-        <p:nvPicPr>
-          <p:cNvPr id="5" name="Immagine 4" descr="Gui-web-GestioneDomande-Insert.jpg"/>
-          <p:cNvPicPr>
-            <a:picLocks noChangeAspect="1"/>
-          </p:cNvPicPr>
-          <p:nvPr/>
-        </p:nvPicPr>
-        <p:blipFill>
-          <a:blip r:embed="rId2" cstate="print"/>
-          <a:stretch>
-            <a:fillRect/>
-          </a:stretch>
-        </p:blipFill>
-        <p:spPr>
-          <a:xfrm>
-            <a:off x="683568" y="1052736"/>
-            <a:ext cx="7812360" cy="4861024"/>
-          </a:xfrm>
-          <a:prstGeom prst="rect">
-            <a:avLst/>
-          </a:prstGeom>
-        </p:spPr>
-      </p:pic>
-    </p:spTree>
-    <p:extLst>
-      <p:ext uri="{BB962C8B-B14F-4D97-AF65-F5344CB8AC3E}">
-        <p14:creationId xmlns:p14="http://schemas.microsoft.com/office/powerpoint/2010/main" val="200703652"/>
-      </p:ext>
-    </p:extLst>
-  </p:cSld>
-  <p:clrMapOvr>
-    <a:masterClrMapping/>
-  </p:clrMapOvr>
-  <p:timing>
-    <p:tnLst>
-      <p:par>
-        <p:cTn id="1" dur="indefinite" restart="never" nodeType="tmRoot"/>
-      </p:par>
-    </p:tnLst>
-  </p:timing>
-</p:sld>
-</file>
-
-<file path=ppt/slides/slide23.xml><?xml version="1.0" encoding="utf-8"?>
 <p:sld xmlns:a="http://schemas.openxmlformats.org/drawingml/2006/main" xmlns:r="http://schemas.openxmlformats.org/officeDocument/2006/relationships" xmlns:p="http://schemas.openxmlformats.org/presentationml/2006/main">
   <p:cSld>
     <p:spTree>
@@ -17054,7 +17025,7 @@
             <a:fld id="{017EC607-BD11-4D4E-AC5F-155C854A0B9D}" type="slidenum">
               <a:rPr lang="it-IT" smtClean="0"/>
               <a:pPr/>
-              <a:t>23</a:t>
+              <a:t>21</a:t>
             </a:fld>
             <a:r>
               <a:rPr lang="it-IT" dirty="0" smtClean="0"/>
@@ -17083,7 +17054,7 @@
 </p:sld>
 </file>
 
-<file path=ppt/slides/slide24.xml><?xml version="1.0" encoding="utf-8"?>
+<file path=ppt/slides/slide22.xml><?xml version="1.0" encoding="utf-8"?>
 <p:sld xmlns:a="http://schemas.openxmlformats.org/drawingml/2006/main" xmlns:r="http://schemas.openxmlformats.org/officeDocument/2006/relationships" xmlns:p="http://schemas.openxmlformats.org/presentationml/2006/main">
   <p:cSld>
     <p:spTree>
@@ -17171,7 +17142,7 @@
             <a:fld id="{017EC607-BD11-4D4E-AC5F-155C854A0B9D}" type="slidenum">
               <a:rPr lang="it-IT"/>
               <a:pPr/>
-              <a:t>24</a:t>
+              <a:t>22</a:t>
             </a:fld>
             <a:r>
               <a:rPr lang="it-IT" dirty="0"/>
@@ -17229,7 +17200,7 @@
 </p:sld>
 </file>
 
-<file path=ppt/slides/slide25.xml><?xml version="1.0" encoding="utf-8"?>
+<file path=ppt/slides/slide23.xml><?xml version="1.0" encoding="utf-8"?>
 <p:sld xmlns:a="http://schemas.openxmlformats.org/drawingml/2006/main" xmlns:r="http://schemas.openxmlformats.org/officeDocument/2006/relationships" xmlns:p="http://schemas.openxmlformats.org/presentationml/2006/main">
   <p:cSld>
     <p:spTree>
@@ -17317,7 +17288,7 @@
             <a:fld id="{017EC607-BD11-4D4E-AC5F-155C854A0B9D}" type="slidenum">
               <a:rPr lang="it-IT" smtClean="0"/>
               <a:pPr/>
-              <a:t>25</a:t>
+              <a:t>23</a:t>
             </a:fld>
             <a:r>
               <a:rPr lang="it-IT" dirty="0"/>
@@ -17333,21 +17304,21 @@
       </p:sp>
       <p:graphicFrame>
         <p:nvGraphicFramePr>
-          <p:cNvPr id="5" name="Grafico 4"/>
+          <p:cNvPr id="7" name="Grafico 6"/>
           <p:cNvGraphicFramePr>
             <a:graphicFrameLocks/>
           </p:cNvGraphicFramePr>
           <p:nvPr>
             <p:extLst>
               <p:ext uri="{D42A27DB-BD31-4B8C-83A1-F6EECF244321}">
-                <p14:modId xmlns:p14="http://schemas.microsoft.com/office/powerpoint/2010/main" val="67701067"/>
+                <p14:modId xmlns:p14="http://schemas.microsoft.com/office/powerpoint/2010/main" val="2838740758"/>
               </p:ext>
             </p:extLst>
           </p:nvPr>
         </p:nvGraphicFramePr>
         <p:xfrm>
-          <a:off x="899592" y="1340768"/>
-          <a:ext cx="7272808" cy="4680520"/>
+          <a:off x="1429067" y="1673424"/>
+          <a:ext cx="6408712" cy="4176464"/>
         </p:xfrm>
         <a:graphic>
           <a:graphicData uri="http://schemas.openxmlformats.org/drawingml/2006/chart">
@@ -17375,7 +17346,7 @@
 </p:sld>
 </file>
 
-<file path=ppt/slides/slide26.xml><?xml version="1.0" encoding="utf-8"?>
+<file path=ppt/slides/slide24.xml><?xml version="1.0" encoding="utf-8"?>
 <p:sld xmlns:a="http://schemas.openxmlformats.org/drawingml/2006/main" xmlns:r="http://schemas.openxmlformats.org/officeDocument/2006/relationships" xmlns:p="http://schemas.openxmlformats.org/presentationml/2006/main">
   <p:cSld>
     <p:spTree>
@@ -17463,7 +17434,7 @@
             <a:fld id="{017EC607-BD11-4D4E-AC5F-155C854A0B9D}" type="slidenum">
               <a:rPr lang="it-IT" smtClean="0"/>
               <a:pPr/>
-              <a:t>26</a:t>
+              <a:t>24</a:t>
             </a:fld>
             <a:r>
               <a:rPr lang="it-IT" dirty="0"/>
@@ -17764,7 +17735,7 @@
             </a:fld>
             <a:r>
               <a:rPr lang="it-IT" dirty="0" smtClean="0"/>
-              <a:t> di 67</a:t>
+              <a:t> di 24</a:t>
             </a:r>
             <a:endParaRPr lang="it-IT" dirty="0"/>
           </a:p>
@@ -17837,36 +17808,6 @@
           <a:chExt cx="0" cy="0"/>
         </a:xfrm>
       </p:grpSpPr>
-      <p:pic>
-        <p:nvPicPr>
-          <p:cNvPr id="3" name="Immagine 2"/>
-          <p:cNvPicPr>
-            <a:picLocks noChangeAspect="1"/>
-          </p:cNvPicPr>
-          <p:nvPr/>
-        </p:nvPicPr>
-        <p:blipFill>
-          <a:blip r:embed="rId2" cstate="print">
-            <a:extLst>
-              <a:ext uri="{28A0092B-C50C-407E-A947-70E740481C1C}">
-                <a14:useLocalDpi xmlns:a14="http://schemas.microsoft.com/office/drawing/2010/main" val="0"/>
-              </a:ext>
-            </a:extLst>
-          </a:blip>
-          <a:stretch>
-            <a:fillRect/>
-          </a:stretch>
-        </p:blipFill>
-        <p:spPr>
-          <a:xfrm>
-            <a:off x="2750630" y="1268760"/>
-            <a:ext cx="3765586" cy="4581128"/>
-          </a:xfrm>
-          <a:prstGeom prst="rect">
-            <a:avLst/>
-          </a:prstGeom>
-        </p:spPr>
-      </p:pic>
       <p:sp>
         <p:nvSpPr>
           <p:cNvPr id="2" name="Titolo 1"/>
@@ -17877,24 +17818,72 @@
             <p:ph type="title"/>
           </p:nvPr>
         </p:nvSpPr>
-        <p:spPr>
-          <a:xfrm>
-            <a:off x="1043608" y="2996952"/>
-            <a:ext cx="7024744" cy="1143000"/>
-          </a:xfrm>
-        </p:spPr>
+        <p:spPr/>
         <p:txBody>
           <a:bodyPr/>
           <a:lstStyle/>
           <a:p>
-            <a:pPr algn="ctr"/>
             <a:r>
               <a:rPr lang="it-IT" dirty="0" smtClean="0"/>
-              <a:t>2. </a:t>
-            </a:r>
+              <a:t>Tecnologie utilizzate</a:t>
+            </a:r>
+            <a:endParaRPr lang="it-IT" dirty="0"/>
+          </a:p>
+        </p:txBody>
+      </p:sp>
+      <p:sp>
+        <p:nvSpPr>
+          <p:cNvPr id="3" name="Segnaposto contenuto 2"/>
+          <p:cNvSpPr>
+            <a:spLocks noGrp="1"/>
+          </p:cNvSpPr>
+          <p:nvPr>
+            <p:ph idx="1"/>
+          </p:nvPr>
+        </p:nvSpPr>
+        <p:spPr/>
+        <p:txBody>
+          <a:bodyPr/>
+          <a:lstStyle/>
+          <a:p>
+            <a:r>
+              <a:rPr lang="it-IT" dirty="0" smtClean="0"/>
+              <a:t>Java</a:t>
+            </a:r>
+          </a:p>
+          <a:p>
+            <a:r>
+              <a:rPr lang="it-IT" dirty="0" smtClean="0"/>
+              <a:t>XHTML</a:t>
+            </a:r>
+          </a:p>
+          <a:p>
+            <a:r>
+              <a:rPr lang="it-IT" dirty="0" smtClean="0"/>
+              <a:t>JSP</a:t>
+            </a:r>
+          </a:p>
+          <a:p>
             <a:r>
               <a:rPr lang="it-IT" dirty="0" err="1" smtClean="0"/>
-              <a:t>Back-End</a:t>
+              <a:t>MySql</a:t>
+            </a:r>
+            <a:endParaRPr lang="it-IT" dirty="0" smtClean="0"/>
+          </a:p>
+          <a:p>
+            <a:r>
+              <a:rPr lang="it-IT" dirty="0" err="1" smtClean="0"/>
+              <a:t>Android</a:t>
+            </a:r>
+            <a:r>
+              <a:rPr lang="it-IT" dirty="0" smtClean="0"/>
+              <a:t> SDK</a:t>
+            </a:r>
+          </a:p>
+          <a:p>
+            <a:r>
+              <a:rPr lang="it-IT" dirty="0" err="1" smtClean="0"/>
+              <a:t>Tomcat</a:t>
             </a:r>
             <a:endParaRPr lang="it-IT" dirty="0"/>
           </a:p>
@@ -17925,7 +17914,7 @@
       </p:sp>
       <p:sp>
         <p:nvSpPr>
-          <p:cNvPr id="7" name="Segnaposto numero diapositiva 6"/>
+          <p:cNvPr id="5" name="Segnaposto numero diapositiva 4"/>
           <p:cNvSpPr>
             <a:spLocks noGrp="1"/>
           </p:cNvSpPr>
@@ -17953,7 +17942,7 @@
     </p:spTree>
     <p:extLst>
       <p:ext uri="{BB962C8B-B14F-4D97-AF65-F5344CB8AC3E}">
-        <p14:creationId xmlns:p14="http://schemas.microsoft.com/office/powerpoint/2010/main" val="2537002"/>
+        <p14:creationId xmlns:p14="http://schemas.microsoft.com/office/powerpoint/2010/main" val="3554633121"/>
       </p:ext>
     </p:extLst>
   </p:cSld>
@@ -17971,130 +17960,6 @@
 </file>
 
 <file path=ppt/slides/slide6.xml><?xml version="1.0" encoding="utf-8"?>
-<p:sld xmlns:a="http://schemas.openxmlformats.org/drawingml/2006/main" xmlns:r="http://schemas.openxmlformats.org/officeDocument/2006/relationships" xmlns:p="http://schemas.openxmlformats.org/presentationml/2006/main">
-  <p:cSld>
-    <p:spTree>
-      <p:nvGrpSpPr>
-        <p:cNvPr id="1" name=""/>
-        <p:cNvGrpSpPr/>
-        <p:nvPr/>
-      </p:nvGrpSpPr>
-      <p:grpSpPr>
-        <a:xfrm>
-          <a:off x="0" y="0"/>
-          <a:ext cx="0" cy="0"/>
-          <a:chOff x="0" y="0"/>
-          <a:chExt cx="0" cy="0"/>
-        </a:xfrm>
-      </p:grpSpPr>
-      <p:sp>
-        <p:nvSpPr>
-          <p:cNvPr id="6" name="Segnaposto data 5"/>
-          <p:cNvSpPr>
-            <a:spLocks noGrp="1"/>
-          </p:cNvSpPr>
-          <p:nvPr>
-            <p:ph type="dt" sz="half" idx="10"/>
-          </p:nvPr>
-        </p:nvSpPr>
-        <p:spPr/>
-        <p:txBody>
-          <a:bodyPr/>
-          <a:lstStyle/>
-          <a:p>
-            <a:r>
-              <a:rPr lang="it-IT" dirty="0" smtClean="0"/>
-              <a:t>Progetto </a:t>
-            </a:r>
-            <a:r>
-              <a:rPr lang="it-IT" dirty="0" err="1" smtClean="0"/>
-              <a:t>Gamification</a:t>
-            </a:r>
-            <a:r>
-              <a:rPr lang="it-IT" dirty="0" smtClean="0"/>
-              <a:t> - Team </a:t>
-            </a:r>
-            <a:r>
-              <a:rPr lang="it-IT" dirty="0" err="1" smtClean="0"/>
-              <a:t>Committed</a:t>
-            </a:r>
-            <a:endParaRPr lang="it-IT" dirty="0"/>
-          </a:p>
-        </p:txBody>
-      </p:sp>
-      <p:sp>
-        <p:nvSpPr>
-          <p:cNvPr id="9" name="Segnaposto numero diapositiva 8"/>
-          <p:cNvSpPr>
-            <a:spLocks noGrp="1"/>
-          </p:cNvSpPr>
-          <p:nvPr>
-            <p:ph type="sldNum" sz="quarter" idx="12"/>
-          </p:nvPr>
-        </p:nvSpPr>
-        <p:spPr/>
-        <p:txBody>
-          <a:bodyPr/>
-          <a:lstStyle/>
-          <a:p>
-            <a:fld id="{017EC607-BD11-4D4E-AC5F-155C854A0B9D}" type="slidenum">
-              <a:rPr lang="it-IT" smtClean="0"/>
-              <a:pPr/>
-              <a:t>6</a:t>
-            </a:fld>
-            <a:r>
-              <a:rPr lang="it-IT" dirty="0" smtClean="0"/>
-              <a:t> di 24</a:t>
-            </a:r>
-            <a:endParaRPr lang="it-IT" dirty="0"/>
-          </a:p>
-        </p:txBody>
-      </p:sp>
-      <p:pic>
-        <p:nvPicPr>
-          <p:cNvPr id="5" name="Immagine 4" descr="BackEnd.png"/>
-          <p:cNvPicPr>
-            <a:picLocks noChangeAspect="1"/>
-          </p:cNvPicPr>
-          <p:nvPr/>
-        </p:nvPicPr>
-        <p:blipFill>
-          <a:blip r:embed="rId2" cstate="print"/>
-          <a:stretch>
-            <a:fillRect/>
-          </a:stretch>
-        </p:blipFill>
-        <p:spPr>
-          <a:xfrm>
-            <a:off x="2339752" y="692696"/>
-            <a:ext cx="4418852" cy="5776071"/>
-          </a:xfrm>
-          <a:prstGeom prst="rect">
-            <a:avLst/>
-          </a:prstGeom>
-        </p:spPr>
-      </p:pic>
-    </p:spTree>
-    <p:extLst>
-      <p:ext uri="{BB962C8B-B14F-4D97-AF65-F5344CB8AC3E}">
-        <p14:creationId xmlns:p14="http://schemas.microsoft.com/office/powerpoint/2010/main" val="200703652"/>
-      </p:ext>
-    </p:extLst>
-  </p:cSld>
-  <p:clrMapOvr>
-    <a:masterClrMapping/>
-  </p:clrMapOvr>
-  <p:timing>
-    <p:tnLst>
-      <p:par>
-        <p:cTn id="1" dur="indefinite" restart="never" nodeType="tmRoot"/>
-      </p:par>
-    </p:tnLst>
-  </p:timing>
-</p:sld>
-</file>
-
-<file path=ppt/slides/slide7.xml><?xml version="1.0" encoding="utf-8"?>
 <p:sld xmlns:a="http://schemas.openxmlformats.org/drawingml/2006/main" xmlns:r="http://schemas.openxmlformats.org/officeDocument/2006/relationships" xmlns:p="http://schemas.openxmlformats.org/presentationml/2006/main">
   <p:cSld>
     <p:spTree>
@@ -18165,8 +18030,16 @@
           <a:p>
             <a:pPr algn="ctr"/>
             <a:r>
+              <a:rPr lang="it-IT" dirty="0"/>
+              <a:t>2</a:t>
+            </a:r>
+            <a:r>
               <a:rPr lang="it-IT" dirty="0" smtClean="0"/>
-              <a:t>3. Front-End Desktop</a:t>
+              <a:t>. </a:t>
+            </a:r>
+            <a:r>
+              <a:rPr lang="it-IT" dirty="0" smtClean="0"/>
+              <a:t>Front-End Desktop</a:t>
             </a:r>
             <a:endParaRPr lang="it-IT" dirty="0"/>
           </a:p>
@@ -18213,11 +18086,11 @@
             <a:fld id="{017EC607-BD11-4D4E-AC5F-155C854A0B9D}" type="slidenum">
               <a:rPr lang="it-IT" smtClean="0"/>
               <a:pPr/>
-              <a:t>7</a:t>
+              <a:t>6</a:t>
             </a:fld>
             <a:r>
               <a:rPr lang="it-IT" dirty="0" smtClean="0"/>
-              <a:t> di 67</a:t>
+              <a:t> di 24</a:t>
             </a:r>
           </a:p>
         </p:txBody>
@@ -18242,7 +18115,7 @@
 </p:sld>
 </file>
 
-<file path=ppt/slides/slide8.xml><?xml version="1.0" encoding="utf-8"?>
+<file path=ppt/slides/slide7.xml><?xml version="1.0" encoding="utf-8"?>
 <p:sld xmlns:a="http://schemas.openxmlformats.org/drawingml/2006/main" xmlns:r="http://schemas.openxmlformats.org/officeDocument/2006/relationships" xmlns:p="http://schemas.openxmlformats.org/presentationml/2006/main">
   <p:cSld>
     <p:spTree>
@@ -18312,11 +18185,11 @@
             <a:fld id="{017EC607-BD11-4D4E-AC5F-155C854A0B9D}" type="slidenum">
               <a:rPr lang="it-IT" smtClean="0"/>
               <a:pPr/>
-              <a:t>8</a:t>
+              <a:t>7</a:t>
             </a:fld>
             <a:r>
               <a:rPr lang="it-IT" dirty="0" smtClean="0"/>
-              <a:t> di 67</a:t>
+              <a:t> di 24</a:t>
             </a:r>
             <a:endParaRPr lang="it-IT" dirty="0"/>
           </a:p>
@@ -18372,7 +18245,7 @@
 </p:sld>
 </file>
 
-<file path=ppt/slides/slide9.xml><?xml version="1.0" encoding="utf-8"?>
+<file path=ppt/slides/slide8.xml><?xml version="1.0" encoding="utf-8"?>
 <p:sld xmlns:a="http://schemas.openxmlformats.org/drawingml/2006/main" xmlns:r="http://schemas.openxmlformats.org/officeDocument/2006/relationships" xmlns:p="http://schemas.openxmlformats.org/presentationml/2006/main">
   <p:cSld>
     <p:spTree>
@@ -18441,8 +18314,12 @@
           <a:p>
             <a:pPr algn="ctr"/>
             <a:r>
+              <a:rPr lang="it-IT" dirty="0"/>
+              <a:t>3</a:t>
+            </a:r>
+            <a:r>
               <a:rPr lang="it-IT" dirty="0" smtClean="0"/>
-              <a:t>4. </a:t>
+              <a:t>. </a:t>
             </a:r>
             <a:r>
               <a:rPr lang="it-IT" dirty="0" err="1" smtClean="0"/>
@@ -18497,7 +18374,7 @@
             <a:fld id="{017EC607-BD11-4D4E-AC5F-155C854A0B9D}" type="slidenum">
               <a:rPr lang="it-IT" smtClean="0"/>
               <a:pPr/>
-              <a:t>9</a:t>
+              <a:t>8</a:t>
             </a:fld>
             <a:r>
               <a:rPr lang="it-IT" dirty="0" smtClean="0"/>
@@ -18510,6 +18387,130 @@
     <p:extLst>
       <p:ext uri="{BB962C8B-B14F-4D97-AF65-F5344CB8AC3E}">
         <p14:creationId xmlns:p14="http://schemas.microsoft.com/office/powerpoint/2010/main" val="2537002"/>
+      </p:ext>
+    </p:extLst>
+  </p:cSld>
+  <p:clrMapOvr>
+    <a:masterClrMapping/>
+  </p:clrMapOvr>
+  <p:timing>
+    <p:tnLst>
+      <p:par>
+        <p:cTn id="1" dur="indefinite" restart="never" nodeType="tmRoot"/>
+      </p:par>
+    </p:tnLst>
+  </p:timing>
+</p:sld>
+</file>
+
+<file path=ppt/slides/slide9.xml><?xml version="1.0" encoding="utf-8"?>
+<p:sld xmlns:a="http://schemas.openxmlformats.org/drawingml/2006/main" xmlns:r="http://schemas.openxmlformats.org/officeDocument/2006/relationships" xmlns:p="http://schemas.openxmlformats.org/presentationml/2006/main">
+  <p:cSld>
+    <p:spTree>
+      <p:nvGrpSpPr>
+        <p:cNvPr id="1" name=""/>
+        <p:cNvGrpSpPr/>
+        <p:nvPr/>
+      </p:nvGrpSpPr>
+      <p:grpSpPr>
+        <a:xfrm>
+          <a:off x="0" y="0"/>
+          <a:ext cx="0" cy="0"/>
+          <a:chOff x="0" y="0"/>
+          <a:chExt cx="0" cy="0"/>
+        </a:xfrm>
+      </p:grpSpPr>
+      <p:sp>
+        <p:nvSpPr>
+          <p:cNvPr id="6" name="Segnaposto data 5"/>
+          <p:cNvSpPr>
+            <a:spLocks noGrp="1"/>
+          </p:cNvSpPr>
+          <p:nvPr>
+            <p:ph type="dt" sz="half" idx="10"/>
+          </p:nvPr>
+        </p:nvSpPr>
+        <p:spPr/>
+        <p:txBody>
+          <a:bodyPr/>
+          <a:lstStyle/>
+          <a:p>
+            <a:r>
+              <a:rPr lang="it-IT" dirty="0" smtClean="0"/>
+              <a:t>Progetto </a:t>
+            </a:r>
+            <a:r>
+              <a:rPr lang="it-IT" dirty="0" err="1" smtClean="0"/>
+              <a:t>Gamification</a:t>
+            </a:r>
+            <a:r>
+              <a:rPr lang="it-IT" dirty="0" smtClean="0"/>
+              <a:t> - Team </a:t>
+            </a:r>
+            <a:r>
+              <a:rPr lang="it-IT" dirty="0" err="1" smtClean="0"/>
+              <a:t>Committed</a:t>
+            </a:r>
+            <a:endParaRPr lang="it-IT" dirty="0"/>
+          </a:p>
+        </p:txBody>
+      </p:sp>
+      <p:sp>
+        <p:nvSpPr>
+          <p:cNvPr id="9" name="Segnaposto numero diapositiva 8"/>
+          <p:cNvSpPr>
+            <a:spLocks noGrp="1"/>
+          </p:cNvSpPr>
+          <p:nvPr>
+            <p:ph type="sldNum" sz="quarter" idx="12"/>
+          </p:nvPr>
+        </p:nvSpPr>
+        <p:spPr/>
+        <p:txBody>
+          <a:bodyPr/>
+          <a:lstStyle/>
+          <a:p>
+            <a:fld id="{017EC607-BD11-4D4E-AC5F-155C854A0B9D}" type="slidenum">
+              <a:rPr lang="it-IT" smtClean="0"/>
+              <a:pPr/>
+              <a:t>9</a:t>
+            </a:fld>
+            <a:r>
+              <a:rPr lang="it-IT" dirty="0" smtClean="0"/>
+              <a:t> di 24</a:t>
+            </a:r>
+            <a:endParaRPr lang="it-IT" dirty="0"/>
+          </a:p>
+        </p:txBody>
+      </p:sp>
+      <p:pic>
+        <p:nvPicPr>
+          <p:cNvPr id="11" name="Immagine 10" descr="frontEndWeb.png"/>
+          <p:cNvPicPr>
+            <a:picLocks noChangeAspect="1"/>
+          </p:cNvPicPr>
+          <p:nvPr/>
+        </p:nvPicPr>
+        <p:blipFill>
+          <a:blip r:embed="rId2" cstate="print"/>
+          <a:stretch>
+            <a:fillRect/>
+          </a:stretch>
+        </p:blipFill>
+        <p:spPr>
+          <a:xfrm>
+            <a:off x="2051720" y="692696"/>
+            <a:ext cx="5020413" cy="5760640"/>
+          </a:xfrm>
+          <a:prstGeom prst="rect">
+            <a:avLst/>
+          </a:prstGeom>
+        </p:spPr>
+      </p:pic>
+    </p:spTree>
+    <p:extLst>
+      <p:ext uri="{BB962C8B-B14F-4D97-AF65-F5344CB8AC3E}">
+        <p14:creationId xmlns:p14="http://schemas.microsoft.com/office/powerpoint/2010/main" val="200703652"/>
       </p:ext>
     </p:extLst>
   </p:cSld>

</xml_diff>

<commit_message>
[Presentazione] Aggiornata presentazione + pdf
</commit_message>
<xml_diff>
--- a/RP/Esterni/Presentazione/RP-Presentazione.pptx
+++ b/RP/Esterni/Presentazione/RP-Presentazione.pptx
@@ -375,12 +375,12 @@
         </c:dLbls>
         <c:gapWidth val="150"/>
         <c:shape val="box"/>
-        <c:axId val="103741312"/>
-        <c:axId val="103742848"/>
+        <c:axId val="88860544"/>
+        <c:axId val="88862080"/>
         <c:axId val="0"/>
       </c:bar3DChart>
       <c:catAx>
-        <c:axId val="103741312"/>
+        <c:axId val="88860544"/>
         <c:scaling>
           <c:orientation val="minMax"/>
         </c:scaling>
@@ -389,7 +389,7 @@
         <c:majorTickMark val="out"/>
         <c:minorTickMark val="none"/>
         <c:tickLblPos val="nextTo"/>
-        <c:crossAx val="103742848"/>
+        <c:crossAx val="88862080"/>
         <c:crosses val="autoZero"/>
         <c:auto val="1"/>
         <c:lblAlgn val="ctr"/>
@@ -397,7 +397,7 @@
         <c:noMultiLvlLbl val="0"/>
       </c:catAx>
       <c:valAx>
-        <c:axId val="103742848"/>
+        <c:axId val="88862080"/>
         <c:scaling>
           <c:orientation val="minMax"/>
         </c:scaling>
@@ -408,7 +408,7 @@
         <c:majorTickMark val="out"/>
         <c:minorTickMark val="none"/>
         <c:tickLblPos val="nextTo"/>
-        <c:crossAx val="103741312"/>
+        <c:crossAx val="88860544"/>
         <c:crosses val="autoZero"/>
         <c:crossBetween val="between"/>
       </c:valAx>
@@ -500,21 +500,6 @@
           </c:spPr>
           <c:invertIfNegative val="0"/>
           <c:dLbls>
-            <c:dLbl>
-              <c:idx val="0"/>
-              <c:layout>
-                <c:manualLayout>
-                  <c:x val="4.1615226273235557E-2"/>
-                  <c:y val="-9.1225496017683858E-3"/>
-                </c:manualLayout>
-              </c:layout>
-              <c:showLegendKey val="0"/>
-              <c:showVal val="1"/>
-              <c:showCatName val="0"/>
-              <c:showSerName val="0"/>
-              <c:showPercent val="0"/>
-              <c:showBubbleSize val="0"/>
-            </c:dLbl>
             <c:txPr>
               <a:bodyPr/>
               <a:lstStyle/>
@@ -562,21 +547,6 @@
           </c:tx>
           <c:invertIfNegative val="0"/>
           <c:dLbls>
-            <c:dLbl>
-              <c:idx val="0"/>
-              <c:layout>
-                <c:manualLayout>
-                  <c:x val="4.1615226273235557E-2"/>
-                  <c:y val="6.0816997345122569E-3"/>
-                </c:manualLayout>
-              </c:layout>
-              <c:showLegendKey val="0"/>
-              <c:showVal val="1"/>
-              <c:showCatName val="0"/>
-              <c:showSerName val="0"/>
-              <c:showPercent val="0"/>
-              <c:showBubbleSize val="0"/>
-            </c:dLbl>
             <c:txPr>
               <a:bodyPr/>
               <a:lstStyle/>
@@ -626,12 +596,12 @@
         </c:dLbls>
         <c:gapWidth val="150"/>
         <c:shape val="box"/>
-        <c:axId val="121440512"/>
-        <c:axId val="121446400"/>
+        <c:axId val="79571968"/>
+        <c:axId val="79578240"/>
         <c:axId val="0"/>
       </c:bar3DChart>
       <c:catAx>
-        <c:axId val="121440512"/>
+        <c:axId val="79571968"/>
         <c:scaling>
           <c:orientation val="minMax"/>
         </c:scaling>
@@ -640,7 +610,7 @@
         <c:majorTickMark val="out"/>
         <c:minorTickMark val="none"/>
         <c:tickLblPos val="nextTo"/>
-        <c:crossAx val="121446400"/>
+        <c:crossAx val="79578240"/>
         <c:crosses val="autoZero"/>
         <c:auto val="1"/>
         <c:lblAlgn val="ctr"/>
@@ -648,7 +618,7 @@
         <c:noMultiLvlLbl val="0"/>
       </c:catAx>
       <c:valAx>
-        <c:axId val="121446400"/>
+        <c:axId val="79578240"/>
         <c:scaling>
           <c:orientation val="minMax"/>
         </c:scaling>
@@ -659,9 +629,10 @@
         <c:majorTickMark val="out"/>
         <c:minorTickMark val="none"/>
         <c:tickLblPos val="nextTo"/>
-        <c:crossAx val="121440512"/>
+        <c:crossAx val="79571968"/>
         <c:crosses val="autoZero"/>
         <c:crossBetween val="between"/>
+        <c:majorUnit val="100"/>
       </c:valAx>
     </c:plotArea>
     <c:legend>
@@ -14892,7 +14863,11 @@
           <a:p>
             <a:r>
               <a:rPr lang="it-IT" sz="2800" dirty="0" smtClean="0"/>
-              <a:t>A.A. 2011/2012 – 10/01/2012</a:t>
+              <a:t>A.A. 2011/2012 – </a:t>
+            </a:r>
+            <a:r>
+              <a:rPr lang="it-IT" sz="2800" dirty="0" smtClean="0"/>
+              <a:t>2012/02/07</a:t>
             </a:r>
             <a:endParaRPr lang="it-IT" sz="2800" dirty="0"/>
           </a:p>
@@ -16591,11 +16566,7 @@
             </a:pPr>
             <a:r>
               <a:rPr lang="it-IT" dirty="0" smtClean="0"/>
-              <a:t>Front-end </a:t>
-            </a:r>
-            <a:r>
-              <a:rPr lang="it-IT" dirty="0" smtClean="0"/>
-              <a:t>Desktop</a:t>
+              <a:t>Front-end Desktop</a:t>
             </a:r>
           </a:p>
           <a:p>
@@ -16627,7 +16598,6 @@
               <a:rPr lang="it-IT" dirty="0" smtClean="0"/>
               <a:t>Back-end</a:t>
             </a:r>
-            <a:endParaRPr lang="it-IT" dirty="0" smtClean="0"/>
           </a:p>
           <a:p>
             <a:pPr marL="525780" indent="-457200">
@@ -16636,11 +16606,7 @@
             </a:pPr>
             <a:r>
               <a:rPr lang="it-IT" dirty="0" smtClean="0"/>
-              <a:t>Diagramma </a:t>
-            </a:r>
-            <a:r>
-              <a:rPr lang="it-IT" dirty="0" smtClean="0"/>
-              <a:t>delle Attività</a:t>
+              <a:t>Diagramma delle Attività</a:t>
             </a:r>
           </a:p>
           <a:p>
@@ -17304,21 +17270,21 @@
       </p:sp>
       <p:graphicFrame>
         <p:nvGraphicFramePr>
-          <p:cNvPr id="7" name="Grafico 6"/>
+          <p:cNvPr id="8" name="Grafico 7"/>
           <p:cNvGraphicFramePr>
             <a:graphicFrameLocks/>
           </p:cNvGraphicFramePr>
           <p:nvPr>
             <p:extLst>
               <p:ext uri="{D42A27DB-BD31-4B8C-83A1-F6EECF244321}">
-                <p14:modId xmlns:p14="http://schemas.microsoft.com/office/powerpoint/2010/main" val="2838740758"/>
+                <p14:modId xmlns:p14="http://schemas.microsoft.com/office/powerpoint/2010/main" val="1241911467"/>
               </p:ext>
             </p:extLst>
           </p:nvPr>
         </p:nvGraphicFramePr>
         <p:xfrm>
-          <a:off x="1429067" y="1673424"/>
-          <a:ext cx="6408712" cy="4176464"/>
+          <a:off x="1115616" y="1700808"/>
+          <a:ext cx="6912768" cy="4032448"/>
         </p:xfrm>
         <a:graphic>
           <a:graphicData uri="http://schemas.openxmlformats.org/drawingml/2006/chart">
@@ -17678,6 +17644,36 @@
           <a:chExt cx="0" cy="0"/>
         </a:xfrm>
       </p:grpSpPr>
+      <p:pic>
+        <p:nvPicPr>
+          <p:cNvPr id="7" name="Immagine 6"/>
+          <p:cNvPicPr>
+            <a:picLocks noChangeAspect="1"/>
+          </p:cNvPicPr>
+          <p:nvPr/>
+        </p:nvPicPr>
+        <p:blipFill>
+          <a:blip r:embed="rId2" cstate="print">
+            <a:extLst>
+              <a:ext uri="{28A0092B-C50C-407E-A947-70E740481C1C}">
+                <a14:useLocalDpi xmlns:a14="http://schemas.microsoft.com/office/drawing/2010/main" val="0"/>
+              </a:ext>
+            </a:extLst>
+          </a:blip>
+          <a:stretch>
+            <a:fillRect/>
+          </a:stretch>
+        </p:blipFill>
+        <p:spPr>
+          <a:xfrm>
+            <a:off x="2750630" y="1268760"/>
+            <a:ext cx="3765586" cy="4581128"/>
+          </a:xfrm>
+          <a:prstGeom prst="rect">
+            <a:avLst/>
+          </a:prstGeom>
+        </p:spPr>
+      </p:pic>
       <p:sp>
         <p:nvSpPr>
           <p:cNvPr id="6" name="Segnaposto data 5"/>
@@ -17750,7 +17746,7 @@
           <p:nvPr/>
         </p:nvPicPr>
         <p:blipFill>
-          <a:blip r:embed="rId2">
+          <a:blip r:embed="rId3">
             <a:extLst>
               <a:ext uri="{28A0092B-C50C-407E-A947-70E740481C1C}">
                 <a14:useLocalDpi xmlns:a14="http://schemas.microsoft.com/office/drawing/2010/main" val="0"/>
@@ -17808,6 +17804,36 @@
           <a:chExt cx="0" cy="0"/>
         </a:xfrm>
       </p:grpSpPr>
+      <p:pic>
+        <p:nvPicPr>
+          <p:cNvPr id="6" name="Immagine 5"/>
+          <p:cNvPicPr>
+            <a:picLocks noChangeAspect="1"/>
+          </p:cNvPicPr>
+          <p:nvPr/>
+        </p:nvPicPr>
+        <p:blipFill>
+          <a:blip r:embed="rId2" cstate="print">
+            <a:extLst>
+              <a:ext uri="{28A0092B-C50C-407E-A947-70E740481C1C}">
+                <a14:useLocalDpi xmlns:a14="http://schemas.microsoft.com/office/drawing/2010/main" val="0"/>
+              </a:ext>
+            </a:extLst>
+          </a:blip>
+          <a:stretch>
+            <a:fillRect/>
+          </a:stretch>
+        </p:blipFill>
+        <p:spPr>
+          <a:xfrm>
+            <a:off x="2750630" y="1268760"/>
+            <a:ext cx="3765586" cy="4581128"/>
+          </a:xfrm>
+          <a:prstGeom prst="rect">
+            <a:avLst/>
+          </a:prstGeom>
+        </p:spPr>
+      </p:pic>
       <p:sp>
         <p:nvSpPr>
           <p:cNvPr id="2" name="Titolo 1"/>
@@ -18035,11 +18061,7 @@
             </a:r>
             <a:r>
               <a:rPr lang="it-IT" dirty="0" smtClean="0"/>
-              <a:t>. </a:t>
-            </a:r>
-            <a:r>
-              <a:rPr lang="it-IT" dirty="0" smtClean="0"/>
-              <a:t>Front-End Desktop</a:t>
+              <a:t>. Front-End Desktop</a:t>
             </a:r>
             <a:endParaRPr lang="it-IT" dirty="0"/>
           </a:p>

</xml_diff>

<commit_message>
[Presentazione] Finita. Pronta per oggi
</commit_message>
<xml_diff>
--- a/RP/Esterni/Presentazione/RP-Presentazione.pptx
+++ b/RP/Esterni/Presentazione/RP-Presentazione.pptx
@@ -375,12 +375,12 @@
         </c:dLbls>
         <c:gapWidth val="150"/>
         <c:shape val="box"/>
-        <c:axId val="88860544"/>
-        <c:axId val="88862080"/>
+        <c:axId val="74119040"/>
+        <c:axId val="74120576"/>
         <c:axId val="0"/>
       </c:bar3DChart>
       <c:catAx>
-        <c:axId val="88860544"/>
+        <c:axId val="74119040"/>
         <c:scaling>
           <c:orientation val="minMax"/>
         </c:scaling>
@@ -389,7 +389,7 @@
         <c:majorTickMark val="out"/>
         <c:minorTickMark val="none"/>
         <c:tickLblPos val="nextTo"/>
-        <c:crossAx val="88862080"/>
+        <c:crossAx val="74120576"/>
         <c:crosses val="autoZero"/>
         <c:auto val="1"/>
         <c:lblAlgn val="ctr"/>
@@ -397,7 +397,7 @@
         <c:noMultiLvlLbl val="0"/>
       </c:catAx>
       <c:valAx>
-        <c:axId val="88862080"/>
+        <c:axId val="74120576"/>
         <c:scaling>
           <c:orientation val="minMax"/>
         </c:scaling>
@@ -408,7 +408,7 @@
         <c:majorTickMark val="out"/>
         <c:minorTickMark val="none"/>
         <c:tickLblPos val="nextTo"/>
-        <c:crossAx val="88860544"/>
+        <c:crossAx val="74119040"/>
         <c:crosses val="autoZero"/>
         <c:crossBetween val="between"/>
       </c:valAx>
@@ -500,6 +500,21 @@
           </c:spPr>
           <c:invertIfNegative val="0"/>
           <c:dLbls>
+            <c:dLbl>
+              <c:idx val="0"/>
+              <c:layout>
+                <c:manualLayout>
+                  <c:x val="3.85807826908122E-2"/>
+                  <c:y val="-5.0391226371672988E-2"/>
+                </c:manualLayout>
+              </c:layout>
+              <c:showLegendKey val="0"/>
+              <c:showVal val="1"/>
+              <c:showCatName val="0"/>
+              <c:showSerName val="0"/>
+              <c:showPercent val="0"/>
+              <c:showBubbleSize val="0"/>
+            </c:dLbl>
             <c:txPr>
               <a:bodyPr/>
               <a:lstStyle/>
@@ -547,6 +562,21 @@
           </c:tx>
           <c:invertIfNegative val="0"/>
           <c:dLbls>
+            <c:dLbl>
+              <c:idx val="0"/>
+              <c:layout>
+                <c:manualLayout>
+                  <c:x val="4.4092323075213866E-2"/>
+                  <c:y val="-1.8896709889377371E-2"/>
+                </c:manualLayout>
+              </c:layout>
+              <c:showLegendKey val="0"/>
+              <c:showVal val="1"/>
+              <c:showCatName val="0"/>
+              <c:showSerName val="0"/>
+              <c:showPercent val="0"/>
+              <c:showBubbleSize val="0"/>
+            </c:dLbl>
             <c:txPr>
               <a:bodyPr/>
               <a:lstStyle/>
@@ -596,12 +626,12 @@
         </c:dLbls>
         <c:gapWidth val="150"/>
         <c:shape val="box"/>
-        <c:axId val="79571968"/>
-        <c:axId val="79578240"/>
+        <c:axId val="74582272"/>
+        <c:axId val="74588160"/>
         <c:axId val="0"/>
       </c:bar3DChart>
       <c:catAx>
-        <c:axId val="79571968"/>
+        <c:axId val="74582272"/>
         <c:scaling>
           <c:orientation val="minMax"/>
         </c:scaling>
@@ -610,7 +640,7 @@
         <c:majorTickMark val="out"/>
         <c:minorTickMark val="none"/>
         <c:tickLblPos val="nextTo"/>
-        <c:crossAx val="79578240"/>
+        <c:crossAx val="74588160"/>
         <c:crosses val="autoZero"/>
         <c:auto val="1"/>
         <c:lblAlgn val="ctr"/>
@@ -618,7 +648,7 @@
         <c:noMultiLvlLbl val="0"/>
       </c:catAx>
       <c:valAx>
-        <c:axId val="79578240"/>
+        <c:axId val="74588160"/>
         <c:scaling>
           <c:orientation val="minMax"/>
         </c:scaling>
@@ -629,7 +659,7 @@
         <c:majorTickMark val="out"/>
         <c:minorTickMark val="none"/>
         <c:tickLblPos val="nextTo"/>
-        <c:crossAx val="79571968"/>
+        <c:crossAx val="74582272"/>
         <c:crosses val="autoZero"/>
         <c:crossBetween val="between"/>
         <c:majorUnit val="100"/>
@@ -765,7 +795,7 @@
             <a:fld id="{6B71E980-16C9-4DBF-B0BF-5D16F9726465}" type="datetimeFigureOut">
               <a:rPr lang="it-IT" smtClean="0"/>
               <a:pPr/>
-              <a:t>06/02/2012</a:t>
+              <a:t>07/02/2012</a:t>
             </a:fld>
             <a:endParaRPr lang="it-IT"/>
           </a:p>
@@ -14863,11 +14893,7 @@
           <a:p>
             <a:r>
               <a:rPr lang="it-IT" sz="2800" dirty="0" smtClean="0"/>
-              <a:t>A.A. 2011/2012 – </a:t>
-            </a:r>
-            <a:r>
-              <a:rPr lang="it-IT" sz="2800" dirty="0" smtClean="0"/>
-              <a:t>2012/02/07</a:t>
+              <a:t>A.A. 2011/2012 – 2012/02/07</a:t>
             </a:r>
             <a:endParaRPr lang="it-IT" sz="2800" dirty="0"/>
           </a:p>
@@ -15711,22 +15737,28 @@
       </p:sp>
       <p:pic>
         <p:nvPicPr>
-          <p:cNvPr id="7" name="Immagine 6" descr="attivita_generale.png"/>
+          <p:cNvPr id="2" name="Immagine 1"/>
           <p:cNvPicPr>
             <a:picLocks noChangeAspect="1"/>
           </p:cNvPicPr>
           <p:nvPr/>
         </p:nvPicPr>
         <p:blipFill>
-          <a:blip r:embed="rId2" cstate="print"/>
+          <a:blip r:embed="rId2">
+            <a:extLst>
+              <a:ext uri="{28A0092B-C50C-407E-A947-70E740481C1C}">
+                <a14:useLocalDpi xmlns:a14="http://schemas.microsoft.com/office/drawing/2010/main" val="0"/>
+              </a:ext>
+            </a:extLst>
+          </a:blip>
           <a:stretch>
             <a:fillRect/>
           </a:stretch>
         </p:blipFill>
         <p:spPr>
           <a:xfrm>
-            <a:off x="971600" y="1772816"/>
-            <a:ext cx="7439867" cy="2952328"/>
+            <a:off x="899592" y="1718072"/>
+            <a:ext cx="7488832" cy="2971759"/>
           </a:xfrm>
           <a:prstGeom prst="rect">
             <a:avLst/>
@@ -17277,7 +17309,7 @@
           <p:nvPr>
             <p:extLst>
               <p:ext uri="{D42A27DB-BD31-4B8C-83A1-F6EECF244321}">
-                <p14:modId xmlns:p14="http://schemas.microsoft.com/office/powerpoint/2010/main" val="1241911467"/>
+                <p14:modId xmlns:p14="http://schemas.microsoft.com/office/powerpoint/2010/main" val="409499605"/>
               </p:ext>
             </p:extLst>
           </p:nvPr>

</xml_diff>